<commit_message>
Added third example with queryfirst method with additional execution time measuring
</commit_message>
<xml_diff>
--- a/Files/Szkolenie warsztatowe Dapper.pptx
+++ b/Files/Szkolenie warsztatowe Dapper.pptx
@@ -21,7 +21,8 @@
     <p:sldId id="269" r:id="rId15"/>
     <p:sldId id="270" r:id="rId16"/>
     <p:sldId id="271" r:id="rId17"/>
-    <p:sldId id="257" r:id="rId18"/>
+    <p:sldId id="273" r:id="rId18"/>
+    <p:sldId id="257" r:id="rId19"/>
   </p:sldIdLst>
   <p:sldSz cx="9144000" cy="6858000" type="screen4x3"/>
   <p:notesSz cx="6858000" cy="9144000"/>
@@ -122,7 +123,7 @@
   </p:defaultTextStyle>
   <p:extLst>
     <p:ext uri="{EFAFB233-063F-42B5-8137-9DF3F51BA10A}">
-      <p15:sldGuideLst xmlns:p15="http://schemas.microsoft.com/office/powerpoint/2012/main">
+      <p15:sldGuideLst xmlns:p15="http://schemas.microsoft.com/office/powerpoint/2012/main" xmlns="">
         <p15:guide id="1" orient="horz" pos="2160">
           <p15:clr>
             <a:srgbClr val="A4A3A4"/>
@@ -756,7 +757,7 @@
           <a:p>
             <a:fld id="{16640E76-C82D-4E8C-B2F3-167F39B211B3}" type="datetimeFigureOut">
               <a:rPr lang="pl-PL" smtClean="0"/>
-              <a:t>31.10.2017</a:t>
+              <a:t>01.11.2017</a:t>
             </a:fld>
             <a:endParaRPr lang="pl-PL"/>
           </a:p>
@@ -949,7 +950,7 @@
           <a:p>
             <a:fld id="{16640E76-C82D-4E8C-B2F3-167F39B211B3}" type="datetimeFigureOut">
               <a:rPr lang="pl-PL" smtClean="0"/>
-              <a:t>31.10.2017</a:t>
+              <a:t>01.11.2017</a:t>
             </a:fld>
             <a:endParaRPr lang="pl-PL"/>
           </a:p>
@@ -1127,7 +1128,7 @@
           <a:p>
             <a:fld id="{16640E76-C82D-4E8C-B2F3-167F39B211B3}" type="datetimeFigureOut">
               <a:rPr lang="pl-PL" smtClean="0"/>
-              <a:t>31.10.2017</a:t>
+              <a:t>01.11.2017</a:t>
             </a:fld>
             <a:endParaRPr lang="pl-PL"/>
           </a:p>
@@ -1272,7 +1273,7 @@
           <a:p>
             <a:fld id="{16640E76-C82D-4E8C-B2F3-167F39B211B3}" type="datetimeFigureOut">
               <a:rPr lang="pl-PL" smtClean="0"/>
-              <a:t>31.10.2017</a:t>
+              <a:t>01.11.2017</a:t>
             </a:fld>
             <a:endParaRPr lang="pl-PL"/>
           </a:p>
@@ -1522,7 +1523,7 @@
           <a:p>
             <a:fld id="{16640E76-C82D-4E8C-B2F3-167F39B211B3}" type="datetimeFigureOut">
               <a:rPr lang="pl-PL" smtClean="0"/>
-              <a:t>31.10.2017</a:t>
+              <a:t>01.11.2017</a:t>
             </a:fld>
             <a:endParaRPr lang="pl-PL"/>
           </a:p>
@@ -1924,7 +1925,7 @@
           <a:p>
             <a:fld id="{16640E76-C82D-4E8C-B2F3-167F39B211B3}" type="datetimeFigureOut">
               <a:rPr lang="pl-PL" smtClean="0"/>
-              <a:t>31.10.2017</a:t>
+              <a:t>01.11.2017</a:t>
             </a:fld>
             <a:endParaRPr lang="pl-PL"/>
           </a:p>
@@ -2365,7 +2366,7 @@
           <a:p>
             <a:fld id="{16640E76-C82D-4E8C-B2F3-167F39B211B3}" type="datetimeFigureOut">
               <a:rPr lang="pl-PL" smtClean="0"/>
-              <a:t>31.10.2017</a:t>
+              <a:t>01.11.2017</a:t>
             </a:fld>
             <a:endParaRPr lang="pl-PL"/>
           </a:p>
@@ -2463,7 +2464,7 @@
           <a:p>
             <a:fld id="{16640E76-C82D-4E8C-B2F3-167F39B211B3}" type="datetimeFigureOut">
               <a:rPr lang="pl-PL" smtClean="0"/>
-              <a:t>31.10.2017</a:t>
+              <a:t>01.11.2017</a:t>
             </a:fld>
             <a:endParaRPr lang="pl-PL"/>
           </a:p>
@@ -2579,7 +2580,7 @@
           <a:p>
             <a:fld id="{16640E76-C82D-4E8C-B2F3-167F39B211B3}" type="datetimeFigureOut">
               <a:rPr lang="pl-PL" smtClean="0"/>
-              <a:t>31.10.2017</a:t>
+              <a:t>01.11.2017</a:t>
             </a:fld>
             <a:endParaRPr lang="pl-PL"/>
           </a:p>
@@ -2850,7 +2851,7 @@
           <a:p>
             <a:fld id="{16640E76-C82D-4E8C-B2F3-167F39B211B3}" type="datetimeFigureOut">
               <a:rPr lang="pl-PL" smtClean="0"/>
-              <a:t>31.10.2017</a:t>
+              <a:t>01.11.2017</a:t>
             </a:fld>
             <a:endParaRPr lang="pl-PL"/>
           </a:p>
@@ -3054,7 +3055,7 @@
           <a:p>
             <a:fld id="{16640E76-C82D-4E8C-B2F3-167F39B211B3}" type="datetimeFigureOut">
               <a:rPr lang="pl-PL" smtClean="0"/>
-              <a:t>31.10.2017</a:t>
+              <a:t>01.11.2017</a:t>
             </a:fld>
             <a:endParaRPr lang="pl-PL"/>
           </a:p>
@@ -4146,7 +4147,7 @@
           <a:p>
             <a:fld id="{16640E76-C82D-4E8C-B2F3-167F39B211B3}" type="datetimeFigureOut">
               <a:rPr lang="pl-PL" smtClean="0"/>
-              <a:t>31.10.2017</a:t>
+              <a:t>01.11.2017</a:t>
             </a:fld>
             <a:endParaRPr lang="pl-PL"/>
           </a:p>
@@ -6725,6 +6726,145 @@
       </p:grpSpPr>
       <p:sp>
         <p:nvSpPr>
+          <p:cNvPr id="2" name="Symbol zastępczy zawartości 1"/>
+          <p:cNvSpPr>
+            <a:spLocks noGrp="1"/>
+          </p:cNvSpPr>
+          <p:nvPr>
+            <p:ph idx="1"/>
+          </p:nvPr>
+        </p:nvSpPr>
+        <p:spPr/>
+        <p:txBody>
+          <a:bodyPr/>
+          <a:lstStyle/>
+          <a:p>
+            <a:r>
+              <a:rPr lang="pl-PL" dirty="0" smtClean="0"/>
+              <a:t>Zwraca pierwszy wynik zapytania w postaci obiektu (silnie typowany lub anonimowy)</a:t>
+            </a:r>
+          </a:p>
+          <a:p>
+            <a:r>
+              <a:rPr lang="pl-PL" dirty="0" smtClean="0"/>
+              <a:t>Jeśli zapytanie nie zwróci nic </a:t>
+            </a:r>
+            <a:r>
+              <a:rPr lang="pl-PL" dirty="0" err="1" smtClean="0"/>
+              <a:t>QueryFirst</a:t>
+            </a:r>
+            <a:r>
+              <a:rPr lang="pl-PL" dirty="0" smtClean="0"/>
+              <a:t> zwróci </a:t>
+            </a:r>
+            <a:r>
+              <a:rPr lang="pl-PL" dirty="0" err="1" smtClean="0"/>
+              <a:t>exception</a:t>
+            </a:r>
+            <a:endParaRPr lang="pl-PL" dirty="0" smtClean="0"/>
+          </a:p>
+          <a:p>
+            <a:r>
+              <a:rPr lang="pl-PL" dirty="0" smtClean="0"/>
+              <a:t>Przyjmowane parametry identycznie jak w przypadku Query</a:t>
+            </a:r>
+          </a:p>
+          <a:p>
+            <a:r>
+              <a:rPr lang="pl-PL" dirty="0" smtClean="0"/>
+              <a:t>Różnica względem rozszerzenia LINQ Query(…).</a:t>
+            </a:r>
+            <a:r>
+              <a:rPr lang="pl-PL" dirty="0" err="1" smtClean="0"/>
+              <a:t>FirstOrDefault</a:t>
+            </a:r>
+            <a:r>
+              <a:rPr lang="pl-PL" dirty="0" smtClean="0"/>
+              <a:t>()? </a:t>
+            </a:r>
+            <a:r>
+              <a:rPr lang="pl-PL" smtClean="0"/>
+              <a:t>Czas wykonania?</a:t>
+            </a:r>
+            <a:endParaRPr lang="pl-PL" dirty="0" smtClean="0"/>
+          </a:p>
+          <a:p>
+            <a:endParaRPr lang="pl-PL" dirty="0"/>
+          </a:p>
+        </p:txBody>
+      </p:sp>
+      <p:sp>
+        <p:nvSpPr>
+          <p:cNvPr id="3" name="Tytuł 2"/>
+          <p:cNvSpPr>
+            <a:spLocks noGrp="1"/>
+          </p:cNvSpPr>
+          <p:nvPr>
+            <p:ph type="title"/>
+          </p:nvPr>
+        </p:nvSpPr>
+        <p:spPr/>
+        <p:txBody>
+          <a:bodyPr>
+            <a:normAutofit fontScale="90000"/>
+          </a:bodyPr>
+          <a:lstStyle/>
+          <a:p>
+            <a:r>
+              <a:rPr lang="pl-PL" dirty="0" smtClean="0"/>
+              <a:t>Metoda rozszerzająca interfejsu </a:t>
+            </a:r>
+            <a:r>
+              <a:rPr lang="pl-PL" dirty="0" err="1" smtClean="0"/>
+              <a:t>IDbConnection</a:t>
+            </a:r>
+            <a:r>
+              <a:rPr lang="pl-PL" dirty="0" smtClean="0"/>
+              <a:t> - </a:t>
+            </a:r>
+            <a:r>
+              <a:rPr lang="pl-PL" dirty="0" err="1" smtClean="0"/>
+              <a:t>QueryFirst</a:t>
+            </a:r>
+            <a:endParaRPr lang="pl-PL" dirty="0"/>
+          </a:p>
+        </p:txBody>
+      </p:sp>
+    </p:spTree>
+    <p:extLst>
+      <p:ext uri="{BB962C8B-B14F-4D97-AF65-F5344CB8AC3E}">
+        <p14:creationId xmlns:p14="http://schemas.microsoft.com/office/powerpoint/2010/main" val="2415761317"/>
+      </p:ext>
+    </p:extLst>
+  </p:cSld>
+  <p:clrMapOvr>
+    <a:masterClrMapping/>
+  </p:clrMapOvr>
+  <p:transition spd="slow">
+    <p:push dir="u"/>
+  </p:transition>
+</p:sld>
+</file>
+
+<file path=ppt/slides/slide18.xml><?xml version="1.0" encoding="utf-8"?>
+<p:sld xmlns:a="http://schemas.openxmlformats.org/drawingml/2006/main" xmlns:r="http://schemas.openxmlformats.org/officeDocument/2006/relationships" xmlns:p="http://schemas.openxmlformats.org/presentationml/2006/main">
+  <p:cSld>
+    <p:spTree>
+      <p:nvGrpSpPr>
+        <p:cNvPr id="1" name=""/>
+        <p:cNvGrpSpPr/>
+        <p:nvPr/>
+      </p:nvGrpSpPr>
+      <p:grpSpPr>
+        <a:xfrm>
+          <a:off x="0" y="0"/>
+          <a:ext cx="0" cy="0"/>
+          <a:chOff x="0" y="0"/>
+          <a:chExt cx="0" cy="0"/>
+        </a:xfrm>
+      </p:grpSpPr>
+      <p:sp>
+        <p:nvSpPr>
           <p:cNvPr id="3" name="Symbol zastępczy zawartości 2"/>
           <p:cNvSpPr>
             <a:spLocks noGrp="1"/>

</xml_diff>

<commit_message>
added second question to quiz
</commit_message>
<xml_diff>
--- a/Files/Szkolenie warsztatowe Dapper.pptx
+++ b/Files/Szkolenie warsztatowe Dapper.pptx
@@ -123,7 +123,7 @@
   </p:defaultTextStyle>
   <p:extLst>
     <p:ext uri="{EFAFB233-063F-42B5-8137-9DF3F51BA10A}">
-      <p15:sldGuideLst xmlns:p15="http://schemas.microsoft.com/office/powerpoint/2012/main" xmlns="">
+      <p15:sldGuideLst xmlns="" xmlns:p15="http://schemas.microsoft.com/office/powerpoint/2012/main">
         <p15:guide id="1" orient="horz" pos="2160">
           <p15:clr>
             <a:srgbClr val="A4A3A4"/>
@@ -757,7 +757,7 @@
           <a:p>
             <a:fld id="{16640E76-C82D-4E8C-B2F3-167F39B211B3}" type="datetimeFigureOut">
               <a:rPr lang="pl-PL" smtClean="0"/>
-              <a:t>01.11.2017</a:t>
+              <a:t>04.11.2017</a:t>
             </a:fld>
             <a:endParaRPr lang="pl-PL"/>
           </a:p>
@@ -950,7 +950,7 @@
           <a:p>
             <a:fld id="{16640E76-C82D-4E8C-B2F3-167F39B211B3}" type="datetimeFigureOut">
               <a:rPr lang="pl-PL" smtClean="0"/>
-              <a:t>01.11.2017</a:t>
+              <a:t>04.11.2017</a:t>
             </a:fld>
             <a:endParaRPr lang="pl-PL"/>
           </a:p>
@@ -1128,7 +1128,7 @@
           <a:p>
             <a:fld id="{16640E76-C82D-4E8C-B2F3-167F39B211B3}" type="datetimeFigureOut">
               <a:rPr lang="pl-PL" smtClean="0"/>
-              <a:t>01.11.2017</a:t>
+              <a:t>04.11.2017</a:t>
             </a:fld>
             <a:endParaRPr lang="pl-PL"/>
           </a:p>
@@ -1273,7 +1273,7 @@
           <a:p>
             <a:fld id="{16640E76-C82D-4E8C-B2F3-167F39B211B3}" type="datetimeFigureOut">
               <a:rPr lang="pl-PL" smtClean="0"/>
-              <a:t>01.11.2017</a:t>
+              <a:t>04.11.2017</a:t>
             </a:fld>
             <a:endParaRPr lang="pl-PL"/>
           </a:p>
@@ -1523,7 +1523,7 @@
           <a:p>
             <a:fld id="{16640E76-C82D-4E8C-B2F3-167F39B211B3}" type="datetimeFigureOut">
               <a:rPr lang="pl-PL" smtClean="0"/>
-              <a:t>01.11.2017</a:t>
+              <a:t>04.11.2017</a:t>
             </a:fld>
             <a:endParaRPr lang="pl-PL"/>
           </a:p>
@@ -1925,7 +1925,7 @@
           <a:p>
             <a:fld id="{16640E76-C82D-4E8C-B2F3-167F39B211B3}" type="datetimeFigureOut">
               <a:rPr lang="pl-PL" smtClean="0"/>
-              <a:t>01.11.2017</a:t>
+              <a:t>04.11.2017</a:t>
             </a:fld>
             <a:endParaRPr lang="pl-PL"/>
           </a:p>
@@ -2366,7 +2366,7 @@
           <a:p>
             <a:fld id="{16640E76-C82D-4E8C-B2F3-167F39B211B3}" type="datetimeFigureOut">
               <a:rPr lang="pl-PL" smtClean="0"/>
-              <a:t>01.11.2017</a:t>
+              <a:t>04.11.2017</a:t>
             </a:fld>
             <a:endParaRPr lang="pl-PL"/>
           </a:p>
@@ -2464,7 +2464,7 @@
           <a:p>
             <a:fld id="{16640E76-C82D-4E8C-B2F3-167F39B211B3}" type="datetimeFigureOut">
               <a:rPr lang="pl-PL" smtClean="0"/>
-              <a:t>01.11.2017</a:t>
+              <a:t>04.11.2017</a:t>
             </a:fld>
             <a:endParaRPr lang="pl-PL"/>
           </a:p>
@@ -2580,7 +2580,7 @@
           <a:p>
             <a:fld id="{16640E76-C82D-4E8C-B2F3-167F39B211B3}" type="datetimeFigureOut">
               <a:rPr lang="pl-PL" smtClean="0"/>
-              <a:t>01.11.2017</a:t>
+              <a:t>04.11.2017</a:t>
             </a:fld>
             <a:endParaRPr lang="pl-PL"/>
           </a:p>
@@ -2851,7 +2851,7 @@
           <a:p>
             <a:fld id="{16640E76-C82D-4E8C-B2F3-167F39B211B3}" type="datetimeFigureOut">
               <a:rPr lang="pl-PL" smtClean="0"/>
-              <a:t>01.11.2017</a:t>
+              <a:t>04.11.2017</a:t>
             </a:fld>
             <a:endParaRPr lang="pl-PL"/>
           </a:p>
@@ -3055,7 +3055,7 @@
           <a:p>
             <a:fld id="{16640E76-C82D-4E8C-B2F3-167F39B211B3}" type="datetimeFigureOut">
               <a:rPr lang="pl-PL" smtClean="0"/>
-              <a:t>01.11.2017</a:t>
+              <a:t>04.11.2017</a:t>
             </a:fld>
             <a:endParaRPr lang="pl-PL"/>
           </a:p>
@@ -4147,7 +4147,7 @@
           <a:p>
             <a:fld id="{16640E76-C82D-4E8C-B2F3-167F39B211B3}" type="datetimeFigureOut">
               <a:rPr lang="pl-PL" smtClean="0"/>
-              <a:t>01.11.2017</a:t>
+              <a:t>04.11.2017</a:t>
             </a:fld>
             <a:endParaRPr lang="pl-PL"/>
           </a:p>
@@ -6700,7 +6700,957 @@
   <p:timing>
     <p:tnLst>
       <p:par>
-        <p:cTn id="1" dur="indefinite" restart="never" nodeType="tmRoot"/>
+        <p:cTn id="1" dur="indefinite" restart="never" nodeType="tmRoot">
+          <p:childTnLst>
+            <p:seq concurrent="1" nextAc="seek">
+              <p:cTn id="2" dur="indefinite" nodeType="mainSeq">
+                <p:childTnLst>
+                  <p:par>
+                    <p:cTn id="3" fill="hold">
+                      <p:stCondLst>
+                        <p:cond delay="indefinite"/>
+                      </p:stCondLst>
+                      <p:childTnLst>
+                        <p:par>
+                          <p:cTn id="4" fill="hold">
+                            <p:stCondLst>
+                              <p:cond delay="0"/>
+                            </p:stCondLst>
+                            <p:childTnLst>
+                              <p:par>
+                                <p:cTn id="5" presetID="2" presetClass="entr" presetSubtype="4" fill="hold" nodeType="clickEffect">
+                                  <p:stCondLst>
+                                    <p:cond delay="0"/>
+                                  </p:stCondLst>
+                                  <p:childTnLst>
+                                    <p:set>
+                                      <p:cBhvr>
+                                        <p:cTn id="6" dur="1" fill="hold">
+                                          <p:stCondLst>
+                                            <p:cond delay="0"/>
+                                          </p:stCondLst>
+                                        </p:cTn>
+                                        <p:tgtEl>
+                                          <p:spTgt spid="2">
+                                            <p:txEl>
+                                              <p:pRg st="0" end="0"/>
+                                            </p:txEl>
+                                          </p:spTgt>
+                                        </p:tgtEl>
+                                        <p:attrNameLst>
+                                          <p:attrName>style.visibility</p:attrName>
+                                        </p:attrNameLst>
+                                      </p:cBhvr>
+                                      <p:to>
+                                        <p:strVal val="visible"/>
+                                      </p:to>
+                                    </p:set>
+                                    <p:anim calcmode="lin" valueType="num">
+                                      <p:cBhvr additive="base">
+                                        <p:cTn id="7" dur="500" fill="hold"/>
+                                        <p:tgtEl>
+                                          <p:spTgt spid="2">
+                                            <p:txEl>
+                                              <p:pRg st="0" end="0"/>
+                                            </p:txEl>
+                                          </p:spTgt>
+                                        </p:tgtEl>
+                                        <p:attrNameLst>
+                                          <p:attrName>ppt_x</p:attrName>
+                                        </p:attrNameLst>
+                                      </p:cBhvr>
+                                      <p:tavLst>
+                                        <p:tav tm="0">
+                                          <p:val>
+                                            <p:strVal val="#ppt_x"/>
+                                          </p:val>
+                                        </p:tav>
+                                        <p:tav tm="100000">
+                                          <p:val>
+                                            <p:strVal val="#ppt_x"/>
+                                          </p:val>
+                                        </p:tav>
+                                      </p:tavLst>
+                                    </p:anim>
+                                    <p:anim calcmode="lin" valueType="num">
+                                      <p:cBhvr additive="base">
+                                        <p:cTn id="8" dur="500" fill="hold"/>
+                                        <p:tgtEl>
+                                          <p:spTgt spid="2">
+                                            <p:txEl>
+                                              <p:pRg st="0" end="0"/>
+                                            </p:txEl>
+                                          </p:spTgt>
+                                        </p:tgtEl>
+                                        <p:attrNameLst>
+                                          <p:attrName>ppt_y</p:attrName>
+                                        </p:attrNameLst>
+                                      </p:cBhvr>
+                                      <p:tavLst>
+                                        <p:tav tm="0">
+                                          <p:val>
+                                            <p:strVal val="1+#ppt_h/2"/>
+                                          </p:val>
+                                        </p:tav>
+                                        <p:tav tm="100000">
+                                          <p:val>
+                                            <p:strVal val="#ppt_y"/>
+                                          </p:val>
+                                        </p:tav>
+                                      </p:tavLst>
+                                    </p:anim>
+                                  </p:childTnLst>
+                                </p:cTn>
+                              </p:par>
+                            </p:childTnLst>
+                          </p:cTn>
+                        </p:par>
+                      </p:childTnLst>
+                    </p:cTn>
+                  </p:par>
+                  <p:par>
+                    <p:cTn id="9" fill="hold">
+                      <p:stCondLst>
+                        <p:cond delay="indefinite"/>
+                      </p:stCondLst>
+                      <p:childTnLst>
+                        <p:par>
+                          <p:cTn id="10" fill="hold">
+                            <p:stCondLst>
+                              <p:cond delay="0"/>
+                            </p:stCondLst>
+                            <p:childTnLst>
+                              <p:par>
+                                <p:cTn id="11" presetID="2" presetClass="entr" presetSubtype="4" fill="hold" nodeType="clickEffect">
+                                  <p:stCondLst>
+                                    <p:cond delay="0"/>
+                                  </p:stCondLst>
+                                  <p:childTnLst>
+                                    <p:set>
+                                      <p:cBhvr>
+                                        <p:cTn id="12" dur="1" fill="hold">
+                                          <p:stCondLst>
+                                            <p:cond delay="0"/>
+                                          </p:stCondLst>
+                                        </p:cTn>
+                                        <p:tgtEl>
+                                          <p:spTgt spid="2">
+                                            <p:txEl>
+                                              <p:pRg st="1" end="1"/>
+                                            </p:txEl>
+                                          </p:spTgt>
+                                        </p:tgtEl>
+                                        <p:attrNameLst>
+                                          <p:attrName>style.visibility</p:attrName>
+                                        </p:attrNameLst>
+                                      </p:cBhvr>
+                                      <p:to>
+                                        <p:strVal val="visible"/>
+                                      </p:to>
+                                    </p:set>
+                                    <p:anim calcmode="lin" valueType="num">
+                                      <p:cBhvr additive="base">
+                                        <p:cTn id="13" dur="500" fill="hold"/>
+                                        <p:tgtEl>
+                                          <p:spTgt spid="2">
+                                            <p:txEl>
+                                              <p:pRg st="1" end="1"/>
+                                            </p:txEl>
+                                          </p:spTgt>
+                                        </p:tgtEl>
+                                        <p:attrNameLst>
+                                          <p:attrName>ppt_x</p:attrName>
+                                        </p:attrNameLst>
+                                      </p:cBhvr>
+                                      <p:tavLst>
+                                        <p:tav tm="0">
+                                          <p:val>
+                                            <p:strVal val="#ppt_x"/>
+                                          </p:val>
+                                        </p:tav>
+                                        <p:tav tm="100000">
+                                          <p:val>
+                                            <p:strVal val="#ppt_x"/>
+                                          </p:val>
+                                        </p:tav>
+                                      </p:tavLst>
+                                    </p:anim>
+                                    <p:anim calcmode="lin" valueType="num">
+                                      <p:cBhvr additive="base">
+                                        <p:cTn id="14" dur="500" fill="hold"/>
+                                        <p:tgtEl>
+                                          <p:spTgt spid="2">
+                                            <p:txEl>
+                                              <p:pRg st="1" end="1"/>
+                                            </p:txEl>
+                                          </p:spTgt>
+                                        </p:tgtEl>
+                                        <p:attrNameLst>
+                                          <p:attrName>ppt_y</p:attrName>
+                                        </p:attrNameLst>
+                                      </p:cBhvr>
+                                      <p:tavLst>
+                                        <p:tav tm="0">
+                                          <p:val>
+                                            <p:strVal val="1+#ppt_h/2"/>
+                                          </p:val>
+                                        </p:tav>
+                                        <p:tav tm="100000">
+                                          <p:val>
+                                            <p:strVal val="#ppt_y"/>
+                                          </p:val>
+                                        </p:tav>
+                                      </p:tavLst>
+                                    </p:anim>
+                                  </p:childTnLst>
+                                </p:cTn>
+                              </p:par>
+                            </p:childTnLst>
+                          </p:cTn>
+                        </p:par>
+                      </p:childTnLst>
+                    </p:cTn>
+                  </p:par>
+                  <p:par>
+                    <p:cTn id="15" fill="hold">
+                      <p:stCondLst>
+                        <p:cond delay="indefinite"/>
+                      </p:stCondLst>
+                      <p:childTnLst>
+                        <p:par>
+                          <p:cTn id="16" fill="hold">
+                            <p:stCondLst>
+                              <p:cond delay="0"/>
+                            </p:stCondLst>
+                            <p:childTnLst>
+                              <p:par>
+                                <p:cTn id="17" presetID="2" presetClass="entr" presetSubtype="4" fill="hold" nodeType="clickEffect">
+                                  <p:stCondLst>
+                                    <p:cond delay="0"/>
+                                  </p:stCondLst>
+                                  <p:childTnLst>
+                                    <p:set>
+                                      <p:cBhvr>
+                                        <p:cTn id="18" dur="1" fill="hold">
+                                          <p:stCondLst>
+                                            <p:cond delay="0"/>
+                                          </p:stCondLst>
+                                        </p:cTn>
+                                        <p:tgtEl>
+                                          <p:spTgt spid="2">
+                                            <p:txEl>
+                                              <p:pRg st="2" end="2"/>
+                                            </p:txEl>
+                                          </p:spTgt>
+                                        </p:tgtEl>
+                                        <p:attrNameLst>
+                                          <p:attrName>style.visibility</p:attrName>
+                                        </p:attrNameLst>
+                                      </p:cBhvr>
+                                      <p:to>
+                                        <p:strVal val="visible"/>
+                                      </p:to>
+                                    </p:set>
+                                    <p:anim calcmode="lin" valueType="num">
+                                      <p:cBhvr additive="base">
+                                        <p:cTn id="19" dur="500" fill="hold"/>
+                                        <p:tgtEl>
+                                          <p:spTgt spid="2">
+                                            <p:txEl>
+                                              <p:pRg st="2" end="2"/>
+                                            </p:txEl>
+                                          </p:spTgt>
+                                        </p:tgtEl>
+                                        <p:attrNameLst>
+                                          <p:attrName>ppt_x</p:attrName>
+                                        </p:attrNameLst>
+                                      </p:cBhvr>
+                                      <p:tavLst>
+                                        <p:tav tm="0">
+                                          <p:val>
+                                            <p:strVal val="#ppt_x"/>
+                                          </p:val>
+                                        </p:tav>
+                                        <p:tav tm="100000">
+                                          <p:val>
+                                            <p:strVal val="#ppt_x"/>
+                                          </p:val>
+                                        </p:tav>
+                                      </p:tavLst>
+                                    </p:anim>
+                                    <p:anim calcmode="lin" valueType="num">
+                                      <p:cBhvr additive="base">
+                                        <p:cTn id="20" dur="500" fill="hold"/>
+                                        <p:tgtEl>
+                                          <p:spTgt spid="2">
+                                            <p:txEl>
+                                              <p:pRg st="2" end="2"/>
+                                            </p:txEl>
+                                          </p:spTgt>
+                                        </p:tgtEl>
+                                        <p:attrNameLst>
+                                          <p:attrName>ppt_y</p:attrName>
+                                        </p:attrNameLst>
+                                      </p:cBhvr>
+                                      <p:tavLst>
+                                        <p:tav tm="0">
+                                          <p:val>
+                                            <p:strVal val="1+#ppt_h/2"/>
+                                          </p:val>
+                                        </p:tav>
+                                        <p:tav tm="100000">
+                                          <p:val>
+                                            <p:strVal val="#ppt_y"/>
+                                          </p:val>
+                                        </p:tav>
+                                      </p:tavLst>
+                                    </p:anim>
+                                  </p:childTnLst>
+                                </p:cTn>
+                              </p:par>
+                            </p:childTnLst>
+                          </p:cTn>
+                        </p:par>
+                      </p:childTnLst>
+                    </p:cTn>
+                  </p:par>
+                  <p:par>
+                    <p:cTn id="21" fill="hold">
+                      <p:stCondLst>
+                        <p:cond delay="indefinite"/>
+                      </p:stCondLst>
+                      <p:childTnLst>
+                        <p:par>
+                          <p:cTn id="22" fill="hold">
+                            <p:stCondLst>
+                              <p:cond delay="0"/>
+                            </p:stCondLst>
+                            <p:childTnLst>
+                              <p:par>
+                                <p:cTn id="23" presetID="2" presetClass="entr" presetSubtype="4" fill="hold" nodeType="clickEffect">
+                                  <p:stCondLst>
+                                    <p:cond delay="0"/>
+                                  </p:stCondLst>
+                                  <p:childTnLst>
+                                    <p:set>
+                                      <p:cBhvr>
+                                        <p:cTn id="24" dur="1" fill="hold">
+                                          <p:stCondLst>
+                                            <p:cond delay="0"/>
+                                          </p:stCondLst>
+                                        </p:cTn>
+                                        <p:tgtEl>
+                                          <p:spTgt spid="2">
+                                            <p:txEl>
+                                              <p:pRg st="3" end="3"/>
+                                            </p:txEl>
+                                          </p:spTgt>
+                                        </p:tgtEl>
+                                        <p:attrNameLst>
+                                          <p:attrName>style.visibility</p:attrName>
+                                        </p:attrNameLst>
+                                      </p:cBhvr>
+                                      <p:to>
+                                        <p:strVal val="visible"/>
+                                      </p:to>
+                                    </p:set>
+                                    <p:anim calcmode="lin" valueType="num">
+                                      <p:cBhvr additive="base">
+                                        <p:cTn id="25" dur="500" fill="hold"/>
+                                        <p:tgtEl>
+                                          <p:spTgt spid="2">
+                                            <p:txEl>
+                                              <p:pRg st="3" end="3"/>
+                                            </p:txEl>
+                                          </p:spTgt>
+                                        </p:tgtEl>
+                                        <p:attrNameLst>
+                                          <p:attrName>ppt_x</p:attrName>
+                                        </p:attrNameLst>
+                                      </p:cBhvr>
+                                      <p:tavLst>
+                                        <p:tav tm="0">
+                                          <p:val>
+                                            <p:strVal val="#ppt_x"/>
+                                          </p:val>
+                                        </p:tav>
+                                        <p:tav tm="100000">
+                                          <p:val>
+                                            <p:strVal val="#ppt_x"/>
+                                          </p:val>
+                                        </p:tav>
+                                      </p:tavLst>
+                                    </p:anim>
+                                    <p:anim calcmode="lin" valueType="num">
+                                      <p:cBhvr additive="base">
+                                        <p:cTn id="26" dur="500" fill="hold"/>
+                                        <p:tgtEl>
+                                          <p:spTgt spid="2">
+                                            <p:txEl>
+                                              <p:pRg st="3" end="3"/>
+                                            </p:txEl>
+                                          </p:spTgt>
+                                        </p:tgtEl>
+                                        <p:attrNameLst>
+                                          <p:attrName>ppt_y</p:attrName>
+                                        </p:attrNameLst>
+                                      </p:cBhvr>
+                                      <p:tavLst>
+                                        <p:tav tm="0">
+                                          <p:val>
+                                            <p:strVal val="1+#ppt_h/2"/>
+                                          </p:val>
+                                        </p:tav>
+                                        <p:tav tm="100000">
+                                          <p:val>
+                                            <p:strVal val="#ppt_y"/>
+                                          </p:val>
+                                        </p:tav>
+                                      </p:tavLst>
+                                    </p:anim>
+                                  </p:childTnLst>
+                                </p:cTn>
+                              </p:par>
+                            </p:childTnLst>
+                          </p:cTn>
+                        </p:par>
+                      </p:childTnLst>
+                    </p:cTn>
+                  </p:par>
+                  <p:par>
+                    <p:cTn id="27" fill="hold">
+                      <p:stCondLst>
+                        <p:cond delay="indefinite"/>
+                      </p:stCondLst>
+                      <p:childTnLst>
+                        <p:par>
+                          <p:cTn id="28" fill="hold">
+                            <p:stCondLst>
+                              <p:cond delay="0"/>
+                            </p:stCondLst>
+                            <p:childTnLst>
+                              <p:par>
+                                <p:cTn id="29" presetID="2" presetClass="entr" presetSubtype="4" fill="hold" nodeType="clickEffect">
+                                  <p:stCondLst>
+                                    <p:cond delay="0"/>
+                                  </p:stCondLst>
+                                  <p:childTnLst>
+                                    <p:set>
+                                      <p:cBhvr>
+                                        <p:cTn id="30" dur="1" fill="hold">
+                                          <p:stCondLst>
+                                            <p:cond delay="0"/>
+                                          </p:stCondLst>
+                                        </p:cTn>
+                                        <p:tgtEl>
+                                          <p:spTgt spid="2">
+                                            <p:txEl>
+                                              <p:pRg st="4" end="4"/>
+                                            </p:txEl>
+                                          </p:spTgt>
+                                        </p:tgtEl>
+                                        <p:attrNameLst>
+                                          <p:attrName>style.visibility</p:attrName>
+                                        </p:attrNameLst>
+                                      </p:cBhvr>
+                                      <p:to>
+                                        <p:strVal val="visible"/>
+                                      </p:to>
+                                    </p:set>
+                                    <p:anim calcmode="lin" valueType="num">
+                                      <p:cBhvr additive="base">
+                                        <p:cTn id="31" dur="500" fill="hold"/>
+                                        <p:tgtEl>
+                                          <p:spTgt spid="2">
+                                            <p:txEl>
+                                              <p:pRg st="4" end="4"/>
+                                            </p:txEl>
+                                          </p:spTgt>
+                                        </p:tgtEl>
+                                        <p:attrNameLst>
+                                          <p:attrName>ppt_x</p:attrName>
+                                        </p:attrNameLst>
+                                      </p:cBhvr>
+                                      <p:tavLst>
+                                        <p:tav tm="0">
+                                          <p:val>
+                                            <p:strVal val="#ppt_x"/>
+                                          </p:val>
+                                        </p:tav>
+                                        <p:tav tm="100000">
+                                          <p:val>
+                                            <p:strVal val="#ppt_x"/>
+                                          </p:val>
+                                        </p:tav>
+                                      </p:tavLst>
+                                    </p:anim>
+                                    <p:anim calcmode="lin" valueType="num">
+                                      <p:cBhvr additive="base">
+                                        <p:cTn id="32" dur="500" fill="hold"/>
+                                        <p:tgtEl>
+                                          <p:spTgt spid="2">
+                                            <p:txEl>
+                                              <p:pRg st="4" end="4"/>
+                                            </p:txEl>
+                                          </p:spTgt>
+                                        </p:tgtEl>
+                                        <p:attrNameLst>
+                                          <p:attrName>ppt_y</p:attrName>
+                                        </p:attrNameLst>
+                                      </p:cBhvr>
+                                      <p:tavLst>
+                                        <p:tav tm="0">
+                                          <p:val>
+                                            <p:strVal val="1+#ppt_h/2"/>
+                                          </p:val>
+                                        </p:tav>
+                                        <p:tav tm="100000">
+                                          <p:val>
+                                            <p:strVal val="#ppt_y"/>
+                                          </p:val>
+                                        </p:tav>
+                                      </p:tavLst>
+                                    </p:anim>
+                                  </p:childTnLst>
+                                </p:cTn>
+                              </p:par>
+                            </p:childTnLst>
+                          </p:cTn>
+                        </p:par>
+                      </p:childTnLst>
+                    </p:cTn>
+                  </p:par>
+                  <p:par>
+                    <p:cTn id="33" fill="hold">
+                      <p:stCondLst>
+                        <p:cond delay="indefinite"/>
+                      </p:stCondLst>
+                      <p:childTnLst>
+                        <p:par>
+                          <p:cTn id="34" fill="hold">
+                            <p:stCondLst>
+                              <p:cond delay="0"/>
+                            </p:stCondLst>
+                            <p:childTnLst>
+                              <p:par>
+                                <p:cTn id="35" presetID="2" presetClass="entr" presetSubtype="4" fill="hold" nodeType="clickEffect">
+                                  <p:stCondLst>
+                                    <p:cond delay="0"/>
+                                  </p:stCondLst>
+                                  <p:childTnLst>
+                                    <p:set>
+                                      <p:cBhvr>
+                                        <p:cTn id="36" dur="1" fill="hold">
+                                          <p:stCondLst>
+                                            <p:cond delay="0"/>
+                                          </p:stCondLst>
+                                        </p:cTn>
+                                        <p:tgtEl>
+                                          <p:spTgt spid="2">
+                                            <p:txEl>
+                                              <p:pRg st="5" end="5"/>
+                                            </p:txEl>
+                                          </p:spTgt>
+                                        </p:tgtEl>
+                                        <p:attrNameLst>
+                                          <p:attrName>style.visibility</p:attrName>
+                                        </p:attrNameLst>
+                                      </p:cBhvr>
+                                      <p:to>
+                                        <p:strVal val="visible"/>
+                                      </p:to>
+                                    </p:set>
+                                    <p:anim calcmode="lin" valueType="num">
+                                      <p:cBhvr additive="base">
+                                        <p:cTn id="37" dur="500" fill="hold"/>
+                                        <p:tgtEl>
+                                          <p:spTgt spid="2">
+                                            <p:txEl>
+                                              <p:pRg st="5" end="5"/>
+                                            </p:txEl>
+                                          </p:spTgt>
+                                        </p:tgtEl>
+                                        <p:attrNameLst>
+                                          <p:attrName>ppt_x</p:attrName>
+                                        </p:attrNameLst>
+                                      </p:cBhvr>
+                                      <p:tavLst>
+                                        <p:tav tm="0">
+                                          <p:val>
+                                            <p:strVal val="#ppt_x"/>
+                                          </p:val>
+                                        </p:tav>
+                                        <p:tav tm="100000">
+                                          <p:val>
+                                            <p:strVal val="#ppt_x"/>
+                                          </p:val>
+                                        </p:tav>
+                                      </p:tavLst>
+                                    </p:anim>
+                                    <p:anim calcmode="lin" valueType="num">
+                                      <p:cBhvr additive="base">
+                                        <p:cTn id="38" dur="500" fill="hold"/>
+                                        <p:tgtEl>
+                                          <p:spTgt spid="2">
+                                            <p:txEl>
+                                              <p:pRg st="5" end="5"/>
+                                            </p:txEl>
+                                          </p:spTgt>
+                                        </p:tgtEl>
+                                        <p:attrNameLst>
+                                          <p:attrName>ppt_y</p:attrName>
+                                        </p:attrNameLst>
+                                      </p:cBhvr>
+                                      <p:tavLst>
+                                        <p:tav tm="0">
+                                          <p:val>
+                                            <p:strVal val="1+#ppt_h/2"/>
+                                          </p:val>
+                                        </p:tav>
+                                        <p:tav tm="100000">
+                                          <p:val>
+                                            <p:strVal val="#ppt_y"/>
+                                          </p:val>
+                                        </p:tav>
+                                      </p:tavLst>
+                                    </p:anim>
+                                  </p:childTnLst>
+                                </p:cTn>
+                              </p:par>
+                            </p:childTnLst>
+                          </p:cTn>
+                        </p:par>
+                      </p:childTnLst>
+                    </p:cTn>
+                  </p:par>
+                  <p:par>
+                    <p:cTn id="39" fill="hold">
+                      <p:stCondLst>
+                        <p:cond delay="indefinite"/>
+                      </p:stCondLst>
+                      <p:childTnLst>
+                        <p:par>
+                          <p:cTn id="40" fill="hold">
+                            <p:stCondLst>
+                              <p:cond delay="0"/>
+                            </p:stCondLst>
+                            <p:childTnLst>
+                              <p:par>
+                                <p:cTn id="41" presetID="2" presetClass="entr" presetSubtype="4" fill="hold" nodeType="clickEffect">
+                                  <p:stCondLst>
+                                    <p:cond delay="0"/>
+                                  </p:stCondLst>
+                                  <p:childTnLst>
+                                    <p:set>
+                                      <p:cBhvr>
+                                        <p:cTn id="42" dur="1" fill="hold">
+                                          <p:stCondLst>
+                                            <p:cond delay="0"/>
+                                          </p:stCondLst>
+                                        </p:cTn>
+                                        <p:tgtEl>
+                                          <p:spTgt spid="2">
+                                            <p:txEl>
+                                              <p:pRg st="6" end="6"/>
+                                            </p:txEl>
+                                          </p:spTgt>
+                                        </p:tgtEl>
+                                        <p:attrNameLst>
+                                          <p:attrName>style.visibility</p:attrName>
+                                        </p:attrNameLst>
+                                      </p:cBhvr>
+                                      <p:to>
+                                        <p:strVal val="visible"/>
+                                      </p:to>
+                                    </p:set>
+                                    <p:anim calcmode="lin" valueType="num">
+                                      <p:cBhvr additive="base">
+                                        <p:cTn id="43" dur="500" fill="hold"/>
+                                        <p:tgtEl>
+                                          <p:spTgt spid="2">
+                                            <p:txEl>
+                                              <p:pRg st="6" end="6"/>
+                                            </p:txEl>
+                                          </p:spTgt>
+                                        </p:tgtEl>
+                                        <p:attrNameLst>
+                                          <p:attrName>ppt_x</p:attrName>
+                                        </p:attrNameLst>
+                                      </p:cBhvr>
+                                      <p:tavLst>
+                                        <p:tav tm="0">
+                                          <p:val>
+                                            <p:strVal val="#ppt_x"/>
+                                          </p:val>
+                                        </p:tav>
+                                        <p:tav tm="100000">
+                                          <p:val>
+                                            <p:strVal val="#ppt_x"/>
+                                          </p:val>
+                                        </p:tav>
+                                      </p:tavLst>
+                                    </p:anim>
+                                    <p:anim calcmode="lin" valueType="num">
+                                      <p:cBhvr additive="base">
+                                        <p:cTn id="44" dur="500" fill="hold"/>
+                                        <p:tgtEl>
+                                          <p:spTgt spid="2">
+                                            <p:txEl>
+                                              <p:pRg st="6" end="6"/>
+                                            </p:txEl>
+                                          </p:spTgt>
+                                        </p:tgtEl>
+                                        <p:attrNameLst>
+                                          <p:attrName>ppt_y</p:attrName>
+                                        </p:attrNameLst>
+                                      </p:cBhvr>
+                                      <p:tavLst>
+                                        <p:tav tm="0">
+                                          <p:val>
+                                            <p:strVal val="1+#ppt_h/2"/>
+                                          </p:val>
+                                        </p:tav>
+                                        <p:tav tm="100000">
+                                          <p:val>
+                                            <p:strVal val="#ppt_y"/>
+                                          </p:val>
+                                        </p:tav>
+                                      </p:tavLst>
+                                    </p:anim>
+                                  </p:childTnLst>
+                                </p:cTn>
+                              </p:par>
+                            </p:childTnLst>
+                          </p:cTn>
+                        </p:par>
+                      </p:childTnLst>
+                    </p:cTn>
+                  </p:par>
+                  <p:par>
+                    <p:cTn id="45" fill="hold">
+                      <p:stCondLst>
+                        <p:cond delay="indefinite"/>
+                      </p:stCondLst>
+                      <p:childTnLst>
+                        <p:par>
+                          <p:cTn id="46" fill="hold">
+                            <p:stCondLst>
+                              <p:cond delay="0"/>
+                            </p:stCondLst>
+                            <p:childTnLst>
+                              <p:par>
+                                <p:cTn id="47" presetID="2" presetClass="entr" presetSubtype="4" fill="hold" nodeType="clickEffect">
+                                  <p:stCondLst>
+                                    <p:cond delay="0"/>
+                                  </p:stCondLst>
+                                  <p:childTnLst>
+                                    <p:set>
+                                      <p:cBhvr>
+                                        <p:cTn id="48" dur="1" fill="hold">
+                                          <p:stCondLst>
+                                            <p:cond delay="0"/>
+                                          </p:stCondLst>
+                                        </p:cTn>
+                                        <p:tgtEl>
+                                          <p:spTgt spid="2">
+                                            <p:txEl>
+                                              <p:pRg st="7" end="7"/>
+                                            </p:txEl>
+                                          </p:spTgt>
+                                        </p:tgtEl>
+                                        <p:attrNameLst>
+                                          <p:attrName>style.visibility</p:attrName>
+                                        </p:attrNameLst>
+                                      </p:cBhvr>
+                                      <p:to>
+                                        <p:strVal val="visible"/>
+                                      </p:to>
+                                    </p:set>
+                                    <p:anim calcmode="lin" valueType="num">
+                                      <p:cBhvr additive="base">
+                                        <p:cTn id="49" dur="500" fill="hold"/>
+                                        <p:tgtEl>
+                                          <p:spTgt spid="2">
+                                            <p:txEl>
+                                              <p:pRg st="7" end="7"/>
+                                            </p:txEl>
+                                          </p:spTgt>
+                                        </p:tgtEl>
+                                        <p:attrNameLst>
+                                          <p:attrName>ppt_x</p:attrName>
+                                        </p:attrNameLst>
+                                      </p:cBhvr>
+                                      <p:tavLst>
+                                        <p:tav tm="0">
+                                          <p:val>
+                                            <p:strVal val="#ppt_x"/>
+                                          </p:val>
+                                        </p:tav>
+                                        <p:tav tm="100000">
+                                          <p:val>
+                                            <p:strVal val="#ppt_x"/>
+                                          </p:val>
+                                        </p:tav>
+                                      </p:tavLst>
+                                    </p:anim>
+                                    <p:anim calcmode="lin" valueType="num">
+                                      <p:cBhvr additive="base">
+                                        <p:cTn id="50" dur="500" fill="hold"/>
+                                        <p:tgtEl>
+                                          <p:spTgt spid="2">
+                                            <p:txEl>
+                                              <p:pRg st="7" end="7"/>
+                                            </p:txEl>
+                                          </p:spTgt>
+                                        </p:tgtEl>
+                                        <p:attrNameLst>
+                                          <p:attrName>ppt_y</p:attrName>
+                                        </p:attrNameLst>
+                                      </p:cBhvr>
+                                      <p:tavLst>
+                                        <p:tav tm="0">
+                                          <p:val>
+                                            <p:strVal val="1+#ppt_h/2"/>
+                                          </p:val>
+                                        </p:tav>
+                                        <p:tav tm="100000">
+                                          <p:val>
+                                            <p:strVal val="#ppt_y"/>
+                                          </p:val>
+                                        </p:tav>
+                                      </p:tavLst>
+                                    </p:anim>
+                                  </p:childTnLst>
+                                </p:cTn>
+                              </p:par>
+                            </p:childTnLst>
+                          </p:cTn>
+                        </p:par>
+                      </p:childTnLst>
+                    </p:cTn>
+                  </p:par>
+                  <p:par>
+                    <p:cTn id="51" fill="hold">
+                      <p:stCondLst>
+                        <p:cond delay="indefinite"/>
+                      </p:stCondLst>
+                      <p:childTnLst>
+                        <p:par>
+                          <p:cTn id="52" fill="hold">
+                            <p:stCondLst>
+                              <p:cond delay="0"/>
+                            </p:stCondLst>
+                            <p:childTnLst>
+                              <p:par>
+                                <p:cTn id="53" presetID="2" presetClass="entr" presetSubtype="4" fill="hold" nodeType="clickEffect">
+                                  <p:stCondLst>
+                                    <p:cond delay="0"/>
+                                  </p:stCondLst>
+                                  <p:childTnLst>
+                                    <p:set>
+                                      <p:cBhvr>
+                                        <p:cTn id="54" dur="1" fill="hold">
+                                          <p:stCondLst>
+                                            <p:cond delay="0"/>
+                                          </p:stCondLst>
+                                        </p:cTn>
+                                        <p:tgtEl>
+                                          <p:spTgt spid="2">
+                                            <p:txEl>
+                                              <p:pRg st="8" end="8"/>
+                                            </p:txEl>
+                                          </p:spTgt>
+                                        </p:tgtEl>
+                                        <p:attrNameLst>
+                                          <p:attrName>style.visibility</p:attrName>
+                                        </p:attrNameLst>
+                                      </p:cBhvr>
+                                      <p:to>
+                                        <p:strVal val="visible"/>
+                                      </p:to>
+                                    </p:set>
+                                    <p:anim calcmode="lin" valueType="num">
+                                      <p:cBhvr additive="base">
+                                        <p:cTn id="55" dur="500" fill="hold"/>
+                                        <p:tgtEl>
+                                          <p:spTgt spid="2">
+                                            <p:txEl>
+                                              <p:pRg st="8" end="8"/>
+                                            </p:txEl>
+                                          </p:spTgt>
+                                        </p:tgtEl>
+                                        <p:attrNameLst>
+                                          <p:attrName>ppt_x</p:attrName>
+                                        </p:attrNameLst>
+                                      </p:cBhvr>
+                                      <p:tavLst>
+                                        <p:tav tm="0">
+                                          <p:val>
+                                            <p:strVal val="#ppt_x"/>
+                                          </p:val>
+                                        </p:tav>
+                                        <p:tav tm="100000">
+                                          <p:val>
+                                            <p:strVal val="#ppt_x"/>
+                                          </p:val>
+                                        </p:tav>
+                                      </p:tavLst>
+                                    </p:anim>
+                                    <p:anim calcmode="lin" valueType="num">
+                                      <p:cBhvr additive="base">
+                                        <p:cTn id="56" dur="500" fill="hold"/>
+                                        <p:tgtEl>
+                                          <p:spTgt spid="2">
+                                            <p:txEl>
+                                              <p:pRg st="8" end="8"/>
+                                            </p:txEl>
+                                          </p:spTgt>
+                                        </p:tgtEl>
+                                        <p:attrNameLst>
+                                          <p:attrName>ppt_y</p:attrName>
+                                        </p:attrNameLst>
+                                      </p:cBhvr>
+                                      <p:tavLst>
+                                        <p:tav tm="0">
+                                          <p:val>
+                                            <p:strVal val="1+#ppt_h/2"/>
+                                          </p:val>
+                                        </p:tav>
+                                        <p:tav tm="100000">
+                                          <p:val>
+                                            <p:strVal val="#ppt_y"/>
+                                          </p:val>
+                                        </p:tav>
+                                      </p:tavLst>
+                                    </p:anim>
+                                  </p:childTnLst>
+                                </p:cTn>
+                              </p:par>
+                            </p:childTnLst>
+                          </p:cTn>
+                        </p:par>
+                      </p:childTnLst>
+                    </p:cTn>
+                  </p:par>
+                </p:childTnLst>
+              </p:cTn>
+              <p:prevCondLst>
+                <p:cond evt="onPrev" delay="0">
+                  <p:tgtEl>
+                    <p:sldTgt/>
+                  </p:tgtEl>
+                </p:cond>
+              </p:prevCondLst>
+              <p:nextCondLst>
+                <p:cond evt="onNext" delay="0">
+                  <p:tgtEl>
+                    <p:sldTgt/>
+                  </p:tgtEl>
+                </p:cond>
+              </p:nextCondLst>
+            </p:seq>
+          </p:childTnLst>
+        </p:cTn>
       </p:par>
     </p:tnLst>
   </p:timing>
@@ -6782,11 +7732,22 @@
               <a:rPr lang="pl-PL" dirty="0" smtClean="0"/>
               <a:t>()? </a:t>
             </a:r>
-            <a:r>
-              <a:rPr lang="pl-PL" smtClean="0"/>
-              <a:t>Czas wykonania?</a:t>
-            </a:r>
             <a:endParaRPr lang="pl-PL" dirty="0" smtClean="0"/>
+          </a:p>
+          <a:p>
+            <a:r>
+              <a:rPr lang="pl-PL" b="1" dirty="0" smtClean="0">
+                <a:solidFill>
+                  <a:srgbClr val="FF0000"/>
+                </a:solidFill>
+              </a:rPr>
+              <a:t>Czas wykonania</a:t>
+            </a:r>
+            <a:endParaRPr lang="pl-PL" b="1" dirty="0" smtClean="0">
+              <a:solidFill>
+                <a:srgbClr val="FF0000"/>
+              </a:solidFill>
+            </a:endParaRPr>
           </a:p>
           <a:p>
             <a:endParaRPr lang="pl-PL" dirty="0"/>
@@ -6843,6 +7804,551 @@
   <p:transition spd="slow">
     <p:push dir="u"/>
   </p:transition>
+  <p:timing>
+    <p:tnLst>
+      <p:par>
+        <p:cTn id="1" dur="indefinite" restart="never" nodeType="tmRoot">
+          <p:childTnLst>
+            <p:seq concurrent="1" nextAc="seek">
+              <p:cTn id="2" dur="indefinite" nodeType="mainSeq">
+                <p:childTnLst>
+                  <p:par>
+                    <p:cTn id="3" fill="hold">
+                      <p:stCondLst>
+                        <p:cond delay="indefinite"/>
+                      </p:stCondLst>
+                      <p:childTnLst>
+                        <p:par>
+                          <p:cTn id="4" fill="hold">
+                            <p:stCondLst>
+                              <p:cond delay="0"/>
+                            </p:stCondLst>
+                            <p:childTnLst>
+                              <p:par>
+                                <p:cTn id="5" presetID="2" presetClass="entr" presetSubtype="4" fill="hold" nodeType="clickEffect">
+                                  <p:stCondLst>
+                                    <p:cond delay="0"/>
+                                  </p:stCondLst>
+                                  <p:childTnLst>
+                                    <p:set>
+                                      <p:cBhvr>
+                                        <p:cTn id="6" dur="1" fill="hold">
+                                          <p:stCondLst>
+                                            <p:cond delay="0"/>
+                                          </p:stCondLst>
+                                        </p:cTn>
+                                        <p:tgtEl>
+                                          <p:spTgt spid="2">
+                                            <p:txEl>
+                                              <p:pRg st="0" end="0"/>
+                                            </p:txEl>
+                                          </p:spTgt>
+                                        </p:tgtEl>
+                                        <p:attrNameLst>
+                                          <p:attrName>style.visibility</p:attrName>
+                                        </p:attrNameLst>
+                                      </p:cBhvr>
+                                      <p:to>
+                                        <p:strVal val="visible"/>
+                                      </p:to>
+                                    </p:set>
+                                    <p:anim calcmode="lin" valueType="num">
+                                      <p:cBhvr additive="base">
+                                        <p:cTn id="7" dur="500" fill="hold"/>
+                                        <p:tgtEl>
+                                          <p:spTgt spid="2">
+                                            <p:txEl>
+                                              <p:pRg st="0" end="0"/>
+                                            </p:txEl>
+                                          </p:spTgt>
+                                        </p:tgtEl>
+                                        <p:attrNameLst>
+                                          <p:attrName>ppt_x</p:attrName>
+                                        </p:attrNameLst>
+                                      </p:cBhvr>
+                                      <p:tavLst>
+                                        <p:tav tm="0">
+                                          <p:val>
+                                            <p:strVal val="#ppt_x"/>
+                                          </p:val>
+                                        </p:tav>
+                                        <p:tav tm="100000">
+                                          <p:val>
+                                            <p:strVal val="#ppt_x"/>
+                                          </p:val>
+                                        </p:tav>
+                                      </p:tavLst>
+                                    </p:anim>
+                                    <p:anim calcmode="lin" valueType="num">
+                                      <p:cBhvr additive="base">
+                                        <p:cTn id="8" dur="500" fill="hold"/>
+                                        <p:tgtEl>
+                                          <p:spTgt spid="2">
+                                            <p:txEl>
+                                              <p:pRg st="0" end="0"/>
+                                            </p:txEl>
+                                          </p:spTgt>
+                                        </p:tgtEl>
+                                        <p:attrNameLst>
+                                          <p:attrName>ppt_y</p:attrName>
+                                        </p:attrNameLst>
+                                      </p:cBhvr>
+                                      <p:tavLst>
+                                        <p:tav tm="0">
+                                          <p:val>
+                                            <p:strVal val="1+#ppt_h/2"/>
+                                          </p:val>
+                                        </p:tav>
+                                        <p:tav tm="100000">
+                                          <p:val>
+                                            <p:strVal val="#ppt_y"/>
+                                          </p:val>
+                                        </p:tav>
+                                      </p:tavLst>
+                                    </p:anim>
+                                  </p:childTnLst>
+                                </p:cTn>
+                              </p:par>
+                            </p:childTnLst>
+                          </p:cTn>
+                        </p:par>
+                      </p:childTnLst>
+                    </p:cTn>
+                  </p:par>
+                  <p:par>
+                    <p:cTn id="9" fill="hold">
+                      <p:stCondLst>
+                        <p:cond delay="indefinite"/>
+                      </p:stCondLst>
+                      <p:childTnLst>
+                        <p:par>
+                          <p:cTn id="10" fill="hold">
+                            <p:stCondLst>
+                              <p:cond delay="0"/>
+                            </p:stCondLst>
+                            <p:childTnLst>
+                              <p:par>
+                                <p:cTn id="11" presetID="2" presetClass="entr" presetSubtype="4" fill="hold" nodeType="clickEffect">
+                                  <p:stCondLst>
+                                    <p:cond delay="0"/>
+                                  </p:stCondLst>
+                                  <p:childTnLst>
+                                    <p:set>
+                                      <p:cBhvr>
+                                        <p:cTn id="12" dur="1" fill="hold">
+                                          <p:stCondLst>
+                                            <p:cond delay="0"/>
+                                          </p:stCondLst>
+                                        </p:cTn>
+                                        <p:tgtEl>
+                                          <p:spTgt spid="2">
+                                            <p:txEl>
+                                              <p:pRg st="1" end="1"/>
+                                            </p:txEl>
+                                          </p:spTgt>
+                                        </p:tgtEl>
+                                        <p:attrNameLst>
+                                          <p:attrName>style.visibility</p:attrName>
+                                        </p:attrNameLst>
+                                      </p:cBhvr>
+                                      <p:to>
+                                        <p:strVal val="visible"/>
+                                      </p:to>
+                                    </p:set>
+                                    <p:anim calcmode="lin" valueType="num">
+                                      <p:cBhvr additive="base">
+                                        <p:cTn id="13" dur="500" fill="hold"/>
+                                        <p:tgtEl>
+                                          <p:spTgt spid="2">
+                                            <p:txEl>
+                                              <p:pRg st="1" end="1"/>
+                                            </p:txEl>
+                                          </p:spTgt>
+                                        </p:tgtEl>
+                                        <p:attrNameLst>
+                                          <p:attrName>ppt_x</p:attrName>
+                                        </p:attrNameLst>
+                                      </p:cBhvr>
+                                      <p:tavLst>
+                                        <p:tav tm="0">
+                                          <p:val>
+                                            <p:strVal val="#ppt_x"/>
+                                          </p:val>
+                                        </p:tav>
+                                        <p:tav tm="100000">
+                                          <p:val>
+                                            <p:strVal val="#ppt_x"/>
+                                          </p:val>
+                                        </p:tav>
+                                      </p:tavLst>
+                                    </p:anim>
+                                    <p:anim calcmode="lin" valueType="num">
+                                      <p:cBhvr additive="base">
+                                        <p:cTn id="14" dur="500" fill="hold"/>
+                                        <p:tgtEl>
+                                          <p:spTgt spid="2">
+                                            <p:txEl>
+                                              <p:pRg st="1" end="1"/>
+                                            </p:txEl>
+                                          </p:spTgt>
+                                        </p:tgtEl>
+                                        <p:attrNameLst>
+                                          <p:attrName>ppt_y</p:attrName>
+                                        </p:attrNameLst>
+                                      </p:cBhvr>
+                                      <p:tavLst>
+                                        <p:tav tm="0">
+                                          <p:val>
+                                            <p:strVal val="1+#ppt_h/2"/>
+                                          </p:val>
+                                        </p:tav>
+                                        <p:tav tm="100000">
+                                          <p:val>
+                                            <p:strVal val="#ppt_y"/>
+                                          </p:val>
+                                        </p:tav>
+                                      </p:tavLst>
+                                    </p:anim>
+                                  </p:childTnLst>
+                                </p:cTn>
+                              </p:par>
+                            </p:childTnLst>
+                          </p:cTn>
+                        </p:par>
+                      </p:childTnLst>
+                    </p:cTn>
+                  </p:par>
+                  <p:par>
+                    <p:cTn id="15" fill="hold">
+                      <p:stCondLst>
+                        <p:cond delay="indefinite"/>
+                      </p:stCondLst>
+                      <p:childTnLst>
+                        <p:par>
+                          <p:cTn id="16" fill="hold">
+                            <p:stCondLst>
+                              <p:cond delay="0"/>
+                            </p:stCondLst>
+                            <p:childTnLst>
+                              <p:par>
+                                <p:cTn id="17" presetID="2" presetClass="entr" presetSubtype="4" fill="hold" nodeType="clickEffect">
+                                  <p:stCondLst>
+                                    <p:cond delay="0"/>
+                                  </p:stCondLst>
+                                  <p:childTnLst>
+                                    <p:set>
+                                      <p:cBhvr>
+                                        <p:cTn id="18" dur="1" fill="hold">
+                                          <p:stCondLst>
+                                            <p:cond delay="0"/>
+                                          </p:stCondLst>
+                                        </p:cTn>
+                                        <p:tgtEl>
+                                          <p:spTgt spid="2">
+                                            <p:txEl>
+                                              <p:pRg st="2" end="2"/>
+                                            </p:txEl>
+                                          </p:spTgt>
+                                        </p:tgtEl>
+                                        <p:attrNameLst>
+                                          <p:attrName>style.visibility</p:attrName>
+                                        </p:attrNameLst>
+                                      </p:cBhvr>
+                                      <p:to>
+                                        <p:strVal val="visible"/>
+                                      </p:to>
+                                    </p:set>
+                                    <p:anim calcmode="lin" valueType="num">
+                                      <p:cBhvr additive="base">
+                                        <p:cTn id="19" dur="500" fill="hold"/>
+                                        <p:tgtEl>
+                                          <p:spTgt spid="2">
+                                            <p:txEl>
+                                              <p:pRg st="2" end="2"/>
+                                            </p:txEl>
+                                          </p:spTgt>
+                                        </p:tgtEl>
+                                        <p:attrNameLst>
+                                          <p:attrName>ppt_x</p:attrName>
+                                        </p:attrNameLst>
+                                      </p:cBhvr>
+                                      <p:tavLst>
+                                        <p:tav tm="0">
+                                          <p:val>
+                                            <p:strVal val="#ppt_x"/>
+                                          </p:val>
+                                        </p:tav>
+                                        <p:tav tm="100000">
+                                          <p:val>
+                                            <p:strVal val="#ppt_x"/>
+                                          </p:val>
+                                        </p:tav>
+                                      </p:tavLst>
+                                    </p:anim>
+                                    <p:anim calcmode="lin" valueType="num">
+                                      <p:cBhvr additive="base">
+                                        <p:cTn id="20" dur="500" fill="hold"/>
+                                        <p:tgtEl>
+                                          <p:spTgt spid="2">
+                                            <p:txEl>
+                                              <p:pRg st="2" end="2"/>
+                                            </p:txEl>
+                                          </p:spTgt>
+                                        </p:tgtEl>
+                                        <p:attrNameLst>
+                                          <p:attrName>ppt_y</p:attrName>
+                                        </p:attrNameLst>
+                                      </p:cBhvr>
+                                      <p:tavLst>
+                                        <p:tav tm="0">
+                                          <p:val>
+                                            <p:strVal val="1+#ppt_h/2"/>
+                                          </p:val>
+                                        </p:tav>
+                                        <p:tav tm="100000">
+                                          <p:val>
+                                            <p:strVal val="#ppt_y"/>
+                                          </p:val>
+                                        </p:tav>
+                                      </p:tavLst>
+                                    </p:anim>
+                                  </p:childTnLst>
+                                </p:cTn>
+                              </p:par>
+                            </p:childTnLst>
+                          </p:cTn>
+                        </p:par>
+                      </p:childTnLst>
+                    </p:cTn>
+                  </p:par>
+                  <p:par>
+                    <p:cTn id="21" fill="hold">
+                      <p:stCondLst>
+                        <p:cond delay="indefinite"/>
+                      </p:stCondLst>
+                      <p:childTnLst>
+                        <p:par>
+                          <p:cTn id="22" fill="hold">
+                            <p:stCondLst>
+                              <p:cond delay="0"/>
+                            </p:stCondLst>
+                            <p:childTnLst>
+                              <p:par>
+                                <p:cTn id="23" presetID="2" presetClass="entr" presetSubtype="4" fill="hold" nodeType="clickEffect">
+                                  <p:stCondLst>
+                                    <p:cond delay="0"/>
+                                  </p:stCondLst>
+                                  <p:childTnLst>
+                                    <p:set>
+                                      <p:cBhvr>
+                                        <p:cTn id="24" dur="1" fill="hold">
+                                          <p:stCondLst>
+                                            <p:cond delay="0"/>
+                                          </p:stCondLst>
+                                        </p:cTn>
+                                        <p:tgtEl>
+                                          <p:spTgt spid="2">
+                                            <p:txEl>
+                                              <p:pRg st="3" end="3"/>
+                                            </p:txEl>
+                                          </p:spTgt>
+                                        </p:tgtEl>
+                                        <p:attrNameLst>
+                                          <p:attrName>style.visibility</p:attrName>
+                                        </p:attrNameLst>
+                                      </p:cBhvr>
+                                      <p:to>
+                                        <p:strVal val="visible"/>
+                                      </p:to>
+                                    </p:set>
+                                    <p:anim calcmode="lin" valueType="num">
+                                      <p:cBhvr additive="base">
+                                        <p:cTn id="25" dur="500" fill="hold"/>
+                                        <p:tgtEl>
+                                          <p:spTgt spid="2">
+                                            <p:txEl>
+                                              <p:pRg st="3" end="3"/>
+                                            </p:txEl>
+                                          </p:spTgt>
+                                        </p:tgtEl>
+                                        <p:attrNameLst>
+                                          <p:attrName>ppt_x</p:attrName>
+                                        </p:attrNameLst>
+                                      </p:cBhvr>
+                                      <p:tavLst>
+                                        <p:tav tm="0">
+                                          <p:val>
+                                            <p:strVal val="#ppt_x"/>
+                                          </p:val>
+                                        </p:tav>
+                                        <p:tav tm="100000">
+                                          <p:val>
+                                            <p:strVal val="#ppt_x"/>
+                                          </p:val>
+                                        </p:tav>
+                                      </p:tavLst>
+                                    </p:anim>
+                                    <p:anim calcmode="lin" valueType="num">
+                                      <p:cBhvr additive="base">
+                                        <p:cTn id="26" dur="500" fill="hold"/>
+                                        <p:tgtEl>
+                                          <p:spTgt spid="2">
+                                            <p:txEl>
+                                              <p:pRg st="3" end="3"/>
+                                            </p:txEl>
+                                          </p:spTgt>
+                                        </p:tgtEl>
+                                        <p:attrNameLst>
+                                          <p:attrName>ppt_y</p:attrName>
+                                        </p:attrNameLst>
+                                      </p:cBhvr>
+                                      <p:tavLst>
+                                        <p:tav tm="0">
+                                          <p:val>
+                                            <p:strVal val="1+#ppt_h/2"/>
+                                          </p:val>
+                                        </p:tav>
+                                        <p:tav tm="100000">
+                                          <p:val>
+                                            <p:strVal val="#ppt_y"/>
+                                          </p:val>
+                                        </p:tav>
+                                      </p:tavLst>
+                                    </p:anim>
+                                  </p:childTnLst>
+                                </p:cTn>
+                              </p:par>
+                            </p:childTnLst>
+                          </p:cTn>
+                        </p:par>
+                      </p:childTnLst>
+                    </p:cTn>
+                  </p:par>
+                  <p:par>
+                    <p:cTn id="27" fill="hold">
+                      <p:stCondLst>
+                        <p:cond delay="indefinite"/>
+                      </p:stCondLst>
+                      <p:childTnLst>
+                        <p:par>
+                          <p:cTn id="28" fill="hold">
+                            <p:stCondLst>
+                              <p:cond delay="0"/>
+                            </p:stCondLst>
+                            <p:childTnLst>
+                              <p:par>
+                                <p:cTn id="29" presetID="2" presetClass="entr" presetSubtype="4" fill="hold" nodeType="clickEffect">
+                                  <p:stCondLst>
+                                    <p:cond delay="0"/>
+                                  </p:stCondLst>
+                                  <p:childTnLst>
+                                    <p:set>
+                                      <p:cBhvr>
+                                        <p:cTn id="30" dur="1" fill="hold">
+                                          <p:stCondLst>
+                                            <p:cond delay="0"/>
+                                          </p:stCondLst>
+                                        </p:cTn>
+                                        <p:tgtEl>
+                                          <p:spTgt spid="2">
+                                            <p:txEl>
+                                              <p:pRg st="4" end="4"/>
+                                            </p:txEl>
+                                          </p:spTgt>
+                                        </p:tgtEl>
+                                        <p:attrNameLst>
+                                          <p:attrName>style.visibility</p:attrName>
+                                        </p:attrNameLst>
+                                      </p:cBhvr>
+                                      <p:to>
+                                        <p:strVal val="visible"/>
+                                      </p:to>
+                                    </p:set>
+                                    <p:anim calcmode="lin" valueType="num">
+                                      <p:cBhvr additive="base">
+                                        <p:cTn id="31" dur="500" fill="hold"/>
+                                        <p:tgtEl>
+                                          <p:spTgt spid="2">
+                                            <p:txEl>
+                                              <p:pRg st="4" end="4"/>
+                                            </p:txEl>
+                                          </p:spTgt>
+                                        </p:tgtEl>
+                                        <p:attrNameLst>
+                                          <p:attrName>ppt_x</p:attrName>
+                                        </p:attrNameLst>
+                                      </p:cBhvr>
+                                      <p:tavLst>
+                                        <p:tav tm="0">
+                                          <p:val>
+                                            <p:strVal val="#ppt_x"/>
+                                          </p:val>
+                                        </p:tav>
+                                        <p:tav tm="100000">
+                                          <p:val>
+                                            <p:strVal val="#ppt_x"/>
+                                          </p:val>
+                                        </p:tav>
+                                      </p:tavLst>
+                                    </p:anim>
+                                    <p:anim calcmode="lin" valueType="num">
+                                      <p:cBhvr additive="base">
+                                        <p:cTn id="32" dur="500" fill="hold"/>
+                                        <p:tgtEl>
+                                          <p:spTgt spid="2">
+                                            <p:txEl>
+                                              <p:pRg st="4" end="4"/>
+                                            </p:txEl>
+                                          </p:spTgt>
+                                        </p:tgtEl>
+                                        <p:attrNameLst>
+                                          <p:attrName>ppt_y</p:attrName>
+                                        </p:attrNameLst>
+                                      </p:cBhvr>
+                                      <p:tavLst>
+                                        <p:tav tm="0">
+                                          <p:val>
+                                            <p:strVal val="1+#ppt_h/2"/>
+                                          </p:val>
+                                        </p:tav>
+                                        <p:tav tm="100000">
+                                          <p:val>
+                                            <p:strVal val="#ppt_y"/>
+                                          </p:val>
+                                        </p:tav>
+                                      </p:tavLst>
+                                    </p:anim>
+                                  </p:childTnLst>
+                                </p:cTn>
+                              </p:par>
+                            </p:childTnLst>
+                          </p:cTn>
+                        </p:par>
+                      </p:childTnLst>
+                    </p:cTn>
+                  </p:par>
+                </p:childTnLst>
+              </p:cTn>
+              <p:prevCondLst>
+                <p:cond evt="onPrev" delay="0">
+                  <p:tgtEl>
+                    <p:sldTgt/>
+                  </p:tgtEl>
+                </p:cond>
+              </p:prevCondLst>
+              <p:nextCondLst>
+                <p:cond evt="onNext" delay="0">
+                  <p:tgtEl>
+                    <p:sldTgt/>
+                  </p:tgtEl>
+                </p:cond>
+              </p:nextCondLst>
+            </p:seq>
+          </p:childTnLst>
+        </p:cTn>
+      </p:par>
+    </p:tnLst>
+  </p:timing>
 </p:sld>
 </file>
 
@@ -10353,6 +11859,13 @@
   <p:transition spd="slow">
     <p:push dir="u"/>
   </p:transition>
+  <p:timing>
+    <p:tnLst>
+      <p:par>
+        <p:cTn id="1" dur="indefinite" restart="never" nodeType="tmRoot"/>
+      </p:par>
+    </p:tnLst>
+  </p:timing>
 </p:sld>
 </file>
 

</xml_diff>

<commit_message>
added 4th example with another quiz question, changed presentation and workshopplan
</commit_message>
<xml_diff>
--- a/Files/Szkolenie warsztatowe Dapper.pptx
+++ b/Files/Szkolenie warsztatowe Dapper.pptx
@@ -22,7 +22,10 @@
     <p:sldId id="270" r:id="rId16"/>
     <p:sldId id="271" r:id="rId17"/>
     <p:sldId id="273" r:id="rId18"/>
-    <p:sldId id="257" r:id="rId19"/>
+    <p:sldId id="275" r:id="rId19"/>
+    <p:sldId id="274" r:id="rId20"/>
+    <p:sldId id="276" r:id="rId21"/>
+    <p:sldId id="257" r:id="rId22"/>
   </p:sldIdLst>
   <p:sldSz cx="9144000" cy="6858000" type="screen4x3"/>
   <p:notesSz cx="6858000" cy="9144000"/>
@@ -7725,14 +7728,9 @@
               <a:t>Różnica względem rozszerzenia LINQ Query(…).</a:t>
             </a:r>
             <a:r>
-              <a:rPr lang="pl-PL" dirty="0" err="1" smtClean="0"/>
-              <a:t>FirstOrDefault</a:t>
-            </a:r>
-            <a:r>
               <a:rPr lang="pl-PL" dirty="0" smtClean="0"/>
-              <a:t>()? </a:t>
-            </a:r>
-            <a:endParaRPr lang="pl-PL" dirty="0" smtClean="0"/>
+              <a:t>First()? </a:t>
+            </a:r>
           </a:p>
           <a:p>
             <a:r>
@@ -8371,7 +8369,7 @@
       </p:grpSpPr>
       <p:sp>
         <p:nvSpPr>
-          <p:cNvPr id="3" name="Symbol zastępczy zawartości 2"/>
+          <p:cNvPr id="2" name="Symbol zastępczy zawartości 1"/>
           <p:cNvSpPr>
             <a:spLocks noGrp="1"/>
           </p:cNvSpPr>
@@ -8381,34 +8379,87 @@
         </p:nvSpPr>
         <p:spPr/>
         <p:txBody>
-          <a:bodyPr>
-            <a:normAutofit lnSpcReduction="10000"/>
-          </a:bodyPr>
+          <a:bodyPr/>
           <a:lstStyle/>
           <a:p>
-            <a:pPr marL="109728" indent="0">
-              <a:buNone/>
-            </a:pPr>
+            <a:r>
+              <a:rPr lang="pl-PL" dirty="0"/>
+              <a:t>Włączyć program szkoleniowy</a:t>
+            </a:r>
+          </a:p>
+          <a:p>
+            <a:r>
+              <a:rPr lang="pl-PL" dirty="0"/>
+              <a:t>Wybrać e (</a:t>
+            </a:r>
+            <a:r>
+              <a:rPr lang="pl-PL" dirty="0" err="1"/>
+              <a:t>example</a:t>
+            </a:r>
+            <a:r>
+              <a:rPr lang="pl-PL" dirty="0"/>
+              <a:t>)</a:t>
+            </a:r>
+          </a:p>
+          <a:p>
+            <a:r>
+              <a:rPr lang="pl-PL" dirty="0"/>
+              <a:t>Wybrać przykład nr </a:t>
+            </a:r>
             <a:r>
               <a:rPr lang="pl-PL" dirty="0" smtClean="0"/>
-              <a:t>Przedstawione materiały szkoleniowe, prezentacja wraz z konspektem, projekt użyty do prezentacji i warsztatów jest własnością intelektualną szkolących Michała Gwóźdź oraz Łukasza Szustaka.</a:t>
-            </a:r>
-          </a:p>
-          <a:p>
-            <a:pPr marL="109728" indent="0">
-              <a:buNone/>
-            </a:pPr>
+              <a:t>3</a:t>
+            </a:r>
+            <a:endParaRPr lang="pl-PL" dirty="0"/>
+          </a:p>
+          <a:p>
+            <a:r>
+              <a:rPr lang="pl-PL" dirty="0"/>
+              <a:t>Sprawdzić wynik działania programu</a:t>
+            </a:r>
+          </a:p>
+          <a:p>
+            <a:r>
+              <a:rPr lang="pl-PL" dirty="0"/>
+              <a:t>Zastosować skrót „</a:t>
+            </a:r>
+            <a:r>
+              <a:rPr lang="pl-PL" dirty="0" err="1"/>
+              <a:t>Ctrl</a:t>
+            </a:r>
+            <a:r>
+              <a:rPr lang="pl-PL" dirty="0"/>
+              <a:t> + ,”</a:t>
+            </a:r>
+          </a:p>
+          <a:p>
+            <a:r>
+              <a:rPr lang="pl-PL" dirty="0"/>
+              <a:t>Wpisać „</a:t>
+            </a:r>
             <a:r>
               <a:rPr lang="pl-PL" dirty="0" smtClean="0"/>
-              <a:t>Wykorzystanie bez zgody twórców któregokolwiek materiału do innych celów niż samokształcenie osoby szkolonej, takie jak upublicznianie, cytowanie lub inna forma redystrybucji jest jawnym naruszeniem praw autorskich.</a:t>
-            </a:r>
+              <a:t>Example_3” </a:t>
+            </a:r>
+            <a:r>
+              <a:rPr lang="pl-PL" dirty="0"/>
+              <a:t>i przejść do znalezionej klasy</a:t>
+            </a:r>
+          </a:p>
+          <a:p>
+            <a:r>
+              <a:rPr lang="pl-PL" dirty="0"/>
+              <a:t>Przeanalizować kod</a:t>
+            </a:r>
+          </a:p>
+          <a:p>
             <a:endParaRPr lang="pl-PL" dirty="0"/>
           </a:p>
         </p:txBody>
       </p:sp>
       <p:sp>
         <p:nvSpPr>
-          <p:cNvPr id="2" name="Tytuł 1"/>
+          <p:cNvPr id="3" name="Tytuł 2"/>
           <p:cNvSpPr>
             <a:spLocks noGrp="1"/>
           </p:cNvSpPr>
@@ -8418,12 +8469,26 @@
         </p:nvSpPr>
         <p:spPr/>
         <p:txBody>
-          <a:bodyPr/>
+          <a:bodyPr>
+            <a:normAutofit/>
+          </a:bodyPr>
           <a:lstStyle/>
           <a:p>
             <a:r>
+              <a:rPr lang="pl-PL" dirty="0"/>
+              <a:t>Przykład nr </a:t>
+            </a:r>
+            <a:r>
               <a:rPr lang="pl-PL" dirty="0" smtClean="0"/>
-              <a:t>Słowo końcowe</a:t>
+              <a:t>3 </a:t>
+            </a:r>
+            <a:r>
+              <a:rPr lang="pl-PL" dirty="0"/>
+              <a:t>– </a:t>
+            </a:r>
+            <a:r>
+              <a:rPr lang="pl-PL" dirty="0" err="1" smtClean="0"/>
+              <a:t>QueryFirst</a:t>
             </a:r>
             <a:endParaRPr lang="pl-PL" dirty="0"/>
           </a:p>
@@ -8432,7 +8497,131 @@
     </p:spTree>
     <p:extLst>
       <p:ext uri="{BB962C8B-B14F-4D97-AF65-F5344CB8AC3E}">
-        <p14:creationId xmlns:p14="http://schemas.microsoft.com/office/powerpoint/2010/main" val="3785988704"/>
+        <p14:creationId xmlns:p14="http://schemas.microsoft.com/office/powerpoint/2010/main" val="2462394334"/>
+      </p:ext>
+    </p:extLst>
+  </p:cSld>
+  <p:clrMapOvr>
+    <a:masterClrMapping/>
+  </p:clrMapOvr>
+  <p:transition spd="slow">
+    <p:push dir="u"/>
+  </p:transition>
+  <p:timing>
+    <p:tnLst>
+      <p:par>
+        <p:cTn id="1" dur="indefinite" restart="never" nodeType="tmRoot"/>
+      </p:par>
+    </p:tnLst>
+  </p:timing>
+</p:sld>
+</file>
+
+<file path=ppt/slides/slide19.xml><?xml version="1.0" encoding="utf-8"?>
+<p:sld xmlns:a="http://schemas.openxmlformats.org/drawingml/2006/main" xmlns:r="http://schemas.openxmlformats.org/officeDocument/2006/relationships" xmlns:p="http://schemas.openxmlformats.org/presentationml/2006/main">
+  <p:cSld>
+    <p:spTree>
+      <p:nvGrpSpPr>
+        <p:cNvPr id="1" name=""/>
+        <p:cNvGrpSpPr/>
+        <p:nvPr/>
+      </p:nvGrpSpPr>
+      <p:grpSpPr>
+        <a:xfrm>
+          <a:off x="0" y="0"/>
+          <a:ext cx="0" cy="0"/>
+          <a:chOff x="0" y="0"/>
+          <a:chExt cx="0" cy="0"/>
+        </a:xfrm>
+      </p:grpSpPr>
+      <p:sp>
+        <p:nvSpPr>
+          <p:cNvPr id="2" name="Symbol zastępczy zawartości 1"/>
+          <p:cNvSpPr>
+            <a:spLocks noGrp="1"/>
+          </p:cNvSpPr>
+          <p:nvPr>
+            <p:ph idx="1"/>
+          </p:nvPr>
+        </p:nvSpPr>
+        <p:spPr/>
+        <p:txBody>
+          <a:bodyPr/>
+          <a:lstStyle/>
+          <a:p>
+            <a:r>
+              <a:rPr lang="pl-PL" dirty="0"/>
+              <a:t>Zwraca pierwszy wynik zapytania w postaci obiektu (silnie typowany lub anonimowy)</a:t>
+            </a:r>
+          </a:p>
+          <a:p>
+            <a:r>
+              <a:rPr lang="pl-PL" dirty="0"/>
+              <a:t>Jeśli zapytanie nie zwróci nic </a:t>
+            </a:r>
+            <a:r>
+              <a:rPr lang="pl-PL" smtClean="0"/>
+              <a:t>QueryFirstOrDefault </a:t>
+            </a:r>
+            <a:r>
+              <a:rPr lang="pl-PL" dirty="0"/>
+              <a:t>zwróci </a:t>
+            </a:r>
+            <a:r>
+              <a:rPr lang="pl-PL" dirty="0" smtClean="0"/>
+              <a:t>wartość domyślną dla oczekiwanego typu</a:t>
+            </a:r>
+            <a:endParaRPr lang="pl-PL" dirty="0"/>
+          </a:p>
+          <a:p>
+            <a:r>
+              <a:rPr lang="pl-PL" dirty="0"/>
+              <a:t>Przyjmowane parametry identycznie jak w przypadku Query</a:t>
+            </a:r>
+          </a:p>
+        </p:txBody>
+      </p:sp>
+      <p:sp>
+        <p:nvSpPr>
+          <p:cNvPr id="3" name="Tytuł 2"/>
+          <p:cNvSpPr>
+            <a:spLocks noGrp="1"/>
+          </p:cNvSpPr>
+          <p:nvPr>
+            <p:ph type="title"/>
+          </p:nvPr>
+        </p:nvSpPr>
+        <p:spPr/>
+        <p:txBody>
+          <a:bodyPr>
+            <a:noAutofit/>
+          </a:bodyPr>
+          <a:lstStyle/>
+          <a:p>
+            <a:r>
+              <a:rPr lang="pl-PL" sz="3200" dirty="0"/>
+              <a:t>Metoda rozszerzająca interfejsu </a:t>
+            </a:r>
+            <a:r>
+              <a:rPr lang="pl-PL" sz="3200" dirty="0" err="1"/>
+              <a:t>IDbConnection</a:t>
+            </a:r>
+            <a:r>
+              <a:rPr lang="pl-PL" sz="3200" dirty="0"/>
+              <a:t> - </a:t>
+            </a:r>
+            <a:r>
+              <a:rPr lang="pl-PL" sz="3200" dirty="0" err="1" smtClean="0"/>
+              <a:t>QueryFirstOrDefault</a:t>
+            </a:r>
+            <a:endParaRPr lang="pl-PL" sz="3200" dirty="0"/>
+          </a:p>
+        </p:txBody>
+      </p:sp>
+    </p:spTree>
+    <p:extLst>
+      <p:ext uri="{BB962C8B-B14F-4D97-AF65-F5344CB8AC3E}">
+        <p14:creationId xmlns:p14="http://schemas.microsoft.com/office/powerpoint/2010/main" val="482514816"/>
       </p:ext>
     </p:extLst>
   </p:cSld>
@@ -8476,7 +8665,7 @@
                                           </p:stCondLst>
                                         </p:cTn>
                                         <p:tgtEl>
-                                          <p:spTgt spid="3">
+                                          <p:spTgt spid="2">
                                             <p:txEl>
                                               <p:pRg st="0" end="0"/>
                                             </p:txEl>
@@ -8494,7 +8683,7 @@
                                       <p:cBhvr additive="base">
                                         <p:cTn id="7" dur="500" fill="hold"/>
                                         <p:tgtEl>
-                                          <p:spTgt spid="3">
+                                          <p:spTgt spid="2">
                                             <p:txEl>
                                               <p:pRg st="0" end="0"/>
                                             </p:txEl>
@@ -8521,7 +8710,7 @@
                                       <p:cBhvr additive="base">
                                         <p:cTn id="8" dur="500" fill="hold"/>
                                         <p:tgtEl>
-                                          <p:spTgt spid="3">
+                                          <p:spTgt spid="2">
                                             <p:txEl>
                                               <p:pRg st="0" end="0"/>
                                             </p:txEl>
@@ -8579,7 +8768,7 @@
                                           </p:stCondLst>
                                         </p:cTn>
                                         <p:tgtEl>
-                                          <p:spTgt spid="3">
+                                          <p:spTgt spid="2">
                                             <p:txEl>
                                               <p:pRg st="1" end="1"/>
                                             </p:txEl>
@@ -8597,7 +8786,7 @@
                                       <p:cBhvr additive="base">
                                         <p:cTn id="13" dur="500" fill="hold"/>
                                         <p:tgtEl>
-                                          <p:spTgt spid="3">
+                                          <p:spTgt spid="2">
                                             <p:txEl>
                                               <p:pRg st="1" end="1"/>
                                             </p:txEl>
@@ -8624,9 +8813,112 @@
                                       <p:cBhvr additive="base">
                                         <p:cTn id="14" dur="500" fill="hold"/>
                                         <p:tgtEl>
-                                          <p:spTgt spid="3">
+                                          <p:spTgt spid="2">
                                             <p:txEl>
                                               <p:pRg st="1" end="1"/>
+                                            </p:txEl>
+                                          </p:spTgt>
+                                        </p:tgtEl>
+                                        <p:attrNameLst>
+                                          <p:attrName>ppt_y</p:attrName>
+                                        </p:attrNameLst>
+                                      </p:cBhvr>
+                                      <p:tavLst>
+                                        <p:tav tm="0">
+                                          <p:val>
+                                            <p:strVal val="1+#ppt_h/2"/>
+                                          </p:val>
+                                        </p:tav>
+                                        <p:tav tm="100000">
+                                          <p:val>
+                                            <p:strVal val="#ppt_y"/>
+                                          </p:val>
+                                        </p:tav>
+                                      </p:tavLst>
+                                    </p:anim>
+                                  </p:childTnLst>
+                                </p:cTn>
+                              </p:par>
+                            </p:childTnLst>
+                          </p:cTn>
+                        </p:par>
+                      </p:childTnLst>
+                    </p:cTn>
+                  </p:par>
+                  <p:par>
+                    <p:cTn id="15" fill="hold">
+                      <p:stCondLst>
+                        <p:cond delay="indefinite"/>
+                      </p:stCondLst>
+                      <p:childTnLst>
+                        <p:par>
+                          <p:cTn id="16" fill="hold">
+                            <p:stCondLst>
+                              <p:cond delay="0"/>
+                            </p:stCondLst>
+                            <p:childTnLst>
+                              <p:par>
+                                <p:cTn id="17" presetID="2" presetClass="entr" presetSubtype="4" fill="hold" nodeType="clickEffect">
+                                  <p:stCondLst>
+                                    <p:cond delay="0"/>
+                                  </p:stCondLst>
+                                  <p:childTnLst>
+                                    <p:set>
+                                      <p:cBhvr>
+                                        <p:cTn id="18" dur="1" fill="hold">
+                                          <p:stCondLst>
+                                            <p:cond delay="0"/>
+                                          </p:stCondLst>
+                                        </p:cTn>
+                                        <p:tgtEl>
+                                          <p:spTgt spid="2">
+                                            <p:txEl>
+                                              <p:pRg st="2" end="2"/>
+                                            </p:txEl>
+                                          </p:spTgt>
+                                        </p:tgtEl>
+                                        <p:attrNameLst>
+                                          <p:attrName>style.visibility</p:attrName>
+                                        </p:attrNameLst>
+                                      </p:cBhvr>
+                                      <p:to>
+                                        <p:strVal val="visible"/>
+                                      </p:to>
+                                    </p:set>
+                                    <p:anim calcmode="lin" valueType="num">
+                                      <p:cBhvr additive="base">
+                                        <p:cTn id="19" dur="500" fill="hold"/>
+                                        <p:tgtEl>
+                                          <p:spTgt spid="2">
+                                            <p:txEl>
+                                              <p:pRg st="2" end="2"/>
+                                            </p:txEl>
+                                          </p:spTgt>
+                                        </p:tgtEl>
+                                        <p:attrNameLst>
+                                          <p:attrName>ppt_x</p:attrName>
+                                        </p:attrNameLst>
+                                      </p:cBhvr>
+                                      <p:tavLst>
+                                        <p:tav tm="0">
+                                          <p:val>
+                                            <p:strVal val="#ppt_x"/>
+                                          </p:val>
+                                        </p:tav>
+                                        <p:tav tm="100000">
+                                          <p:val>
+                                            <p:strVal val="#ppt_x"/>
+                                          </p:val>
+                                        </p:tav>
+                                      </p:tavLst>
+                                    </p:anim>
+                                    <p:anim calcmode="lin" valueType="num">
+                                      <p:cBhvr additive="base">
+                                        <p:cTn id="20" dur="500" fill="hold"/>
+                                        <p:tgtEl>
+                                          <p:spTgt spid="2">
+                                            <p:txEl>
+                                              <p:pRg st="2" end="2"/>
                                             </p:txEl>
                                           </p:spTgt>
                                         </p:tgtEl>
@@ -9437,6 +9729,497 @@
     <p:bldLst>
       <p:bldP spid="2" grpId="0" build="p"/>
     </p:bldLst>
+  </p:timing>
+</p:sld>
+</file>
+
+<file path=ppt/slides/slide20.xml><?xml version="1.0" encoding="utf-8"?>
+<p:sld xmlns:a="http://schemas.openxmlformats.org/drawingml/2006/main" xmlns:r="http://schemas.openxmlformats.org/officeDocument/2006/relationships" xmlns:p="http://schemas.openxmlformats.org/presentationml/2006/main">
+  <p:cSld>
+    <p:spTree>
+      <p:nvGrpSpPr>
+        <p:cNvPr id="1" name=""/>
+        <p:cNvGrpSpPr/>
+        <p:nvPr/>
+      </p:nvGrpSpPr>
+      <p:grpSpPr>
+        <a:xfrm>
+          <a:off x="0" y="0"/>
+          <a:ext cx="0" cy="0"/>
+          <a:chOff x="0" y="0"/>
+          <a:chExt cx="0" cy="0"/>
+        </a:xfrm>
+      </p:grpSpPr>
+      <p:sp>
+        <p:nvSpPr>
+          <p:cNvPr id="2" name="Symbol zastępczy zawartości 1"/>
+          <p:cNvSpPr>
+            <a:spLocks noGrp="1"/>
+          </p:cNvSpPr>
+          <p:nvPr>
+            <p:ph idx="1"/>
+          </p:nvPr>
+        </p:nvSpPr>
+        <p:spPr/>
+        <p:txBody>
+          <a:bodyPr/>
+          <a:lstStyle/>
+          <a:p>
+            <a:r>
+              <a:rPr lang="pl-PL" dirty="0"/>
+              <a:t>Włączyć program szkoleniowy</a:t>
+            </a:r>
+          </a:p>
+          <a:p>
+            <a:r>
+              <a:rPr lang="pl-PL" dirty="0"/>
+              <a:t>Wybrać e (</a:t>
+            </a:r>
+            <a:r>
+              <a:rPr lang="pl-PL" dirty="0" err="1"/>
+              <a:t>example</a:t>
+            </a:r>
+            <a:r>
+              <a:rPr lang="pl-PL" dirty="0"/>
+              <a:t>)</a:t>
+            </a:r>
+          </a:p>
+          <a:p>
+            <a:r>
+              <a:rPr lang="pl-PL" dirty="0"/>
+              <a:t>Wybrać przykład nr 4</a:t>
+            </a:r>
+          </a:p>
+          <a:p>
+            <a:r>
+              <a:rPr lang="pl-PL" dirty="0"/>
+              <a:t>Sprawdzić wynik działania programu</a:t>
+            </a:r>
+          </a:p>
+          <a:p>
+            <a:r>
+              <a:rPr lang="pl-PL" dirty="0"/>
+              <a:t>Zastosować skrót „</a:t>
+            </a:r>
+            <a:r>
+              <a:rPr lang="pl-PL" dirty="0" err="1"/>
+              <a:t>Ctrl</a:t>
+            </a:r>
+            <a:r>
+              <a:rPr lang="pl-PL" dirty="0"/>
+              <a:t> + ,”</a:t>
+            </a:r>
+          </a:p>
+          <a:p>
+            <a:r>
+              <a:rPr lang="pl-PL" dirty="0"/>
+              <a:t>Wpisać „</a:t>
+            </a:r>
+            <a:r>
+              <a:rPr lang="pl-PL" dirty="0" smtClean="0"/>
+              <a:t>Example_4” </a:t>
+            </a:r>
+            <a:r>
+              <a:rPr lang="pl-PL" dirty="0"/>
+              <a:t>i przejść do znalezionej klasy</a:t>
+            </a:r>
+          </a:p>
+          <a:p>
+            <a:r>
+              <a:rPr lang="pl-PL" dirty="0"/>
+              <a:t>Przeanalizować kod</a:t>
+            </a:r>
+          </a:p>
+          <a:p>
+            <a:endParaRPr lang="pl-PL" dirty="0"/>
+          </a:p>
+        </p:txBody>
+      </p:sp>
+      <p:sp>
+        <p:nvSpPr>
+          <p:cNvPr id="3" name="Tytuł 2"/>
+          <p:cNvSpPr>
+            <a:spLocks noGrp="1"/>
+          </p:cNvSpPr>
+          <p:nvPr>
+            <p:ph type="title"/>
+          </p:nvPr>
+        </p:nvSpPr>
+        <p:spPr/>
+        <p:txBody>
+          <a:bodyPr>
+            <a:normAutofit fontScale="90000"/>
+          </a:bodyPr>
+          <a:lstStyle/>
+          <a:p>
+            <a:r>
+              <a:rPr lang="pl-PL" sz="4000" dirty="0"/>
+              <a:t>Przykład nr 4</a:t>
+            </a:r>
+            <a:r>
+              <a:rPr lang="pl-PL" sz="4000" dirty="0" smtClean="0"/>
+              <a:t> </a:t>
+            </a:r>
+            <a:r>
+              <a:rPr lang="pl-PL" sz="4000" dirty="0"/>
+              <a:t>– </a:t>
+            </a:r>
+            <a:r>
+              <a:rPr lang="pl-PL" sz="4000" dirty="0" err="1" smtClean="0"/>
+              <a:t>QueryFirstOrDefault</a:t>
+            </a:r>
+            <a:endParaRPr lang="pl-PL" dirty="0"/>
+          </a:p>
+        </p:txBody>
+      </p:sp>
+    </p:spTree>
+    <p:extLst>
+      <p:ext uri="{BB962C8B-B14F-4D97-AF65-F5344CB8AC3E}">
+        <p14:creationId xmlns:p14="http://schemas.microsoft.com/office/powerpoint/2010/main" val="2881835010"/>
+      </p:ext>
+    </p:extLst>
+  </p:cSld>
+  <p:clrMapOvr>
+    <a:masterClrMapping/>
+  </p:clrMapOvr>
+  <p:transition spd="slow">
+    <p:push dir="u"/>
+  </p:transition>
+  <p:timing>
+    <p:tnLst>
+      <p:par>
+        <p:cTn id="1" dur="indefinite" restart="never" nodeType="tmRoot"/>
+      </p:par>
+    </p:tnLst>
+  </p:timing>
+</p:sld>
+</file>
+
+<file path=ppt/slides/slide21.xml><?xml version="1.0" encoding="utf-8"?>
+<p:sld xmlns:a="http://schemas.openxmlformats.org/drawingml/2006/main" xmlns:r="http://schemas.openxmlformats.org/officeDocument/2006/relationships" xmlns:p="http://schemas.openxmlformats.org/presentationml/2006/main">
+  <p:cSld>
+    <p:spTree>
+      <p:nvGrpSpPr>
+        <p:cNvPr id="1" name=""/>
+        <p:cNvGrpSpPr/>
+        <p:nvPr/>
+      </p:nvGrpSpPr>
+      <p:grpSpPr>
+        <a:xfrm>
+          <a:off x="0" y="0"/>
+          <a:ext cx="0" cy="0"/>
+          <a:chOff x="0" y="0"/>
+          <a:chExt cx="0" cy="0"/>
+        </a:xfrm>
+      </p:grpSpPr>
+      <p:sp>
+        <p:nvSpPr>
+          <p:cNvPr id="3" name="Symbol zastępczy zawartości 2"/>
+          <p:cNvSpPr>
+            <a:spLocks noGrp="1"/>
+          </p:cNvSpPr>
+          <p:nvPr>
+            <p:ph idx="1"/>
+          </p:nvPr>
+        </p:nvSpPr>
+        <p:spPr/>
+        <p:txBody>
+          <a:bodyPr>
+            <a:normAutofit lnSpcReduction="10000"/>
+          </a:bodyPr>
+          <a:lstStyle/>
+          <a:p>
+            <a:pPr marL="109728" indent="0">
+              <a:buNone/>
+            </a:pPr>
+            <a:r>
+              <a:rPr lang="pl-PL" dirty="0" smtClean="0"/>
+              <a:t>Przedstawione materiały szkoleniowe, prezentacja wraz z konspektem, projekt użyty do prezentacji i warsztatów jest własnością intelektualną szkolących Michała Gwóźdź oraz Łukasza Szustaka.</a:t>
+            </a:r>
+          </a:p>
+          <a:p>
+            <a:pPr marL="109728" indent="0">
+              <a:buNone/>
+            </a:pPr>
+            <a:r>
+              <a:rPr lang="pl-PL" dirty="0" smtClean="0"/>
+              <a:t>Wykorzystanie bez zgody twórców któregokolwiek materiału do innych celów niż samokształcenie osoby szkolonej, takie jak upublicznianie, cytowanie lub inna forma redystrybucji jest jawnym naruszeniem praw autorskich.</a:t>
+            </a:r>
+            <a:endParaRPr lang="pl-PL" dirty="0"/>
+          </a:p>
+        </p:txBody>
+      </p:sp>
+      <p:sp>
+        <p:nvSpPr>
+          <p:cNvPr id="2" name="Tytuł 1"/>
+          <p:cNvSpPr>
+            <a:spLocks noGrp="1"/>
+          </p:cNvSpPr>
+          <p:nvPr>
+            <p:ph type="title"/>
+          </p:nvPr>
+        </p:nvSpPr>
+        <p:spPr/>
+        <p:txBody>
+          <a:bodyPr/>
+          <a:lstStyle/>
+          <a:p>
+            <a:r>
+              <a:rPr lang="pl-PL" dirty="0" smtClean="0"/>
+              <a:t>Słowo końcowe</a:t>
+            </a:r>
+            <a:endParaRPr lang="pl-PL" dirty="0"/>
+          </a:p>
+        </p:txBody>
+      </p:sp>
+    </p:spTree>
+    <p:extLst>
+      <p:ext uri="{BB962C8B-B14F-4D97-AF65-F5344CB8AC3E}">
+        <p14:creationId xmlns:p14="http://schemas.microsoft.com/office/powerpoint/2010/main" val="3785988704"/>
+      </p:ext>
+    </p:extLst>
+  </p:cSld>
+  <p:clrMapOvr>
+    <a:masterClrMapping/>
+  </p:clrMapOvr>
+  <p:transition spd="slow">
+    <p:push dir="u"/>
+  </p:transition>
+  <p:timing>
+    <p:tnLst>
+      <p:par>
+        <p:cTn id="1" dur="indefinite" restart="never" nodeType="tmRoot">
+          <p:childTnLst>
+            <p:seq concurrent="1" nextAc="seek">
+              <p:cTn id="2" dur="indefinite" nodeType="mainSeq">
+                <p:childTnLst>
+                  <p:par>
+                    <p:cTn id="3" fill="hold">
+                      <p:stCondLst>
+                        <p:cond delay="indefinite"/>
+                      </p:stCondLst>
+                      <p:childTnLst>
+                        <p:par>
+                          <p:cTn id="4" fill="hold">
+                            <p:stCondLst>
+                              <p:cond delay="0"/>
+                            </p:stCondLst>
+                            <p:childTnLst>
+                              <p:par>
+                                <p:cTn id="5" presetID="2" presetClass="entr" presetSubtype="4" fill="hold" nodeType="clickEffect">
+                                  <p:stCondLst>
+                                    <p:cond delay="0"/>
+                                  </p:stCondLst>
+                                  <p:childTnLst>
+                                    <p:set>
+                                      <p:cBhvr>
+                                        <p:cTn id="6" dur="1" fill="hold">
+                                          <p:stCondLst>
+                                            <p:cond delay="0"/>
+                                          </p:stCondLst>
+                                        </p:cTn>
+                                        <p:tgtEl>
+                                          <p:spTgt spid="3">
+                                            <p:txEl>
+                                              <p:pRg st="0" end="0"/>
+                                            </p:txEl>
+                                          </p:spTgt>
+                                        </p:tgtEl>
+                                        <p:attrNameLst>
+                                          <p:attrName>style.visibility</p:attrName>
+                                        </p:attrNameLst>
+                                      </p:cBhvr>
+                                      <p:to>
+                                        <p:strVal val="visible"/>
+                                      </p:to>
+                                    </p:set>
+                                    <p:anim calcmode="lin" valueType="num">
+                                      <p:cBhvr additive="base">
+                                        <p:cTn id="7" dur="500" fill="hold"/>
+                                        <p:tgtEl>
+                                          <p:spTgt spid="3">
+                                            <p:txEl>
+                                              <p:pRg st="0" end="0"/>
+                                            </p:txEl>
+                                          </p:spTgt>
+                                        </p:tgtEl>
+                                        <p:attrNameLst>
+                                          <p:attrName>ppt_x</p:attrName>
+                                        </p:attrNameLst>
+                                      </p:cBhvr>
+                                      <p:tavLst>
+                                        <p:tav tm="0">
+                                          <p:val>
+                                            <p:strVal val="#ppt_x"/>
+                                          </p:val>
+                                        </p:tav>
+                                        <p:tav tm="100000">
+                                          <p:val>
+                                            <p:strVal val="#ppt_x"/>
+                                          </p:val>
+                                        </p:tav>
+                                      </p:tavLst>
+                                    </p:anim>
+                                    <p:anim calcmode="lin" valueType="num">
+                                      <p:cBhvr additive="base">
+                                        <p:cTn id="8" dur="500" fill="hold"/>
+                                        <p:tgtEl>
+                                          <p:spTgt spid="3">
+                                            <p:txEl>
+                                              <p:pRg st="0" end="0"/>
+                                            </p:txEl>
+                                          </p:spTgt>
+                                        </p:tgtEl>
+                                        <p:attrNameLst>
+                                          <p:attrName>ppt_y</p:attrName>
+                                        </p:attrNameLst>
+                                      </p:cBhvr>
+                                      <p:tavLst>
+                                        <p:tav tm="0">
+                                          <p:val>
+                                            <p:strVal val="1+#ppt_h/2"/>
+                                          </p:val>
+                                        </p:tav>
+                                        <p:tav tm="100000">
+                                          <p:val>
+                                            <p:strVal val="#ppt_y"/>
+                                          </p:val>
+                                        </p:tav>
+                                      </p:tavLst>
+                                    </p:anim>
+                                  </p:childTnLst>
+                                </p:cTn>
+                              </p:par>
+                            </p:childTnLst>
+                          </p:cTn>
+                        </p:par>
+                      </p:childTnLst>
+                    </p:cTn>
+                  </p:par>
+                  <p:par>
+                    <p:cTn id="9" fill="hold">
+                      <p:stCondLst>
+                        <p:cond delay="indefinite"/>
+                      </p:stCondLst>
+                      <p:childTnLst>
+                        <p:par>
+                          <p:cTn id="10" fill="hold">
+                            <p:stCondLst>
+                              <p:cond delay="0"/>
+                            </p:stCondLst>
+                            <p:childTnLst>
+                              <p:par>
+                                <p:cTn id="11" presetID="2" presetClass="entr" presetSubtype="4" fill="hold" nodeType="clickEffect">
+                                  <p:stCondLst>
+                                    <p:cond delay="0"/>
+                                  </p:stCondLst>
+                                  <p:childTnLst>
+                                    <p:set>
+                                      <p:cBhvr>
+                                        <p:cTn id="12" dur="1" fill="hold">
+                                          <p:stCondLst>
+                                            <p:cond delay="0"/>
+                                          </p:stCondLst>
+                                        </p:cTn>
+                                        <p:tgtEl>
+                                          <p:spTgt spid="3">
+                                            <p:txEl>
+                                              <p:pRg st="1" end="1"/>
+                                            </p:txEl>
+                                          </p:spTgt>
+                                        </p:tgtEl>
+                                        <p:attrNameLst>
+                                          <p:attrName>style.visibility</p:attrName>
+                                        </p:attrNameLst>
+                                      </p:cBhvr>
+                                      <p:to>
+                                        <p:strVal val="visible"/>
+                                      </p:to>
+                                    </p:set>
+                                    <p:anim calcmode="lin" valueType="num">
+                                      <p:cBhvr additive="base">
+                                        <p:cTn id="13" dur="500" fill="hold"/>
+                                        <p:tgtEl>
+                                          <p:spTgt spid="3">
+                                            <p:txEl>
+                                              <p:pRg st="1" end="1"/>
+                                            </p:txEl>
+                                          </p:spTgt>
+                                        </p:tgtEl>
+                                        <p:attrNameLst>
+                                          <p:attrName>ppt_x</p:attrName>
+                                        </p:attrNameLst>
+                                      </p:cBhvr>
+                                      <p:tavLst>
+                                        <p:tav tm="0">
+                                          <p:val>
+                                            <p:strVal val="#ppt_x"/>
+                                          </p:val>
+                                        </p:tav>
+                                        <p:tav tm="100000">
+                                          <p:val>
+                                            <p:strVal val="#ppt_x"/>
+                                          </p:val>
+                                        </p:tav>
+                                      </p:tavLst>
+                                    </p:anim>
+                                    <p:anim calcmode="lin" valueType="num">
+                                      <p:cBhvr additive="base">
+                                        <p:cTn id="14" dur="500" fill="hold"/>
+                                        <p:tgtEl>
+                                          <p:spTgt spid="3">
+                                            <p:txEl>
+                                              <p:pRg st="1" end="1"/>
+                                            </p:txEl>
+                                          </p:spTgt>
+                                        </p:tgtEl>
+                                        <p:attrNameLst>
+                                          <p:attrName>ppt_y</p:attrName>
+                                        </p:attrNameLst>
+                                      </p:cBhvr>
+                                      <p:tavLst>
+                                        <p:tav tm="0">
+                                          <p:val>
+                                            <p:strVal val="1+#ppt_h/2"/>
+                                          </p:val>
+                                        </p:tav>
+                                        <p:tav tm="100000">
+                                          <p:val>
+                                            <p:strVal val="#ppt_y"/>
+                                          </p:val>
+                                        </p:tav>
+                                      </p:tavLst>
+                                    </p:anim>
+                                  </p:childTnLst>
+                                </p:cTn>
+                              </p:par>
+                            </p:childTnLst>
+                          </p:cTn>
+                        </p:par>
+                      </p:childTnLst>
+                    </p:cTn>
+                  </p:par>
+                </p:childTnLst>
+              </p:cTn>
+              <p:prevCondLst>
+                <p:cond evt="onPrev" delay="0">
+                  <p:tgtEl>
+                    <p:sldTgt/>
+                  </p:tgtEl>
+                </p:cond>
+              </p:prevCondLst>
+              <p:nextCondLst>
+                <p:cond evt="onNext" delay="0">
+                  <p:tgtEl>
+                    <p:sldTgt/>
+                  </p:tgtEl>
+                </p:cond>
+              </p:nextCondLst>
+            </p:seq>
+          </p:childTnLst>
+        </p:cTn>
+      </p:par>
+    </p:tnLst>
   </p:timing>
 </p:sld>
 </file>

</xml_diff>

<commit_message>
presentation - added anonymous parameter
</commit_message>
<xml_diff>
--- a/Files/Szkolenie warsztatowe Dapper.pptx
+++ b/Files/Szkolenie warsztatowe Dapper.pptx
@@ -31,7 +31,12 @@
     <p:sldId id="280" r:id="rId25"/>
     <p:sldId id="281" r:id="rId26"/>
     <p:sldId id="282" r:id="rId27"/>
-    <p:sldId id="257" r:id="rId28"/>
+    <p:sldId id="283" r:id="rId28"/>
+    <p:sldId id="284" r:id="rId29"/>
+    <p:sldId id="285" r:id="rId30"/>
+    <p:sldId id="286" r:id="rId31"/>
+    <p:sldId id="287" r:id="rId32"/>
+    <p:sldId id="257" r:id="rId33"/>
   </p:sldIdLst>
   <p:sldSz cx="9144000" cy="6858000" type="screen4x3"/>
   <p:notesSz cx="6858000" cy="9144000"/>
@@ -132,7 +137,7 @@
   </p:defaultTextStyle>
   <p:extLst>
     <p:ext uri="{EFAFB233-063F-42B5-8137-9DF3F51BA10A}">
-      <p15:sldGuideLst xmlns:p15="http://schemas.microsoft.com/office/powerpoint/2012/main" xmlns="">
+      <p15:sldGuideLst xmlns="" xmlns:p15="http://schemas.microsoft.com/office/powerpoint/2012/main">
         <p15:guide id="1" orient="horz" pos="2160">
           <p15:clr>
             <a:srgbClr val="A4A3A4"/>
@@ -766,7 +771,7 @@
           <a:p>
             <a:fld id="{16640E76-C82D-4E8C-B2F3-167F39B211B3}" type="datetimeFigureOut">
               <a:rPr lang="pl-PL" smtClean="0"/>
-              <a:t>05.11.2017</a:t>
+              <a:t>11.11.2017</a:t>
             </a:fld>
             <a:endParaRPr lang="pl-PL"/>
           </a:p>
@@ -959,7 +964,7 @@
           <a:p>
             <a:fld id="{16640E76-C82D-4E8C-B2F3-167F39B211B3}" type="datetimeFigureOut">
               <a:rPr lang="pl-PL" smtClean="0"/>
-              <a:t>05.11.2017</a:t>
+              <a:t>11.11.2017</a:t>
             </a:fld>
             <a:endParaRPr lang="pl-PL"/>
           </a:p>
@@ -1137,7 +1142,7 @@
           <a:p>
             <a:fld id="{16640E76-C82D-4E8C-B2F3-167F39B211B3}" type="datetimeFigureOut">
               <a:rPr lang="pl-PL" smtClean="0"/>
-              <a:t>05.11.2017</a:t>
+              <a:t>11.11.2017</a:t>
             </a:fld>
             <a:endParaRPr lang="pl-PL"/>
           </a:p>
@@ -1282,7 +1287,7 @@
           <a:p>
             <a:fld id="{16640E76-C82D-4E8C-B2F3-167F39B211B3}" type="datetimeFigureOut">
               <a:rPr lang="pl-PL" smtClean="0"/>
-              <a:t>05.11.2017</a:t>
+              <a:t>11.11.2017</a:t>
             </a:fld>
             <a:endParaRPr lang="pl-PL"/>
           </a:p>
@@ -1532,7 +1537,7 @@
           <a:p>
             <a:fld id="{16640E76-C82D-4E8C-B2F3-167F39B211B3}" type="datetimeFigureOut">
               <a:rPr lang="pl-PL" smtClean="0"/>
-              <a:t>05.11.2017</a:t>
+              <a:t>11.11.2017</a:t>
             </a:fld>
             <a:endParaRPr lang="pl-PL"/>
           </a:p>
@@ -1934,7 +1939,7 @@
           <a:p>
             <a:fld id="{16640E76-C82D-4E8C-B2F3-167F39B211B3}" type="datetimeFigureOut">
               <a:rPr lang="pl-PL" smtClean="0"/>
-              <a:t>05.11.2017</a:t>
+              <a:t>11.11.2017</a:t>
             </a:fld>
             <a:endParaRPr lang="pl-PL"/>
           </a:p>
@@ -2375,7 +2380,7 @@
           <a:p>
             <a:fld id="{16640E76-C82D-4E8C-B2F3-167F39B211B3}" type="datetimeFigureOut">
               <a:rPr lang="pl-PL" smtClean="0"/>
-              <a:t>05.11.2017</a:t>
+              <a:t>11.11.2017</a:t>
             </a:fld>
             <a:endParaRPr lang="pl-PL"/>
           </a:p>
@@ -2473,7 +2478,7 @@
           <a:p>
             <a:fld id="{16640E76-C82D-4E8C-B2F3-167F39B211B3}" type="datetimeFigureOut">
               <a:rPr lang="pl-PL" smtClean="0"/>
-              <a:t>05.11.2017</a:t>
+              <a:t>11.11.2017</a:t>
             </a:fld>
             <a:endParaRPr lang="pl-PL"/>
           </a:p>
@@ -2589,7 +2594,7 @@
           <a:p>
             <a:fld id="{16640E76-C82D-4E8C-B2F3-167F39B211B3}" type="datetimeFigureOut">
               <a:rPr lang="pl-PL" smtClean="0"/>
-              <a:t>05.11.2017</a:t>
+              <a:t>11.11.2017</a:t>
             </a:fld>
             <a:endParaRPr lang="pl-PL"/>
           </a:p>
@@ -2860,7 +2865,7 @@
           <a:p>
             <a:fld id="{16640E76-C82D-4E8C-B2F3-167F39B211B3}" type="datetimeFigureOut">
               <a:rPr lang="pl-PL" smtClean="0"/>
-              <a:t>05.11.2017</a:t>
+              <a:t>11.11.2017</a:t>
             </a:fld>
             <a:endParaRPr lang="pl-PL"/>
           </a:p>
@@ -3064,7 +3069,7 @@
           <a:p>
             <a:fld id="{16640E76-C82D-4E8C-B2F3-167F39B211B3}" type="datetimeFigureOut">
               <a:rPr lang="pl-PL" smtClean="0"/>
-              <a:t>05.11.2017</a:t>
+              <a:t>11.11.2017</a:t>
             </a:fld>
             <a:endParaRPr lang="pl-PL"/>
           </a:p>
@@ -4156,7 +4161,7 @@
           <a:p>
             <a:fld id="{16640E76-C82D-4E8C-B2F3-167F39B211B3}" type="datetimeFigureOut">
               <a:rPr lang="pl-PL" smtClean="0"/>
-              <a:t>05.11.2017</a:t>
+              <a:t>11.11.2017</a:t>
             </a:fld>
             <a:endParaRPr lang="pl-PL"/>
           </a:p>
@@ -14887,8 +14892,29 @@
           <a:p>
             <a:r>
               <a:rPr lang="pl-PL" dirty="0" smtClean="0"/>
-              <a:t>Może mapować na obiekt silnie typowany lub anonimowy</a:t>
-            </a:r>
+              <a:t>Może mapować na </a:t>
+            </a:r>
+            <a:r>
+              <a:rPr lang="pl-PL" dirty="0" smtClean="0"/>
+              <a:t>obiekty </a:t>
+            </a:r>
+            <a:r>
+              <a:rPr lang="pl-PL" dirty="0" smtClean="0"/>
+              <a:t>silnie </a:t>
+            </a:r>
+            <a:r>
+              <a:rPr lang="pl-PL" dirty="0" smtClean="0"/>
+              <a:t>typowane </a:t>
+            </a:r>
+            <a:r>
+              <a:rPr lang="pl-PL" dirty="0" smtClean="0"/>
+              <a:t>lub </a:t>
+            </a:r>
+            <a:r>
+              <a:rPr lang="pl-PL" dirty="0" smtClean="0"/>
+              <a:t>\ i anonimowe</a:t>
+            </a:r>
+            <a:endParaRPr lang="pl-PL" dirty="0" smtClean="0"/>
           </a:p>
           <a:p>
             <a:r>
@@ -16324,7 +16350,7 @@
       </p:grpSpPr>
       <p:sp>
         <p:nvSpPr>
-          <p:cNvPr id="3" name="Symbol zastępczy zawartości 2"/>
+          <p:cNvPr id="2" name="Symbol zastępczy zawartości 1"/>
           <p:cNvSpPr>
             <a:spLocks noGrp="1"/>
           </p:cNvSpPr>
@@ -16334,26 +16360,48 @@
         </p:nvSpPr>
         <p:spPr/>
         <p:txBody>
-          <a:bodyPr>
-            <a:normAutofit lnSpcReduction="10000"/>
-          </a:bodyPr>
+          <a:bodyPr/>
           <a:lstStyle/>
           <a:p>
-            <a:pPr marL="109728" indent="0">
-              <a:buNone/>
-            </a:pPr>
             <a:r>
               <a:rPr lang="pl-PL" dirty="0" smtClean="0"/>
-              <a:t>Przedstawione materiały szkoleniowe, prezentacja wraz z konspektem, projekt użyty do prezentacji i warsztatów jest własnością intelektualną szkolących Michała Gwóźdź oraz Łukasza Szustaka.</a:t>
-            </a:r>
-          </a:p>
-          <a:p>
-            <a:pPr marL="109728" indent="0">
-              <a:buNone/>
-            </a:pPr>
+              <a:t>Jakie znacie metody?</a:t>
+            </a:r>
+          </a:p>
+          <a:p>
             <a:r>
               <a:rPr lang="pl-PL" dirty="0" smtClean="0"/>
-              <a:t>Wykorzystanie bez zgody twórców któregokolwiek materiału do innych celów niż samokształcenie osoby szkolonej, takie jak upublicznianie, cytowanie lub inna forma redystrybucji jest jawnym naruszeniem praw autorskich.</a:t>
+              <a:t>Anonimowe</a:t>
+            </a:r>
+          </a:p>
+          <a:p>
+            <a:r>
+              <a:rPr lang="pl-PL" dirty="0" smtClean="0"/>
+              <a:t>Dynamiczne</a:t>
+            </a:r>
+          </a:p>
+          <a:p>
+            <a:r>
+              <a:rPr lang="pl-PL" dirty="0" smtClean="0"/>
+              <a:t>Obiektowe</a:t>
+            </a:r>
+          </a:p>
+          <a:p>
+            <a:r>
+              <a:rPr lang="pl-PL" dirty="0" smtClean="0"/>
+              <a:t>Lista obiektów</a:t>
+            </a:r>
+          </a:p>
+          <a:p>
+            <a:r>
+              <a:rPr lang="pl-PL" dirty="0" smtClean="0"/>
+              <a:t>Ciąg znaków</a:t>
+            </a:r>
+          </a:p>
+          <a:p>
+            <a:r>
+              <a:rPr lang="pl-PL" dirty="0" smtClean="0"/>
+              <a:t>Które z powyższych metod są najlepsze i dlaczego?</a:t>
             </a:r>
             <a:endParaRPr lang="pl-PL" dirty="0"/>
           </a:p>
@@ -16361,7 +16409,7 @@
       </p:sp>
       <p:sp>
         <p:nvSpPr>
-          <p:cNvPr id="2" name="Tytuł 1"/>
+          <p:cNvPr id="3" name="Tytuł 2"/>
           <p:cNvSpPr>
             <a:spLocks noGrp="1"/>
           </p:cNvSpPr>
@@ -16371,12 +16419,14 @@
         </p:nvSpPr>
         <p:spPr/>
         <p:txBody>
-          <a:bodyPr/>
+          <a:bodyPr>
+            <a:normAutofit fontScale="90000"/>
+          </a:bodyPr>
           <a:lstStyle/>
           <a:p>
             <a:r>
-              <a:rPr lang="pl-PL" dirty="0" smtClean="0"/>
-              <a:t>Słowo końcowe</a:t>
+              <a:rPr lang="pl-PL" sz="4000" dirty="0" smtClean="0"/>
+              <a:t>Metody przekazywania parametrów</a:t>
             </a:r>
             <a:endParaRPr lang="pl-PL" dirty="0"/>
           </a:p>
@@ -16385,7 +16435,7 @@
     </p:spTree>
     <p:extLst>
       <p:ext uri="{BB962C8B-B14F-4D97-AF65-F5344CB8AC3E}">
-        <p14:creationId xmlns:p14="http://schemas.microsoft.com/office/powerpoint/2010/main" val="3785988704"/>
+        <p14:creationId xmlns:p14="http://schemas.microsoft.com/office/powerpoint/2010/main" val="3352368911"/>
       </p:ext>
     </p:extLst>
   </p:cSld>
@@ -16429,7 +16479,7 @@
                                           </p:stCondLst>
                                         </p:cTn>
                                         <p:tgtEl>
-                                          <p:spTgt spid="3">
+                                          <p:spTgt spid="2">
                                             <p:txEl>
                                               <p:pRg st="0" end="0"/>
                                             </p:txEl>
@@ -16447,7 +16497,7 @@
                                       <p:cBhvr additive="base">
                                         <p:cTn id="7" dur="500" fill="hold"/>
                                         <p:tgtEl>
-                                          <p:spTgt spid="3">
+                                          <p:spTgt spid="2">
                                             <p:txEl>
                                               <p:pRg st="0" end="0"/>
                                             </p:txEl>
@@ -16474,7 +16524,7 @@
                                       <p:cBhvr additive="base">
                                         <p:cTn id="8" dur="500" fill="hold"/>
                                         <p:tgtEl>
-                                          <p:spTgt spid="3">
+                                          <p:spTgt spid="2">
                                             <p:txEl>
                                               <p:pRg st="0" end="0"/>
                                             </p:txEl>
@@ -16532,7 +16582,7 @@
                                           </p:stCondLst>
                                         </p:cTn>
                                         <p:tgtEl>
-                                          <p:spTgt spid="3">
+                                          <p:spTgt spid="2">
                                             <p:txEl>
                                               <p:pRg st="1" end="1"/>
                                             </p:txEl>
@@ -16550,7 +16600,7 @@
                                       <p:cBhvr additive="base">
                                         <p:cTn id="13" dur="500" fill="hold"/>
                                         <p:tgtEl>
-                                          <p:spTgt spid="3">
+                                          <p:spTgt spid="2">
                                             <p:txEl>
                                               <p:pRg st="1" end="1"/>
                                             </p:txEl>
@@ -16577,11 +16627,2093 @@
                                       <p:cBhvr additive="base">
                                         <p:cTn id="14" dur="500" fill="hold"/>
                                         <p:tgtEl>
-                                          <p:spTgt spid="3">
+                                          <p:spTgt spid="2">
                                             <p:txEl>
                                               <p:pRg st="1" end="1"/>
                                             </p:txEl>
                                           </p:spTgt>
+                                        </p:tgtEl>
+                                        <p:attrNameLst>
+                                          <p:attrName>ppt_y</p:attrName>
+                                        </p:attrNameLst>
+                                      </p:cBhvr>
+                                      <p:tavLst>
+                                        <p:tav tm="0">
+                                          <p:val>
+                                            <p:strVal val="1+#ppt_h/2"/>
+                                          </p:val>
+                                        </p:tav>
+                                        <p:tav tm="100000">
+                                          <p:val>
+                                            <p:strVal val="#ppt_y"/>
+                                          </p:val>
+                                        </p:tav>
+                                      </p:tavLst>
+                                    </p:anim>
+                                  </p:childTnLst>
+                                </p:cTn>
+                              </p:par>
+                            </p:childTnLst>
+                          </p:cTn>
+                        </p:par>
+                      </p:childTnLst>
+                    </p:cTn>
+                  </p:par>
+                  <p:par>
+                    <p:cTn id="15" fill="hold">
+                      <p:stCondLst>
+                        <p:cond delay="indefinite"/>
+                      </p:stCondLst>
+                      <p:childTnLst>
+                        <p:par>
+                          <p:cTn id="16" fill="hold">
+                            <p:stCondLst>
+                              <p:cond delay="0"/>
+                            </p:stCondLst>
+                            <p:childTnLst>
+                              <p:par>
+                                <p:cTn id="17" presetID="2" presetClass="entr" presetSubtype="4" fill="hold" nodeType="clickEffect">
+                                  <p:stCondLst>
+                                    <p:cond delay="0"/>
+                                  </p:stCondLst>
+                                  <p:childTnLst>
+                                    <p:set>
+                                      <p:cBhvr>
+                                        <p:cTn id="18" dur="1" fill="hold">
+                                          <p:stCondLst>
+                                            <p:cond delay="0"/>
+                                          </p:stCondLst>
+                                        </p:cTn>
+                                        <p:tgtEl>
+                                          <p:spTgt spid="2">
+                                            <p:txEl>
+                                              <p:pRg st="2" end="2"/>
+                                            </p:txEl>
+                                          </p:spTgt>
+                                        </p:tgtEl>
+                                        <p:attrNameLst>
+                                          <p:attrName>style.visibility</p:attrName>
+                                        </p:attrNameLst>
+                                      </p:cBhvr>
+                                      <p:to>
+                                        <p:strVal val="visible"/>
+                                      </p:to>
+                                    </p:set>
+                                    <p:anim calcmode="lin" valueType="num">
+                                      <p:cBhvr additive="base">
+                                        <p:cTn id="19" dur="500" fill="hold"/>
+                                        <p:tgtEl>
+                                          <p:spTgt spid="2">
+                                            <p:txEl>
+                                              <p:pRg st="2" end="2"/>
+                                            </p:txEl>
+                                          </p:spTgt>
+                                        </p:tgtEl>
+                                        <p:attrNameLst>
+                                          <p:attrName>ppt_x</p:attrName>
+                                        </p:attrNameLst>
+                                      </p:cBhvr>
+                                      <p:tavLst>
+                                        <p:tav tm="0">
+                                          <p:val>
+                                            <p:strVal val="#ppt_x"/>
+                                          </p:val>
+                                        </p:tav>
+                                        <p:tav tm="100000">
+                                          <p:val>
+                                            <p:strVal val="#ppt_x"/>
+                                          </p:val>
+                                        </p:tav>
+                                      </p:tavLst>
+                                    </p:anim>
+                                    <p:anim calcmode="lin" valueType="num">
+                                      <p:cBhvr additive="base">
+                                        <p:cTn id="20" dur="500" fill="hold"/>
+                                        <p:tgtEl>
+                                          <p:spTgt spid="2">
+                                            <p:txEl>
+                                              <p:pRg st="2" end="2"/>
+                                            </p:txEl>
+                                          </p:spTgt>
+                                        </p:tgtEl>
+                                        <p:attrNameLst>
+                                          <p:attrName>ppt_y</p:attrName>
+                                        </p:attrNameLst>
+                                      </p:cBhvr>
+                                      <p:tavLst>
+                                        <p:tav tm="0">
+                                          <p:val>
+                                            <p:strVal val="1+#ppt_h/2"/>
+                                          </p:val>
+                                        </p:tav>
+                                        <p:tav tm="100000">
+                                          <p:val>
+                                            <p:strVal val="#ppt_y"/>
+                                          </p:val>
+                                        </p:tav>
+                                      </p:tavLst>
+                                    </p:anim>
+                                  </p:childTnLst>
+                                </p:cTn>
+                              </p:par>
+                            </p:childTnLst>
+                          </p:cTn>
+                        </p:par>
+                      </p:childTnLst>
+                    </p:cTn>
+                  </p:par>
+                  <p:par>
+                    <p:cTn id="21" fill="hold">
+                      <p:stCondLst>
+                        <p:cond delay="indefinite"/>
+                      </p:stCondLst>
+                      <p:childTnLst>
+                        <p:par>
+                          <p:cTn id="22" fill="hold">
+                            <p:stCondLst>
+                              <p:cond delay="0"/>
+                            </p:stCondLst>
+                            <p:childTnLst>
+                              <p:par>
+                                <p:cTn id="23" presetID="2" presetClass="entr" presetSubtype="4" fill="hold" nodeType="clickEffect">
+                                  <p:stCondLst>
+                                    <p:cond delay="0"/>
+                                  </p:stCondLst>
+                                  <p:childTnLst>
+                                    <p:set>
+                                      <p:cBhvr>
+                                        <p:cTn id="24" dur="1" fill="hold">
+                                          <p:stCondLst>
+                                            <p:cond delay="0"/>
+                                          </p:stCondLst>
+                                        </p:cTn>
+                                        <p:tgtEl>
+                                          <p:spTgt spid="2">
+                                            <p:txEl>
+                                              <p:pRg st="3" end="3"/>
+                                            </p:txEl>
+                                          </p:spTgt>
+                                        </p:tgtEl>
+                                        <p:attrNameLst>
+                                          <p:attrName>style.visibility</p:attrName>
+                                        </p:attrNameLst>
+                                      </p:cBhvr>
+                                      <p:to>
+                                        <p:strVal val="visible"/>
+                                      </p:to>
+                                    </p:set>
+                                    <p:anim calcmode="lin" valueType="num">
+                                      <p:cBhvr additive="base">
+                                        <p:cTn id="25" dur="500" fill="hold"/>
+                                        <p:tgtEl>
+                                          <p:spTgt spid="2">
+                                            <p:txEl>
+                                              <p:pRg st="3" end="3"/>
+                                            </p:txEl>
+                                          </p:spTgt>
+                                        </p:tgtEl>
+                                        <p:attrNameLst>
+                                          <p:attrName>ppt_x</p:attrName>
+                                        </p:attrNameLst>
+                                      </p:cBhvr>
+                                      <p:tavLst>
+                                        <p:tav tm="0">
+                                          <p:val>
+                                            <p:strVal val="#ppt_x"/>
+                                          </p:val>
+                                        </p:tav>
+                                        <p:tav tm="100000">
+                                          <p:val>
+                                            <p:strVal val="#ppt_x"/>
+                                          </p:val>
+                                        </p:tav>
+                                      </p:tavLst>
+                                    </p:anim>
+                                    <p:anim calcmode="lin" valueType="num">
+                                      <p:cBhvr additive="base">
+                                        <p:cTn id="26" dur="500" fill="hold"/>
+                                        <p:tgtEl>
+                                          <p:spTgt spid="2">
+                                            <p:txEl>
+                                              <p:pRg st="3" end="3"/>
+                                            </p:txEl>
+                                          </p:spTgt>
+                                        </p:tgtEl>
+                                        <p:attrNameLst>
+                                          <p:attrName>ppt_y</p:attrName>
+                                        </p:attrNameLst>
+                                      </p:cBhvr>
+                                      <p:tavLst>
+                                        <p:tav tm="0">
+                                          <p:val>
+                                            <p:strVal val="1+#ppt_h/2"/>
+                                          </p:val>
+                                        </p:tav>
+                                        <p:tav tm="100000">
+                                          <p:val>
+                                            <p:strVal val="#ppt_y"/>
+                                          </p:val>
+                                        </p:tav>
+                                      </p:tavLst>
+                                    </p:anim>
+                                  </p:childTnLst>
+                                </p:cTn>
+                              </p:par>
+                            </p:childTnLst>
+                          </p:cTn>
+                        </p:par>
+                      </p:childTnLst>
+                    </p:cTn>
+                  </p:par>
+                  <p:par>
+                    <p:cTn id="27" fill="hold">
+                      <p:stCondLst>
+                        <p:cond delay="indefinite"/>
+                      </p:stCondLst>
+                      <p:childTnLst>
+                        <p:par>
+                          <p:cTn id="28" fill="hold">
+                            <p:stCondLst>
+                              <p:cond delay="0"/>
+                            </p:stCondLst>
+                            <p:childTnLst>
+                              <p:par>
+                                <p:cTn id="29" presetID="2" presetClass="entr" presetSubtype="4" fill="hold" nodeType="clickEffect">
+                                  <p:stCondLst>
+                                    <p:cond delay="0"/>
+                                  </p:stCondLst>
+                                  <p:childTnLst>
+                                    <p:set>
+                                      <p:cBhvr>
+                                        <p:cTn id="30" dur="1" fill="hold">
+                                          <p:stCondLst>
+                                            <p:cond delay="0"/>
+                                          </p:stCondLst>
+                                        </p:cTn>
+                                        <p:tgtEl>
+                                          <p:spTgt spid="2">
+                                            <p:txEl>
+                                              <p:pRg st="4" end="4"/>
+                                            </p:txEl>
+                                          </p:spTgt>
+                                        </p:tgtEl>
+                                        <p:attrNameLst>
+                                          <p:attrName>style.visibility</p:attrName>
+                                        </p:attrNameLst>
+                                      </p:cBhvr>
+                                      <p:to>
+                                        <p:strVal val="visible"/>
+                                      </p:to>
+                                    </p:set>
+                                    <p:anim calcmode="lin" valueType="num">
+                                      <p:cBhvr additive="base">
+                                        <p:cTn id="31" dur="500" fill="hold"/>
+                                        <p:tgtEl>
+                                          <p:spTgt spid="2">
+                                            <p:txEl>
+                                              <p:pRg st="4" end="4"/>
+                                            </p:txEl>
+                                          </p:spTgt>
+                                        </p:tgtEl>
+                                        <p:attrNameLst>
+                                          <p:attrName>ppt_x</p:attrName>
+                                        </p:attrNameLst>
+                                      </p:cBhvr>
+                                      <p:tavLst>
+                                        <p:tav tm="0">
+                                          <p:val>
+                                            <p:strVal val="#ppt_x"/>
+                                          </p:val>
+                                        </p:tav>
+                                        <p:tav tm="100000">
+                                          <p:val>
+                                            <p:strVal val="#ppt_x"/>
+                                          </p:val>
+                                        </p:tav>
+                                      </p:tavLst>
+                                    </p:anim>
+                                    <p:anim calcmode="lin" valueType="num">
+                                      <p:cBhvr additive="base">
+                                        <p:cTn id="32" dur="500" fill="hold"/>
+                                        <p:tgtEl>
+                                          <p:spTgt spid="2">
+                                            <p:txEl>
+                                              <p:pRg st="4" end="4"/>
+                                            </p:txEl>
+                                          </p:spTgt>
+                                        </p:tgtEl>
+                                        <p:attrNameLst>
+                                          <p:attrName>ppt_y</p:attrName>
+                                        </p:attrNameLst>
+                                      </p:cBhvr>
+                                      <p:tavLst>
+                                        <p:tav tm="0">
+                                          <p:val>
+                                            <p:strVal val="1+#ppt_h/2"/>
+                                          </p:val>
+                                        </p:tav>
+                                        <p:tav tm="100000">
+                                          <p:val>
+                                            <p:strVal val="#ppt_y"/>
+                                          </p:val>
+                                        </p:tav>
+                                      </p:tavLst>
+                                    </p:anim>
+                                  </p:childTnLst>
+                                </p:cTn>
+                              </p:par>
+                            </p:childTnLst>
+                          </p:cTn>
+                        </p:par>
+                      </p:childTnLst>
+                    </p:cTn>
+                  </p:par>
+                  <p:par>
+                    <p:cTn id="33" fill="hold">
+                      <p:stCondLst>
+                        <p:cond delay="indefinite"/>
+                      </p:stCondLst>
+                      <p:childTnLst>
+                        <p:par>
+                          <p:cTn id="34" fill="hold">
+                            <p:stCondLst>
+                              <p:cond delay="0"/>
+                            </p:stCondLst>
+                            <p:childTnLst>
+                              <p:par>
+                                <p:cTn id="35" presetID="2" presetClass="entr" presetSubtype="4" fill="hold" nodeType="clickEffect">
+                                  <p:stCondLst>
+                                    <p:cond delay="0"/>
+                                  </p:stCondLst>
+                                  <p:childTnLst>
+                                    <p:set>
+                                      <p:cBhvr>
+                                        <p:cTn id="36" dur="1" fill="hold">
+                                          <p:stCondLst>
+                                            <p:cond delay="0"/>
+                                          </p:stCondLst>
+                                        </p:cTn>
+                                        <p:tgtEl>
+                                          <p:spTgt spid="2">
+                                            <p:txEl>
+                                              <p:pRg st="5" end="5"/>
+                                            </p:txEl>
+                                          </p:spTgt>
+                                        </p:tgtEl>
+                                        <p:attrNameLst>
+                                          <p:attrName>style.visibility</p:attrName>
+                                        </p:attrNameLst>
+                                      </p:cBhvr>
+                                      <p:to>
+                                        <p:strVal val="visible"/>
+                                      </p:to>
+                                    </p:set>
+                                    <p:anim calcmode="lin" valueType="num">
+                                      <p:cBhvr additive="base">
+                                        <p:cTn id="37" dur="500" fill="hold"/>
+                                        <p:tgtEl>
+                                          <p:spTgt spid="2">
+                                            <p:txEl>
+                                              <p:pRg st="5" end="5"/>
+                                            </p:txEl>
+                                          </p:spTgt>
+                                        </p:tgtEl>
+                                        <p:attrNameLst>
+                                          <p:attrName>ppt_x</p:attrName>
+                                        </p:attrNameLst>
+                                      </p:cBhvr>
+                                      <p:tavLst>
+                                        <p:tav tm="0">
+                                          <p:val>
+                                            <p:strVal val="#ppt_x"/>
+                                          </p:val>
+                                        </p:tav>
+                                        <p:tav tm="100000">
+                                          <p:val>
+                                            <p:strVal val="#ppt_x"/>
+                                          </p:val>
+                                        </p:tav>
+                                      </p:tavLst>
+                                    </p:anim>
+                                    <p:anim calcmode="lin" valueType="num">
+                                      <p:cBhvr additive="base">
+                                        <p:cTn id="38" dur="500" fill="hold"/>
+                                        <p:tgtEl>
+                                          <p:spTgt spid="2">
+                                            <p:txEl>
+                                              <p:pRg st="5" end="5"/>
+                                            </p:txEl>
+                                          </p:spTgt>
+                                        </p:tgtEl>
+                                        <p:attrNameLst>
+                                          <p:attrName>ppt_y</p:attrName>
+                                        </p:attrNameLst>
+                                      </p:cBhvr>
+                                      <p:tavLst>
+                                        <p:tav tm="0">
+                                          <p:val>
+                                            <p:strVal val="1+#ppt_h/2"/>
+                                          </p:val>
+                                        </p:tav>
+                                        <p:tav tm="100000">
+                                          <p:val>
+                                            <p:strVal val="#ppt_y"/>
+                                          </p:val>
+                                        </p:tav>
+                                      </p:tavLst>
+                                    </p:anim>
+                                  </p:childTnLst>
+                                </p:cTn>
+                              </p:par>
+                            </p:childTnLst>
+                          </p:cTn>
+                        </p:par>
+                      </p:childTnLst>
+                    </p:cTn>
+                  </p:par>
+                  <p:par>
+                    <p:cTn id="39" fill="hold">
+                      <p:stCondLst>
+                        <p:cond delay="indefinite"/>
+                      </p:stCondLst>
+                      <p:childTnLst>
+                        <p:par>
+                          <p:cTn id="40" fill="hold">
+                            <p:stCondLst>
+                              <p:cond delay="0"/>
+                            </p:stCondLst>
+                            <p:childTnLst>
+                              <p:par>
+                                <p:cTn id="41" presetID="2" presetClass="entr" presetSubtype="4" fill="hold" nodeType="clickEffect">
+                                  <p:stCondLst>
+                                    <p:cond delay="0"/>
+                                  </p:stCondLst>
+                                  <p:childTnLst>
+                                    <p:set>
+                                      <p:cBhvr>
+                                        <p:cTn id="42" dur="1" fill="hold">
+                                          <p:stCondLst>
+                                            <p:cond delay="0"/>
+                                          </p:stCondLst>
+                                        </p:cTn>
+                                        <p:tgtEl>
+                                          <p:spTgt spid="2">
+                                            <p:txEl>
+                                              <p:pRg st="6" end="6"/>
+                                            </p:txEl>
+                                          </p:spTgt>
+                                        </p:tgtEl>
+                                        <p:attrNameLst>
+                                          <p:attrName>style.visibility</p:attrName>
+                                        </p:attrNameLst>
+                                      </p:cBhvr>
+                                      <p:to>
+                                        <p:strVal val="visible"/>
+                                      </p:to>
+                                    </p:set>
+                                    <p:anim calcmode="lin" valueType="num">
+                                      <p:cBhvr additive="base">
+                                        <p:cTn id="43" dur="500" fill="hold"/>
+                                        <p:tgtEl>
+                                          <p:spTgt spid="2">
+                                            <p:txEl>
+                                              <p:pRg st="6" end="6"/>
+                                            </p:txEl>
+                                          </p:spTgt>
+                                        </p:tgtEl>
+                                        <p:attrNameLst>
+                                          <p:attrName>ppt_x</p:attrName>
+                                        </p:attrNameLst>
+                                      </p:cBhvr>
+                                      <p:tavLst>
+                                        <p:tav tm="0">
+                                          <p:val>
+                                            <p:strVal val="#ppt_x"/>
+                                          </p:val>
+                                        </p:tav>
+                                        <p:tav tm="100000">
+                                          <p:val>
+                                            <p:strVal val="#ppt_x"/>
+                                          </p:val>
+                                        </p:tav>
+                                      </p:tavLst>
+                                    </p:anim>
+                                    <p:anim calcmode="lin" valueType="num">
+                                      <p:cBhvr additive="base">
+                                        <p:cTn id="44" dur="500" fill="hold"/>
+                                        <p:tgtEl>
+                                          <p:spTgt spid="2">
+                                            <p:txEl>
+                                              <p:pRg st="6" end="6"/>
+                                            </p:txEl>
+                                          </p:spTgt>
+                                        </p:tgtEl>
+                                        <p:attrNameLst>
+                                          <p:attrName>ppt_y</p:attrName>
+                                        </p:attrNameLst>
+                                      </p:cBhvr>
+                                      <p:tavLst>
+                                        <p:tav tm="0">
+                                          <p:val>
+                                            <p:strVal val="1+#ppt_h/2"/>
+                                          </p:val>
+                                        </p:tav>
+                                        <p:tav tm="100000">
+                                          <p:val>
+                                            <p:strVal val="#ppt_y"/>
+                                          </p:val>
+                                        </p:tav>
+                                      </p:tavLst>
+                                    </p:anim>
+                                  </p:childTnLst>
+                                </p:cTn>
+                              </p:par>
+                            </p:childTnLst>
+                          </p:cTn>
+                        </p:par>
+                      </p:childTnLst>
+                    </p:cTn>
+                  </p:par>
+                </p:childTnLst>
+              </p:cTn>
+              <p:prevCondLst>
+                <p:cond evt="onPrev" delay="0">
+                  <p:tgtEl>
+                    <p:sldTgt/>
+                  </p:tgtEl>
+                </p:cond>
+              </p:prevCondLst>
+              <p:nextCondLst>
+                <p:cond evt="onNext" delay="0">
+                  <p:tgtEl>
+                    <p:sldTgt/>
+                  </p:tgtEl>
+                </p:cond>
+              </p:nextCondLst>
+            </p:seq>
+          </p:childTnLst>
+        </p:cTn>
+      </p:par>
+    </p:tnLst>
+  </p:timing>
+</p:sld>
+</file>
+
+<file path=ppt/slides/slide28.xml><?xml version="1.0" encoding="utf-8"?>
+<p:sld xmlns:a="http://schemas.openxmlformats.org/drawingml/2006/main" xmlns:r="http://schemas.openxmlformats.org/officeDocument/2006/relationships" xmlns:p="http://schemas.openxmlformats.org/presentationml/2006/main">
+  <p:cSld>
+    <p:spTree>
+      <p:nvGrpSpPr>
+        <p:cNvPr id="1" name=""/>
+        <p:cNvGrpSpPr/>
+        <p:nvPr/>
+      </p:nvGrpSpPr>
+      <p:grpSpPr>
+        <a:xfrm>
+          <a:off x="0" y="0"/>
+          <a:ext cx="0" cy="0"/>
+          <a:chOff x="0" y="0"/>
+          <a:chExt cx="0" cy="0"/>
+        </a:xfrm>
+      </p:grpSpPr>
+      <p:sp>
+        <p:nvSpPr>
+          <p:cNvPr id="2" name="Symbol zastępczy zawartości 1"/>
+          <p:cNvSpPr>
+            <a:spLocks noGrp="1"/>
+          </p:cNvSpPr>
+          <p:nvPr>
+            <p:ph idx="1"/>
+          </p:nvPr>
+        </p:nvSpPr>
+        <p:spPr/>
+        <p:txBody>
+          <a:bodyPr>
+            <a:normAutofit fontScale="77500" lnSpcReduction="20000"/>
+          </a:bodyPr>
+          <a:lstStyle/>
+          <a:p>
+            <a:r>
+              <a:rPr lang="pl-PL" dirty="0" smtClean="0"/>
+              <a:t>Przypomnienie – co to jest typ anonimowy?</a:t>
+            </a:r>
+          </a:p>
+          <a:p>
+            <a:r>
+              <a:rPr lang="pl-PL" dirty="0" smtClean="0"/>
+              <a:t>Pojawił się w C# 3.0 (C# 8.0 w drodze)</a:t>
+            </a:r>
+          </a:p>
+          <a:p>
+            <a:r>
+              <a:rPr lang="pl-PL" dirty="0" smtClean="0"/>
+              <a:t>Typ anonimowy to nic innego jak wygodna forma zapisania zbioru właściwości tylko do odczytu w postaci pojedynczego obiektu bez konieczności definiowania jego struktury</a:t>
+            </a:r>
+          </a:p>
+          <a:p>
+            <a:r>
+              <a:rPr lang="pl-PL" dirty="0" smtClean="0"/>
+              <a:t>Jest bardzo przydatny i często wykorzystywany wraz z LINQ oraz wyrażeniami lambda</a:t>
+            </a:r>
+          </a:p>
+          <a:p>
+            <a:r>
+              <a:rPr lang="pl-PL" dirty="0" smtClean="0"/>
+              <a:t>Kompilator nadaje im nazwę wykonawczą, lecz jest ona niedostępna z poziomu kodu</a:t>
+            </a:r>
+          </a:p>
+          <a:p>
+            <a:r>
+              <a:rPr lang="pl-PL" dirty="0" smtClean="0"/>
+              <a:t>Z punktu widzenia kodu pośredniego typy anonimowe nie różnią się od standardowych typów referencyjnych</a:t>
+            </a:r>
+          </a:p>
+          <a:p>
+            <a:r>
+              <a:rPr lang="pl-PL" dirty="0" smtClean="0"/>
+              <a:t>Nie mogą być rzutowane na inne typy – dziedziczą bezpośrednio po typie głównym </a:t>
+            </a:r>
+            <a:r>
+              <a:rPr lang="pl-PL" dirty="0" err="1" smtClean="0"/>
+              <a:t>object</a:t>
+            </a:r>
+            <a:endParaRPr lang="pl-PL" dirty="0"/>
+          </a:p>
+        </p:txBody>
+      </p:sp>
+      <p:sp>
+        <p:nvSpPr>
+          <p:cNvPr id="3" name="Tytuł 2"/>
+          <p:cNvSpPr>
+            <a:spLocks noGrp="1"/>
+          </p:cNvSpPr>
+          <p:nvPr>
+            <p:ph type="title"/>
+          </p:nvPr>
+        </p:nvSpPr>
+        <p:spPr/>
+        <p:txBody>
+          <a:bodyPr/>
+          <a:lstStyle/>
+          <a:p>
+            <a:r>
+              <a:rPr lang="pl-PL" dirty="0" smtClean="0"/>
+              <a:t>Parametry anonimowe</a:t>
+            </a:r>
+            <a:endParaRPr lang="pl-PL" dirty="0"/>
+          </a:p>
+        </p:txBody>
+      </p:sp>
+    </p:spTree>
+    <p:extLst>
+      <p:ext uri="{BB962C8B-B14F-4D97-AF65-F5344CB8AC3E}">
+        <p14:creationId xmlns:p14="http://schemas.microsoft.com/office/powerpoint/2010/main" val="1444736751"/>
+      </p:ext>
+    </p:extLst>
+  </p:cSld>
+  <p:clrMapOvr>
+    <a:masterClrMapping/>
+  </p:clrMapOvr>
+  <p:transition spd="slow">
+    <p:push dir="u"/>
+  </p:transition>
+  <p:timing>
+    <p:tnLst>
+      <p:par>
+        <p:cTn id="1" dur="indefinite" restart="never" nodeType="tmRoot">
+          <p:childTnLst>
+            <p:seq concurrent="1" nextAc="seek">
+              <p:cTn id="2" dur="indefinite" nodeType="mainSeq">
+                <p:childTnLst>
+                  <p:par>
+                    <p:cTn id="3" fill="hold">
+                      <p:stCondLst>
+                        <p:cond delay="indefinite"/>
+                      </p:stCondLst>
+                      <p:childTnLst>
+                        <p:par>
+                          <p:cTn id="4" fill="hold">
+                            <p:stCondLst>
+                              <p:cond delay="0"/>
+                            </p:stCondLst>
+                            <p:childTnLst>
+                              <p:par>
+                                <p:cTn id="5" presetID="2" presetClass="entr" presetSubtype="4" fill="hold" nodeType="clickEffect">
+                                  <p:stCondLst>
+                                    <p:cond delay="0"/>
+                                  </p:stCondLst>
+                                  <p:childTnLst>
+                                    <p:set>
+                                      <p:cBhvr>
+                                        <p:cTn id="6" dur="1" fill="hold">
+                                          <p:stCondLst>
+                                            <p:cond delay="0"/>
+                                          </p:stCondLst>
+                                        </p:cTn>
+                                        <p:tgtEl>
+                                          <p:spTgt spid="2">
+                                            <p:txEl>
+                                              <p:pRg st="0" end="0"/>
+                                            </p:txEl>
+                                          </p:spTgt>
+                                        </p:tgtEl>
+                                        <p:attrNameLst>
+                                          <p:attrName>style.visibility</p:attrName>
+                                        </p:attrNameLst>
+                                      </p:cBhvr>
+                                      <p:to>
+                                        <p:strVal val="visible"/>
+                                      </p:to>
+                                    </p:set>
+                                    <p:anim calcmode="lin" valueType="num">
+                                      <p:cBhvr additive="base">
+                                        <p:cTn id="7" dur="500" fill="hold"/>
+                                        <p:tgtEl>
+                                          <p:spTgt spid="2">
+                                            <p:txEl>
+                                              <p:pRg st="0" end="0"/>
+                                            </p:txEl>
+                                          </p:spTgt>
+                                        </p:tgtEl>
+                                        <p:attrNameLst>
+                                          <p:attrName>ppt_x</p:attrName>
+                                        </p:attrNameLst>
+                                      </p:cBhvr>
+                                      <p:tavLst>
+                                        <p:tav tm="0">
+                                          <p:val>
+                                            <p:strVal val="#ppt_x"/>
+                                          </p:val>
+                                        </p:tav>
+                                        <p:tav tm="100000">
+                                          <p:val>
+                                            <p:strVal val="#ppt_x"/>
+                                          </p:val>
+                                        </p:tav>
+                                      </p:tavLst>
+                                    </p:anim>
+                                    <p:anim calcmode="lin" valueType="num">
+                                      <p:cBhvr additive="base">
+                                        <p:cTn id="8" dur="500" fill="hold"/>
+                                        <p:tgtEl>
+                                          <p:spTgt spid="2">
+                                            <p:txEl>
+                                              <p:pRg st="0" end="0"/>
+                                            </p:txEl>
+                                          </p:spTgt>
+                                        </p:tgtEl>
+                                        <p:attrNameLst>
+                                          <p:attrName>ppt_y</p:attrName>
+                                        </p:attrNameLst>
+                                      </p:cBhvr>
+                                      <p:tavLst>
+                                        <p:tav tm="0">
+                                          <p:val>
+                                            <p:strVal val="1+#ppt_h/2"/>
+                                          </p:val>
+                                        </p:tav>
+                                        <p:tav tm="100000">
+                                          <p:val>
+                                            <p:strVal val="#ppt_y"/>
+                                          </p:val>
+                                        </p:tav>
+                                      </p:tavLst>
+                                    </p:anim>
+                                  </p:childTnLst>
+                                </p:cTn>
+                              </p:par>
+                            </p:childTnLst>
+                          </p:cTn>
+                        </p:par>
+                      </p:childTnLst>
+                    </p:cTn>
+                  </p:par>
+                  <p:par>
+                    <p:cTn id="9" fill="hold">
+                      <p:stCondLst>
+                        <p:cond delay="indefinite"/>
+                      </p:stCondLst>
+                      <p:childTnLst>
+                        <p:par>
+                          <p:cTn id="10" fill="hold">
+                            <p:stCondLst>
+                              <p:cond delay="0"/>
+                            </p:stCondLst>
+                            <p:childTnLst>
+                              <p:par>
+                                <p:cTn id="11" presetID="2" presetClass="entr" presetSubtype="4" fill="hold" nodeType="clickEffect">
+                                  <p:stCondLst>
+                                    <p:cond delay="0"/>
+                                  </p:stCondLst>
+                                  <p:childTnLst>
+                                    <p:set>
+                                      <p:cBhvr>
+                                        <p:cTn id="12" dur="1" fill="hold">
+                                          <p:stCondLst>
+                                            <p:cond delay="0"/>
+                                          </p:stCondLst>
+                                        </p:cTn>
+                                        <p:tgtEl>
+                                          <p:spTgt spid="2">
+                                            <p:txEl>
+                                              <p:pRg st="1" end="1"/>
+                                            </p:txEl>
+                                          </p:spTgt>
+                                        </p:tgtEl>
+                                        <p:attrNameLst>
+                                          <p:attrName>style.visibility</p:attrName>
+                                        </p:attrNameLst>
+                                      </p:cBhvr>
+                                      <p:to>
+                                        <p:strVal val="visible"/>
+                                      </p:to>
+                                    </p:set>
+                                    <p:anim calcmode="lin" valueType="num">
+                                      <p:cBhvr additive="base">
+                                        <p:cTn id="13" dur="500" fill="hold"/>
+                                        <p:tgtEl>
+                                          <p:spTgt spid="2">
+                                            <p:txEl>
+                                              <p:pRg st="1" end="1"/>
+                                            </p:txEl>
+                                          </p:spTgt>
+                                        </p:tgtEl>
+                                        <p:attrNameLst>
+                                          <p:attrName>ppt_x</p:attrName>
+                                        </p:attrNameLst>
+                                      </p:cBhvr>
+                                      <p:tavLst>
+                                        <p:tav tm="0">
+                                          <p:val>
+                                            <p:strVal val="#ppt_x"/>
+                                          </p:val>
+                                        </p:tav>
+                                        <p:tav tm="100000">
+                                          <p:val>
+                                            <p:strVal val="#ppt_x"/>
+                                          </p:val>
+                                        </p:tav>
+                                      </p:tavLst>
+                                    </p:anim>
+                                    <p:anim calcmode="lin" valueType="num">
+                                      <p:cBhvr additive="base">
+                                        <p:cTn id="14" dur="500" fill="hold"/>
+                                        <p:tgtEl>
+                                          <p:spTgt spid="2">
+                                            <p:txEl>
+                                              <p:pRg st="1" end="1"/>
+                                            </p:txEl>
+                                          </p:spTgt>
+                                        </p:tgtEl>
+                                        <p:attrNameLst>
+                                          <p:attrName>ppt_y</p:attrName>
+                                        </p:attrNameLst>
+                                      </p:cBhvr>
+                                      <p:tavLst>
+                                        <p:tav tm="0">
+                                          <p:val>
+                                            <p:strVal val="1+#ppt_h/2"/>
+                                          </p:val>
+                                        </p:tav>
+                                        <p:tav tm="100000">
+                                          <p:val>
+                                            <p:strVal val="#ppt_y"/>
+                                          </p:val>
+                                        </p:tav>
+                                      </p:tavLst>
+                                    </p:anim>
+                                  </p:childTnLst>
+                                </p:cTn>
+                              </p:par>
+                            </p:childTnLst>
+                          </p:cTn>
+                        </p:par>
+                      </p:childTnLst>
+                    </p:cTn>
+                  </p:par>
+                  <p:par>
+                    <p:cTn id="15" fill="hold">
+                      <p:stCondLst>
+                        <p:cond delay="indefinite"/>
+                      </p:stCondLst>
+                      <p:childTnLst>
+                        <p:par>
+                          <p:cTn id="16" fill="hold">
+                            <p:stCondLst>
+                              <p:cond delay="0"/>
+                            </p:stCondLst>
+                            <p:childTnLst>
+                              <p:par>
+                                <p:cTn id="17" presetID="2" presetClass="entr" presetSubtype="4" fill="hold" nodeType="clickEffect">
+                                  <p:stCondLst>
+                                    <p:cond delay="0"/>
+                                  </p:stCondLst>
+                                  <p:childTnLst>
+                                    <p:set>
+                                      <p:cBhvr>
+                                        <p:cTn id="18" dur="1" fill="hold">
+                                          <p:stCondLst>
+                                            <p:cond delay="0"/>
+                                          </p:stCondLst>
+                                        </p:cTn>
+                                        <p:tgtEl>
+                                          <p:spTgt spid="2">
+                                            <p:txEl>
+                                              <p:pRg st="2" end="2"/>
+                                            </p:txEl>
+                                          </p:spTgt>
+                                        </p:tgtEl>
+                                        <p:attrNameLst>
+                                          <p:attrName>style.visibility</p:attrName>
+                                        </p:attrNameLst>
+                                      </p:cBhvr>
+                                      <p:to>
+                                        <p:strVal val="visible"/>
+                                      </p:to>
+                                    </p:set>
+                                    <p:anim calcmode="lin" valueType="num">
+                                      <p:cBhvr additive="base">
+                                        <p:cTn id="19" dur="500" fill="hold"/>
+                                        <p:tgtEl>
+                                          <p:spTgt spid="2">
+                                            <p:txEl>
+                                              <p:pRg st="2" end="2"/>
+                                            </p:txEl>
+                                          </p:spTgt>
+                                        </p:tgtEl>
+                                        <p:attrNameLst>
+                                          <p:attrName>ppt_x</p:attrName>
+                                        </p:attrNameLst>
+                                      </p:cBhvr>
+                                      <p:tavLst>
+                                        <p:tav tm="0">
+                                          <p:val>
+                                            <p:strVal val="#ppt_x"/>
+                                          </p:val>
+                                        </p:tav>
+                                        <p:tav tm="100000">
+                                          <p:val>
+                                            <p:strVal val="#ppt_x"/>
+                                          </p:val>
+                                        </p:tav>
+                                      </p:tavLst>
+                                    </p:anim>
+                                    <p:anim calcmode="lin" valueType="num">
+                                      <p:cBhvr additive="base">
+                                        <p:cTn id="20" dur="500" fill="hold"/>
+                                        <p:tgtEl>
+                                          <p:spTgt spid="2">
+                                            <p:txEl>
+                                              <p:pRg st="2" end="2"/>
+                                            </p:txEl>
+                                          </p:spTgt>
+                                        </p:tgtEl>
+                                        <p:attrNameLst>
+                                          <p:attrName>ppt_y</p:attrName>
+                                        </p:attrNameLst>
+                                      </p:cBhvr>
+                                      <p:tavLst>
+                                        <p:tav tm="0">
+                                          <p:val>
+                                            <p:strVal val="1+#ppt_h/2"/>
+                                          </p:val>
+                                        </p:tav>
+                                        <p:tav tm="100000">
+                                          <p:val>
+                                            <p:strVal val="#ppt_y"/>
+                                          </p:val>
+                                        </p:tav>
+                                      </p:tavLst>
+                                    </p:anim>
+                                  </p:childTnLst>
+                                </p:cTn>
+                              </p:par>
+                            </p:childTnLst>
+                          </p:cTn>
+                        </p:par>
+                      </p:childTnLst>
+                    </p:cTn>
+                  </p:par>
+                  <p:par>
+                    <p:cTn id="21" fill="hold">
+                      <p:stCondLst>
+                        <p:cond delay="indefinite"/>
+                      </p:stCondLst>
+                      <p:childTnLst>
+                        <p:par>
+                          <p:cTn id="22" fill="hold">
+                            <p:stCondLst>
+                              <p:cond delay="0"/>
+                            </p:stCondLst>
+                            <p:childTnLst>
+                              <p:par>
+                                <p:cTn id="23" presetID="2" presetClass="entr" presetSubtype="4" fill="hold" nodeType="clickEffect">
+                                  <p:stCondLst>
+                                    <p:cond delay="0"/>
+                                  </p:stCondLst>
+                                  <p:childTnLst>
+                                    <p:set>
+                                      <p:cBhvr>
+                                        <p:cTn id="24" dur="1" fill="hold">
+                                          <p:stCondLst>
+                                            <p:cond delay="0"/>
+                                          </p:stCondLst>
+                                        </p:cTn>
+                                        <p:tgtEl>
+                                          <p:spTgt spid="2">
+                                            <p:txEl>
+                                              <p:pRg st="3" end="3"/>
+                                            </p:txEl>
+                                          </p:spTgt>
+                                        </p:tgtEl>
+                                        <p:attrNameLst>
+                                          <p:attrName>style.visibility</p:attrName>
+                                        </p:attrNameLst>
+                                      </p:cBhvr>
+                                      <p:to>
+                                        <p:strVal val="visible"/>
+                                      </p:to>
+                                    </p:set>
+                                    <p:anim calcmode="lin" valueType="num">
+                                      <p:cBhvr additive="base">
+                                        <p:cTn id="25" dur="500" fill="hold"/>
+                                        <p:tgtEl>
+                                          <p:spTgt spid="2">
+                                            <p:txEl>
+                                              <p:pRg st="3" end="3"/>
+                                            </p:txEl>
+                                          </p:spTgt>
+                                        </p:tgtEl>
+                                        <p:attrNameLst>
+                                          <p:attrName>ppt_x</p:attrName>
+                                        </p:attrNameLst>
+                                      </p:cBhvr>
+                                      <p:tavLst>
+                                        <p:tav tm="0">
+                                          <p:val>
+                                            <p:strVal val="#ppt_x"/>
+                                          </p:val>
+                                        </p:tav>
+                                        <p:tav tm="100000">
+                                          <p:val>
+                                            <p:strVal val="#ppt_x"/>
+                                          </p:val>
+                                        </p:tav>
+                                      </p:tavLst>
+                                    </p:anim>
+                                    <p:anim calcmode="lin" valueType="num">
+                                      <p:cBhvr additive="base">
+                                        <p:cTn id="26" dur="500" fill="hold"/>
+                                        <p:tgtEl>
+                                          <p:spTgt spid="2">
+                                            <p:txEl>
+                                              <p:pRg st="3" end="3"/>
+                                            </p:txEl>
+                                          </p:spTgt>
+                                        </p:tgtEl>
+                                        <p:attrNameLst>
+                                          <p:attrName>ppt_y</p:attrName>
+                                        </p:attrNameLst>
+                                      </p:cBhvr>
+                                      <p:tavLst>
+                                        <p:tav tm="0">
+                                          <p:val>
+                                            <p:strVal val="1+#ppt_h/2"/>
+                                          </p:val>
+                                        </p:tav>
+                                        <p:tav tm="100000">
+                                          <p:val>
+                                            <p:strVal val="#ppt_y"/>
+                                          </p:val>
+                                        </p:tav>
+                                      </p:tavLst>
+                                    </p:anim>
+                                  </p:childTnLst>
+                                </p:cTn>
+                              </p:par>
+                            </p:childTnLst>
+                          </p:cTn>
+                        </p:par>
+                      </p:childTnLst>
+                    </p:cTn>
+                  </p:par>
+                  <p:par>
+                    <p:cTn id="27" fill="hold">
+                      <p:stCondLst>
+                        <p:cond delay="indefinite"/>
+                      </p:stCondLst>
+                      <p:childTnLst>
+                        <p:par>
+                          <p:cTn id="28" fill="hold">
+                            <p:stCondLst>
+                              <p:cond delay="0"/>
+                            </p:stCondLst>
+                            <p:childTnLst>
+                              <p:par>
+                                <p:cTn id="29" presetID="2" presetClass="entr" presetSubtype="4" fill="hold" nodeType="clickEffect">
+                                  <p:stCondLst>
+                                    <p:cond delay="0"/>
+                                  </p:stCondLst>
+                                  <p:childTnLst>
+                                    <p:set>
+                                      <p:cBhvr>
+                                        <p:cTn id="30" dur="1" fill="hold">
+                                          <p:stCondLst>
+                                            <p:cond delay="0"/>
+                                          </p:stCondLst>
+                                        </p:cTn>
+                                        <p:tgtEl>
+                                          <p:spTgt spid="2">
+                                            <p:txEl>
+                                              <p:pRg st="4" end="4"/>
+                                            </p:txEl>
+                                          </p:spTgt>
+                                        </p:tgtEl>
+                                        <p:attrNameLst>
+                                          <p:attrName>style.visibility</p:attrName>
+                                        </p:attrNameLst>
+                                      </p:cBhvr>
+                                      <p:to>
+                                        <p:strVal val="visible"/>
+                                      </p:to>
+                                    </p:set>
+                                    <p:anim calcmode="lin" valueType="num">
+                                      <p:cBhvr additive="base">
+                                        <p:cTn id="31" dur="500" fill="hold"/>
+                                        <p:tgtEl>
+                                          <p:spTgt spid="2">
+                                            <p:txEl>
+                                              <p:pRg st="4" end="4"/>
+                                            </p:txEl>
+                                          </p:spTgt>
+                                        </p:tgtEl>
+                                        <p:attrNameLst>
+                                          <p:attrName>ppt_x</p:attrName>
+                                        </p:attrNameLst>
+                                      </p:cBhvr>
+                                      <p:tavLst>
+                                        <p:tav tm="0">
+                                          <p:val>
+                                            <p:strVal val="#ppt_x"/>
+                                          </p:val>
+                                        </p:tav>
+                                        <p:tav tm="100000">
+                                          <p:val>
+                                            <p:strVal val="#ppt_x"/>
+                                          </p:val>
+                                        </p:tav>
+                                      </p:tavLst>
+                                    </p:anim>
+                                    <p:anim calcmode="lin" valueType="num">
+                                      <p:cBhvr additive="base">
+                                        <p:cTn id="32" dur="500" fill="hold"/>
+                                        <p:tgtEl>
+                                          <p:spTgt spid="2">
+                                            <p:txEl>
+                                              <p:pRg st="4" end="4"/>
+                                            </p:txEl>
+                                          </p:spTgt>
+                                        </p:tgtEl>
+                                        <p:attrNameLst>
+                                          <p:attrName>ppt_y</p:attrName>
+                                        </p:attrNameLst>
+                                      </p:cBhvr>
+                                      <p:tavLst>
+                                        <p:tav tm="0">
+                                          <p:val>
+                                            <p:strVal val="1+#ppt_h/2"/>
+                                          </p:val>
+                                        </p:tav>
+                                        <p:tav tm="100000">
+                                          <p:val>
+                                            <p:strVal val="#ppt_y"/>
+                                          </p:val>
+                                        </p:tav>
+                                      </p:tavLst>
+                                    </p:anim>
+                                  </p:childTnLst>
+                                </p:cTn>
+                              </p:par>
+                            </p:childTnLst>
+                          </p:cTn>
+                        </p:par>
+                      </p:childTnLst>
+                    </p:cTn>
+                  </p:par>
+                  <p:par>
+                    <p:cTn id="33" fill="hold">
+                      <p:stCondLst>
+                        <p:cond delay="indefinite"/>
+                      </p:stCondLst>
+                      <p:childTnLst>
+                        <p:par>
+                          <p:cTn id="34" fill="hold">
+                            <p:stCondLst>
+                              <p:cond delay="0"/>
+                            </p:stCondLst>
+                            <p:childTnLst>
+                              <p:par>
+                                <p:cTn id="35" presetID="2" presetClass="entr" presetSubtype="4" fill="hold" nodeType="clickEffect">
+                                  <p:stCondLst>
+                                    <p:cond delay="0"/>
+                                  </p:stCondLst>
+                                  <p:childTnLst>
+                                    <p:set>
+                                      <p:cBhvr>
+                                        <p:cTn id="36" dur="1" fill="hold">
+                                          <p:stCondLst>
+                                            <p:cond delay="0"/>
+                                          </p:stCondLst>
+                                        </p:cTn>
+                                        <p:tgtEl>
+                                          <p:spTgt spid="2">
+                                            <p:txEl>
+                                              <p:pRg st="5" end="5"/>
+                                            </p:txEl>
+                                          </p:spTgt>
+                                        </p:tgtEl>
+                                        <p:attrNameLst>
+                                          <p:attrName>style.visibility</p:attrName>
+                                        </p:attrNameLst>
+                                      </p:cBhvr>
+                                      <p:to>
+                                        <p:strVal val="visible"/>
+                                      </p:to>
+                                    </p:set>
+                                    <p:anim calcmode="lin" valueType="num">
+                                      <p:cBhvr additive="base">
+                                        <p:cTn id="37" dur="500" fill="hold"/>
+                                        <p:tgtEl>
+                                          <p:spTgt spid="2">
+                                            <p:txEl>
+                                              <p:pRg st="5" end="5"/>
+                                            </p:txEl>
+                                          </p:spTgt>
+                                        </p:tgtEl>
+                                        <p:attrNameLst>
+                                          <p:attrName>ppt_x</p:attrName>
+                                        </p:attrNameLst>
+                                      </p:cBhvr>
+                                      <p:tavLst>
+                                        <p:tav tm="0">
+                                          <p:val>
+                                            <p:strVal val="#ppt_x"/>
+                                          </p:val>
+                                        </p:tav>
+                                        <p:tav tm="100000">
+                                          <p:val>
+                                            <p:strVal val="#ppt_x"/>
+                                          </p:val>
+                                        </p:tav>
+                                      </p:tavLst>
+                                    </p:anim>
+                                    <p:anim calcmode="lin" valueType="num">
+                                      <p:cBhvr additive="base">
+                                        <p:cTn id="38" dur="500" fill="hold"/>
+                                        <p:tgtEl>
+                                          <p:spTgt spid="2">
+                                            <p:txEl>
+                                              <p:pRg st="5" end="5"/>
+                                            </p:txEl>
+                                          </p:spTgt>
+                                        </p:tgtEl>
+                                        <p:attrNameLst>
+                                          <p:attrName>ppt_y</p:attrName>
+                                        </p:attrNameLst>
+                                      </p:cBhvr>
+                                      <p:tavLst>
+                                        <p:tav tm="0">
+                                          <p:val>
+                                            <p:strVal val="1+#ppt_h/2"/>
+                                          </p:val>
+                                        </p:tav>
+                                        <p:tav tm="100000">
+                                          <p:val>
+                                            <p:strVal val="#ppt_y"/>
+                                          </p:val>
+                                        </p:tav>
+                                      </p:tavLst>
+                                    </p:anim>
+                                  </p:childTnLst>
+                                </p:cTn>
+                              </p:par>
+                            </p:childTnLst>
+                          </p:cTn>
+                        </p:par>
+                      </p:childTnLst>
+                    </p:cTn>
+                  </p:par>
+                  <p:par>
+                    <p:cTn id="39" fill="hold">
+                      <p:stCondLst>
+                        <p:cond delay="indefinite"/>
+                      </p:stCondLst>
+                      <p:childTnLst>
+                        <p:par>
+                          <p:cTn id="40" fill="hold">
+                            <p:stCondLst>
+                              <p:cond delay="0"/>
+                            </p:stCondLst>
+                            <p:childTnLst>
+                              <p:par>
+                                <p:cTn id="41" presetID="2" presetClass="entr" presetSubtype="4" fill="hold" nodeType="clickEffect">
+                                  <p:stCondLst>
+                                    <p:cond delay="0"/>
+                                  </p:stCondLst>
+                                  <p:childTnLst>
+                                    <p:set>
+                                      <p:cBhvr>
+                                        <p:cTn id="42" dur="1" fill="hold">
+                                          <p:stCondLst>
+                                            <p:cond delay="0"/>
+                                          </p:stCondLst>
+                                        </p:cTn>
+                                        <p:tgtEl>
+                                          <p:spTgt spid="2">
+                                            <p:txEl>
+                                              <p:pRg st="6" end="6"/>
+                                            </p:txEl>
+                                          </p:spTgt>
+                                        </p:tgtEl>
+                                        <p:attrNameLst>
+                                          <p:attrName>style.visibility</p:attrName>
+                                        </p:attrNameLst>
+                                      </p:cBhvr>
+                                      <p:to>
+                                        <p:strVal val="visible"/>
+                                      </p:to>
+                                    </p:set>
+                                    <p:anim calcmode="lin" valueType="num">
+                                      <p:cBhvr additive="base">
+                                        <p:cTn id="43" dur="500" fill="hold"/>
+                                        <p:tgtEl>
+                                          <p:spTgt spid="2">
+                                            <p:txEl>
+                                              <p:pRg st="6" end="6"/>
+                                            </p:txEl>
+                                          </p:spTgt>
+                                        </p:tgtEl>
+                                        <p:attrNameLst>
+                                          <p:attrName>ppt_x</p:attrName>
+                                        </p:attrNameLst>
+                                      </p:cBhvr>
+                                      <p:tavLst>
+                                        <p:tav tm="0">
+                                          <p:val>
+                                            <p:strVal val="#ppt_x"/>
+                                          </p:val>
+                                        </p:tav>
+                                        <p:tav tm="100000">
+                                          <p:val>
+                                            <p:strVal val="#ppt_x"/>
+                                          </p:val>
+                                        </p:tav>
+                                      </p:tavLst>
+                                    </p:anim>
+                                    <p:anim calcmode="lin" valueType="num">
+                                      <p:cBhvr additive="base">
+                                        <p:cTn id="44" dur="500" fill="hold"/>
+                                        <p:tgtEl>
+                                          <p:spTgt spid="2">
+                                            <p:txEl>
+                                              <p:pRg st="6" end="6"/>
+                                            </p:txEl>
+                                          </p:spTgt>
+                                        </p:tgtEl>
+                                        <p:attrNameLst>
+                                          <p:attrName>ppt_y</p:attrName>
+                                        </p:attrNameLst>
+                                      </p:cBhvr>
+                                      <p:tavLst>
+                                        <p:tav tm="0">
+                                          <p:val>
+                                            <p:strVal val="1+#ppt_h/2"/>
+                                          </p:val>
+                                        </p:tav>
+                                        <p:tav tm="100000">
+                                          <p:val>
+                                            <p:strVal val="#ppt_y"/>
+                                          </p:val>
+                                        </p:tav>
+                                      </p:tavLst>
+                                    </p:anim>
+                                  </p:childTnLst>
+                                </p:cTn>
+                              </p:par>
+                            </p:childTnLst>
+                          </p:cTn>
+                        </p:par>
+                      </p:childTnLst>
+                    </p:cTn>
+                  </p:par>
+                </p:childTnLst>
+              </p:cTn>
+              <p:prevCondLst>
+                <p:cond evt="onPrev" delay="0">
+                  <p:tgtEl>
+                    <p:sldTgt/>
+                  </p:tgtEl>
+                </p:cond>
+              </p:prevCondLst>
+              <p:nextCondLst>
+                <p:cond evt="onNext" delay="0">
+                  <p:tgtEl>
+                    <p:sldTgt/>
+                  </p:tgtEl>
+                </p:cond>
+              </p:nextCondLst>
+            </p:seq>
+          </p:childTnLst>
+        </p:cTn>
+      </p:par>
+    </p:tnLst>
+  </p:timing>
+</p:sld>
+</file>
+
+<file path=ppt/slides/slide29.xml><?xml version="1.0" encoding="utf-8"?>
+<p:sld xmlns:a="http://schemas.openxmlformats.org/drawingml/2006/main" xmlns:r="http://schemas.openxmlformats.org/officeDocument/2006/relationships" xmlns:p="http://schemas.openxmlformats.org/presentationml/2006/main">
+  <p:cSld>
+    <p:spTree>
+      <p:nvGrpSpPr>
+        <p:cNvPr id="1" name=""/>
+        <p:cNvGrpSpPr/>
+        <p:nvPr/>
+      </p:nvGrpSpPr>
+      <p:grpSpPr>
+        <a:xfrm>
+          <a:off x="0" y="0"/>
+          <a:ext cx="0" cy="0"/>
+          <a:chOff x="0" y="0"/>
+          <a:chExt cx="0" cy="0"/>
+        </a:xfrm>
+      </p:grpSpPr>
+      <p:sp>
+        <p:nvSpPr>
+          <p:cNvPr id="2" name="Symbol zastępczy zawartości 1"/>
+          <p:cNvSpPr>
+            <a:spLocks noGrp="1"/>
+          </p:cNvSpPr>
+          <p:nvPr>
+            <p:ph idx="1"/>
+          </p:nvPr>
+        </p:nvSpPr>
+        <p:spPr/>
+        <p:txBody>
+          <a:bodyPr/>
+          <a:lstStyle/>
+          <a:p>
+            <a:r>
+              <a:rPr lang="pl-PL" dirty="0" smtClean="0"/>
+              <a:t>Deklaracja typu anonimowego:</a:t>
+            </a:r>
+          </a:p>
+          <a:p>
+            <a:r>
+              <a:rPr lang="pl-PL" dirty="0" smtClean="0"/>
+              <a:t>Słowo kluczowe </a:t>
+            </a:r>
+            <a:r>
+              <a:rPr lang="pl-PL" dirty="0" err="1" smtClean="0"/>
+              <a:t>new</a:t>
+            </a:r>
+            <a:endParaRPr lang="pl-PL" dirty="0"/>
+          </a:p>
+          <a:p>
+            <a:r>
+              <a:rPr lang="pl-PL" dirty="0" err="1" smtClean="0"/>
+              <a:t>Inicjalizator</a:t>
+            </a:r>
+            <a:r>
+              <a:rPr lang="pl-PL" dirty="0" smtClean="0"/>
+              <a:t> obiektu – klamry { }</a:t>
+            </a:r>
+          </a:p>
+          <a:p>
+            <a:r>
+              <a:rPr lang="pl-PL" dirty="0" smtClean="0"/>
+              <a:t>Przykład:</a:t>
+            </a:r>
+          </a:p>
+          <a:p>
+            <a:endParaRPr lang="pl-PL" dirty="0"/>
+          </a:p>
+        </p:txBody>
+      </p:sp>
+      <p:sp>
+        <p:nvSpPr>
+          <p:cNvPr id="3" name="Tytuł 2"/>
+          <p:cNvSpPr>
+            <a:spLocks noGrp="1"/>
+          </p:cNvSpPr>
+          <p:nvPr>
+            <p:ph type="title"/>
+          </p:nvPr>
+        </p:nvSpPr>
+        <p:spPr/>
+        <p:txBody>
+          <a:bodyPr/>
+          <a:lstStyle/>
+          <a:p>
+            <a:r>
+              <a:rPr lang="pl-PL" dirty="0" smtClean="0"/>
+              <a:t>Parametry anonimowe</a:t>
+            </a:r>
+            <a:endParaRPr lang="pl-PL" dirty="0"/>
+          </a:p>
+        </p:txBody>
+      </p:sp>
+      <p:pic>
+        <p:nvPicPr>
+          <p:cNvPr id="1026" name="Picture 2"/>
+          <p:cNvPicPr>
+            <a:picLocks noChangeAspect="1" noChangeArrowheads="1"/>
+          </p:cNvPicPr>
+          <p:nvPr/>
+        </p:nvPicPr>
+        <p:blipFill>
+          <a:blip r:embed="rId2">
+            <a:extLst>
+              <a:ext uri="{28A0092B-C50C-407E-A947-70E740481C1C}">
+                <a14:useLocalDpi xmlns:a14="http://schemas.microsoft.com/office/drawing/2010/main" val="0"/>
+              </a:ext>
+            </a:extLst>
+          </a:blip>
+          <a:srcRect/>
+          <a:stretch>
+            <a:fillRect/>
+          </a:stretch>
+        </p:blipFill>
+        <p:spPr bwMode="auto">
+          <a:xfrm>
+            <a:off x="2381250" y="3284984"/>
+            <a:ext cx="4381500" cy="2457450"/>
+          </a:xfrm>
+          <a:prstGeom prst="rect">
+            <a:avLst/>
+          </a:prstGeom>
+          <a:noFill/>
+          <a:ln>
+            <a:noFill/>
+          </a:ln>
+          <a:extLst>
+            <a:ext uri="{909E8E84-426E-40DD-AFC4-6F175D3DCCD1}">
+              <a14:hiddenFill xmlns:a14="http://schemas.microsoft.com/office/drawing/2010/main">
+                <a:solidFill>
+                  <a:schemeClr val="accent1"/>
+                </a:solidFill>
+              </a14:hiddenFill>
+            </a:ext>
+            <a:ext uri="{91240B29-F687-4F45-9708-019B960494DF}">
+              <a14:hiddenLine xmlns:a14="http://schemas.microsoft.com/office/drawing/2010/main" w="9525">
+                <a:solidFill>
+                  <a:schemeClr val="tx1"/>
+                </a:solidFill>
+                <a:miter lim="800000"/>
+                <a:headEnd/>
+                <a:tailEnd/>
+              </a14:hiddenLine>
+            </a:ext>
+          </a:extLst>
+        </p:spPr>
+      </p:pic>
+    </p:spTree>
+    <p:extLst>
+      <p:ext uri="{BB962C8B-B14F-4D97-AF65-F5344CB8AC3E}">
+        <p14:creationId xmlns:p14="http://schemas.microsoft.com/office/powerpoint/2010/main" val="4249841798"/>
+      </p:ext>
+    </p:extLst>
+  </p:cSld>
+  <p:clrMapOvr>
+    <a:masterClrMapping/>
+  </p:clrMapOvr>
+  <p:transition spd="slow">
+    <p:push dir="u"/>
+  </p:transition>
+  <p:timing>
+    <p:tnLst>
+      <p:par>
+        <p:cTn id="1" dur="indefinite" restart="never" nodeType="tmRoot">
+          <p:childTnLst>
+            <p:seq concurrent="1" nextAc="seek">
+              <p:cTn id="2" dur="indefinite" nodeType="mainSeq">
+                <p:childTnLst>
+                  <p:par>
+                    <p:cTn id="3" fill="hold">
+                      <p:stCondLst>
+                        <p:cond delay="indefinite"/>
+                      </p:stCondLst>
+                      <p:childTnLst>
+                        <p:par>
+                          <p:cTn id="4" fill="hold">
+                            <p:stCondLst>
+                              <p:cond delay="0"/>
+                            </p:stCondLst>
+                            <p:childTnLst>
+                              <p:par>
+                                <p:cTn id="5" presetID="2" presetClass="entr" presetSubtype="4" fill="hold" nodeType="clickEffect">
+                                  <p:stCondLst>
+                                    <p:cond delay="0"/>
+                                  </p:stCondLst>
+                                  <p:childTnLst>
+                                    <p:set>
+                                      <p:cBhvr>
+                                        <p:cTn id="6" dur="1" fill="hold">
+                                          <p:stCondLst>
+                                            <p:cond delay="0"/>
+                                          </p:stCondLst>
+                                        </p:cTn>
+                                        <p:tgtEl>
+                                          <p:spTgt spid="2">
+                                            <p:txEl>
+                                              <p:pRg st="0" end="0"/>
+                                            </p:txEl>
+                                          </p:spTgt>
+                                        </p:tgtEl>
+                                        <p:attrNameLst>
+                                          <p:attrName>style.visibility</p:attrName>
+                                        </p:attrNameLst>
+                                      </p:cBhvr>
+                                      <p:to>
+                                        <p:strVal val="visible"/>
+                                      </p:to>
+                                    </p:set>
+                                    <p:anim calcmode="lin" valueType="num">
+                                      <p:cBhvr additive="base">
+                                        <p:cTn id="7" dur="500" fill="hold"/>
+                                        <p:tgtEl>
+                                          <p:spTgt spid="2">
+                                            <p:txEl>
+                                              <p:pRg st="0" end="0"/>
+                                            </p:txEl>
+                                          </p:spTgt>
+                                        </p:tgtEl>
+                                        <p:attrNameLst>
+                                          <p:attrName>ppt_x</p:attrName>
+                                        </p:attrNameLst>
+                                      </p:cBhvr>
+                                      <p:tavLst>
+                                        <p:tav tm="0">
+                                          <p:val>
+                                            <p:strVal val="#ppt_x"/>
+                                          </p:val>
+                                        </p:tav>
+                                        <p:tav tm="100000">
+                                          <p:val>
+                                            <p:strVal val="#ppt_x"/>
+                                          </p:val>
+                                        </p:tav>
+                                      </p:tavLst>
+                                    </p:anim>
+                                    <p:anim calcmode="lin" valueType="num">
+                                      <p:cBhvr additive="base">
+                                        <p:cTn id="8" dur="500" fill="hold"/>
+                                        <p:tgtEl>
+                                          <p:spTgt spid="2">
+                                            <p:txEl>
+                                              <p:pRg st="0" end="0"/>
+                                            </p:txEl>
+                                          </p:spTgt>
+                                        </p:tgtEl>
+                                        <p:attrNameLst>
+                                          <p:attrName>ppt_y</p:attrName>
+                                        </p:attrNameLst>
+                                      </p:cBhvr>
+                                      <p:tavLst>
+                                        <p:tav tm="0">
+                                          <p:val>
+                                            <p:strVal val="1+#ppt_h/2"/>
+                                          </p:val>
+                                        </p:tav>
+                                        <p:tav tm="100000">
+                                          <p:val>
+                                            <p:strVal val="#ppt_y"/>
+                                          </p:val>
+                                        </p:tav>
+                                      </p:tavLst>
+                                    </p:anim>
+                                  </p:childTnLst>
+                                </p:cTn>
+                              </p:par>
+                            </p:childTnLst>
+                          </p:cTn>
+                        </p:par>
+                      </p:childTnLst>
+                    </p:cTn>
+                  </p:par>
+                  <p:par>
+                    <p:cTn id="9" fill="hold">
+                      <p:stCondLst>
+                        <p:cond delay="indefinite"/>
+                      </p:stCondLst>
+                      <p:childTnLst>
+                        <p:par>
+                          <p:cTn id="10" fill="hold">
+                            <p:stCondLst>
+                              <p:cond delay="0"/>
+                            </p:stCondLst>
+                            <p:childTnLst>
+                              <p:par>
+                                <p:cTn id="11" presetID="2" presetClass="entr" presetSubtype="4" fill="hold" nodeType="clickEffect">
+                                  <p:stCondLst>
+                                    <p:cond delay="0"/>
+                                  </p:stCondLst>
+                                  <p:childTnLst>
+                                    <p:set>
+                                      <p:cBhvr>
+                                        <p:cTn id="12" dur="1" fill="hold">
+                                          <p:stCondLst>
+                                            <p:cond delay="0"/>
+                                          </p:stCondLst>
+                                        </p:cTn>
+                                        <p:tgtEl>
+                                          <p:spTgt spid="2">
+                                            <p:txEl>
+                                              <p:pRg st="1" end="1"/>
+                                            </p:txEl>
+                                          </p:spTgt>
+                                        </p:tgtEl>
+                                        <p:attrNameLst>
+                                          <p:attrName>style.visibility</p:attrName>
+                                        </p:attrNameLst>
+                                      </p:cBhvr>
+                                      <p:to>
+                                        <p:strVal val="visible"/>
+                                      </p:to>
+                                    </p:set>
+                                    <p:anim calcmode="lin" valueType="num">
+                                      <p:cBhvr additive="base">
+                                        <p:cTn id="13" dur="500" fill="hold"/>
+                                        <p:tgtEl>
+                                          <p:spTgt spid="2">
+                                            <p:txEl>
+                                              <p:pRg st="1" end="1"/>
+                                            </p:txEl>
+                                          </p:spTgt>
+                                        </p:tgtEl>
+                                        <p:attrNameLst>
+                                          <p:attrName>ppt_x</p:attrName>
+                                        </p:attrNameLst>
+                                      </p:cBhvr>
+                                      <p:tavLst>
+                                        <p:tav tm="0">
+                                          <p:val>
+                                            <p:strVal val="#ppt_x"/>
+                                          </p:val>
+                                        </p:tav>
+                                        <p:tav tm="100000">
+                                          <p:val>
+                                            <p:strVal val="#ppt_x"/>
+                                          </p:val>
+                                        </p:tav>
+                                      </p:tavLst>
+                                    </p:anim>
+                                    <p:anim calcmode="lin" valueType="num">
+                                      <p:cBhvr additive="base">
+                                        <p:cTn id="14" dur="500" fill="hold"/>
+                                        <p:tgtEl>
+                                          <p:spTgt spid="2">
+                                            <p:txEl>
+                                              <p:pRg st="1" end="1"/>
+                                            </p:txEl>
+                                          </p:spTgt>
+                                        </p:tgtEl>
+                                        <p:attrNameLst>
+                                          <p:attrName>ppt_y</p:attrName>
+                                        </p:attrNameLst>
+                                      </p:cBhvr>
+                                      <p:tavLst>
+                                        <p:tav tm="0">
+                                          <p:val>
+                                            <p:strVal val="1+#ppt_h/2"/>
+                                          </p:val>
+                                        </p:tav>
+                                        <p:tav tm="100000">
+                                          <p:val>
+                                            <p:strVal val="#ppt_y"/>
+                                          </p:val>
+                                        </p:tav>
+                                      </p:tavLst>
+                                    </p:anim>
+                                  </p:childTnLst>
+                                </p:cTn>
+                              </p:par>
+                            </p:childTnLst>
+                          </p:cTn>
+                        </p:par>
+                      </p:childTnLst>
+                    </p:cTn>
+                  </p:par>
+                  <p:par>
+                    <p:cTn id="15" fill="hold">
+                      <p:stCondLst>
+                        <p:cond delay="indefinite"/>
+                      </p:stCondLst>
+                      <p:childTnLst>
+                        <p:par>
+                          <p:cTn id="16" fill="hold">
+                            <p:stCondLst>
+                              <p:cond delay="0"/>
+                            </p:stCondLst>
+                            <p:childTnLst>
+                              <p:par>
+                                <p:cTn id="17" presetID="2" presetClass="entr" presetSubtype="4" fill="hold" nodeType="clickEffect">
+                                  <p:stCondLst>
+                                    <p:cond delay="0"/>
+                                  </p:stCondLst>
+                                  <p:childTnLst>
+                                    <p:set>
+                                      <p:cBhvr>
+                                        <p:cTn id="18" dur="1" fill="hold">
+                                          <p:stCondLst>
+                                            <p:cond delay="0"/>
+                                          </p:stCondLst>
+                                        </p:cTn>
+                                        <p:tgtEl>
+                                          <p:spTgt spid="2">
+                                            <p:txEl>
+                                              <p:pRg st="2" end="2"/>
+                                            </p:txEl>
+                                          </p:spTgt>
+                                        </p:tgtEl>
+                                        <p:attrNameLst>
+                                          <p:attrName>style.visibility</p:attrName>
+                                        </p:attrNameLst>
+                                      </p:cBhvr>
+                                      <p:to>
+                                        <p:strVal val="visible"/>
+                                      </p:to>
+                                    </p:set>
+                                    <p:anim calcmode="lin" valueType="num">
+                                      <p:cBhvr additive="base">
+                                        <p:cTn id="19" dur="500" fill="hold"/>
+                                        <p:tgtEl>
+                                          <p:spTgt spid="2">
+                                            <p:txEl>
+                                              <p:pRg st="2" end="2"/>
+                                            </p:txEl>
+                                          </p:spTgt>
+                                        </p:tgtEl>
+                                        <p:attrNameLst>
+                                          <p:attrName>ppt_x</p:attrName>
+                                        </p:attrNameLst>
+                                      </p:cBhvr>
+                                      <p:tavLst>
+                                        <p:tav tm="0">
+                                          <p:val>
+                                            <p:strVal val="#ppt_x"/>
+                                          </p:val>
+                                        </p:tav>
+                                        <p:tav tm="100000">
+                                          <p:val>
+                                            <p:strVal val="#ppt_x"/>
+                                          </p:val>
+                                        </p:tav>
+                                      </p:tavLst>
+                                    </p:anim>
+                                    <p:anim calcmode="lin" valueType="num">
+                                      <p:cBhvr additive="base">
+                                        <p:cTn id="20" dur="500" fill="hold"/>
+                                        <p:tgtEl>
+                                          <p:spTgt spid="2">
+                                            <p:txEl>
+                                              <p:pRg st="2" end="2"/>
+                                            </p:txEl>
+                                          </p:spTgt>
+                                        </p:tgtEl>
+                                        <p:attrNameLst>
+                                          <p:attrName>ppt_y</p:attrName>
+                                        </p:attrNameLst>
+                                      </p:cBhvr>
+                                      <p:tavLst>
+                                        <p:tav tm="0">
+                                          <p:val>
+                                            <p:strVal val="1+#ppt_h/2"/>
+                                          </p:val>
+                                        </p:tav>
+                                        <p:tav tm="100000">
+                                          <p:val>
+                                            <p:strVal val="#ppt_y"/>
+                                          </p:val>
+                                        </p:tav>
+                                      </p:tavLst>
+                                    </p:anim>
+                                  </p:childTnLst>
+                                </p:cTn>
+                              </p:par>
+                            </p:childTnLst>
+                          </p:cTn>
+                        </p:par>
+                      </p:childTnLst>
+                    </p:cTn>
+                  </p:par>
+                  <p:par>
+                    <p:cTn id="21" fill="hold">
+                      <p:stCondLst>
+                        <p:cond delay="indefinite"/>
+                      </p:stCondLst>
+                      <p:childTnLst>
+                        <p:par>
+                          <p:cTn id="22" fill="hold">
+                            <p:stCondLst>
+                              <p:cond delay="0"/>
+                            </p:stCondLst>
+                            <p:childTnLst>
+                              <p:par>
+                                <p:cTn id="23" presetID="2" presetClass="entr" presetSubtype="4" fill="hold" nodeType="clickEffect">
+                                  <p:stCondLst>
+                                    <p:cond delay="0"/>
+                                  </p:stCondLst>
+                                  <p:childTnLst>
+                                    <p:set>
+                                      <p:cBhvr>
+                                        <p:cTn id="24" dur="1" fill="hold">
+                                          <p:stCondLst>
+                                            <p:cond delay="0"/>
+                                          </p:stCondLst>
+                                        </p:cTn>
+                                        <p:tgtEl>
+                                          <p:spTgt spid="2">
+                                            <p:txEl>
+                                              <p:pRg st="3" end="3"/>
+                                            </p:txEl>
+                                          </p:spTgt>
+                                        </p:tgtEl>
+                                        <p:attrNameLst>
+                                          <p:attrName>style.visibility</p:attrName>
+                                        </p:attrNameLst>
+                                      </p:cBhvr>
+                                      <p:to>
+                                        <p:strVal val="visible"/>
+                                      </p:to>
+                                    </p:set>
+                                    <p:anim calcmode="lin" valueType="num">
+                                      <p:cBhvr additive="base">
+                                        <p:cTn id="25" dur="500" fill="hold"/>
+                                        <p:tgtEl>
+                                          <p:spTgt spid="2">
+                                            <p:txEl>
+                                              <p:pRg st="3" end="3"/>
+                                            </p:txEl>
+                                          </p:spTgt>
+                                        </p:tgtEl>
+                                        <p:attrNameLst>
+                                          <p:attrName>ppt_x</p:attrName>
+                                        </p:attrNameLst>
+                                      </p:cBhvr>
+                                      <p:tavLst>
+                                        <p:tav tm="0">
+                                          <p:val>
+                                            <p:strVal val="#ppt_x"/>
+                                          </p:val>
+                                        </p:tav>
+                                        <p:tav tm="100000">
+                                          <p:val>
+                                            <p:strVal val="#ppt_x"/>
+                                          </p:val>
+                                        </p:tav>
+                                      </p:tavLst>
+                                    </p:anim>
+                                    <p:anim calcmode="lin" valueType="num">
+                                      <p:cBhvr additive="base">
+                                        <p:cTn id="26" dur="500" fill="hold"/>
+                                        <p:tgtEl>
+                                          <p:spTgt spid="2">
+                                            <p:txEl>
+                                              <p:pRg st="3" end="3"/>
+                                            </p:txEl>
+                                          </p:spTgt>
+                                        </p:tgtEl>
+                                        <p:attrNameLst>
+                                          <p:attrName>ppt_y</p:attrName>
+                                        </p:attrNameLst>
+                                      </p:cBhvr>
+                                      <p:tavLst>
+                                        <p:tav tm="0">
+                                          <p:val>
+                                            <p:strVal val="1+#ppt_h/2"/>
+                                          </p:val>
+                                        </p:tav>
+                                        <p:tav tm="100000">
+                                          <p:val>
+                                            <p:strVal val="#ppt_y"/>
+                                          </p:val>
+                                        </p:tav>
+                                      </p:tavLst>
+                                    </p:anim>
+                                  </p:childTnLst>
+                                </p:cTn>
+                              </p:par>
+                            </p:childTnLst>
+                          </p:cTn>
+                        </p:par>
+                      </p:childTnLst>
+                    </p:cTn>
+                  </p:par>
+                  <p:par>
+                    <p:cTn id="27" fill="hold">
+                      <p:stCondLst>
+                        <p:cond delay="indefinite"/>
+                      </p:stCondLst>
+                      <p:childTnLst>
+                        <p:par>
+                          <p:cTn id="28" fill="hold">
+                            <p:stCondLst>
+                              <p:cond delay="0"/>
+                            </p:stCondLst>
+                            <p:childTnLst>
+                              <p:par>
+                                <p:cTn id="29" presetID="2" presetClass="entr" presetSubtype="4" fill="hold" nodeType="clickEffect">
+                                  <p:stCondLst>
+                                    <p:cond delay="0"/>
+                                  </p:stCondLst>
+                                  <p:childTnLst>
+                                    <p:set>
+                                      <p:cBhvr>
+                                        <p:cTn id="30" dur="1" fill="hold">
+                                          <p:stCondLst>
+                                            <p:cond delay="0"/>
+                                          </p:stCondLst>
+                                        </p:cTn>
+                                        <p:tgtEl>
+                                          <p:spTgt spid="1026"/>
+                                        </p:tgtEl>
+                                        <p:attrNameLst>
+                                          <p:attrName>style.visibility</p:attrName>
+                                        </p:attrNameLst>
+                                      </p:cBhvr>
+                                      <p:to>
+                                        <p:strVal val="visible"/>
+                                      </p:to>
+                                    </p:set>
+                                    <p:anim calcmode="lin" valueType="num">
+                                      <p:cBhvr additive="base">
+                                        <p:cTn id="31" dur="500" fill="hold"/>
+                                        <p:tgtEl>
+                                          <p:spTgt spid="1026"/>
+                                        </p:tgtEl>
+                                        <p:attrNameLst>
+                                          <p:attrName>ppt_x</p:attrName>
+                                        </p:attrNameLst>
+                                      </p:cBhvr>
+                                      <p:tavLst>
+                                        <p:tav tm="0">
+                                          <p:val>
+                                            <p:strVal val="#ppt_x"/>
+                                          </p:val>
+                                        </p:tav>
+                                        <p:tav tm="100000">
+                                          <p:val>
+                                            <p:strVal val="#ppt_x"/>
+                                          </p:val>
+                                        </p:tav>
+                                      </p:tavLst>
+                                    </p:anim>
+                                    <p:anim calcmode="lin" valueType="num">
+                                      <p:cBhvr additive="base">
+                                        <p:cTn id="32" dur="500" fill="hold"/>
+                                        <p:tgtEl>
+                                          <p:spTgt spid="1026"/>
                                         </p:tgtEl>
                                         <p:attrNameLst>
                                           <p:attrName>ppt_y</p:attrName>
@@ -16983,6 +19115,1070 @@
     <p:bldLst>
       <p:bldP spid="2" grpId="0" build="p"/>
     </p:bldLst>
+  </p:timing>
+</p:sld>
+</file>
+
+<file path=ppt/slides/slide30.xml><?xml version="1.0" encoding="utf-8"?>
+<p:sld xmlns:a="http://schemas.openxmlformats.org/drawingml/2006/main" xmlns:r="http://schemas.openxmlformats.org/officeDocument/2006/relationships" xmlns:p="http://schemas.openxmlformats.org/presentationml/2006/main">
+  <p:cSld>
+    <p:spTree>
+      <p:nvGrpSpPr>
+        <p:cNvPr id="1" name=""/>
+        <p:cNvGrpSpPr/>
+        <p:nvPr/>
+      </p:nvGrpSpPr>
+      <p:grpSpPr>
+        <a:xfrm>
+          <a:off x="0" y="0"/>
+          <a:ext cx="0" cy="0"/>
+          <a:chOff x="0" y="0"/>
+          <a:chExt cx="0" cy="0"/>
+        </a:xfrm>
+      </p:grpSpPr>
+      <p:sp>
+        <p:nvSpPr>
+          <p:cNvPr id="2" name="Symbol zastępczy zawartości 1"/>
+          <p:cNvSpPr>
+            <a:spLocks noGrp="1"/>
+          </p:cNvSpPr>
+          <p:nvPr>
+            <p:ph idx="1"/>
+          </p:nvPr>
+        </p:nvSpPr>
+        <p:spPr/>
+        <p:txBody>
+          <a:bodyPr/>
+          <a:lstStyle/>
+          <a:p>
+            <a:r>
+              <a:rPr lang="pl-PL" dirty="0" smtClean="0"/>
+              <a:t>Pojedynczy parametr</a:t>
+            </a:r>
+          </a:p>
+          <a:p>
+            <a:endParaRPr lang="pl-PL" dirty="0"/>
+          </a:p>
+        </p:txBody>
+      </p:sp>
+      <p:sp>
+        <p:nvSpPr>
+          <p:cNvPr id="3" name="Tytuł 2"/>
+          <p:cNvSpPr>
+            <a:spLocks noGrp="1"/>
+          </p:cNvSpPr>
+          <p:nvPr>
+            <p:ph type="title"/>
+          </p:nvPr>
+        </p:nvSpPr>
+        <p:spPr/>
+        <p:txBody>
+          <a:bodyPr>
+            <a:normAutofit fontScale="90000"/>
+          </a:bodyPr>
+          <a:lstStyle/>
+          <a:p>
+            <a:r>
+              <a:rPr lang="pl-PL" dirty="0" smtClean="0"/>
+              <a:t>Parametry anonimowe w </a:t>
+            </a:r>
+            <a:r>
+              <a:rPr lang="pl-PL" dirty="0" err="1" smtClean="0"/>
+              <a:t>Dapper</a:t>
+            </a:r>
+            <a:endParaRPr lang="pl-PL" dirty="0"/>
+          </a:p>
+        </p:txBody>
+      </p:sp>
+      <p:pic>
+        <p:nvPicPr>
+          <p:cNvPr id="2050" name="Picture 2"/>
+          <p:cNvPicPr>
+            <a:picLocks noChangeAspect="1" noChangeArrowheads="1"/>
+          </p:cNvPicPr>
+          <p:nvPr/>
+        </p:nvPicPr>
+        <p:blipFill>
+          <a:blip r:embed="rId2">
+            <a:extLst>
+              <a:ext uri="{28A0092B-C50C-407E-A947-70E740481C1C}">
+                <a14:useLocalDpi xmlns:a14="http://schemas.microsoft.com/office/drawing/2010/main" val="0"/>
+              </a:ext>
+            </a:extLst>
+          </a:blip>
+          <a:srcRect/>
+          <a:stretch>
+            <a:fillRect/>
+          </a:stretch>
+        </p:blipFill>
+        <p:spPr bwMode="auto">
+          <a:xfrm>
+            <a:off x="251520" y="2060848"/>
+            <a:ext cx="8675801" cy="2386423"/>
+          </a:xfrm>
+          <a:prstGeom prst="rect">
+            <a:avLst/>
+          </a:prstGeom>
+          <a:noFill/>
+          <a:ln>
+            <a:noFill/>
+          </a:ln>
+          <a:extLst>
+            <a:ext uri="{909E8E84-426E-40DD-AFC4-6F175D3DCCD1}">
+              <a14:hiddenFill xmlns:a14="http://schemas.microsoft.com/office/drawing/2010/main">
+                <a:solidFill>
+                  <a:schemeClr val="accent1"/>
+                </a:solidFill>
+              </a14:hiddenFill>
+            </a:ext>
+            <a:ext uri="{91240B29-F687-4F45-9708-019B960494DF}">
+              <a14:hiddenLine xmlns:a14="http://schemas.microsoft.com/office/drawing/2010/main" w="9525">
+                <a:solidFill>
+                  <a:schemeClr val="tx1"/>
+                </a:solidFill>
+                <a:miter lim="800000"/>
+                <a:headEnd/>
+                <a:tailEnd/>
+              </a14:hiddenLine>
+            </a:ext>
+          </a:extLst>
+        </p:spPr>
+      </p:pic>
+    </p:spTree>
+    <p:extLst>
+      <p:ext uri="{BB962C8B-B14F-4D97-AF65-F5344CB8AC3E}">
+        <p14:creationId xmlns:p14="http://schemas.microsoft.com/office/powerpoint/2010/main" val="1871072537"/>
+      </p:ext>
+    </p:extLst>
+  </p:cSld>
+  <p:clrMapOvr>
+    <a:masterClrMapping/>
+  </p:clrMapOvr>
+  <p:transition spd="slow">
+    <p:push dir="u"/>
+  </p:transition>
+  <p:timing>
+    <p:tnLst>
+      <p:par>
+        <p:cTn id="1" dur="indefinite" restart="never" nodeType="tmRoot">
+          <p:childTnLst>
+            <p:seq concurrent="1" nextAc="seek">
+              <p:cTn id="2" dur="indefinite" nodeType="mainSeq">
+                <p:childTnLst>
+                  <p:par>
+                    <p:cTn id="3" fill="hold">
+                      <p:stCondLst>
+                        <p:cond delay="indefinite"/>
+                      </p:stCondLst>
+                      <p:childTnLst>
+                        <p:par>
+                          <p:cTn id="4" fill="hold">
+                            <p:stCondLst>
+                              <p:cond delay="0"/>
+                            </p:stCondLst>
+                            <p:childTnLst>
+                              <p:par>
+                                <p:cTn id="5" presetID="2" presetClass="entr" presetSubtype="4" fill="hold" nodeType="clickEffect">
+                                  <p:stCondLst>
+                                    <p:cond delay="0"/>
+                                  </p:stCondLst>
+                                  <p:childTnLst>
+                                    <p:set>
+                                      <p:cBhvr>
+                                        <p:cTn id="6" dur="1" fill="hold">
+                                          <p:stCondLst>
+                                            <p:cond delay="0"/>
+                                          </p:stCondLst>
+                                        </p:cTn>
+                                        <p:tgtEl>
+                                          <p:spTgt spid="2">
+                                            <p:txEl>
+                                              <p:pRg st="0" end="0"/>
+                                            </p:txEl>
+                                          </p:spTgt>
+                                        </p:tgtEl>
+                                        <p:attrNameLst>
+                                          <p:attrName>style.visibility</p:attrName>
+                                        </p:attrNameLst>
+                                      </p:cBhvr>
+                                      <p:to>
+                                        <p:strVal val="visible"/>
+                                      </p:to>
+                                    </p:set>
+                                    <p:anim calcmode="lin" valueType="num">
+                                      <p:cBhvr additive="base">
+                                        <p:cTn id="7" dur="500" fill="hold"/>
+                                        <p:tgtEl>
+                                          <p:spTgt spid="2">
+                                            <p:txEl>
+                                              <p:pRg st="0" end="0"/>
+                                            </p:txEl>
+                                          </p:spTgt>
+                                        </p:tgtEl>
+                                        <p:attrNameLst>
+                                          <p:attrName>ppt_x</p:attrName>
+                                        </p:attrNameLst>
+                                      </p:cBhvr>
+                                      <p:tavLst>
+                                        <p:tav tm="0">
+                                          <p:val>
+                                            <p:strVal val="#ppt_x"/>
+                                          </p:val>
+                                        </p:tav>
+                                        <p:tav tm="100000">
+                                          <p:val>
+                                            <p:strVal val="#ppt_x"/>
+                                          </p:val>
+                                        </p:tav>
+                                      </p:tavLst>
+                                    </p:anim>
+                                    <p:anim calcmode="lin" valueType="num">
+                                      <p:cBhvr additive="base">
+                                        <p:cTn id="8" dur="500" fill="hold"/>
+                                        <p:tgtEl>
+                                          <p:spTgt spid="2">
+                                            <p:txEl>
+                                              <p:pRg st="0" end="0"/>
+                                            </p:txEl>
+                                          </p:spTgt>
+                                        </p:tgtEl>
+                                        <p:attrNameLst>
+                                          <p:attrName>ppt_y</p:attrName>
+                                        </p:attrNameLst>
+                                      </p:cBhvr>
+                                      <p:tavLst>
+                                        <p:tav tm="0">
+                                          <p:val>
+                                            <p:strVal val="1+#ppt_h/2"/>
+                                          </p:val>
+                                        </p:tav>
+                                        <p:tav tm="100000">
+                                          <p:val>
+                                            <p:strVal val="#ppt_y"/>
+                                          </p:val>
+                                        </p:tav>
+                                      </p:tavLst>
+                                    </p:anim>
+                                  </p:childTnLst>
+                                </p:cTn>
+                              </p:par>
+                            </p:childTnLst>
+                          </p:cTn>
+                        </p:par>
+                      </p:childTnLst>
+                    </p:cTn>
+                  </p:par>
+                  <p:par>
+                    <p:cTn id="9" fill="hold">
+                      <p:stCondLst>
+                        <p:cond delay="indefinite"/>
+                      </p:stCondLst>
+                      <p:childTnLst>
+                        <p:par>
+                          <p:cTn id="10" fill="hold">
+                            <p:stCondLst>
+                              <p:cond delay="0"/>
+                            </p:stCondLst>
+                            <p:childTnLst>
+                              <p:par>
+                                <p:cTn id="11" presetID="2" presetClass="entr" presetSubtype="4" fill="hold" nodeType="clickEffect">
+                                  <p:stCondLst>
+                                    <p:cond delay="0"/>
+                                  </p:stCondLst>
+                                  <p:childTnLst>
+                                    <p:set>
+                                      <p:cBhvr>
+                                        <p:cTn id="12" dur="1" fill="hold">
+                                          <p:stCondLst>
+                                            <p:cond delay="0"/>
+                                          </p:stCondLst>
+                                        </p:cTn>
+                                        <p:tgtEl>
+                                          <p:spTgt spid="2050"/>
+                                        </p:tgtEl>
+                                        <p:attrNameLst>
+                                          <p:attrName>style.visibility</p:attrName>
+                                        </p:attrNameLst>
+                                      </p:cBhvr>
+                                      <p:to>
+                                        <p:strVal val="visible"/>
+                                      </p:to>
+                                    </p:set>
+                                    <p:anim calcmode="lin" valueType="num">
+                                      <p:cBhvr additive="base">
+                                        <p:cTn id="13" dur="500" fill="hold"/>
+                                        <p:tgtEl>
+                                          <p:spTgt spid="2050"/>
+                                        </p:tgtEl>
+                                        <p:attrNameLst>
+                                          <p:attrName>ppt_x</p:attrName>
+                                        </p:attrNameLst>
+                                      </p:cBhvr>
+                                      <p:tavLst>
+                                        <p:tav tm="0">
+                                          <p:val>
+                                            <p:strVal val="#ppt_x"/>
+                                          </p:val>
+                                        </p:tav>
+                                        <p:tav tm="100000">
+                                          <p:val>
+                                            <p:strVal val="#ppt_x"/>
+                                          </p:val>
+                                        </p:tav>
+                                      </p:tavLst>
+                                    </p:anim>
+                                    <p:anim calcmode="lin" valueType="num">
+                                      <p:cBhvr additive="base">
+                                        <p:cTn id="14" dur="500" fill="hold"/>
+                                        <p:tgtEl>
+                                          <p:spTgt spid="2050"/>
+                                        </p:tgtEl>
+                                        <p:attrNameLst>
+                                          <p:attrName>ppt_y</p:attrName>
+                                        </p:attrNameLst>
+                                      </p:cBhvr>
+                                      <p:tavLst>
+                                        <p:tav tm="0">
+                                          <p:val>
+                                            <p:strVal val="1+#ppt_h/2"/>
+                                          </p:val>
+                                        </p:tav>
+                                        <p:tav tm="100000">
+                                          <p:val>
+                                            <p:strVal val="#ppt_y"/>
+                                          </p:val>
+                                        </p:tav>
+                                      </p:tavLst>
+                                    </p:anim>
+                                  </p:childTnLst>
+                                </p:cTn>
+                              </p:par>
+                            </p:childTnLst>
+                          </p:cTn>
+                        </p:par>
+                      </p:childTnLst>
+                    </p:cTn>
+                  </p:par>
+                </p:childTnLst>
+              </p:cTn>
+              <p:prevCondLst>
+                <p:cond evt="onPrev" delay="0">
+                  <p:tgtEl>
+                    <p:sldTgt/>
+                  </p:tgtEl>
+                </p:cond>
+              </p:prevCondLst>
+              <p:nextCondLst>
+                <p:cond evt="onNext" delay="0">
+                  <p:tgtEl>
+                    <p:sldTgt/>
+                  </p:tgtEl>
+                </p:cond>
+              </p:nextCondLst>
+            </p:seq>
+          </p:childTnLst>
+        </p:cTn>
+      </p:par>
+    </p:tnLst>
+  </p:timing>
+</p:sld>
+</file>
+
+<file path=ppt/slides/slide31.xml><?xml version="1.0" encoding="utf-8"?>
+<p:sld xmlns:a="http://schemas.openxmlformats.org/drawingml/2006/main" xmlns:r="http://schemas.openxmlformats.org/officeDocument/2006/relationships" xmlns:p="http://schemas.openxmlformats.org/presentationml/2006/main">
+  <p:cSld>
+    <p:spTree>
+      <p:nvGrpSpPr>
+        <p:cNvPr id="1" name=""/>
+        <p:cNvGrpSpPr/>
+        <p:nvPr/>
+      </p:nvGrpSpPr>
+      <p:grpSpPr>
+        <a:xfrm>
+          <a:off x="0" y="0"/>
+          <a:ext cx="0" cy="0"/>
+          <a:chOff x="0" y="0"/>
+          <a:chExt cx="0" cy="0"/>
+        </a:xfrm>
+      </p:grpSpPr>
+      <p:sp>
+        <p:nvSpPr>
+          <p:cNvPr id="2" name="Symbol zastępczy zawartości 1"/>
+          <p:cNvSpPr>
+            <a:spLocks noGrp="1"/>
+          </p:cNvSpPr>
+          <p:nvPr>
+            <p:ph idx="1"/>
+          </p:nvPr>
+        </p:nvSpPr>
+        <p:spPr/>
+        <p:txBody>
+          <a:bodyPr/>
+          <a:lstStyle/>
+          <a:p>
+            <a:r>
+              <a:rPr lang="pl-PL" dirty="0" smtClean="0"/>
+              <a:t>Parametr </a:t>
+            </a:r>
+            <a:r>
+              <a:rPr lang="pl-PL" dirty="0" err="1" smtClean="0"/>
+              <a:t>wieloktorny</a:t>
+            </a:r>
+            <a:endParaRPr lang="pl-PL" dirty="0" smtClean="0"/>
+          </a:p>
+          <a:p>
+            <a:endParaRPr lang="pl-PL" dirty="0"/>
+          </a:p>
+        </p:txBody>
+      </p:sp>
+      <p:sp>
+        <p:nvSpPr>
+          <p:cNvPr id="3" name="Tytuł 2"/>
+          <p:cNvSpPr>
+            <a:spLocks noGrp="1"/>
+          </p:cNvSpPr>
+          <p:nvPr>
+            <p:ph type="title"/>
+          </p:nvPr>
+        </p:nvSpPr>
+        <p:spPr/>
+        <p:txBody>
+          <a:bodyPr>
+            <a:normAutofit fontScale="90000"/>
+          </a:bodyPr>
+          <a:lstStyle/>
+          <a:p>
+            <a:r>
+              <a:rPr lang="pl-PL" dirty="0" smtClean="0"/>
+              <a:t>Parametry anonimowe w </a:t>
+            </a:r>
+            <a:r>
+              <a:rPr lang="pl-PL" dirty="0" err="1" smtClean="0"/>
+              <a:t>Dapper</a:t>
+            </a:r>
+            <a:endParaRPr lang="pl-PL" dirty="0"/>
+          </a:p>
+        </p:txBody>
+      </p:sp>
+      <p:pic>
+        <p:nvPicPr>
+          <p:cNvPr id="3075" name="Picture 3"/>
+          <p:cNvPicPr>
+            <a:picLocks noChangeAspect="1" noChangeArrowheads="1"/>
+          </p:cNvPicPr>
+          <p:nvPr/>
+        </p:nvPicPr>
+        <p:blipFill>
+          <a:blip r:embed="rId2">
+            <a:extLst>
+              <a:ext uri="{28A0092B-C50C-407E-A947-70E740481C1C}">
+                <a14:useLocalDpi xmlns:a14="http://schemas.microsoft.com/office/drawing/2010/main" val="0"/>
+              </a:ext>
+            </a:extLst>
+          </a:blip>
+          <a:srcRect/>
+          <a:stretch>
+            <a:fillRect/>
+          </a:stretch>
+        </p:blipFill>
+        <p:spPr bwMode="auto">
+          <a:xfrm>
+            <a:off x="971600" y="2132856"/>
+            <a:ext cx="7354987" cy="3293669"/>
+          </a:xfrm>
+          <a:prstGeom prst="rect">
+            <a:avLst/>
+          </a:prstGeom>
+          <a:noFill/>
+          <a:ln>
+            <a:noFill/>
+          </a:ln>
+          <a:extLst>
+            <a:ext uri="{909E8E84-426E-40DD-AFC4-6F175D3DCCD1}">
+              <a14:hiddenFill xmlns:a14="http://schemas.microsoft.com/office/drawing/2010/main">
+                <a:solidFill>
+                  <a:schemeClr val="accent1"/>
+                </a:solidFill>
+              </a14:hiddenFill>
+            </a:ext>
+            <a:ext uri="{91240B29-F687-4F45-9708-019B960494DF}">
+              <a14:hiddenLine xmlns:a14="http://schemas.microsoft.com/office/drawing/2010/main" w="9525">
+                <a:solidFill>
+                  <a:schemeClr val="tx1"/>
+                </a:solidFill>
+                <a:miter lim="800000"/>
+                <a:headEnd/>
+                <a:tailEnd/>
+              </a14:hiddenLine>
+            </a:ext>
+          </a:extLst>
+        </p:spPr>
+      </p:pic>
+    </p:spTree>
+    <p:extLst>
+      <p:ext uri="{BB962C8B-B14F-4D97-AF65-F5344CB8AC3E}">
+        <p14:creationId xmlns:p14="http://schemas.microsoft.com/office/powerpoint/2010/main" val="1385118370"/>
+      </p:ext>
+    </p:extLst>
+  </p:cSld>
+  <p:clrMapOvr>
+    <a:masterClrMapping/>
+  </p:clrMapOvr>
+  <p:transition spd="slow">
+    <p:push dir="u"/>
+  </p:transition>
+  <p:timing>
+    <p:tnLst>
+      <p:par>
+        <p:cTn id="1" dur="indefinite" restart="never" nodeType="tmRoot">
+          <p:childTnLst>
+            <p:seq concurrent="1" nextAc="seek">
+              <p:cTn id="2" dur="indefinite" nodeType="mainSeq">
+                <p:childTnLst>
+                  <p:par>
+                    <p:cTn id="3" fill="hold">
+                      <p:stCondLst>
+                        <p:cond delay="indefinite"/>
+                      </p:stCondLst>
+                      <p:childTnLst>
+                        <p:par>
+                          <p:cTn id="4" fill="hold">
+                            <p:stCondLst>
+                              <p:cond delay="0"/>
+                            </p:stCondLst>
+                            <p:childTnLst>
+                              <p:par>
+                                <p:cTn id="5" presetID="2" presetClass="entr" presetSubtype="4" fill="hold" nodeType="clickEffect">
+                                  <p:stCondLst>
+                                    <p:cond delay="0"/>
+                                  </p:stCondLst>
+                                  <p:childTnLst>
+                                    <p:set>
+                                      <p:cBhvr>
+                                        <p:cTn id="6" dur="1" fill="hold">
+                                          <p:stCondLst>
+                                            <p:cond delay="0"/>
+                                          </p:stCondLst>
+                                        </p:cTn>
+                                        <p:tgtEl>
+                                          <p:spTgt spid="2">
+                                            <p:txEl>
+                                              <p:pRg st="0" end="0"/>
+                                            </p:txEl>
+                                          </p:spTgt>
+                                        </p:tgtEl>
+                                        <p:attrNameLst>
+                                          <p:attrName>style.visibility</p:attrName>
+                                        </p:attrNameLst>
+                                      </p:cBhvr>
+                                      <p:to>
+                                        <p:strVal val="visible"/>
+                                      </p:to>
+                                    </p:set>
+                                    <p:anim calcmode="lin" valueType="num">
+                                      <p:cBhvr additive="base">
+                                        <p:cTn id="7" dur="500" fill="hold"/>
+                                        <p:tgtEl>
+                                          <p:spTgt spid="2">
+                                            <p:txEl>
+                                              <p:pRg st="0" end="0"/>
+                                            </p:txEl>
+                                          </p:spTgt>
+                                        </p:tgtEl>
+                                        <p:attrNameLst>
+                                          <p:attrName>ppt_x</p:attrName>
+                                        </p:attrNameLst>
+                                      </p:cBhvr>
+                                      <p:tavLst>
+                                        <p:tav tm="0">
+                                          <p:val>
+                                            <p:strVal val="#ppt_x"/>
+                                          </p:val>
+                                        </p:tav>
+                                        <p:tav tm="100000">
+                                          <p:val>
+                                            <p:strVal val="#ppt_x"/>
+                                          </p:val>
+                                        </p:tav>
+                                      </p:tavLst>
+                                    </p:anim>
+                                    <p:anim calcmode="lin" valueType="num">
+                                      <p:cBhvr additive="base">
+                                        <p:cTn id="8" dur="500" fill="hold"/>
+                                        <p:tgtEl>
+                                          <p:spTgt spid="2">
+                                            <p:txEl>
+                                              <p:pRg st="0" end="0"/>
+                                            </p:txEl>
+                                          </p:spTgt>
+                                        </p:tgtEl>
+                                        <p:attrNameLst>
+                                          <p:attrName>ppt_y</p:attrName>
+                                        </p:attrNameLst>
+                                      </p:cBhvr>
+                                      <p:tavLst>
+                                        <p:tav tm="0">
+                                          <p:val>
+                                            <p:strVal val="1+#ppt_h/2"/>
+                                          </p:val>
+                                        </p:tav>
+                                        <p:tav tm="100000">
+                                          <p:val>
+                                            <p:strVal val="#ppt_y"/>
+                                          </p:val>
+                                        </p:tav>
+                                      </p:tavLst>
+                                    </p:anim>
+                                  </p:childTnLst>
+                                </p:cTn>
+                              </p:par>
+                            </p:childTnLst>
+                          </p:cTn>
+                        </p:par>
+                      </p:childTnLst>
+                    </p:cTn>
+                  </p:par>
+                  <p:par>
+                    <p:cTn id="9" fill="hold">
+                      <p:stCondLst>
+                        <p:cond delay="indefinite"/>
+                      </p:stCondLst>
+                      <p:childTnLst>
+                        <p:par>
+                          <p:cTn id="10" fill="hold">
+                            <p:stCondLst>
+                              <p:cond delay="0"/>
+                            </p:stCondLst>
+                            <p:childTnLst>
+                              <p:par>
+                                <p:cTn id="11" presetID="2" presetClass="entr" presetSubtype="4" fill="hold" nodeType="clickEffect">
+                                  <p:stCondLst>
+                                    <p:cond delay="0"/>
+                                  </p:stCondLst>
+                                  <p:childTnLst>
+                                    <p:set>
+                                      <p:cBhvr>
+                                        <p:cTn id="12" dur="1" fill="hold">
+                                          <p:stCondLst>
+                                            <p:cond delay="0"/>
+                                          </p:stCondLst>
+                                        </p:cTn>
+                                        <p:tgtEl>
+                                          <p:spTgt spid="3075"/>
+                                        </p:tgtEl>
+                                        <p:attrNameLst>
+                                          <p:attrName>style.visibility</p:attrName>
+                                        </p:attrNameLst>
+                                      </p:cBhvr>
+                                      <p:to>
+                                        <p:strVal val="visible"/>
+                                      </p:to>
+                                    </p:set>
+                                    <p:anim calcmode="lin" valueType="num">
+                                      <p:cBhvr additive="base">
+                                        <p:cTn id="13" dur="500" fill="hold"/>
+                                        <p:tgtEl>
+                                          <p:spTgt spid="3075"/>
+                                        </p:tgtEl>
+                                        <p:attrNameLst>
+                                          <p:attrName>ppt_x</p:attrName>
+                                        </p:attrNameLst>
+                                      </p:cBhvr>
+                                      <p:tavLst>
+                                        <p:tav tm="0">
+                                          <p:val>
+                                            <p:strVal val="#ppt_x"/>
+                                          </p:val>
+                                        </p:tav>
+                                        <p:tav tm="100000">
+                                          <p:val>
+                                            <p:strVal val="#ppt_x"/>
+                                          </p:val>
+                                        </p:tav>
+                                      </p:tavLst>
+                                    </p:anim>
+                                    <p:anim calcmode="lin" valueType="num">
+                                      <p:cBhvr additive="base">
+                                        <p:cTn id="14" dur="500" fill="hold"/>
+                                        <p:tgtEl>
+                                          <p:spTgt spid="3075"/>
+                                        </p:tgtEl>
+                                        <p:attrNameLst>
+                                          <p:attrName>ppt_y</p:attrName>
+                                        </p:attrNameLst>
+                                      </p:cBhvr>
+                                      <p:tavLst>
+                                        <p:tav tm="0">
+                                          <p:val>
+                                            <p:strVal val="1+#ppt_h/2"/>
+                                          </p:val>
+                                        </p:tav>
+                                        <p:tav tm="100000">
+                                          <p:val>
+                                            <p:strVal val="#ppt_y"/>
+                                          </p:val>
+                                        </p:tav>
+                                      </p:tavLst>
+                                    </p:anim>
+                                  </p:childTnLst>
+                                </p:cTn>
+                              </p:par>
+                            </p:childTnLst>
+                          </p:cTn>
+                        </p:par>
+                      </p:childTnLst>
+                    </p:cTn>
+                  </p:par>
+                </p:childTnLst>
+              </p:cTn>
+              <p:prevCondLst>
+                <p:cond evt="onPrev" delay="0">
+                  <p:tgtEl>
+                    <p:sldTgt/>
+                  </p:tgtEl>
+                </p:cond>
+              </p:prevCondLst>
+              <p:nextCondLst>
+                <p:cond evt="onNext" delay="0">
+                  <p:tgtEl>
+                    <p:sldTgt/>
+                  </p:tgtEl>
+                </p:cond>
+              </p:nextCondLst>
+            </p:seq>
+          </p:childTnLst>
+        </p:cTn>
+      </p:par>
+    </p:tnLst>
+  </p:timing>
+</p:sld>
+</file>
+
+<file path=ppt/slides/slide32.xml><?xml version="1.0" encoding="utf-8"?>
+<p:sld xmlns:a="http://schemas.openxmlformats.org/drawingml/2006/main" xmlns:r="http://schemas.openxmlformats.org/officeDocument/2006/relationships" xmlns:p="http://schemas.openxmlformats.org/presentationml/2006/main">
+  <p:cSld>
+    <p:spTree>
+      <p:nvGrpSpPr>
+        <p:cNvPr id="1" name=""/>
+        <p:cNvGrpSpPr/>
+        <p:nvPr/>
+      </p:nvGrpSpPr>
+      <p:grpSpPr>
+        <a:xfrm>
+          <a:off x="0" y="0"/>
+          <a:ext cx="0" cy="0"/>
+          <a:chOff x="0" y="0"/>
+          <a:chExt cx="0" cy="0"/>
+        </a:xfrm>
+      </p:grpSpPr>
+      <p:sp>
+        <p:nvSpPr>
+          <p:cNvPr id="3" name="Symbol zastępczy zawartości 2"/>
+          <p:cNvSpPr>
+            <a:spLocks noGrp="1"/>
+          </p:cNvSpPr>
+          <p:nvPr>
+            <p:ph idx="1"/>
+          </p:nvPr>
+        </p:nvSpPr>
+        <p:spPr/>
+        <p:txBody>
+          <a:bodyPr>
+            <a:normAutofit lnSpcReduction="10000"/>
+          </a:bodyPr>
+          <a:lstStyle/>
+          <a:p>
+            <a:pPr marL="109728" indent="0">
+              <a:buNone/>
+            </a:pPr>
+            <a:r>
+              <a:rPr lang="pl-PL" dirty="0" smtClean="0"/>
+              <a:t>Przedstawione materiały szkoleniowe, prezentacja wraz z konspektem, projekt użyty do prezentacji i warsztatów jest własnością intelektualną szkolących Michała Gwóźdź oraz Łukasza Szustaka.</a:t>
+            </a:r>
+          </a:p>
+          <a:p>
+            <a:pPr marL="109728" indent="0">
+              <a:buNone/>
+            </a:pPr>
+            <a:r>
+              <a:rPr lang="pl-PL" dirty="0" smtClean="0"/>
+              <a:t>Wykorzystanie bez zgody twórców któregokolwiek materiału do innych celów niż samokształcenie osoby szkolonej, takie jak upublicznianie, cytowanie lub inna forma redystrybucji jest jawnym naruszeniem praw autorskich.</a:t>
+            </a:r>
+            <a:endParaRPr lang="pl-PL" dirty="0"/>
+          </a:p>
+        </p:txBody>
+      </p:sp>
+      <p:sp>
+        <p:nvSpPr>
+          <p:cNvPr id="2" name="Tytuł 1"/>
+          <p:cNvSpPr>
+            <a:spLocks noGrp="1"/>
+          </p:cNvSpPr>
+          <p:nvPr>
+            <p:ph type="title"/>
+          </p:nvPr>
+        </p:nvSpPr>
+        <p:spPr/>
+        <p:txBody>
+          <a:bodyPr/>
+          <a:lstStyle/>
+          <a:p>
+            <a:r>
+              <a:rPr lang="pl-PL" dirty="0" smtClean="0"/>
+              <a:t>Słowo końcowe</a:t>
+            </a:r>
+            <a:endParaRPr lang="pl-PL" dirty="0"/>
+          </a:p>
+        </p:txBody>
+      </p:sp>
+    </p:spTree>
+    <p:extLst>
+      <p:ext uri="{BB962C8B-B14F-4D97-AF65-F5344CB8AC3E}">
+        <p14:creationId xmlns:p14="http://schemas.microsoft.com/office/powerpoint/2010/main" val="3785988704"/>
+      </p:ext>
+    </p:extLst>
+  </p:cSld>
+  <p:clrMapOvr>
+    <a:masterClrMapping/>
+  </p:clrMapOvr>
+  <p:transition spd="slow">
+    <p:push dir="u"/>
+  </p:transition>
+  <p:timing>
+    <p:tnLst>
+      <p:par>
+        <p:cTn id="1" dur="indefinite" restart="never" nodeType="tmRoot">
+          <p:childTnLst>
+            <p:seq concurrent="1" nextAc="seek">
+              <p:cTn id="2" dur="indefinite" nodeType="mainSeq">
+                <p:childTnLst>
+                  <p:par>
+                    <p:cTn id="3" fill="hold">
+                      <p:stCondLst>
+                        <p:cond delay="indefinite"/>
+                      </p:stCondLst>
+                      <p:childTnLst>
+                        <p:par>
+                          <p:cTn id="4" fill="hold">
+                            <p:stCondLst>
+                              <p:cond delay="0"/>
+                            </p:stCondLst>
+                            <p:childTnLst>
+                              <p:par>
+                                <p:cTn id="5" presetID="2" presetClass="entr" presetSubtype="4" fill="hold" nodeType="clickEffect">
+                                  <p:stCondLst>
+                                    <p:cond delay="0"/>
+                                  </p:stCondLst>
+                                  <p:childTnLst>
+                                    <p:set>
+                                      <p:cBhvr>
+                                        <p:cTn id="6" dur="1" fill="hold">
+                                          <p:stCondLst>
+                                            <p:cond delay="0"/>
+                                          </p:stCondLst>
+                                        </p:cTn>
+                                        <p:tgtEl>
+                                          <p:spTgt spid="3">
+                                            <p:txEl>
+                                              <p:pRg st="0" end="0"/>
+                                            </p:txEl>
+                                          </p:spTgt>
+                                        </p:tgtEl>
+                                        <p:attrNameLst>
+                                          <p:attrName>style.visibility</p:attrName>
+                                        </p:attrNameLst>
+                                      </p:cBhvr>
+                                      <p:to>
+                                        <p:strVal val="visible"/>
+                                      </p:to>
+                                    </p:set>
+                                    <p:anim calcmode="lin" valueType="num">
+                                      <p:cBhvr additive="base">
+                                        <p:cTn id="7" dur="500" fill="hold"/>
+                                        <p:tgtEl>
+                                          <p:spTgt spid="3">
+                                            <p:txEl>
+                                              <p:pRg st="0" end="0"/>
+                                            </p:txEl>
+                                          </p:spTgt>
+                                        </p:tgtEl>
+                                        <p:attrNameLst>
+                                          <p:attrName>ppt_x</p:attrName>
+                                        </p:attrNameLst>
+                                      </p:cBhvr>
+                                      <p:tavLst>
+                                        <p:tav tm="0">
+                                          <p:val>
+                                            <p:strVal val="#ppt_x"/>
+                                          </p:val>
+                                        </p:tav>
+                                        <p:tav tm="100000">
+                                          <p:val>
+                                            <p:strVal val="#ppt_x"/>
+                                          </p:val>
+                                        </p:tav>
+                                      </p:tavLst>
+                                    </p:anim>
+                                    <p:anim calcmode="lin" valueType="num">
+                                      <p:cBhvr additive="base">
+                                        <p:cTn id="8" dur="500" fill="hold"/>
+                                        <p:tgtEl>
+                                          <p:spTgt spid="3">
+                                            <p:txEl>
+                                              <p:pRg st="0" end="0"/>
+                                            </p:txEl>
+                                          </p:spTgt>
+                                        </p:tgtEl>
+                                        <p:attrNameLst>
+                                          <p:attrName>ppt_y</p:attrName>
+                                        </p:attrNameLst>
+                                      </p:cBhvr>
+                                      <p:tavLst>
+                                        <p:tav tm="0">
+                                          <p:val>
+                                            <p:strVal val="1+#ppt_h/2"/>
+                                          </p:val>
+                                        </p:tav>
+                                        <p:tav tm="100000">
+                                          <p:val>
+                                            <p:strVal val="#ppt_y"/>
+                                          </p:val>
+                                        </p:tav>
+                                      </p:tavLst>
+                                    </p:anim>
+                                  </p:childTnLst>
+                                </p:cTn>
+                              </p:par>
+                            </p:childTnLst>
+                          </p:cTn>
+                        </p:par>
+                      </p:childTnLst>
+                    </p:cTn>
+                  </p:par>
+                  <p:par>
+                    <p:cTn id="9" fill="hold">
+                      <p:stCondLst>
+                        <p:cond delay="indefinite"/>
+                      </p:stCondLst>
+                      <p:childTnLst>
+                        <p:par>
+                          <p:cTn id="10" fill="hold">
+                            <p:stCondLst>
+                              <p:cond delay="0"/>
+                            </p:stCondLst>
+                            <p:childTnLst>
+                              <p:par>
+                                <p:cTn id="11" presetID="2" presetClass="entr" presetSubtype="4" fill="hold" nodeType="clickEffect">
+                                  <p:stCondLst>
+                                    <p:cond delay="0"/>
+                                  </p:stCondLst>
+                                  <p:childTnLst>
+                                    <p:set>
+                                      <p:cBhvr>
+                                        <p:cTn id="12" dur="1" fill="hold">
+                                          <p:stCondLst>
+                                            <p:cond delay="0"/>
+                                          </p:stCondLst>
+                                        </p:cTn>
+                                        <p:tgtEl>
+                                          <p:spTgt spid="3">
+                                            <p:txEl>
+                                              <p:pRg st="1" end="1"/>
+                                            </p:txEl>
+                                          </p:spTgt>
+                                        </p:tgtEl>
+                                        <p:attrNameLst>
+                                          <p:attrName>style.visibility</p:attrName>
+                                        </p:attrNameLst>
+                                      </p:cBhvr>
+                                      <p:to>
+                                        <p:strVal val="visible"/>
+                                      </p:to>
+                                    </p:set>
+                                    <p:anim calcmode="lin" valueType="num">
+                                      <p:cBhvr additive="base">
+                                        <p:cTn id="13" dur="500" fill="hold"/>
+                                        <p:tgtEl>
+                                          <p:spTgt spid="3">
+                                            <p:txEl>
+                                              <p:pRg st="1" end="1"/>
+                                            </p:txEl>
+                                          </p:spTgt>
+                                        </p:tgtEl>
+                                        <p:attrNameLst>
+                                          <p:attrName>ppt_x</p:attrName>
+                                        </p:attrNameLst>
+                                      </p:cBhvr>
+                                      <p:tavLst>
+                                        <p:tav tm="0">
+                                          <p:val>
+                                            <p:strVal val="#ppt_x"/>
+                                          </p:val>
+                                        </p:tav>
+                                        <p:tav tm="100000">
+                                          <p:val>
+                                            <p:strVal val="#ppt_x"/>
+                                          </p:val>
+                                        </p:tav>
+                                      </p:tavLst>
+                                    </p:anim>
+                                    <p:anim calcmode="lin" valueType="num">
+                                      <p:cBhvr additive="base">
+                                        <p:cTn id="14" dur="500" fill="hold"/>
+                                        <p:tgtEl>
+                                          <p:spTgt spid="3">
+                                            <p:txEl>
+                                              <p:pRg st="1" end="1"/>
+                                            </p:txEl>
+                                          </p:spTgt>
+                                        </p:tgtEl>
+                                        <p:attrNameLst>
+                                          <p:attrName>ppt_y</p:attrName>
+                                        </p:attrNameLst>
+                                      </p:cBhvr>
+                                      <p:tavLst>
+                                        <p:tav tm="0">
+                                          <p:val>
+                                            <p:strVal val="1+#ppt_h/2"/>
+                                          </p:val>
+                                        </p:tav>
+                                        <p:tav tm="100000">
+                                          <p:val>
+                                            <p:strVal val="#ppt_y"/>
+                                          </p:val>
+                                        </p:tav>
+                                      </p:tavLst>
+                                    </p:anim>
+                                  </p:childTnLst>
+                                </p:cTn>
+                              </p:par>
+                            </p:childTnLst>
+                          </p:cTn>
+                        </p:par>
+                      </p:childTnLst>
+                    </p:cTn>
+                  </p:par>
+                </p:childTnLst>
+              </p:cTn>
+              <p:prevCondLst>
+                <p:cond evt="onPrev" delay="0">
+                  <p:tgtEl>
+                    <p:sldTgt/>
+                  </p:tgtEl>
+                </p:cond>
+              </p:prevCondLst>
+              <p:nextCondLst>
+                <p:cond evt="onNext" delay="0">
+                  <p:tgtEl>
+                    <p:sldTgt/>
+                  </p:tgtEl>
+                </p:cond>
+              </p:nextCondLst>
+            </p:seq>
+          </p:childTnLst>
+        </p:cTn>
+      </p:par>
+    </p:tnLst>
   </p:timing>
 </p:sld>
 </file>

</xml_diff>

<commit_message>
presentation - added dynamic parameters
</commit_message>
<xml_diff>
--- a/Files/Szkolenie warsztatowe Dapper.pptx
+++ b/Files/Szkolenie warsztatowe Dapper.pptx
@@ -36,7 +36,9 @@
     <p:sldId id="285" r:id="rId30"/>
     <p:sldId id="286" r:id="rId31"/>
     <p:sldId id="287" r:id="rId32"/>
-    <p:sldId id="257" r:id="rId33"/>
+    <p:sldId id="288" r:id="rId33"/>
+    <p:sldId id="289" r:id="rId34"/>
+    <p:sldId id="257" r:id="rId35"/>
   </p:sldIdLst>
   <p:sldSz cx="9144000" cy="6858000" type="screen4x3"/>
   <p:notesSz cx="6858000" cy="9144000"/>
@@ -19873,6 +19875,510 @@
       </p:grpSpPr>
       <p:sp>
         <p:nvSpPr>
+          <p:cNvPr id="3" name="Tytuł 2"/>
+          <p:cNvSpPr>
+            <a:spLocks noGrp="1"/>
+          </p:cNvSpPr>
+          <p:nvPr>
+            <p:ph type="title"/>
+          </p:nvPr>
+        </p:nvSpPr>
+        <p:spPr/>
+        <p:txBody>
+          <a:bodyPr/>
+          <a:lstStyle/>
+          <a:p>
+            <a:r>
+              <a:rPr lang="pl-PL" dirty="0" smtClean="0"/>
+              <a:t>Parametry dynamiczne</a:t>
+            </a:r>
+            <a:endParaRPr lang="pl-PL" dirty="0"/>
+          </a:p>
+        </p:txBody>
+      </p:sp>
+      <p:sp>
+        <p:nvSpPr>
+          <p:cNvPr id="4" name="Symbol zastępczy zawartości 3"/>
+          <p:cNvSpPr>
+            <a:spLocks noGrp="1"/>
+          </p:cNvSpPr>
+          <p:nvPr>
+            <p:ph idx="1"/>
+          </p:nvPr>
+        </p:nvSpPr>
+        <p:spPr/>
+        <p:txBody>
+          <a:bodyPr/>
+          <a:lstStyle/>
+          <a:p>
+            <a:r>
+              <a:rPr lang="pl-PL" dirty="0" smtClean="0"/>
+              <a:t>Parametr pojedynczy</a:t>
+            </a:r>
+          </a:p>
+          <a:p>
+            <a:endParaRPr lang="pl-PL" dirty="0"/>
+          </a:p>
+        </p:txBody>
+      </p:sp>
+      <p:pic>
+        <p:nvPicPr>
+          <p:cNvPr id="4099" name="Picture 3"/>
+          <p:cNvPicPr>
+            <a:picLocks noChangeAspect="1" noChangeArrowheads="1"/>
+          </p:cNvPicPr>
+          <p:nvPr/>
+        </p:nvPicPr>
+        <p:blipFill>
+          <a:blip r:embed="rId2">
+            <a:extLst>
+              <a:ext uri="{28A0092B-C50C-407E-A947-70E740481C1C}">
+                <a14:useLocalDpi xmlns:a14="http://schemas.microsoft.com/office/drawing/2010/main" val="0"/>
+              </a:ext>
+            </a:extLst>
+          </a:blip>
+          <a:srcRect/>
+          <a:stretch>
+            <a:fillRect/>
+          </a:stretch>
+        </p:blipFill>
+        <p:spPr bwMode="auto">
+          <a:xfrm>
+            <a:off x="299191" y="2348880"/>
+            <a:ext cx="8678962" cy="1730829"/>
+          </a:xfrm>
+          <a:prstGeom prst="rect">
+            <a:avLst/>
+          </a:prstGeom>
+          <a:noFill/>
+          <a:ln>
+            <a:noFill/>
+          </a:ln>
+          <a:extLst>
+            <a:ext uri="{909E8E84-426E-40DD-AFC4-6F175D3DCCD1}">
+              <a14:hiddenFill xmlns:a14="http://schemas.microsoft.com/office/drawing/2010/main">
+                <a:solidFill>
+                  <a:schemeClr val="accent1"/>
+                </a:solidFill>
+              </a14:hiddenFill>
+            </a:ext>
+            <a:ext uri="{91240B29-F687-4F45-9708-019B960494DF}">
+              <a14:hiddenLine xmlns:a14="http://schemas.microsoft.com/office/drawing/2010/main" w="9525">
+                <a:solidFill>
+                  <a:schemeClr val="tx1"/>
+                </a:solidFill>
+                <a:miter lim="800000"/>
+                <a:headEnd/>
+                <a:tailEnd/>
+              </a14:hiddenLine>
+            </a:ext>
+          </a:extLst>
+        </p:spPr>
+      </p:pic>
+    </p:spTree>
+    <p:extLst>
+      <p:ext uri="{BB962C8B-B14F-4D97-AF65-F5344CB8AC3E}">
+        <p14:creationId xmlns:p14="http://schemas.microsoft.com/office/powerpoint/2010/main" val="2017750107"/>
+      </p:ext>
+    </p:extLst>
+  </p:cSld>
+  <p:clrMapOvr>
+    <a:masterClrMapping/>
+  </p:clrMapOvr>
+  <p:transition spd="slow">
+    <p:push dir="u"/>
+  </p:transition>
+  <p:timing>
+    <p:tnLst>
+      <p:par>
+        <p:cTn id="1" dur="indefinite" restart="never" nodeType="tmRoot">
+          <p:childTnLst>
+            <p:seq concurrent="1" nextAc="seek">
+              <p:cTn id="2" dur="indefinite" nodeType="mainSeq">
+                <p:childTnLst>
+                  <p:par>
+                    <p:cTn id="3" fill="hold">
+                      <p:stCondLst>
+                        <p:cond delay="indefinite"/>
+                      </p:stCondLst>
+                      <p:childTnLst>
+                        <p:par>
+                          <p:cTn id="4" fill="hold">
+                            <p:stCondLst>
+                              <p:cond delay="0"/>
+                            </p:stCondLst>
+                            <p:childTnLst>
+                              <p:par>
+                                <p:cTn id="5" presetID="2" presetClass="entr" presetSubtype="4" fill="hold" grpId="0" nodeType="clickEffect">
+                                  <p:stCondLst>
+                                    <p:cond delay="0"/>
+                                  </p:stCondLst>
+                                  <p:childTnLst>
+                                    <p:set>
+                                      <p:cBhvr>
+                                        <p:cTn id="6" dur="1" fill="hold">
+                                          <p:stCondLst>
+                                            <p:cond delay="0"/>
+                                          </p:stCondLst>
+                                        </p:cTn>
+                                        <p:tgtEl>
+                                          <p:spTgt spid="4">
+                                            <p:txEl>
+                                              <p:pRg st="0" end="0"/>
+                                            </p:txEl>
+                                          </p:spTgt>
+                                        </p:tgtEl>
+                                        <p:attrNameLst>
+                                          <p:attrName>style.visibility</p:attrName>
+                                        </p:attrNameLst>
+                                      </p:cBhvr>
+                                      <p:to>
+                                        <p:strVal val="visible"/>
+                                      </p:to>
+                                    </p:set>
+                                    <p:anim calcmode="lin" valueType="num">
+                                      <p:cBhvr additive="base">
+                                        <p:cTn id="7" dur="500" fill="hold"/>
+                                        <p:tgtEl>
+                                          <p:spTgt spid="4">
+                                            <p:txEl>
+                                              <p:pRg st="0" end="0"/>
+                                            </p:txEl>
+                                          </p:spTgt>
+                                        </p:tgtEl>
+                                        <p:attrNameLst>
+                                          <p:attrName>ppt_x</p:attrName>
+                                        </p:attrNameLst>
+                                      </p:cBhvr>
+                                      <p:tavLst>
+                                        <p:tav tm="0">
+                                          <p:val>
+                                            <p:strVal val="#ppt_x"/>
+                                          </p:val>
+                                        </p:tav>
+                                        <p:tav tm="100000">
+                                          <p:val>
+                                            <p:strVal val="#ppt_x"/>
+                                          </p:val>
+                                        </p:tav>
+                                      </p:tavLst>
+                                    </p:anim>
+                                    <p:anim calcmode="lin" valueType="num">
+                                      <p:cBhvr additive="base">
+                                        <p:cTn id="8" dur="500" fill="hold"/>
+                                        <p:tgtEl>
+                                          <p:spTgt spid="4">
+                                            <p:txEl>
+                                              <p:pRg st="0" end="0"/>
+                                            </p:txEl>
+                                          </p:spTgt>
+                                        </p:tgtEl>
+                                        <p:attrNameLst>
+                                          <p:attrName>ppt_y</p:attrName>
+                                        </p:attrNameLst>
+                                      </p:cBhvr>
+                                      <p:tavLst>
+                                        <p:tav tm="0">
+                                          <p:val>
+                                            <p:strVal val="1+#ppt_h/2"/>
+                                          </p:val>
+                                        </p:tav>
+                                        <p:tav tm="100000">
+                                          <p:val>
+                                            <p:strVal val="#ppt_y"/>
+                                          </p:val>
+                                        </p:tav>
+                                      </p:tavLst>
+                                    </p:anim>
+                                  </p:childTnLst>
+                                </p:cTn>
+                              </p:par>
+                            </p:childTnLst>
+                          </p:cTn>
+                        </p:par>
+                      </p:childTnLst>
+                    </p:cTn>
+                  </p:par>
+                  <p:par>
+                    <p:cTn id="9" fill="hold">
+                      <p:stCondLst>
+                        <p:cond delay="indefinite"/>
+                      </p:stCondLst>
+                      <p:childTnLst>
+                        <p:par>
+                          <p:cTn id="10" fill="hold">
+                            <p:stCondLst>
+                              <p:cond delay="0"/>
+                            </p:stCondLst>
+                            <p:childTnLst>
+                              <p:par>
+                                <p:cTn id="11" presetID="2" presetClass="entr" presetSubtype="4" fill="hold" nodeType="clickEffect">
+                                  <p:stCondLst>
+                                    <p:cond delay="0"/>
+                                  </p:stCondLst>
+                                  <p:childTnLst>
+                                    <p:set>
+                                      <p:cBhvr>
+                                        <p:cTn id="12" dur="1" fill="hold">
+                                          <p:stCondLst>
+                                            <p:cond delay="0"/>
+                                          </p:stCondLst>
+                                        </p:cTn>
+                                        <p:tgtEl>
+                                          <p:spTgt spid="4099"/>
+                                        </p:tgtEl>
+                                        <p:attrNameLst>
+                                          <p:attrName>style.visibility</p:attrName>
+                                        </p:attrNameLst>
+                                      </p:cBhvr>
+                                      <p:to>
+                                        <p:strVal val="visible"/>
+                                      </p:to>
+                                    </p:set>
+                                    <p:anim calcmode="lin" valueType="num">
+                                      <p:cBhvr additive="base">
+                                        <p:cTn id="13" dur="500" fill="hold"/>
+                                        <p:tgtEl>
+                                          <p:spTgt spid="4099"/>
+                                        </p:tgtEl>
+                                        <p:attrNameLst>
+                                          <p:attrName>ppt_x</p:attrName>
+                                        </p:attrNameLst>
+                                      </p:cBhvr>
+                                      <p:tavLst>
+                                        <p:tav tm="0">
+                                          <p:val>
+                                            <p:strVal val="#ppt_x"/>
+                                          </p:val>
+                                        </p:tav>
+                                        <p:tav tm="100000">
+                                          <p:val>
+                                            <p:strVal val="#ppt_x"/>
+                                          </p:val>
+                                        </p:tav>
+                                      </p:tavLst>
+                                    </p:anim>
+                                    <p:anim calcmode="lin" valueType="num">
+                                      <p:cBhvr additive="base">
+                                        <p:cTn id="14" dur="500" fill="hold"/>
+                                        <p:tgtEl>
+                                          <p:spTgt spid="4099"/>
+                                        </p:tgtEl>
+                                        <p:attrNameLst>
+                                          <p:attrName>ppt_y</p:attrName>
+                                        </p:attrNameLst>
+                                      </p:cBhvr>
+                                      <p:tavLst>
+                                        <p:tav tm="0">
+                                          <p:val>
+                                            <p:strVal val="1+#ppt_h/2"/>
+                                          </p:val>
+                                        </p:tav>
+                                        <p:tav tm="100000">
+                                          <p:val>
+                                            <p:strVal val="#ppt_y"/>
+                                          </p:val>
+                                        </p:tav>
+                                      </p:tavLst>
+                                    </p:anim>
+                                  </p:childTnLst>
+                                </p:cTn>
+                              </p:par>
+                            </p:childTnLst>
+                          </p:cTn>
+                        </p:par>
+                      </p:childTnLst>
+                    </p:cTn>
+                  </p:par>
+                </p:childTnLst>
+              </p:cTn>
+              <p:prevCondLst>
+                <p:cond evt="onPrev" delay="0">
+                  <p:tgtEl>
+                    <p:sldTgt/>
+                  </p:tgtEl>
+                </p:cond>
+              </p:prevCondLst>
+              <p:nextCondLst>
+                <p:cond evt="onNext" delay="0">
+                  <p:tgtEl>
+                    <p:sldTgt/>
+                  </p:tgtEl>
+                </p:cond>
+              </p:nextCondLst>
+            </p:seq>
+          </p:childTnLst>
+        </p:cTn>
+      </p:par>
+    </p:tnLst>
+    <p:bldLst>
+      <p:bldP spid="4" grpId="0" build="p"/>
+    </p:bldLst>
+  </p:timing>
+</p:sld>
+</file>
+
+<file path=ppt/slides/slide33.xml><?xml version="1.0" encoding="utf-8"?>
+<p:sld xmlns:a="http://schemas.openxmlformats.org/drawingml/2006/main" xmlns:r="http://schemas.openxmlformats.org/officeDocument/2006/relationships" xmlns:p="http://schemas.openxmlformats.org/presentationml/2006/main">
+  <p:cSld>
+    <p:spTree>
+      <p:nvGrpSpPr>
+        <p:cNvPr id="1" name=""/>
+        <p:cNvGrpSpPr/>
+        <p:nvPr/>
+      </p:nvGrpSpPr>
+      <p:grpSpPr>
+        <a:xfrm>
+          <a:off x="0" y="0"/>
+          <a:ext cx="0" cy="0"/>
+          <a:chOff x="0" y="0"/>
+          <a:chExt cx="0" cy="0"/>
+        </a:xfrm>
+      </p:grpSpPr>
+      <p:sp>
+        <p:nvSpPr>
+          <p:cNvPr id="2" name="Symbol zastępczy zawartości 1"/>
+          <p:cNvSpPr>
+            <a:spLocks noGrp="1"/>
+          </p:cNvSpPr>
+          <p:nvPr>
+            <p:ph idx="1"/>
+          </p:nvPr>
+        </p:nvSpPr>
+        <p:spPr/>
+        <p:txBody>
+          <a:bodyPr/>
+          <a:lstStyle/>
+          <a:p>
+            <a:r>
+              <a:rPr lang="pl-PL" dirty="0" smtClean="0"/>
+              <a:t>Parametr wielokrotny</a:t>
+            </a:r>
+          </a:p>
+          <a:p>
+            <a:endParaRPr lang="pl-PL" dirty="0"/>
+          </a:p>
+        </p:txBody>
+      </p:sp>
+      <p:sp>
+        <p:nvSpPr>
+          <p:cNvPr id="3" name="Tytuł 2"/>
+          <p:cNvSpPr>
+            <a:spLocks noGrp="1"/>
+          </p:cNvSpPr>
+          <p:nvPr>
+            <p:ph type="title"/>
+          </p:nvPr>
+        </p:nvSpPr>
+        <p:spPr/>
+        <p:txBody>
+          <a:bodyPr/>
+          <a:lstStyle/>
+          <a:p>
+            <a:r>
+              <a:rPr lang="pl-PL" dirty="0" smtClean="0"/>
+              <a:t>Parametry dynamiczne</a:t>
+            </a:r>
+            <a:endParaRPr lang="pl-PL" dirty="0"/>
+          </a:p>
+        </p:txBody>
+      </p:sp>
+      <p:pic>
+        <p:nvPicPr>
+          <p:cNvPr id="5122" name="Picture 2"/>
+          <p:cNvPicPr>
+            <a:picLocks noChangeAspect="1" noChangeArrowheads="1"/>
+          </p:cNvPicPr>
+          <p:nvPr/>
+        </p:nvPicPr>
+        <p:blipFill>
+          <a:blip r:embed="rId2">
+            <a:extLst>
+              <a:ext uri="{28A0092B-C50C-407E-A947-70E740481C1C}">
+                <a14:useLocalDpi xmlns:a14="http://schemas.microsoft.com/office/drawing/2010/main" val="0"/>
+              </a:ext>
+            </a:extLst>
+          </a:blip>
+          <a:srcRect/>
+          <a:stretch>
+            <a:fillRect/>
+          </a:stretch>
+        </p:blipFill>
+        <p:spPr bwMode="auto">
+          <a:xfrm>
+            <a:off x="107504" y="2060848"/>
+            <a:ext cx="8883005" cy="3335279"/>
+          </a:xfrm>
+          <a:prstGeom prst="rect">
+            <a:avLst/>
+          </a:prstGeom>
+          <a:noFill/>
+          <a:ln>
+            <a:noFill/>
+          </a:ln>
+          <a:extLst>
+            <a:ext uri="{909E8E84-426E-40DD-AFC4-6F175D3DCCD1}">
+              <a14:hiddenFill xmlns:a14="http://schemas.microsoft.com/office/drawing/2010/main">
+                <a:solidFill>
+                  <a:schemeClr val="accent1"/>
+                </a:solidFill>
+              </a14:hiddenFill>
+            </a:ext>
+            <a:ext uri="{91240B29-F687-4F45-9708-019B960494DF}">
+              <a14:hiddenLine xmlns:a14="http://schemas.microsoft.com/office/drawing/2010/main" w="9525">
+                <a:solidFill>
+                  <a:schemeClr val="tx1"/>
+                </a:solidFill>
+                <a:miter lim="800000"/>
+                <a:headEnd/>
+                <a:tailEnd/>
+              </a14:hiddenLine>
+            </a:ext>
+          </a:extLst>
+        </p:spPr>
+      </p:pic>
+    </p:spTree>
+    <p:extLst>
+      <p:ext uri="{BB962C8B-B14F-4D97-AF65-F5344CB8AC3E}">
+        <p14:creationId xmlns:p14="http://schemas.microsoft.com/office/powerpoint/2010/main" val="2057531208"/>
+      </p:ext>
+    </p:extLst>
+  </p:cSld>
+  <p:clrMapOvr>
+    <a:masterClrMapping/>
+  </p:clrMapOvr>
+  <p:transition spd="slow">
+    <p:push dir="u"/>
+  </p:transition>
+  <p:timing>
+    <p:tnLst>
+      <p:par>
+        <p:cTn id="1" dur="indefinite" restart="never" nodeType="tmRoot"/>
+      </p:par>
+    </p:tnLst>
+  </p:timing>
+</p:sld>
+</file>
+
+<file path=ppt/slides/slide34.xml><?xml version="1.0" encoding="utf-8"?>
+<p:sld xmlns:a="http://schemas.openxmlformats.org/drawingml/2006/main" xmlns:r="http://schemas.openxmlformats.org/officeDocument/2006/relationships" xmlns:p="http://schemas.openxmlformats.org/presentationml/2006/main">
+  <p:cSld>
+    <p:spTree>
+      <p:nvGrpSpPr>
+        <p:cNvPr id="1" name=""/>
+        <p:cNvGrpSpPr/>
+        <p:nvPr/>
+      </p:nvGrpSpPr>
+      <p:grpSpPr>
+        <a:xfrm>
+          <a:off x="0" y="0"/>
+          <a:ext cx="0" cy="0"/>
+          <a:chOff x="0" y="0"/>
+          <a:chExt cx="0" cy="0"/>
+        </a:xfrm>
+      </p:grpSpPr>
+      <p:sp>
+        <p:nvSpPr>
           <p:cNvPr id="3" name="Symbol zastępczy zawartości 2"/>
           <p:cNvSpPr>
             <a:spLocks noGrp="1"/>

</xml_diff>

<commit_message>
presentation - added parameter types
</commit_message>
<xml_diff>
--- a/Files/Szkolenie warsztatowe Dapper.pptx
+++ b/Files/Szkolenie warsztatowe Dapper.pptx
@@ -38,7 +38,12 @@
     <p:sldId id="287" r:id="rId32"/>
     <p:sldId id="288" r:id="rId33"/>
     <p:sldId id="289" r:id="rId34"/>
-    <p:sldId id="257" r:id="rId35"/>
+    <p:sldId id="291" r:id="rId35"/>
+    <p:sldId id="292" r:id="rId36"/>
+    <p:sldId id="293" r:id="rId37"/>
+    <p:sldId id="294" r:id="rId38"/>
+    <p:sldId id="290" r:id="rId39"/>
+    <p:sldId id="257" r:id="rId40"/>
   </p:sldIdLst>
   <p:sldSz cx="9144000" cy="6858000" type="screen4x3"/>
   <p:notesSz cx="6858000" cy="9144000"/>
@@ -139,7 +144,7 @@
   </p:defaultTextStyle>
   <p:extLst>
     <p:ext uri="{EFAFB233-063F-42B5-8137-9DF3F51BA10A}">
-      <p15:sldGuideLst xmlns="" xmlns:p15="http://schemas.microsoft.com/office/powerpoint/2012/main">
+      <p15:sldGuideLst xmlns:p15="http://schemas.microsoft.com/office/powerpoint/2012/main" xmlns="">
         <p15:guide id="1" orient="horz" pos="2160">
           <p15:clr>
             <a:srgbClr val="A4A3A4"/>
@@ -773,7 +778,7 @@
           <a:p>
             <a:fld id="{16640E76-C82D-4E8C-B2F3-167F39B211B3}" type="datetimeFigureOut">
               <a:rPr lang="pl-PL" smtClean="0"/>
-              <a:t>11.11.2017</a:t>
+              <a:t>12.11.2017</a:t>
             </a:fld>
             <a:endParaRPr lang="pl-PL"/>
           </a:p>
@@ -966,7 +971,7 @@
           <a:p>
             <a:fld id="{16640E76-C82D-4E8C-B2F3-167F39B211B3}" type="datetimeFigureOut">
               <a:rPr lang="pl-PL" smtClean="0"/>
-              <a:t>11.11.2017</a:t>
+              <a:t>12.11.2017</a:t>
             </a:fld>
             <a:endParaRPr lang="pl-PL"/>
           </a:p>
@@ -1144,7 +1149,7 @@
           <a:p>
             <a:fld id="{16640E76-C82D-4E8C-B2F3-167F39B211B3}" type="datetimeFigureOut">
               <a:rPr lang="pl-PL" smtClean="0"/>
-              <a:t>11.11.2017</a:t>
+              <a:t>12.11.2017</a:t>
             </a:fld>
             <a:endParaRPr lang="pl-PL"/>
           </a:p>
@@ -1289,7 +1294,7 @@
           <a:p>
             <a:fld id="{16640E76-C82D-4E8C-B2F3-167F39B211B3}" type="datetimeFigureOut">
               <a:rPr lang="pl-PL" smtClean="0"/>
-              <a:t>11.11.2017</a:t>
+              <a:t>12.11.2017</a:t>
             </a:fld>
             <a:endParaRPr lang="pl-PL"/>
           </a:p>
@@ -1539,7 +1544,7 @@
           <a:p>
             <a:fld id="{16640E76-C82D-4E8C-B2F3-167F39B211B3}" type="datetimeFigureOut">
               <a:rPr lang="pl-PL" smtClean="0"/>
-              <a:t>11.11.2017</a:t>
+              <a:t>12.11.2017</a:t>
             </a:fld>
             <a:endParaRPr lang="pl-PL"/>
           </a:p>
@@ -1941,7 +1946,7 @@
           <a:p>
             <a:fld id="{16640E76-C82D-4E8C-B2F3-167F39B211B3}" type="datetimeFigureOut">
               <a:rPr lang="pl-PL" smtClean="0"/>
-              <a:t>11.11.2017</a:t>
+              <a:t>12.11.2017</a:t>
             </a:fld>
             <a:endParaRPr lang="pl-PL"/>
           </a:p>
@@ -2382,7 +2387,7 @@
           <a:p>
             <a:fld id="{16640E76-C82D-4E8C-B2F3-167F39B211B3}" type="datetimeFigureOut">
               <a:rPr lang="pl-PL" smtClean="0"/>
-              <a:t>11.11.2017</a:t>
+              <a:t>12.11.2017</a:t>
             </a:fld>
             <a:endParaRPr lang="pl-PL"/>
           </a:p>
@@ -2480,7 +2485,7 @@
           <a:p>
             <a:fld id="{16640E76-C82D-4E8C-B2F3-167F39B211B3}" type="datetimeFigureOut">
               <a:rPr lang="pl-PL" smtClean="0"/>
-              <a:t>11.11.2017</a:t>
+              <a:t>12.11.2017</a:t>
             </a:fld>
             <a:endParaRPr lang="pl-PL"/>
           </a:p>
@@ -2596,7 +2601,7 @@
           <a:p>
             <a:fld id="{16640E76-C82D-4E8C-B2F3-167F39B211B3}" type="datetimeFigureOut">
               <a:rPr lang="pl-PL" smtClean="0"/>
-              <a:t>11.11.2017</a:t>
+              <a:t>12.11.2017</a:t>
             </a:fld>
             <a:endParaRPr lang="pl-PL"/>
           </a:p>
@@ -2867,7 +2872,7 @@
           <a:p>
             <a:fld id="{16640E76-C82D-4E8C-B2F3-167F39B211B3}" type="datetimeFigureOut">
               <a:rPr lang="pl-PL" smtClean="0"/>
-              <a:t>11.11.2017</a:t>
+              <a:t>12.11.2017</a:t>
             </a:fld>
             <a:endParaRPr lang="pl-PL"/>
           </a:p>
@@ -3071,7 +3076,7 @@
           <a:p>
             <a:fld id="{16640E76-C82D-4E8C-B2F3-167F39B211B3}" type="datetimeFigureOut">
               <a:rPr lang="pl-PL" smtClean="0"/>
-              <a:t>11.11.2017</a:t>
+              <a:t>12.11.2017</a:t>
             </a:fld>
             <a:endParaRPr lang="pl-PL"/>
           </a:p>
@@ -4163,7 +4168,7 @@
           <a:p>
             <a:fld id="{16640E76-C82D-4E8C-B2F3-167F39B211B3}" type="datetimeFigureOut">
               <a:rPr lang="pl-PL" smtClean="0"/>
-              <a:t>11.11.2017</a:t>
+              <a:t>12.11.2017</a:t>
             </a:fld>
             <a:endParaRPr lang="pl-PL"/>
           </a:p>
@@ -14894,29 +14899,8 @@
           <a:p>
             <a:r>
               <a:rPr lang="pl-PL" dirty="0" smtClean="0"/>
-              <a:t>Może mapować na </a:t>
-            </a:r>
-            <a:r>
-              <a:rPr lang="pl-PL" dirty="0" smtClean="0"/>
-              <a:t>obiekty </a:t>
-            </a:r>
-            <a:r>
-              <a:rPr lang="pl-PL" dirty="0" smtClean="0"/>
-              <a:t>silnie </a:t>
-            </a:r>
-            <a:r>
-              <a:rPr lang="pl-PL" dirty="0" smtClean="0"/>
-              <a:t>typowane </a:t>
-            </a:r>
-            <a:r>
-              <a:rPr lang="pl-PL" dirty="0" smtClean="0"/>
-              <a:t>lub </a:t>
-            </a:r>
-            <a:r>
-              <a:rPr lang="pl-PL" dirty="0" smtClean="0"/>
-              <a:t>\ i anonimowe</a:t>
-            </a:r>
-            <a:endParaRPr lang="pl-PL" dirty="0" smtClean="0"/>
+              <a:t>Może mapować na obiekty silnie typowane lub \ i anonimowe</a:t>
+            </a:r>
           </a:p>
           <a:p>
             <a:r>
@@ -20353,6 +20337,2217 @@
   <p:timing>
     <p:tnLst>
       <p:par>
+        <p:cTn id="1" dur="indefinite" restart="never" nodeType="tmRoot">
+          <p:childTnLst>
+            <p:seq concurrent="1" nextAc="seek">
+              <p:cTn id="2" dur="indefinite" nodeType="mainSeq">
+                <p:childTnLst>
+                  <p:par>
+                    <p:cTn id="3" fill="hold">
+                      <p:stCondLst>
+                        <p:cond delay="indefinite"/>
+                      </p:stCondLst>
+                      <p:childTnLst>
+                        <p:par>
+                          <p:cTn id="4" fill="hold">
+                            <p:stCondLst>
+                              <p:cond delay="0"/>
+                            </p:stCondLst>
+                            <p:childTnLst>
+                              <p:par>
+                                <p:cTn id="5" presetID="2" presetClass="entr" presetSubtype="4" fill="hold" grpId="0" nodeType="clickEffect">
+                                  <p:stCondLst>
+                                    <p:cond delay="0"/>
+                                  </p:stCondLst>
+                                  <p:childTnLst>
+                                    <p:set>
+                                      <p:cBhvr>
+                                        <p:cTn id="6" dur="1" fill="hold">
+                                          <p:stCondLst>
+                                            <p:cond delay="0"/>
+                                          </p:stCondLst>
+                                        </p:cTn>
+                                        <p:tgtEl>
+                                          <p:spTgt spid="2">
+                                            <p:txEl>
+                                              <p:pRg st="0" end="0"/>
+                                            </p:txEl>
+                                          </p:spTgt>
+                                        </p:tgtEl>
+                                        <p:attrNameLst>
+                                          <p:attrName>style.visibility</p:attrName>
+                                        </p:attrNameLst>
+                                      </p:cBhvr>
+                                      <p:to>
+                                        <p:strVal val="visible"/>
+                                      </p:to>
+                                    </p:set>
+                                    <p:anim calcmode="lin" valueType="num">
+                                      <p:cBhvr additive="base">
+                                        <p:cTn id="7" dur="500" fill="hold"/>
+                                        <p:tgtEl>
+                                          <p:spTgt spid="2">
+                                            <p:txEl>
+                                              <p:pRg st="0" end="0"/>
+                                            </p:txEl>
+                                          </p:spTgt>
+                                        </p:tgtEl>
+                                        <p:attrNameLst>
+                                          <p:attrName>ppt_x</p:attrName>
+                                        </p:attrNameLst>
+                                      </p:cBhvr>
+                                      <p:tavLst>
+                                        <p:tav tm="0">
+                                          <p:val>
+                                            <p:strVal val="#ppt_x"/>
+                                          </p:val>
+                                        </p:tav>
+                                        <p:tav tm="100000">
+                                          <p:val>
+                                            <p:strVal val="#ppt_x"/>
+                                          </p:val>
+                                        </p:tav>
+                                      </p:tavLst>
+                                    </p:anim>
+                                    <p:anim calcmode="lin" valueType="num">
+                                      <p:cBhvr additive="base">
+                                        <p:cTn id="8" dur="500" fill="hold"/>
+                                        <p:tgtEl>
+                                          <p:spTgt spid="2">
+                                            <p:txEl>
+                                              <p:pRg st="0" end="0"/>
+                                            </p:txEl>
+                                          </p:spTgt>
+                                        </p:tgtEl>
+                                        <p:attrNameLst>
+                                          <p:attrName>ppt_y</p:attrName>
+                                        </p:attrNameLst>
+                                      </p:cBhvr>
+                                      <p:tavLst>
+                                        <p:tav tm="0">
+                                          <p:val>
+                                            <p:strVal val="1+#ppt_h/2"/>
+                                          </p:val>
+                                        </p:tav>
+                                        <p:tav tm="100000">
+                                          <p:val>
+                                            <p:strVal val="#ppt_y"/>
+                                          </p:val>
+                                        </p:tav>
+                                      </p:tavLst>
+                                    </p:anim>
+                                  </p:childTnLst>
+                                </p:cTn>
+                              </p:par>
+                            </p:childTnLst>
+                          </p:cTn>
+                        </p:par>
+                      </p:childTnLst>
+                    </p:cTn>
+                  </p:par>
+                  <p:par>
+                    <p:cTn id="9" fill="hold">
+                      <p:stCondLst>
+                        <p:cond delay="indefinite"/>
+                      </p:stCondLst>
+                      <p:childTnLst>
+                        <p:par>
+                          <p:cTn id="10" fill="hold">
+                            <p:stCondLst>
+                              <p:cond delay="0"/>
+                            </p:stCondLst>
+                            <p:childTnLst>
+                              <p:par>
+                                <p:cTn id="11" presetID="2" presetClass="entr" presetSubtype="4" fill="hold" nodeType="clickEffect">
+                                  <p:stCondLst>
+                                    <p:cond delay="0"/>
+                                  </p:stCondLst>
+                                  <p:childTnLst>
+                                    <p:set>
+                                      <p:cBhvr>
+                                        <p:cTn id="12" dur="1" fill="hold">
+                                          <p:stCondLst>
+                                            <p:cond delay="0"/>
+                                          </p:stCondLst>
+                                        </p:cTn>
+                                        <p:tgtEl>
+                                          <p:spTgt spid="5122"/>
+                                        </p:tgtEl>
+                                        <p:attrNameLst>
+                                          <p:attrName>style.visibility</p:attrName>
+                                        </p:attrNameLst>
+                                      </p:cBhvr>
+                                      <p:to>
+                                        <p:strVal val="visible"/>
+                                      </p:to>
+                                    </p:set>
+                                    <p:anim calcmode="lin" valueType="num">
+                                      <p:cBhvr additive="base">
+                                        <p:cTn id="13" dur="500" fill="hold"/>
+                                        <p:tgtEl>
+                                          <p:spTgt spid="5122"/>
+                                        </p:tgtEl>
+                                        <p:attrNameLst>
+                                          <p:attrName>ppt_x</p:attrName>
+                                        </p:attrNameLst>
+                                      </p:cBhvr>
+                                      <p:tavLst>
+                                        <p:tav tm="0">
+                                          <p:val>
+                                            <p:strVal val="#ppt_x"/>
+                                          </p:val>
+                                        </p:tav>
+                                        <p:tav tm="100000">
+                                          <p:val>
+                                            <p:strVal val="#ppt_x"/>
+                                          </p:val>
+                                        </p:tav>
+                                      </p:tavLst>
+                                    </p:anim>
+                                    <p:anim calcmode="lin" valueType="num">
+                                      <p:cBhvr additive="base">
+                                        <p:cTn id="14" dur="500" fill="hold"/>
+                                        <p:tgtEl>
+                                          <p:spTgt spid="5122"/>
+                                        </p:tgtEl>
+                                        <p:attrNameLst>
+                                          <p:attrName>ppt_y</p:attrName>
+                                        </p:attrNameLst>
+                                      </p:cBhvr>
+                                      <p:tavLst>
+                                        <p:tav tm="0">
+                                          <p:val>
+                                            <p:strVal val="1+#ppt_h/2"/>
+                                          </p:val>
+                                        </p:tav>
+                                        <p:tav tm="100000">
+                                          <p:val>
+                                            <p:strVal val="#ppt_y"/>
+                                          </p:val>
+                                        </p:tav>
+                                      </p:tavLst>
+                                    </p:anim>
+                                  </p:childTnLst>
+                                </p:cTn>
+                              </p:par>
+                            </p:childTnLst>
+                          </p:cTn>
+                        </p:par>
+                      </p:childTnLst>
+                    </p:cTn>
+                  </p:par>
+                </p:childTnLst>
+              </p:cTn>
+              <p:prevCondLst>
+                <p:cond evt="onPrev" delay="0">
+                  <p:tgtEl>
+                    <p:sldTgt/>
+                  </p:tgtEl>
+                </p:cond>
+              </p:prevCondLst>
+              <p:nextCondLst>
+                <p:cond evt="onNext" delay="0">
+                  <p:tgtEl>
+                    <p:sldTgt/>
+                  </p:tgtEl>
+                </p:cond>
+              </p:nextCondLst>
+            </p:seq>
+          </p:childTnLst>
+        </p:cTn>
+      </p:par>
+    </p:tnLst>
+    <p:bldLst>
+      <p:bldP spid="2" grpId="0" build="p"/>
+    </p:bldLst>
+  </p:timing>
+</p:sld>
+</file>
+
+<file path=ppt/slides/slide34.xml><?xml version="1.0" encoding="utf-8"?>
+<p:sld xmlns:a="http://schemas.openxmlformats.org/drawingml/2006/main" xmlns:r="http://schemas.openxmlformats.org/officeDocument/2006/relationships" xmlns:p="http://schemas.openxmlformats.org/presentationml/2006/main">
+  <p:cSld>
+    <p:spTree>
+      <p:nvGrpSpPr>
+        <p:cNvPr id="1" name=""/>
+        <p:cNvGrpSpPr/>
+        <p:nvPr/>
+      </p:nvGrpSpPr>
+      <p:grpSpPr>
+        <a:xfrm>
+          <a:off x="0" y="0"/>
+          <a:ext cx="0" cy="0"/>
+          <a:chOff x="0" y="0"/>
+          <a:chExt cx="0" cy="0"/>
+        </a:xfrm>
+      </p:grpSpPr>
+      <p:sp>
+        <p:nvSpPr>
+          <p:cNvPr id="2" name="Symbol zastępczy zawartości 1"/>
+          <p:cNvSpPr>
+            <a:spLocks noGrp="1"/>
+          </p:cNvSpPr>
+          <p:nvPr>
+            <p:ph idx="1"/>
+          </p:nvPr>
+        </p:nvSpPr>
+        <p:spPr/>
+        <p:txBody>
+          <a:bodyPr/>
+          <a:lstStyle/>
+          <a:p>
+            <a:r>
+              <a:rPr lang="pl-PL" dirty="0" smtClean="0"/>
+              <a:t>Parametr w postaci obiektu klasy</a:t>
+            </a:r>
+          </a:p>
+          <a:p>
+            <a:r>
+              <a:rPr lang="pl-PL" dirty="0" smtClean="0"/>
+              <a:t>Musi mieć identyczną liczbę parametrów co wymagane przez procedurę inaczej zapytanie zgłosi </a:t>
+            </a:r>
+            <a:r>
+              <a:rPr lang="pl-PL" dirty="0" err="1" smtClean="0"/>
+              <a:t>exception</a:t>
+            </a:r>
+            <a:endParaRPr lang="pl-PL" dirty="0" smtClean="0"/>
+          </a:p>
+          <a:p>
+            <a:r>
+              <a:rPr lang="pl-PL" dirty="0" smtClean="0"/>
+              <a:t>Można tworzyć specjalne mikro klasy Data Transfer Object na bazie interfejsów tworzonych pod procedury</a:t>
+            </a:r>
+          </a:p>
+          <a:p>
+            <a:r>
+              <a:rPr lang="pl-PL" dirty="0" smtClean="0"/>
+              <a:t>Używane identycznie jak parametry anonimowe</a:t>
+            </a:r>
+            <a:endParaRPr lang="pl-PL" dirty="0"/>
+          </a:p>
+        </p:txBody>
+      </p:sp>
+      <p:sp>
+        <p:nvSpPr>
+          <p:cNvPr id="3" name="Tytuł 2"/>
+          <p:cNvSpPr>
+            <a:spLocks noGrp="1"/>
+          </p:cNvSpPr>
+          <p:nvPr>
+            <p:ph type="title"/>
+          </p:nvPr>
+        </p:nvSpPr>
+        <p:spPr/>
+        <p:txBody>
+          <a:bodyPr/>
+          <a:lstStyle/>
+          <a:p>
+            <a:r>
+              <a:rPr lang="pl-PL" dirty="0" smtClean="0"/>
+              <a:t>Parametry obiektowe</a:t>
+            </a:r>
+            <a:endParaRPr lang="pl-PL" dirty="0"/>
+          </a:p>
+        </p:txBody>
+      </p:sp>
+    </p:spTree>
+    <p:extLst>
+      <p:ext uri="{BB962C8B-B14F-4D97-AF65-F5344CB8AC3E}">
+        <p14:creationId xmlns:p14="http://schemas.microsoft.com/office/powerpoint/2010/main" val="1523495829"/>
+      </p:ext>
+    </p:extLst>
+  </p:cSld>
+  <p:clrMapOvr>
+    <a:masterClrMapping/>
+  </p:clrMapOvr>
+  <p:transition spd="slow">
+    <p:push dir="u"/>
+  </p:transition>
+  <p:timing>
+    <p:tnLst>
+      <p:par>
+        <p:cTn id="1" dur="indefinite" restart="never" nodeType="tmRoot">
+          <p:childTnLst>
+            <p:seq concurrent="1" nextAc="seek">
+              <p:cTn id="2" dur="indefinite" nodeType="mainSeq">
+                <p:childTnLst>
+                  <p:par>
+                    <p:cTn id="3" fill="hold">
+                      <p:stCondLst>
+                        <p:cond delay="indefinite"/>
+                      </p:stCondLst>
+                      <p:childTnLst>
+                        <p:par>
+                          <p:cTn id="4" fill="hold">
+                            <p:stCondLst>
+                              <p:cond delay="0"/>
+                            </p:stCondLst>
+                            <p:childTnLst>
+                              <p:par>
+                                <p:cTn id="5" presetID="2" presetClass="entr" presetSubtype="4" fill="hold" nodeType="clickEffect">
+                                  <p:stCondLst>
+                                    <p:cond delay="0"/>
+                                  </p:stCondLst>
+                                  <p:childTnLst>
+                                    <p:set>
+                                      <p:cBhvr>
+                                        <p:cTn id="6" dur="1" fill="hold">
+                                          <p:stCondLst>
+                                            <p:cond delay="0"/>
+                                          </p:stCondLst>
+                                        </p:cTn>
+                                        <p:tgtEl>
+                                          <p:spTgt spid="2">
+                                            <p:txEl>
+                                              <p:pRg st="0" end="0"/>
+                                            </p:txEl>
+                                          </p:spTgt>
+                                        </p:tgtEl>
+                                        <p:attrNameLst>
+                                          <p:attrName>style.visibility</p:attrName>
+                                        </p:attrNameLst>
+                                      </p:cBhvr>
+                                      <p:to>
+                                        <p:strVal val="visible"/>
+                                      </p:to>
+                                    </p:set>
+                                    <p:anim calcmode="lin" valueType="num">
+                                      <p:cBhvr additive="base">
+                                        <p:cTn id="7" dur="500" fill="hold"/>
+                                        <p:tgtEl>
+                                          <p:spTgt spid="2">
+                                            <p:txEl>
+                                              <p:pRg st="0" end="0"/>
+                                            </p:txEl>
+                                          </p:spTgt>
+                                        </p:tgtEl>
+                                        <p:attrNameLst>
+                                          <p:attrName>ppt_x</p:attrName>
+                                        </p:attrNameLst>
+                                      </p:cBhvr>
+                                      <p:tavLst>
+                                        <p:tav tm="0">
+                                          <p:val>
+                                            <p:strVal val="#ppt_x"/>
+                                          </p:val>
+                                        </p:tav>
+                                        <p:tav tm="100000">
+                                          <p:val>
+                                            <p:strVal val="#ppt_x"/>
+                                          </p:val>
+                                        </p:tav>
+                                      </p:tavLst>
+                                    </p:anim>
+                                    <p:anim calcmode="lin" valueType="num">
+                                      <p:cBhvr additive="base">
+                                        <p:cTn id="8" dur="500" fill="hold"/>
+                                        <p:tgtEl>
+                                          <p:spTgt spid="2">
+                                            <p:txEl>
+                                              <p:pRg st="0" end="0"/>
+                                            </p:txEl>
+                                          </p:spTgt>
+                                        </p:tgtEl>
+                                        <p:attrNameLst>
+                                          <p:attrName>ppt_y</p:attrName>
+                                        </p:attrNameLst>
+                                      </p:cBhvr>
+                                      <p:tavLst>
+                                        <p:tav tm="0">
+                                          <p:val>
+                                            <p:strVal val="1+#ppt_h/2"/>
+                                          </p:val>
+                                        </p:tav>
+                                        <p:tav tm="100000">
+                                          <p:val>
+                                            <p:strVal val="#ppt_y"/>
+                                          </p:val>
+                                        </p:tav>
+                                      </p:tavLst>
+                                    </p:anim>
+                                  </p:childTnLst>
+                                </p:cTn>
+                              </p:par>
+                            </p:childTnLst>
+                          </p:cTn>
+                        </p:par>
+                      </p:childTnLst>
+                    </p:cTn>
+                  </p:par>
+                  <p:par>
+                    <p:cTn id="9" fill="hold">
+                      <p:stCondLst>
+                        <p:cond delay="indefinite"/>
+                      </p:stCondLst>
+                      <p:childTnLst>
+                        <p:par>
+                          <p:cTn id="10" fill="hold">
+                            <p:stCondLst>
+                              <p:cond delay="0"/>
+                            </p:stCondLst>
+                            <p:childTnLst>
+                              <p:par>
+                                <p:cTn id="11" presetID="2" presetClass="entr" presetSubtype="4" fill="hold" nodeType="clickEffect">
+                                  <p:stCondLst>
+                                    <p:cond delay="0"/>
+                                  </p:stCondLst>
+                                  <p:childTnLst>
+                                    <p:set>
+                                      <p:cBhvr>
+                                        <p:cTn id="12" dur="1" fill="hold">
+                                          <p:stCondLst>
+                                            <p:cond delay="0"/>
+                                          </p:stCondLst>
+                                        </p:cTn>
+                                        <p:tgtEl>
+                                          <p:spTgt spid="2">
+                                            <p:txEl>
+                                              <p:pRg st="1" end="1"/>
+                                            </p:txEl>
+                                          </p:spTgt>
+                                        </p:tgtEl>
+                                        <p:attrNameLst>
+                                          <p:attrName>style.visibility</p:attrName>
+                                        </p:attrNameLst>
+                                      </p:cBhvr>
+                                      <p:to>
+                                        <p:strVal val="visible"/>
+                                      </p:to>
+                                    </p:set>
+                                    <p:anim calcmode="lin" valueType="num">
+                                      <p:cBhvr additive="base">
+                                        <p:cTn id="13" dur="500" fill="hold"/>
+                                        <p:tgtEl>
+                                          <p:spTgt spid="2">
+                                            <p:txEl>
+                                              <p:pRg st="1" end="1"/>
+                                            </p:txEl>
+                                          </p:spTgt>
+                                        </p:tgtEl>
+                                        <p:attrNameLst>
+                                          <p:attrName>ppt_x</p:attrName>
+                                        </p:attrNameLst>
+                                      </p:cBhvr>
+                                      <p:tavLst>
+                                        <p:tav tm="0">
+                                          <p:val>
+                                            <p:strVal val="#ppt_x"/>
+                                          </p:val>
+                                        </p:tav>
+                                        <p:tav tm="100000">
+                                          <p:val>
+                                            <p:strVal val="#ppt_x"/>
+                                          </p:val>
+                                        </p:tav>
+                                      </p:tavLst>
+                                    </p:anim>
+                                    <p:anim calcmode="lin" valueType="num">
+                                      <p:cBhvr additive="base">
+                                        <p:cTn id="14" dur="500" fill="hold"/>
+                                        <p:tgtEl>
+                                          <p:spTgt spid="2">
+                                            <p:txEl>
+                                              <p:pRg st="1" end="1"/>
+                                            </p:txEl>
+                                          </p:spTgt>
+                                        </p:tgtEl>
+                                        <p:attrNameLst>
+                                          <p:attrName>ppt_y</p:attrName>
+                                        </p:attrNameLst>
+                                      </p:cBhvr>
+                                      <p:tavLst>
+                                        <p:tav tm="0">
+                                          <p:val>
+                                            <p:strVal val="1+#ppt_h/2"/>
+                                          </p:val>
+                                        </p:tav>
+                                        <p:tav tm="100000">
+                                          <p:val>
+                                            <p:strVal val="#ppt_y"/>
+                                          </p:val>
+                                        </p:tav>
+                                      </p:tavLst>
+                                    </p:anim>
+                                  </p:childTnLst>
+                                </p:cTn>
+                              </p:par>
+                            </p:childTnLst>
+                          </p:cTn>
+                        </p:par>
+                      </p:childTnLst>
+                    </p:cTn>
+                  </p:par>
+                  <p:par>
+                    <p:cTn id="15" fill="hold">
+                      <p:stCondLst>
+                        <p:cond delay="indefinite"/>
+                      </p:stCondLst>
+                      <p:childTnLst>
+                        <p:par>
+                          <p:cTn id="16" fill="hold">
+                            <p:stCondLst>
+                              <p:cond delay="0"/>
+                            </p:stCondLst>
+                            <p:childTnLst>
+                              <p:par>
+                                <p:cTn id="17" presetID="2" presetClass="entr" presetSubtype="4" fill="hold" nodeType="clickEffect">
+                                  <p:stCondLst>
+                                    <p:cond delay="0"/>
+                                  </p:stCondLst>
+                                  <p:childTnLst>
+                                    <p:set>
+                                      <p:cBhvr>
+                                        <p:cTn id="18" dur="1" fill="hold">
+                                          <p:stCondLst>
+                                            <p:cond delay="0"/>
+                                          </p:stCondLst>
+                                        </p:cTn>
+                                        <p:tgtEl>
+                                          <p:spTgt spid="2">
+                                            <p:txEl>
+                                              <p:pRg st="2" end="2"/>
+                                            </p:txEl>
+                                          </p:spTgt>
+                                        </p:tgtEl>
+                                        <p:attrNameLst>
+                                          <p:attrName>style.visibility</p:attrName>
+                                        </p:attrNameLst>
+                                      </p:cBhvr>
+                                      <p:to>
+                                        <p:strVal val="visible"/>
+                                      </p:to>
+                                    </p:set>
+                                    <p:anim calcmode="lin" valueType="num">
+                                      <p:cBhvr additive="base">
+                                        <p:cTn id="19" dur="500" fill="hold"/>
+                                        <p:tgtEl>
+                                          <p:spTgt spid="2">
+                                            <p:txEl>
+                                              <p:pRg st="2" end="2"/>
+                                            </p:txEl>
+                                          </p:spTgt>
+                                        </p:tgtEl>
+                                        <p:attrNameLst>
+                                          <p:attrName>ppt_x</p:attrName>
+                                        </p:attrNameLst>
+                                      </p:cBhvr>
+                                      <p:tavLst>
+                                        <p:tav tm="0">
+                                          <p:val>
+                                            <p:strVal val="#ppt_x"/>
+                                          </p:val>
+                                        </p:tav>
+                                        <p:tav tm="100000">
+                                          <p:val>
+                                            <p:strVal val="#ppt_x"/>
+                                          </p:val>
+                                        </p:tav>
+                                      </p:tavLst>
+                                    </p:anim>
+                                    <p:anim calcmode="lin" valueType="num">
+                                      <p:cBhvr additive="base">
+                                        <p:cTn id="20" dur="500" fill="hold"/>
+                                        <p:tgtEl>
+                                          <p:spTgt spid="2">
+                                            <p:txEl>
+                                              <p:pRg st="2" end="2"/>
+                                            </p:txEl>
+                                          </p:spTgt>
+                                        </p:tgtEl>
+                                        <p:attrNameLst>
+                                          <p:attrName>ppt_y</p:attrName>
+                                        </p:attrNameLst>
+                                      </p:cBhvr>
+                                      <p:tavLst>
+                                        <p:tav tm="0">
+                                          <p:val>
+                                            <p:strVal val="1+#ppt_h/2"/>
+                                          </p:val>
+                                        </p:tav>
+                                        <p:tav tm="100000">
+                                          <p:val>
+                                            <p:strVal val="#ppt_y"/>
+                                          </p:val>
+                                        </p:tav>
+                                      </p:tavLst>
+                                    </p:anim>
+                                  </p:childTnLst>
+                                </p:cTn>
+                              </p:par>
+                            </p:childTnLst>
+                          </p:cTn>
+                        </p:par>
+                      </p:childTnLst>
+                    </p:cTn>
+                  </p:par>
+                  <p:par>
+                    <p:cTn id="21" fill="hold">
+                      <p:stCondLst>
+                        <p:cond delay="indefinite"/>
+                      </p:stCondLst>
+                      <p:childTnLst>
+                        <p:par>
+                          <p:cTn id="22" fill="hold">
+                            <p:stCondLst>
+                              <p:cond delay="0"/>
+                            </p:stCondLst>
+                            <p:childTnLst>
+                              <p:par>
+                                <p:cTn id="23" presetID="2" presetClass="entr" presetSubtype="4" fill="hold" nodeType="clickEffect">
+                                  <p:stCondLst>
+                                    <p:cond delay="0"/>
+                                  </p:stCondLst>
+                                  <p:childTnLst>
+                                    <p:set>
+                                      <p:cBhvr>
+                                        <p:cTn id="24" dur="1" fill="hold">
+                                          <p:stCondLst>
+                                            <p:cond delay="0"/>
+                                          </p:stCondLst>
+                                        </p:cTn>
+                                        <p:tgtEl>
+                                          <p:spTgt spid="2">
+                                            <p:txEl>
+                                              <p:pRg st="3" end="3"/>
+                                            </p:txEl>
+                                          </p:spTgt>
+                                        </p:tgtEl>
+                                        <p:attrNameLst>
+                                          <p:attrName>style.visibility</p:attrName>
+                                        </p:attrNameLst>
+                                      </p:cBhvr>
+                                      <p:to>
+                                        <p:strVal val="visible"/>
+                                      </p:to>
+                                    </p:set>
+                                    <p:anim calcmode="lin" valueType="num">
+                                      <p:cBhvr additive="base">
+                                        <p:cTn id="25" dur="500" fill="hold"/>
+                                        <p:tgtEl>
+                                          <p:spTgt spid="2">
+                                            <p:txEl>
+                                              <p:pRg st="3" end="3"/>
+                                            </p:txEl>
+                                          </p:spTgt>
+                                        </p:tgtEl>
+                                        <p:attrNameLst>
+                                          <p:attrName>ppt_x</p:attrName>
+                                        </p:attrNameLst>
+                                      </p:cBhvr>
+                                      <p:tavLst>
+                                        <p:tav tm="0">
+                                          <p:val>
+                                            <p:strVal val="#ppt_x"/>
+                                          </p:val>
+                                        </p:tav>
+                                        <p:tav tm="100000">
+                                          <p:val>
+                                            <p:strVal val="#ppt_x"/>
+                                          </p:val>
+                                        </p:tav>
+                                      </p:tavLst>
+                                    </p:anim>
+                                    <p:anim calcmode="lin" valueType="num">
+                                      <p:cBhvr additive="base">
+                                        <p:cTn id="26" dur="500" fill="hold"/>
+                                        <p:tgtEl>
+                                          <p:spTgt spid="2">
+                                            <p:txEl>
+                                              <p:pRg st="3" end="3"/>
+                                            </p:txEl>
+                                          </p:spTgt>
+                                        </p:tgtEl>
+                                        <p:attrNameLst>
+                                          <p:attrName>ppt_y</p:attrName>
+                                        </p:attrNameLst>
+                                      </p:cBhvr>
+                                      <p:tavLst>
+                                        <p:tav tm="0">
+                                          <p:val>
+                                            <p:strVal val="1+#ppt_h/2"/>
+                                          </p:val>
+                                        </p:tav>
+                                        <p:tav tm="100000">
+                                          <p:val>
+                                            <p:strVal val="#ppt_y"/>
+                                          </p:val>
+                                        </p:tav>
+                                      </p:tavLst>
+                                    </p:anim>
+                                  </p:childTnLst>
+                                </p:cTn>
+                              </p:par>
+                            </p:childTnLst>
+                          </p:cTn>
+                        </p:par>
+                      </p:childTnLst>
+                    </p:cTn>
+                  </p:par>
+                </p:childTnLst>
+              </p:cTn>
+              <p:prevCondLst>
+                <p:cond evt="onPrev" delay="0">
+                  <p:tgtEl>
+                    <p:sldTgt/>
+                  </p:tgtEl>
+                </p:cond>
+              </p:prevCondLst>
+              <p:nextCondLst>
+                <p:cond evt="onNext" delay="0">
+                  <p:tgtEl>
+                    <p:sldTgt/>
+                  </p:tgtEl>
+                </p:cond>
+              </p:nextCondLst>
+            </p:seq>
+          </p:childTnLst>
+        </p:cTn>
+      </p:par>
+    </p:tnLst>
+  </p:timing>
+</p:sld>
+</file>
+
+<file path=ppt/slides/slide35.xml><?xml version="1.0" encoding="utf-8"?>
+<p:sld xmlns:a="http://schemas.openxmlformats.org/drawingml/2006/main" xmlns:r="http://schemas.openxmlformats.org/officeDocument/2006/relationships" xmlns:p="http://schemas.openxmlformats.org/presentationml/2006/main">
+  <p:cSld>
+    <p:spTree>
+      <p:nvGrpSpPr>
+        <p:cNvPr id="1" name=""/>
+        <p:cNvGrpSpPr/>
+        <p:nvPr/>
+      </p:nvGrpSpPr>
+      <p:grpSpPr>
+        <a:xfrm>
+          <a:off x="0" y="0"/>
+          <a:ext cx="0" cy="0"/>
+          <a:chOff x="0" y="0"/>
+          <a:chExt cx="0" cy="0"/>
+        </a:xfrm>
+      </p:grpSpPr>
+      <p:sp>
+        <p:nvSpPr>
+          <p:cNvPr id="2" name="Symbol zastępczy zawartości 1"/>
+          <p:cNvSpPr>
+            <a:spLocks noGrp="1"/>
+          </p:cNvSpPr>
+          <p:nvPr>
+            <p:ph idx="1"/>
+          </p:nvPr>
+        </p:nvSpPr>
+        <p:spPr/>
+        <p:txBody>
+          <a:bodyPr/>
+          <a:lstStyle/>
+          <a:p>
+            <a:r>
+              <a:rPr lang="pl-PL" dirty="0" smtClean="0"/>
+              <a:t>Przykład:</a:t>
+            </a:r>
+          </a:p>
+          <a:p>
+            <a:endParaRPr lang="pl-PL" dirty="0"/>
+          </a:p>
+        </p:txBody>
+      </p:sp>
+      <p:sp>
+        <p:nvSpPr>
+          <p:cNvPr id="3" name="Tytuł 2"/>
+          <p:cNvSpPr>
+            <a:spLocks noGrp="1"/>
+          </p:cNvSpPr>
+          <p:nvPr>
+            <p:ph type="title"/>
+          </p:nvPr>
+        </p:nvSpPr>
+        <p:spPr/>
+        <p:txBody>
+          <a:bodyPr/>
+          <a:lstStyle/>
+          <a:p>
+            <a:r>
+              <a:rPr lang="pl-PL" dirty="0" smtClean="0"/>
+              <a:t>Parametry obiektowe</a:t>
+            </a:r>
+            <a:endParaRPr lang="pl-PL" dirty="0"/>
+          </a:p>
+        </p:txBody>
+      </p:sp>
+      <p:pic>
+        <p:nvPicPr>
+          <p:cNvPr id="1027" name="Picture 3"/>
+          <p:cNvPicPr>
+            <a:picLocks noChangeAspect="1" noChangeArrowheads="1"/>
+          </p:cNvPicPr>
+          <p:nvPr/>
+        </p:nvPicPr>
+        <p:blipFill>
+          <a:blip r:embed="rId2">
+            <a:extLst>
+              <a:ext uri="{28A0092B-C50C-407E-A947-70E740481C1C}">
+                <a14:useLocalDpi xmlns:a14="http://schemas.microsoft.com/office/drawing/2010/main" val="0"/>
+              </a:ext>
+            </a:extLst>
+          </a:blip>
+          <a:srcRect/>
+          <a:stretch>
+            <a:fillRect/>
+          </a:stretch>
+        </p:blipFill>
+        <p:spPr bwMode="auto">
+          <a:xfrm>
+            <a:off x="107504" y="2132856"/>
+            <a:ext cx="8899798" cy="1222437"/>
+          </a:xfrm>
+          <a:prstGeom prst="rect">
+            <a:avLst/>
+          </a:prstGeom>
+          <a:noFill/>
+          <a:ln>
+            <a:noFill/>
+          </a:ln>
+          <a:extLst>
+            <a:ext uri="{909E8E84-426E-40DD-AFC4-6F175D3DCCD1}">
+              <a14:hiddenFill xmlns:a14="http://schemas.microsoft.com/office/drawing/2010/main">
+                <a:solidFill>
+                  <a:schemeClr val="accent1"/>
+                </a:solidFill>
+              </a14:hiddenFill>
+            </a:ext>
+            <a:ext uri="{91240B29-F687-4F45-9708-019B960494DF}">
+              <a14:hiddenLine xmlns:a14="http://schemas.microsoft.com/office/drawing/2010/main" w="9525">
+                <a:solidFill>
+                  <a:schemeClr val="tx1"/>
+                </a:solidFill>
+                <a:miter lim="800000"/>
+                <a:headEnd/>
+                <a:tailEnd/>
+              </a14:hiddenLine>
+            </a:ext>
+          </a:extLst>
+        </p:spPr>
+      </p:pic>
+    </p:spTree>
+    <p:extLst>
+      <p:ext uri="{BB962C8B-B14F-4D97-AF65-F5344CB8AC3E}">
+        <p14:creationId xmlns:p14="http://schemas.microsoft.com/office/powerpoint/2010/main" val="1852899799"/>
+      </p:ext>
+    </p:extLst>
+  </p:cSld>
+  <p:clrMapOvr>
+    <a:masterClrMapping/>
+  </p:clrMapOvr>
+  <p:transition spd="slow">
+    <p:push dir="u"/>
+  </p:transition>
+  <p:timing>
+    <p:tnLst>
+      <p:par>
+        <p:cTn id="1" dur="indefinite" restart="never" nodeType="tmRoot">
+          <p:childTnLst>
+            <p:seq concurrent="1" nextAc="seek">
+              <p:cTn id="2" dur="indefinite" nodeType="mainSeq">
+                <p:childTnLst>
+                  <p:par>
+                    <p:cTn id="3" fill="hold">
+                      <p:stCondLst>
+                        <p:cond delay="indefinite"/>
+                      </p:stCondLst>
+                      <p:childTnLst>
+                        <p:par>
+                          <p:cTn id="4" fill="hold">
+                            <p:stCondLst>
+                              <p:cond delay="0"/>
+                            </p:stCondLst>
+                            <p:childTnLst>
+                              <p:par>
+                                <p:cTn id="5" presetID="2" presetClass="entr" presetSubtype="4" fill="hold" grpId="0" nodeType="clickEffect">
+                                  <p:stCondLst>
+                                    <p:cond delay="0"/>
+                                  </p:stCondLst>
+                                  <p:childTnLst>
+                                    <p:set>
+                                      <p:cBhvr>
+                                        <p:cTn id="6" dur="1" fill="hold">
+                                          <p:stCondLst>
+                                            <p:cond delay="0"/>
+                                          </p:stCondLst>
+                                        </p:cTn>
+                                        <p:tgtEl>
+                                          <p:spTgt spid="2">
+                                            <p:txEl>
+                                              <p:pRg st="0" end="0"/>
+                                            </p:txEl>
+                                          </p:spTgt>
+                                        </p:tgtEl>
+                                        <p:attrNameLst>
+                                          <p:attrName>style.visibility</p:attrName>
+                                        </p:attrNameLst>
+                                      </p:cBhvr>
+                                      <p:to>
+                                        <p:strVal val="visible"/>
+                                      </p:to>
+                                    </p:set>
+                                    <p:anim calcmode="lin" valueType="num">
+                                      <p:cBhvr additive="base">
+                                        <p:cTn id="7" dur="500" fill="hold"/>
+                                        <p:tgtEl>
+                                          <p:spTgt spid="2">
+                                            <p:txEl>
+                                              <p:pRg st="0" end="0"/>
+                                            </p:txEl>
+                                          </p:spTgt>
+                                        </p:tgtEl>
+                                        <p:attrNameLst>
+                                          <p:attrName>ppt_x</p:attrName>
+                                        </p:attrNameLst>
+                                      </p:cBhvr>
+                                      <p:tavLst>
+                                        <p:tav tm="0">
+                                          <p:val>
+                                            <p:strVal val="#ppt_x"/>
+                                          </p:val>
+                                        </p:tav>
+                                        <p:tav tm="100000">
+                                          <p:val>
+                                            <p:strVal val="#ppt_x"/>
+                                          </p:val>
+                                        </p:tav>
+                                      </p:tavLst>
+                                    </p:anim>
+                                    <p:anim calcmode="lin" valueType="num">
+                                      <p:cBhvr additive="base">
+                                        <p:cTn id="8" dur="500" fill="hold"/>
+                                        <p:tgtEl>
+                                          <p:spTgt spid="2">
+                                            <p:txEl>
+                                              <p:pRg st="0" end="0"/>
+                                            </p:txEl>
+                                          </p:spTgt>
+                                        </p:tgtEl>
+                                        <p:attrNameLst>
+                                          <p:attrName>ppt_y</p:attrName>
+                                        </p:attrNameLst>
+                                      </p:cBhvr>
+                                      <p:tavLst>
+                                        <p:tav tm="0">
+                                          <p:val>
+                                            <p:strVal val="1+#ppt_h/2"/>
+                                          </p:val>
+                                        </p:tav>
+                                        <p:tav tm="100000">
+                                          <p:val>
+                                            <p:strVal val="#ppt_y"/>
+                                          </p:val>
+                                        </p:tav>
+                                      </p:tavLst>
+                                    </p:anim>
+                                  </p:childTnLst>
+                                </p:cTn>
+                              </p:par>
+                            </p:childTnLst>
+                          </p:cTn>
+                        </p:par>
+                      </p:childTnLst>
+                    </p:cTn>
+                  </p:par>
+                  <p:par>
+                    <p:cTn id="9" fill="hold">
+                      <p:stCondLst>
+                        <p:cond delay="indefinite"/>
+                      </p:stCondLst>
+                      <p:childTnLst>
+                        <p:par>
+                          <p:cTn id="10" fill="hold">
+                            <p:stCondLst>
+                              <p:cond delay="0"/>
+                            </p:stCondLst>
+                            <p:childTnLst>
+                              <p:par>
+                                <p:cTn id="11" presetID="2" presetClass="entr" presetSubtype="4" fill="hold" nodeType="clickEffect">
+                                  <p:stCondLst>
+                                    <p:cond delay="0"/>
+                                  </p:stCondLst>
+                                  <p:childTnLst>
+                                    <p:set>
+                                      <p:cBhvr>
+                                        <p:cTn id="12" dur="1" fill="hold">
+                                          <p:stCondLst>
+                                            <p:cond delay="0"/>
+                                          </p:stCondLst>
+                                        </p:cTn>
+                                        <p:tgtEl>
+                                          <p:spTgt spid="1027"/>
+                                        </p:tgtEl>
+                                        <p:attrNameLst>
+                                          <p:attrName>style.visibility</p:attrName>
+                                        </p:attrNameLst>
+                                      </p:cBhvr>
+                                      <p:to>
+                                        <p:strVal val="visible"/>
+                                      </p:to>
+                                    </p:set>
+                                    <p:anim calcmode="lin" valueType="num">
+                                      <p:cBhvr additive="base">
+                                        <p:cTn id="13" dur="500" fill="hold"/>
+                                        <p:tgtEl>
+                                          <p:spTgt spid="1027"/>
+                                        </p:tgtEl>
+                                        <p:attrNameLst>
+                                          <p:attrName>ppt_x</p:attrName>
+                                        </p:attrNameLst>
+                                      </p:cBhvr>
+                                      <p:tavLst>
+                                        <p:tav tm="0">
+                                          <p:val>
+                                            <p:strVal val="#ppt_x"/>
+                                          </p:val>
+                                        </p:tav>
+                                        <p:tav tm="100000">
+                                          <p:val>
+                                            <p:strVal val="#ppt_x"/>
+                                          </p:val>
+                                        </p:tav>
+                                      </p:tavLst>
+                                    </p:anim>
+                                    <p:anim calcmode="lin" valueType="num">
+                                      <p:cBhvr additive="base">
+                                        <p:cTn id="14" dur="500" fill="hold"/>
+                                        <p:tgtEl>
+                                          <p:spTgt spid="1027"/>
+                                        </p:tgtEl>
+                                        <p:attrNameLst>
+                                          <p:attrName>ppt_y</p:attrName>
+                                        </p:attrNameLst>
+                                      </p:cBhvr>
+                                      <p:tavLst>
+                                        <p:tav tm="0">
+                                          <p:val>
+                                            <p:strVal val="1+#ppt_h/2"/>
+                                          </p:val>
+                                        </p:tav>
+                                        <p:tav tm="100000">
+                                          <p:val>
+                                            <p:strVal val="#ppt_y"/>
+                                          </p:val>
+                                        </p:tav>
+                                      </p:tavLst>
+                                    </p:anim>
+                                  </p:childTnLst>
+                                </p:cTn>
+                              </p:par>
+                            </p:childTnLst>
+                          </p:cTn>
+                        </p:par>
+                      </p:childTnLst>
+                    </p:cTn>
+                  </p:par>
+                </p:childTnLst>
+              </p:cTn>
+              <p:prevCondLst>
+                <p:cond evt="onPrev" delay="0">
+                  <p:tgtEl>
+                    <p:sldTgt/>
+                  </p:tgtEl>
+                </p:cond>
+              </p:prevCondLst>
+              <p:nextCondLst>
+                <p:cond evt="onNext" delay="0">
+                  <p:tgtEl>
+                    <p:sldTgt/>
+                  </p:tgtEl>
+                </p:cond>
+              </p:nextCondLst>
+            </p:seq>
+          </p:childTnLst>
+        </p:cTn>
+      </p:par>
+    </p:tnLst>
+    <p:bldLst>
+      <p:bldP spid="2" grpId="0" build="p"/>
+    </p:bldLst>
+  </p:timing>
+</p:sld>
+</file>
+
+<file path=ppt/slides/slide36.xml><?xml version="1.0" encoding="utf-8"?>
+<p:sld xmlns:a="http://schemas.openxmlformats.org/drawingml/2006/main" xmlns:r="http://schemas.openxmlformats.org/officeDocument/2006/relationships" xmlns:p="http://schemas.openxmlformats.org/presentationml/2006/main">
+  <p:cSld>
+    <p:spTree>
+      <p:nvGrpSpPr>
+        <p:cNvPr id="1" name=""/>
+        <p:cNvGrpSpPr/>
+        <p:nvPr/>
+      </p:nvGrpSpPr>
+      <p:grpSpPr>
+        <a:xfrm>
+          <a:off x="0" y="0"/>
+          <a:ext cx="0" cy="0"/>
+          <a:chOff x="0" y="0"/>
+          <a:chExt cx="0" cy="0"/>
+        </a:xfrm>
+      </p:grpSpPr>
+      <p:sp>
+        <p:nvSpPr>
+          <p:cNvPr id="2" name="Symbol zastępczy zawartości 1"/>
+          <p:cNvSpPr>
+            <a:spLocks noGrp="1"/>
+          </p:cNvSpPr>
+          <p:nvPr>
+            <p:ph idx="1"/>
+          </p:nvPr>
+        </p:nvSpPr>
+        <p:spPr/>
+        <p:txBody>
+          <a:bodyPr/>
+          <a:lstStyle/>
+          <a:p>
+            <a:r>
+              <a:rPr lang="pl-PL" dirty="0" smtClean="0"/>
+              <a:t>Umożliwia przekazanie kilku parametrów na raz</a:t>
+            </a:r>
+          </a:p>
+          <a:p>
+            <a:r>
+              <a:rPr lang="pl-PL" dirty="0" smtClean="0"/>
+              <a:t>Korzysta z klauzuli „In” w zapytaniu SQL</a:t>
+            </a:r>
+          </a:p>
+          <a:p>
+            <a:endParaRPr lang="pl-PL" dirty="0"/>
+          </a:p>
+        </p:txBody>
+      </p:sp>
+      <p:sp>
+        <p:nvSpPr>
+          <p:cNvPr id="3" name="Tytuł 2"/>
+          <p:cNvSpPr>
+            <a:spLocks noGrp="1"/>
+          </p:cNvSpPr>
+          <p:nvPr>
+            <p:ph type="title"/>
+          </p:nvPr>
+        </p:nvSpPr>
+        <p:spPr/>
+        <p:txBody>
+          <a:bodyPr/>
+          <a:lstStyle/>
+          <a:p>
+            <a:r>
+              <a:rPr lang="pl-PL" dirty="0" smtClean="0"/>
+              <a:t>Lista obiektów</a:t>
+            </a:r>
+            <a:endParaRPr lang="pl-PL" dirty="0"/>
+          </a:p>
+        </p:txBody>
+      </p:sp>
+      <p:pic>
+        <p:nvPicPr>
+          <p:cNvPr id="2050" name="Picture 2"/>
+          <p:cNvPicPr>
+            <a:picLocks noChangeAspect="1" noChangeArrowheads="1"/>
+          </p:cNvPicPr>
+          <p:nvPr/>
+        </p:nvPicPr>
+        <p:blipFill>
+          <a:blip r:embed="rId2">
+            <a:extLst>
+              <a:ext uri="{28A0092B-C50C-407E-A947-70E740481C1C}">
+                <a14:useLocalDpi xmlns:a14="http://schemas.microsoft.com/office/drawing/2010/main" val="0"/>
+              </a:ext>
+            </a:extLst>
+          </a:blip>
+          <a:srcRect/>
+          <a:stretch>
+            <a:fillRect/>
+          </a:stretch>
+        </p:blipFill>
+        <p:spPr bwMode="auto">
+          <a:xfrm>
+            <a:off x="179512" y="2924943"/>
+            <a:ext cx="8871880" cy="1147738"/>
+          </a:xfrm>
+          <a:prstGeom prst="rect">
+            <a:avLst/>
+          </a:prstGeom>
+          <a:noFill/>
+          <a:ln>
+            <a:noFill/>
+          </a:ln>
+          <a:extLst>
+            <a:ext uri="{909E8E84-426E-40DD-AFC4-6F175D3DCCD1}">
+              <a14:hiddenFill xmlns:a14="http://schemas.microsoft.com/office/drawing/2010/main">
+                <a:solidFill>
+                  <a:schemeClr val="accent1"/>
+                </a:solidFill>
+              </a14:hiddenFill>
+            </a:ext>
+            <a:ext uri="{91240B29-F687-4F45-9708-019B960494DF}">
+              <a14:hiddenLine xmlns:a14="http://schemas.microsoft.com/office/drawing/2010/main" w="9525">
+                <a:solidFill>
+                  <a:schemeClr val="tx1"/>
+                </a:solidFill>
+                <a:miter lim="800000"/>
+                <a:headEnd/>
+                <a:tailEnd/>
+              </a14:hiddenLine>
+            </a:ext>
+          </a:extLst>
+        </p:spPr>
+      </p:pic>
+    </p:spTree>
+    <p:extLst>
+      <p:ext uri="{BB962C8B-B14F-4D97-AF65-F5344CB8AC3E}">
+        <p14:creationId xmlns:p14="http://schemas.microsoft.com/office/powerpoint/2010/main" val="999823891"/>
+      </p:ext>
+    </p:extLst>
+  </p:cSld>
+  <p:clrMapOvr>
+    <a:masterClrMapping/>
+  </p:clrMapOvr>
+  <p:transition spd="slow">
+    <p:push dir="u"/>
+  </p:transition>
+  <p:timing>
+    <p:tnLst>
+      <p:par>
+        <p:cTn id="1" dur="indefinite" restart="never" nodeType="tmRoot">
+          <p:childTnLst>
+            <p:seq concurrent="1" nextAc="seek">
+              <p:cTn id="2" dur="indefinite" nodeType="mainSeq">
+                <p:childTnLst>
+                  <p:par>
+                    <p:cTn id="3" fill="hold">
+                      <p:stCondLst>
+                        <p:cond delay="indefinite"/>
+                      </p:stCondLst>
+                      <p:childTnLst>
+                        <p:par>
+                          <p:cTn id="4" fill="hold">
+                            <p:stCondLst>
+                              <p:cond delay="0"/>
+                            </p:stCondLst>
+                            <p:childTnLst>
+                              <p:par>
+                                <p:cTn id="5" presetID="2" presetClass="entr" presetSubtype="4" fill="hold" nodeType="clickEffect">
+                                  <p:stCondLst>
+                                    <p:cond delay="0"/>
+                                  </p:stCondLst>
+                                  <p:childTnLst>
+                                    <p:set>
+                                      <p:cBhvr>
+                                        <p:cTn id="6" dur="1" fill="hold">
+                                          <p:stCondLst>
+                                            <p:cond delay="0"/>
+                                          </p:stCondLst>
+                                        </p:cTn>
+                                        <p:tgtEl>
+                                          <p:spTgt spid="2050"/>
+                                        </p:tgtEl>
+                                        <p:attrNameLst>
+                                          <p:attrName>style.visibility</p:attrName>
+                                        </p:attrNameLst>
+                                      </p:cBhvr>
+                                      <p:to>
+                                        <p:strVal val="visible"/>
+                                      </p:to>
+                                    </p:set>
+                                    <p:anim calcmode="lin" valueType="num">
+                                      <p:cBhvr additive="base">
+                                        <p:cTn id="7" dur="500" fill="hold"/>
+                                        <p:tgtEl>
+                                          <p:spTgt spid="2050"/>
+                                        </p:tgtEl>
+                                        <p:attrNameLst>
+                                          <p:attrName>ppt_x</p:attrName>
+                                        </p:attrNameLst>
+                                      </p:cBhvr>
+                                      <p:tavLst>
+                                        <p:tav tm="0">
+                                          <p:val>
+                                            <p:strVal val="#ppt_x"/>
+                                          </p:val>
+                                        </p:tav>
+                                        <p:tav tm="100000">
+                                          <p:val>
+                                            <p:strVal val="#ppt_x"/>
+                                          </p:val>
+                                        </p:tav>
+                                      </p:tavLst>
+                                    </p:anim>
+                                    <p:anim calcmode="lin" valueType="num">
+                                      <p:cBhvr additive="base">
+                                        <p:cTn id="8" dur="500" fill="hold"/>
+                                        <p:tgtEl>
+                                          <p:spTgt spid="2050"/>
+                                        </p:tgtEl>
+                                        <p:attrNameLst>
+                                          <p:attrName>ppt_y</p:attrName>
+                                        </p:attrNameLst>
+                                      </p:cBhvr>
+                                      <p:tavLst>
+                                        <p:tav tm="0">
+                                          <p:val>
+                                            <p:strVal val="1+#ppt_h/2"/>
+                                          </p:val>
+                                        </p:tav>
+                                        <p:tav tm="100000">
+                                          <p:val>
+                                            <p:strVal val="#ppt_y"/>
+                                          </p:val>
+                                        </p:tav>
+                                      </p:tavLst>
+                                    </p:anim>
+                                  </p:childTnLst>
+                                </p:cTn>
+                              </p:par>
+                            </p:childTnLst>
+                          </p:cTn>
+                        </p:par>
+                      </p:childTnLst>
+                    </p:cTn>
+                  </p:par>
+                  <p:par>
+                    <p:cTn id="9" fill="hold">
+                      <p:stCondLst>
+                        <p:cond delay="indefinite"/>
+                      </p:stCondLst>
+                      <p:childTnLst>
+                        <p:par>
+                          <p:cTn id="10" fill="hold">
+                            <p:stCondLst>
+                              <p:cond delay="0"/>
+                            </p:stCondLst>
+                            <p:childTnLst>
+                              <p:par>
+                                <p:cTn id="11" presetID="2" presetClass="entr" presetSubtype="4" fill="hold" nodeType="clickEffect">
+                                  <p:stCondLst>
+                                    <p:cond delay="0"/>
+                                  </p:stCondLst>
+                                  <p:childTnLst>
+                                    <p:set>
+                                      <p:cBhvr>
+                                        <p:cTn id="12" dur="1" fill="hold">
+                                          <p:stCondLst>
+                                            <p:cond delay="0"/>
+                                          </p:stCondLst>
+                                        </p:cTn>
+                                        <p:tgtEl>
+                                          <p:spTgt spid="2">
+                                            <p:txEl>
+                                              <p:pRg st="0" end="0"/>
+                                            </p:txEl>
+                                          </p:spTgt>
+                                        </p:tgtEl>
+                                        <p:attrNameLst>
+                                          <p:attrName>style.visibility</p:attrName>
+                                        </p:attrNameLst>
+                                      </p:cBhvr>
+                                      <p:to>
+                                        <p:strVal val="visible"/>
+                                      </p:to>
+                                    </p:set>
+                                    <p:anim calcmode="lin" valueType="num">
+                                      <p:cBhvr additive="base">
+                                        <p:cTn id="13" dur="500" fill="hold"/>
+                                        <p:tgtEl>
+                                          <p:spTgt spid="2">
+                                            <p:txEl>
+                                              <p:pRg st="0" end="0"/>
+                                            </p:txEl>
+                                          </p:spTgt>
+                                        </p:tgtEl>
+                                        <p:attrNameLst>
+                                          <p:attrName>ppt_x</p:attrName>
+                                        </p:attrNameLst>
+                                      </p:cBhvr>
+                                      <p:tavLst>
+                                        <p:tav tm="0">
+                                          <p:val>
+                                            <p:strVal val="#ppt_x"/>
+                                          </p:val>
+                                        </p:tav>
+                                        <p:tav tm="100000">
+                                          <p:val>
+                                            <p:strVal val="#ppt_x"/>
+                                          </p:val>
+                                        </p:tav>
+                                      </p:tavLst>
+                                    </p:anim>
+                                    <p:anim calcmode="lin" valueType="num">
+                                      <p:cBhvr additive="base">
+                                        <p:cTn id="14" dur="500" fill="hold"/>
+                                        <p:tgtEl>
+                                          <p:spTgt spid="2">
+                                            <p:txEl>
+                                              <p:pRg st="0" end="0"/>
+                                            </p:txEl>
+                                          </p:spTgt>
+                                        </p:tgtEl>
+                                        <p:attrNameLst>
+                                          <p:attrName>ppt_y</p:attrName>
+                                        </p:attrNameLst>
+                                      </p:cBhvr>
+                                      <p:tavLst>
+                                        <p:tav tm="0">
+                                          <p:val>
+                                            <p:strVal val="1+#ppt_h/2"/>
+                                          </p:val>
+                                        </p:tav>
+                                        <p:tav tm="100000">
+                                          <p:val>
+                                            <p:strVal val="#ppt_y"/>
+                                          </p:val>
+                                        </p:tav>
+                                      </p:tavLst>
+                                    </p:anim>
+                                  </p:childTnLst>
+                                </p:cTn>
+                              </p:par>
+                            </p:childTnLst>
+                          </p:cTn>
+                        </p:par>
+                      </p:childTnLst>
+                    </p:cTn>
+                  </p:par>
+                  <p:par>
+                    <p:cTn id="15" fill="hold">
+                      <p:stCondLst>
+                        <p:cond delay="indefinite"/>
+                      </p:stCondLst>
+                      <p:childTnLst>
+                        <p:par>
+                          <p:cTn id="16" fill="hold">
+                            <p:stCondLst>
+                              <p:cond delay="0"/>
+                            </p:stCondLst>
+                            <p:childTnLst>
+                              <p:par>
+                                <p:cTn id="17" presetID="2" presetClass="entr" presetSubtype="4" fill="hold" nodeType="clickEffect">
+                                  <p:stCondLst>
+                                    <p:cond delay="0"/>
+                                  </p:stCondLst>
+                                  <p:childTnLst>
+                                    <p:set>
+                                      <p:cBhvr>
+                                        <p:cTn id="18" dur="1" fill="hold">
+                                          <p:stCondLst>
+                                            <p:cond delay="0"/>
+                                          </p:stCondLst>
+                                        </p:cTn>
+                                        <p:tgtEl>
+                                          <p:spTgt spid="2">
+                                            <p:txEl>
+                                              <p:pRg st="1" end="1"/>
+                                            </p:txEl>
+                                          </p:spTgt>
+                                        </p:tgtEl>
+                                        <p:attrNameLst>
+                                          <p:attrName>style.visibility</p:attrName>
+                                        </p:attrNameLst>
+                                      </p:cBhvr>
+                                      <p:to>
+                                        <p:strVal val="visible"/>
+                                      </p:to>
+                                    </p:set>
+                                    <p:anim calcmode="lin" valueType="num">
+                                      <p:cBhvr additive="base">
+                                        <p:cTn id="19" dur="500" fill="hold"/>
+                                        <p:tgtEl>
+                                          <p:spTgt spid="2">
+                                            <p:txEl>
+                                              <p:pRg st="1" end="1"/>
+                                            </p:txEl>
+                                          </p:spTgt>
+                                        </p:tgtEl>
+                                        <p:attrNameLst>
+                                          <p:attrName>ppt_x</p:attrName>
+                                        </p:attrNameLst>
+                                      </p:cBhvr>
+                                      <p:tavLst>
+                                        <p:tav tm="0">
+                                          <p:val>
+                                            <p:strVal val="#ppt_x"/>
+                                          </p:val>
+                                        </p:tav>
+                                        <p:tav tm="100000">
+                                          <p:val>
+                                            <p:strVal val="#ppt_x"/>
+                                          </p:val>
+                                        </p:tav>
+                                      </p:tavLst>
+                                    </p:anim>
+                                    <p:anim calcmode="lin" valueType="num">
+                                      <p:cBhvr additive="base">
+                                        <p:cTn id="20" dur="500" fill="hold"/>
+                                        <p:tgtEl>
+                                          <p:spTgt spid="2">
+                                            <p:txEl>
+                                              <p:pRg st="1" end="1"/>
+                                            </p:txEl>
+                                          </p:spTgt>
+                                        </p:tgtEl>
+                                        <p:attrNameLst>
+                                          <p:attrName>ppt_y</p:attrName>
+                                        </p:attrNameLst>
+                                      </p:cBhvr>
+                                      <p:tavLst>
+                                        <p:tav tm="0">
+                                          <p:val>
+                                            <p:strVal val="1+#ppt_h/2"/>
+                                          </p:val>
+                                        </p:tav>
+                                        <p:tav tm="100000">
+                                          <p:val>
+                                            <p:strVal val="#ppt_y"/>
+                                          </p:val>
+                                        </p:tav>
+                                      </p:tavLst>
+                                    </p:anim>
+                                  </p:childTnLst>
+                                </p:cTn>
+                              </p:par>
+                            </p:childTnLst>
+                          </p:cTn>
+                        </p:par>
+                      </p:childTnLst>
+                    </p:cTn>
+                  </p:par>
+                </p:childTnLst>
+              </p:cTn>
+              <p:prevCondLst>
+                <p:cond evt="onPrev" delay="0">
+                  <p:tgtEl>
+                    <p:sldTgt/>
+                  </p:tgtEl>
+                </p:cond>
+              </p:prevCondLst>
+              <p:nextCondLst>
+                <p:cond evt="onNext" delay="0">
+                  <p:tgtEl>
+                    <p:sldTgt/>
+                  </p:tgtEl>
+                </p:cond>
+              </p:nextCondLst>
+            </p:seq>
+          </p:childTnLst>
+        </p:cTn>
+      </p:par>
+    </p:tnLst>
+  </p:timing>
+</p:sld>
+</file>
+
+<file path=ppt/slides/slide37.xml><?xml version="1.0" encoding="utf-8"?>
+<p:sld xmlns:a="http://schemas.openxmlformats.org/drawingml/2006/main" xmlns:r="http://schemas.openxmlformats.org/officeDocument/2006/relationships" xmlns:p="http://schemas.openxmlformats.org/presentationml/2006/main">
+  <p:cSld>
+    <p:spTree>
+      <p:nvGrpSpPr>
+        <p:cNvPr id="1" name=""/>
+        <p:cNvGrpSpPr/>
+        <p:nvPr/>
+      </p:nvGrpSpPr>
+      <p:grpSpPr>
+        <a:xfrm>
+          <a:off x="0" y="0"/>
+          <a:ext cx="0" cy="0"/>
+          <a:chOff x="0" y="0"/>
+          <a:chExt cx="0" cy="0"/>
+        </a:xfrm>
+      </p:grpSpPr>
+      <p:sp>
+        <p:nvSpPr>
+          <p:cNvPr id="2" name="Symbol zastępczy zawartości 1"/>
+          <p:cNvSpPr>
+            <a:spLocks noGrp="1"/>
+          </p:cNvSpPr>
+          <p:nvPr>
+            <p:ph idx="1"/>
+          </p:nvPr>
+        </p:nvSpPr>
+        <p:spPr/>
+        <p:txBody>
+          <a:bodyPr/>
+          <a:lstStyle/>
+          <a:p>
+            <a:r>
+              <a:rPr lang="pl-PL" dirty="0" smtClean="0"/>
+              <a:t>Umożliwia przekazanie parametru jako ciąg znaków wraz zapytaniem</a:t>
+            </a:r>
+          </a:p>
+          <a:p>
+            <a:r>
+              <a:rPr lang="pl-PL" dirty="0" smtClean="0"/>
+              <a:t>Zgodnie z dokumentacją należy pamiętać o kodowaniu znaków dla stringów w przypadku SQL Server, gdy jest wymagany </a:t>
+            </a:r>
+            <a:r>
+              <a:rPr lang="pl-PL" dirty="0" err="1" smtClean="0"/>
+              <a:t>Unicode</a:t>
+            </a:r>
+            <a:r>
+              <a:rPr lang="pl-PL" dirty="0" smtClean="0"/>
+              <a:t> używamy </a:t>
+            </a:r>
+            <a:r>
+              <a:rPr lang="pl-PL" dirty="0" err="1" smtClean="0"/>
+              <a:t>unicode</a:t>
+            </a:r>
+            <a:r>
+              <a:rPr lang="pl-PL" dirty="0" smtClean="0"/>
+              <a:t>, gdy inne – używamy ANSI</a:t>
+            </a:r>
+          </a:p>
+          <a:p>
+            <a:endParaRPr lang="pl-PL" dirty="0"/>
+          </a:p>
+        </p:txBody>
+      </p:sp>
+      <p:sp>
+        <p:nvSpPr>
+          <p:cNvPr id="3" name="Tytuł 2"/>
+          <p:cNvSpPr>
+            <a:spLocks noGrp="1"/>
+          </p:cNvSpPr>
+          <p:nvPr>
+            <p:ph type="title"/>
+          </p:nvPr>
+        </p:nvSpPr>
+        <p:spPr/>
+        <p:txBody>
+          <a:bodyPr/>
+          <a:lstStyle/>
+          <a:p>
+            <a:r>
+              <a:rPr lang="pl-PL" dirty="0" smtClean="0"/>
+              <a:t>Ciąg znaków</a:t>
+            </a:r>
+            <a:endParaRPr lang="pl-PL" dirty="0"/>
+          </a:p>
+        </p:txBody>
+      </p:sp>
+      <p:pic>
+        <p:nvPicPr>
+          <p:cNvPr id="3076" name="Picture 4"/>
+          <p:cNvPicPr>
+            <a:picLocks noChangeAspect="1" noChangeArrowheads="1"/>
+          </p:cNvPicPr>
+          <p:nvPr/>
+        </p:nvPicPr>
+        <p:blipFill>
+          <a:blip r:embed="rId2">
+            <a:extLst>
+              <a:ext uri="{28A0092B-C50C-407E-A947-70E740481C1C}">
+                <a14:useLocalDpi xmlns:a14="http://schemas.microsoft.com/office/drawing/2010/main" val="0"/>
+              </a:ext>
+            </a:extLst>
+          </a:blip>
+          <a:srcRect/>
+          <a:stretch>
+            <a:fillRect/>
+          </a:stretch>
+        </p:blipFill>
+        <p:spPr bwMode="auto">
+          <a:xfrm>
+            <a:off x="107504" y="4115531"/>
+            <a:ext cx="8959130" cy="1393387"/>
+          </a:xfrm>
+          <a:prstGeom prst="rect">
+            <a:avLst/>
+          </a:prstGeom>
+          <a:noFill/>
+          <a:ln>
+            <a:noFill/>
+          </a:ln>
+          <a:extLst>
+            <a:ext uri="{909E8E84-426E-40DD-AFC4-6F175D3DCCD1}">
+              <a14:hiddenFill xmlns:a14="http://schemas.microsoft.com/office/drawing/2010/main">
+                <a:solidFill>
+                  <a:schemeClr val="accent1"/>
+                </a:solidFill>
+              </a14:hiddenFill>
+            </a:ext>
+            <a:ext uri="{91240B29-F687-4F45-9708-019B960494DF}">
+              <a14:hiddenLine xmlns:a14="http://schemas.microsoft.com/office/drawing/2010/main" w="9525">
+                <a:solidFill>
+                  <a:schemeClr val="tx1"/>
+                </a:solidFill>
+                <a:miter lim="800000"/>
+                <a:headEnd/>
+                <a:tailEnd/>
+              </a14:hiddenLine>
+            </a:ext>
+          </a:extLst>
+        </p:spPr>
+      </p:pic>
+    </p:spTree>
+    <p:extLst>
+      <p:ext uri="{BB962C8B-B14F-4D97-AF65-F5344CB8AC3E}">
+        <p14:creationId xmlns:p14="http://schemas.microsoft.com/office/powerpoint/2010/main" val="411769202"/>
+      </p:ext>
+    </p:extLst>
+  </p:cSld>
+  <p:clrMapOvr>
+    <a:masterClrMapping/>
+  </p:clrMapOvr>
+  <p:transition spd="slow">
+    <p:push dir="u"/>
+  </p:transition>
+  <p:timing>
+    <p:tnLst>
+      <p:par>
+        <p:cTn id="1" dur="indefinite" restart="never" nodeType="tmRoot">
+          <p:childTnLst>
+            <p:seq concurrent="1" nextAc="seek">
+              <p:cTn id="2" dur="indefinite" nodeType="mainSeq">
+                <p:childTnLst>
+                  <p:par>
+                    <p:cTn id="3" fill="hold">
+                      <p:stCondLst>
+                        <p:cond delay="indefinite"/>
+                      </p:stCondLst>
+                      <p:childTnLst>
+                        <p:par>
+                          <p:cTn id="4" fill="hold">
+                            <p:stCondLst>
+                              <p:cond delay="0"/>
+                            </p:stCondLst>
+                            <p:childTnLst>
+                              <p:par>
+                                <p:cTn id="5" presetID="2" presetClass="entr" presetSubtype="4" fill="hold" nodeType="clickEffect">
+                                  <p:stCondLst>
+                                    <p:cond delay="0"/>
+                                  </p:stCondLst>
+                                  <p:childTnLst>
+                                    <p:set>
+                                      <p:cBhvr>
+                                        <p:cTn id="6" dur="1" fill="hold">
+                                          <p:stCondLst>
+                                            <p:cond delay="0"/>
+                                          </p:stCondLst>
+                                        </p:cTn>
+                                        <p:tgtEl>
+                                          <p:spTgt spid="2">
+                                            <p:txEl>
+                                              <p:pRg st="0" end="0"/>
+                                            </p:txEl>
+                                          </p:spTgt>
+                                        </p:tgtEl>
+                                        <p:attrNameLst>
+                                          <p:attrName>style.visibility</p:attrName>
+                                        </p:attrNameLst>
+                                      </p:cBhvr>
+                                      <p:to>
+                                        <p:strVal val="visible"/>
+                                      </p:to>
+                                    </p:set>
+                                    <p:anim calcmode="lin" valueType="num">
+                                      <p:cBhvr additive="base">
+                                        <p:cTn id="7" dur="500" fill="hold"/>
+                                        <p:tgtEl>
+                                          <p:spTgt spid="2">
+                                            <p:txEl>
+                                              <p:pRg st="0" end="0"/>
+                                            </p:txEl>
+                                          </p:spTgt>
+                                        </p:tgtEl>
+                                        <p:attrNameLst>
+                                          <p:attrName>ppt_x</p:attrName>
+                                        </p:attrNameLst>
+                                      </p:cBhvr>
+                                      <p:tavLst>
+                                        <p:tav tm="0">
+                                          <p:val>
+                                            <p:strVal val="#ppt_x"/>
+                                          </p:val>
+                                        </p:tav>
+                                        <p:tav tm="100000">
+                                          <p:val>
+                                            <p:strVal val="#ppt_x"/>
+                                          </p:val>
+                                        </p:tav>
+                                      </p:tavLst>
+                                    </p:anim>
+                                    <p:anim calcmode="lin" valueType="num">
+                                      <p:cBhvr additive="base">
+                                        <p:cTn id="8" dur="500" fill="hold"/>
+                                        <p:tgtEl>
+                                          <p:spTgt spid="2">
+                                            <p:txEl>
+                                              <p:pRg st="0" end="0"/>
+                                            </p:txEl>
+                                          </p:spTgt>
+                                        </p:tgtEl>
+                                        <p:attrNameLst>
+                                          <p:attrName>ppt_y</p:attrName>
+                                        </p:attrNameLst>
+                                      </p:cBhvr>
+                                      <p:tavLst>
+                                        <p:tav tm="0">
+                                          <p:val>
+                                            <p:strVal val="1+#ppt_h/2"/>
+                                          </p:val>
+                                        </p:tav>
+                                        <p:tav tm="100000">
+                                          <p:val>
+                                            <p:strVal val="#ppt_y"/>
+                                          </p:val>
+                                        </p:tav>
+                                      </p:tavLst>
+                                    </p:anim>
+                                  </p:childTnLst>
+                                </p:cTn>
+                              </p:par>
+                            </p:childTnLst>
+                          </p:cTn>
+                        </p:par>
+                      </p:childTnLst>
+                    </p:cTn>
+                  </p:par>
+                  <p:par>
+                    <p:cTn id="9" fill="hold">
+                      <p:stCondLst>
+                        <p:cond delay="indefinite"/>
+                      </p:stCondLst>
+                      <p:childTnLst>
+                        <p:par>
+                          <p:cTn id="10" fill="hold">
+                            <p:stCondLst>
+                              <p:cond delay="0"/>
+                            </p:stCondLst>
+                            <p:childTnLst>
+                              <p:par>
+                                <p:cTn id="11" presetID="2" presetClass="entr" presetSubtype="4" fill="hold" nodeType="clickEffect">
+                                  <p:stCondLst>
+                                    <p:cond delay="0"/>
+                                  </p:stCondLst>
+                                  <p:childTnLst>
+                                    <p:set>
+                                      <p:cBhvr>
+                                        <p:cTn id="12" dur="1" fill="hold">
+                                          <p:stCondLst>
+                                            <p:cond delay="0"/>
+                                          </p:stCondLst>
+                                        </p:cTn>
+                                        <p:tgtEl>
+                                          <p:spTgt spid="2">
+                                            <p:txEl>
+                                              <p:pRg st="1" end="1"/>
+                                            </p:txEl>
+                                          </p:spTgt>
+                                        </p:tgtEl>
+                                        <p:attrNameLst>
+                                          <p:attrName>style.visibility</p:attrName>
+                                        </p:attrNameLst>
+                                      </p:cBhvr>
+                                      <p:to>
+                                        <p:strVal val="visible"/>
+                                      </p:to>
+                                    </p:set>
+                                    <p:anim calcmode="lin" valueType="num">
+                                      <p:cBhvr additive="base">
+                                        <p:cTn id="13" dur="500" fill="hold"/>
+                                        <p:tgtEl>
+                                          <p:spTgt spid="2">
+                                            <p:txEl>
+                                              <p:pRg st="1" end="1"/>
+                                            </p:txEl>
+                                          </p:spTgt>
+                                        </p:tgtEl>
+                                        <p:attrNameLst>
+                                          <p:attrName>ppt_x</p:attrName>
+                                        </p:attrNameLst>
+                                      </p:cBhvr>
+                                      <p:tavLst>
+                                        <p:tav tm="0">
+                                          <p:val>
+                                            <p:strVal val="#ppt_x"/>
+                                          </p:val>
+                                        </p:tav>
+                                        <p:tav tm="100000">
+                                          <p:val>
+                                            <p:strVal val="#ppt_x"/>
+                                          </p:val>
+                                        </p:tav>
+                                      </p:tavLst>
+                                    </p:anim>
+                                    <p:anim calcmode="lin" valueType="num">
+                                      <p:cBhvr additive="base">
+                                        <p:cTn id="14" dur="500" fill="hold"/>
+                                        <p:tgtEl>
+                                          <p:spTgt spid="2">
+                                            <p:txEl>
+                                              <p:pRg st="1" end="1"/>
+                                            </p:txEl>
+                                          </p:spTgt>
+                                        </p:tgtEl>
+                                        <p:attrNameLst>
+                                          <p:attrName>ppt_y</p:attrName>
+                                        </p:attrNameLst>
+                                      </p:cBhvr>
+                                      <p:tavLst>
+                                        <p:tav tm="0">
+                                          <p:val>
+                                            <p:strVal val="1+#ppt_h/2"/>
+                                          </p:val>
+                                        </p:tav>
+                                        <p:tav tm="100000">
+                                          <p:val>
+                                            <p:strVal val="#ppt_y"/>
+                                          </p:val>
+                                        </p:tav>
+                                      </p:tavLst>
+                                    </p:anim>
+                                  </p:childTnLst>
+                                </p:cTn>
+                              </p:par>
+                            </p:childTnLst>
+                          </p:cTn>
+                        </p:par>
+                      </p:childTnLst>
+                    </p:cTn>
+                  </p:par>
+                  <p:par>
+                    <p:cTn id="15" fill="hold">
+                      <p:stCondLst>
+                        <p:cond delay="indefinite"/>
+                      </p:stCondLst>
+                      <p:childTnLst>
+                        <p:par>
+                          <p:cTn id="16" fill="hold">
+                            <p:stCondLst>
+                              <p:cond delay="0"/>
+                            </p:stCondLst>
+                            <p:childTnLst>
+                              <p:par>
+                                <p:cTn id="17" presetID="2" presetClass="entr" presetSubtype="4" fill="hold" nodeType="clickEffect">
+                                  <p:stCondLst>
+                                    <p:cond delay="0"/>
+                                  </p:stCondLst>
+                                  <p:childTnLst>
+                                    <p:set>
+                                      <p:cBhvr>
+                                        <p:cTn id="18" dur="1" fill="hold">
+                                          <p:stCondLst>
+                                            <p:cond delay="0"/>
+                                          </p:stCondLst>
+                                        </p:cTn>
+                                        <p:tgtEl>
+                                          <p:spTgt spid="3076"/>
+                                        </p:tgtEl>
+                                        <p:attrNameLst>
+                                          <p:attrName>style.visibility</p:attrName>
+                                        </p:attrNameLst>
+                                      </p:cBhvr>
+                                      <p:to>
+                                        <p:strVal val="visible"/>
+                                      </p:to>
+                                    </p:set>
+                                    <p:anim calcmode="lin" valueType="num">
+                                      <p:cBhvr additive="base">
+                                        <p:cTn id="19" dur="500" fill="hold"/>
+                                        <p:tgtEl>
+                                          <p:spTgt spid="3076"/>
+                                        </p:tgtEl>
+                                        <p:attrNameLst>
+                                          <p:attrName>ppt_x</p:attrName>
+                                        </p:attrNameLst>
+                                      </p:cBhvr>
+                                      <p:tavLst>
+                                        <p:tav tm="0">
+                                          <p:val>
+                                            <p:strVal val="#ppt_x"/>
+                                          </p:val>
+                                        </p:tav>
+                                        <p:tav tm="100000">
+                                          <p:val>
+                                            <p:strVal val="#ppt_x"/>
+                                          </p:val>
+                                        </p:tav>
+                                      </p:tavLst>
+                                    </p:anim>
+                                    <p:anim calcmode="lin" valueType="num">
+                                      <p:cBhvr additive="base">
+                                        <p:cTn id="20" dur="500" fill="hold"/>
+                                        <p:tgtEl>
+                                          <p:spTgt spid="3076"/>
+                                        </p:tgtEl>
+                                        <p:attrNameLst>
+                                          <p:attrName>ppt_y</p:attrName>
+                                        </p:attrNameLst>
+                                      </p:cBhvr>
+                                      <p:tavLst>
+                                        <p:tav tm="0">
+                                          <p:val>
+                                            <p:strVal val="1+#ppt_h/2"/>
+                                          </p:val>
+                                        </p:tav>
+                                        <p:tav tm="100000">
+                                          <p:val>
+                                            <p:strVal val="#ppt_y"/>
+                                          </p:val>
+                                        </p:tav>
+                                      </p:tavLst>
+                                    </p:anim>
+                                  </p:childTnLst>
+                                </p:cTn>
+                              </p:par>
+                            </p:childTnLst>
+                          </p:cTn>
+                        </p:par>
+                      </p:childTnLst>
+                    </p:cTn>
+                  </p:par>
+                </p:childTnLst>
+              </p:cTn>
+              <p:prevCondLst>
+                <p:cond evt="onPrev" delay="0">
+                  <p:tgtEl>
+                    <p:sldTgt/>
+                  </p:tgtEl>
+                </p:cond>
+              </p:prevCondLst>
+              <p:nextCondLst>
+                <p:cond evt="onNext" delay="0">
+                  <p:tgtEl>
+                    <p:sldTgt/>
+                  </p:tgtEl>
+                </p:cond>
+              </p:nextCondLst>
+            </p:seq>
+          </p:childTnLst>
+        </p:cTn>
+      </p:par>
+    </p:tnLst>
+  </p:timing>
+</p:sld>
+</file>
+
+<file path=ppt/slides/slide38.xml><?xml version="1.0" encoding="utf-8"?>
+<p:sld xmlns:a="http://schemas.openxmlformats.org/drawingml/2006/main" xmlns:r="http://schemas.openxmlformats.org/officeDocument/2006/relationships" xmlns:p="http://schemas.openxmlformats.org/presentationml/2006/main">
+  <p:cSld>
+    <p:spTree>
+      <p:nvGrpSpPr>
+        <p:cNvPr id="1" name=""/>
+        <p:cNvGrpSpPr/>
+        <p:nvPr/>
+      </p:nvGrpSpPr>
+      <p:grpSpPr>
+        <a:xfrm>
+          <a:off x="0" y="0"/>
+          <a:ext cx="0" cy="0"/>
+          <a:chOff x="0" y="0"/>
+          <a:chExt cx="0" cy="0"/>
+        </a:xfrm>
+      </p:grpSpPr>
+      <p:sp>
+        <p:nvSpPr>
+          <p:cNvPr id="2" name="Symbol zastępczy zawartości 1"/>
+          <p:cNvSpPr>
+            <a:spLocks noGrp="1"/>
+          </p:cNvSpPr>
+          <p:nvPr>
+            <p:ph idx="1"/>
+          </p:nvPr>
+        </p:nvSpPr>
+        <p:spPr/>
+        <p:txBody>
+          <a:bodyPr/>
+          <a:lstStyle/>
+          <a:p>
+            <a:r>
+              <a:rPr lang="pl-PL" dirty="0" smtClean="0"/>
+              <a:t>Która z metod jest najlepsza?</a:t>
+            </a:r>
+          </a:p>
+          <a:p>
+            <a:r>
+              <a:rPr lang="pl-PL" dirty="0" smtClean="0"/>
+              <a:t>1. Anonimowe – najbardziej uniwersalne i jasne</a:t>
+            </a:r>
+          </a:p>
+          <a:p>
+            <a:r>
+              <a:rPr lang="pl-PL" dirty="0" smtClean="0"/>
+              <a:t>2. Obiektowe – jest znany kontekst, porządek</a:t>
+            </a:r>
+          </a:p>
+          <a:p>
+            <a:r>
+              <a:rPr lang="pl-PL" dirty="0" smtClean="0"/>
+              <a:t>3. Lista obiektów – umożliwia przekazanie kilku parametrów na raz</a:t>
+            </a:r>
+          </a:p>
+          <a:p>
+            <a:r>
+              <a:rPr lang="pl-PL" dirty="0" smtClean="0"/>
+              <a:t>4. Ciąg znaków – dla lubiących </a:t>
+            </a:r>
+            <a:r>
+              <a:rPr lang="pl-PL" dirty="0" err="1" smtClean="0"/>
+              <a:t>oldschool</a:t>
+            </a:r>
+            <a:endParaRPr lang="pl-PL" dirty="0" smtClean="0"/>
+          </a:p>
+          <a:p>
+            <a:r>
+              <a:rPr lang="pl-PL" dirty="0" smtClean="0"/>
+              <a:t>5. </a:t>
+            </a:r>
+            <a:r>
+              <a:rPr lang="pl-PL" dirty="0" err="1" smtClean="0"/>
+              <a:t>DynamicParameters</a:t>
+            </a:r>
+            <a:r>
+              <a:rPr lang="pl-PL" dirty="0" smtClean="0"/>
+              <a:t> – uniwersalna lecz mało czytelna metoda</a:t>
+            </a:r>
+          </a:p>
+          <a:p>
+            <a:endParaRPr lang="pl-PL" dirty="0"/>
+          </a:p>
+        </p:txBody>
+      </p:sp>
+      <p:sp>
+        <p:nvSpPr>
+          <p:cNvPr id="3" name="Tytuł 2"/>
+          <p:cNvSpPr>
+            <a:spLocks noGrp="1"/>
+          </p:cNvSpPr>
+          <p:nvPr>
+            <p:ph type="title"/>
+          </p:nvPr>
+        </p:nvSpPr>
+        <p:spPr/>
+        <p:txBody>
+          <a:bodyPr>
+            <a:normAutofit fontScale="90000"/>
+          </a:bodyPr>
+          <a:lstStyle/>
+          <a:p>
+            <a:r>
+              <a:rPr lang="pl-PL" sz="4000" dirty="0" smtClean="0"/>
+              <a:t>Metody przekazywania parametrów</a:t>
+            </a:r>
+            <a:endParaRPr lang="pl-PL" dirty="0"/>
+          </a:p>
+        </p:txBody>
+      </p:sp>
+    </p:spTree>
+    <p:extLst>
+      <p:ext uri="{BB962C8B-B14F-4D97-AF65-F5344CB8AC3E}">
+        <p14:creationId xmlns:p14="http://schemas.microsoft.com/office/powerpoint/2010/main" val="3301805933"/>
+      </p:ext>
+    </p:extLst>
+  </p:cSld>
+  <p:clrMapOvr>
+    <a:masterClrMapping/>
+  </p:clrMapOvr>
+  <p:transition spd="slow">
+    <p:push dir="u"/>
+  </p:transition>
+  <p:timing>
+    <p:tnLst>
+      <p:par>
         <p:cTn id="1" dur="indefinite" restart="never" nodeType="tmRoot"/>
       </p:par>
     </p:tnLst>
@@ -20360,7 +22555,7 @@
 </p:sld>
 </file>
 
-<file path=ppt/slides/slide34.xml><?xml version="1.0" encoding="utf-8"?>
+<file path=ppt/slides/slide39.xml><?xml version="1.0" encoding="utf-8"?>
 <p:sld xmlns:a="http://schemas.openxmlformats.org/drawingml/2006/main" xmlns:r="http://schemas.openxmlformats.org/officeDocument/2006/relationships" xmlns:p="http://schemas.openxmlformats.org/presentationml/2006/main">
   <p:cSld>
     <p:spTree>

</xml_diff>

<commit_message>
presentation - mapping methods added
</commit_message>
<xml_diff>
--- a/Files/Szkolenie warsztatowe Dapper.pptx
+++ b/Files/Szkolenie warsztatowe Dapper.pptx
@@ -43,7 +43,10 @@
     <p:sldId id="293" r:id="rId37"/>
     <p:sldId id="294" r:id="rId38"/>
     <p:sldId id="290" r:id="rId39"/>
-    <p:sldId id="257" r:id="rId40"/>
+    <p:sldId id="295" r:id="rId40"/>
+    <p:sldId id="296" r:id="rId41"/>
+    <p:sldId id="297" r:id="rId42"/>
+    <p:sldId id="257" r:id="rId43"/>
   </p:sldIdLst>
   <p:sldSz cx="9144000" cy="6858000" type="screen4x3"/>
   <p:notesSz cx="6858000" cy="9144000"/>
@@ -144,7 +147,7 @@
   </p:defaultTextStyle>
   <p:extLst>
     <p:ext uri="{EFAFB233-063F-42B5-8137-9DF3F51BA10A}">
-      <p15:sldGuideLst xmlns:p15="http://schemas.microsoft.com/office/powerpoint/2012/main" xmlns="">
+      <p15:sldGuideLst xmlns="" xmlns:p15="http://schemas.microsoft.com/office/powerpoint/2012/main">
         <p15:guide id="1" orient="horz" pos="2160">
           <p15:clr>
             <a:srgbClr val="A4A3A4"/>
@@ -22574,7 +22577,7 @@
       </p:grpSpPr>
       <p:sp>
         <p:nvSpPr>
-          <p:cNvPr id="3" name="Symbol zastępczy zawartości 2"/>
+          <p:cNvPr id="2" name="Symbol zastępczy zawartości 1"/>
           <p:cNvSpPr>
             <a:spLocks noGrp="1"/>
           </p:cNvSpPr>
@@ -22584,26 +22587,44 @@
         </p:nvSpPr>
         <p:spPr/>
         <p:txBody>
-          <a:bodyPr>
-            <a:normAutofit lnSpcReduction="10000"/>
-          </a:bodyPr>
+          <a:bodyPr/>
           <a:lstStyle/>
           <a:p>
-            <a:pPr marL="109728" indent="0">
-              <a:buNone/>
-            </a:pPr>
             <a:r>
               <a:rPr lang="pl-PL" dirty="0" smtClean="0"/>
-              <a:t>Przedstawione materiały szkoleniowe, prezentacja wraz z konspektem, projekt użyty do prezentacji i warsztatów jest własnością intelektualną szkolących Michała Gwóźdź oraz Łukasza Szustaka.</a:t>
-            </a:r>
-          </a:p>
-          <a:p>
-            <a:pPr marL="109728" indent="0">
-              <a:buNone/>
-            </a:pPr>
+              <a:t>Silnie typowane</a:t>
+            </a:r>
+          </a:p>
+          <a:p>
             <a:r>
               <a:rPr lang="pl-PL" dirty="0" smtClean="0"/>
-              <a:t>Wykorzystanie bez zgody twórców któregokolwiek materiału do innych celów niż samokształcenie osoby szkolonej, takie jak upublicznianie, cytowanie lub inna forma redystrybucji jest jawnym naruszeniem praw autorskich.</a:t>
+              <a:t>Anonimowe</a:t>
+            </a:r>
+          </a:p>
+          <a:p>
+            <a:r>
+              <a:rPr lang="pl-PL" dirty="0" err="1" smtClean="0"/>
+              <a:t>Multimapping</a:t>
+            </a:r>
+            <a:r>
+              <a:rPr lang="pl-PL" dirty="0" smtClean="0"/>
+              <a:t> 1 do 1</a:t>
+            </a:r>
+          </a:p>
+          <a:p>
+            <a:r>
+              <a:rPr lang="pl-PL" dirty="0" err="1" smtClean="0"/>
+              <a:t>Multimapping</a:t>
+            </a:r>
+            <a:r>
+              <a:rPr lang="pl-PL" dirty="0" smtClean="0"/>
+              <a:t> 1 do n</a:t>
+            </a:r>
+          </a:p>
+          <a:p>
+            <a:r>
+              <a:rPr lang="pl-PL" dirty="0" err="1" smtClean="0"/>
+              <a:t>Multiresult</a:t>
             </a:r>
             <a:endParaRPr lang="pl-PL" dirty="0"/>
           </a:p>
@@ -22611,7 +22632,7 @@
       </p:sp>
       <p:sp>
         <p:nvSpPr>
-          <p:cNvPr id="2" name="Tytuł 1"/>
+          <p:cNvPr id="3" name="Tytuł 2"/>
           <p:cNvSpPr>
             <a:spLocks noGrp="1"/>
           </p:cNvSpPr>
@@ -22626,7 +22647,7 @@
           <a:p>
             <a:r>
               <a:rPr lang="pl-PL" dirty="0" smtClean="0"/>
-              <a:t>Słowo końcowe</a:t>
+              <a:t>Metody mapowania</a:t>
             </a:r>
             <a:endParaRPr lang="pl-PL" dirty="0"/>
           </a:p>
@@ -22635,7 +22656,7 @@
     </p:spTree>
     <p:extLst>
       <p:ext uri="{BB962C8B-B14F-4D97-AF65-F5344CB8AC3E}">
-        <p14:creationId xmlns:p14="http://schemas.microsoft.com/office/powerpoint/2010/main" val="3785988704"/>
+        <p14:creationId xmlns:p14="http://schemas.microsoft.com/office/powerpoint/2010/main" val="2714810602"/>
       </p:ext>
     </p:extLst>
   </p:cSld>
@@ -22679,7 +22700,7 @@
                                           </p:stCondLst>
                                         </p:cTn>
                                         <p:tgtEl>
-                                          <p:spTgt spid="3">
+                                          <p:spTgt spid="2">
                                             <p:txEl>
                                               <p:pRg st="0" end="0"/>
                                             </p:txEl>
@@ -22697,7 +22718,7 @@
                                       <p:cBhvr additive="base">
                                         <p:cTn id="7" dur="500" fill="hold"/>
                                         <p:tgtEl>
-                                          <p:spTgt spid="3">
+                                          <p:spTgt spid="2">
                                             <p:txEl>
                                               <p:pRg st="0" end="0"/>
                                             </p:txEl>
@@ -22724,7 +22745,7 @@
                                       <p:cBhvr additive="base">
                                         <p:cTn id="8" dur="500" fill="hold"/>
                                         <p:tgtEl>
-                                          <p:spTgt spid="3">
+                                          <p:spTgt spid="2">
                                             <p:txEl>
                                               <p:pRg st="0" end="0"/>
                                             </p:txEl>
@@ -22782,7 +22803,7 @@
                                           </p:stCondLst>
                                         </p:cTn>
                                         <p:tgtEl>
-                                          <p:spTgt spid="3">
+                                          <p:spTgt spid="2">
                                             <p:txEl>
                                               <p:pRg st="1" end="1"/>
                                             </p:txEl>
@@ -22800,7 +22821,7 @@
                                       <p:cBhvr additive="base">
                                         <p:cTn id="13" dur="500" fill="hold"/>
                                         <p:tgtEl>
-                                          <p:spTgt spid="3">
+                                          <p:spTgt spid="2">
                                             <p:txEl>
                                               <p:pRg st="1" end="1"/>
                                             </p:txEl>
@@ -22827,9 +22848,318 @@
                                       <p:cBhvr additive="base">
                                         <p:cTn id="14" dur="500" fill="hold"/>
                                         <p:tgtEl>
-                                          <p:spTgt spid="3">
+                                          <p:spTgt spid="2">
                                             <p:txEl>
                                               <p:pRg st="1" end="1"/>
+                                            </p:txEl>
+                                          </p:spTgt>
+                                        </p:tgtEl>
+                                        <p:attrNameLst>
+                                          <p:attrName>ppt_y</p:attrName>
+                                        </p:attrNameLst>
+                                      </p:cBhvr>
+                                      <p:tavLst>
+                                        <p:tav tm="0">
+                                          <p:val>
+                                            <p:strVal val="1+#ppt_h/2"/>
+                                          </p:val>
+                                        </p:tav>
+                                        <p:tav tm="100000">
+                                          <p:val>
+                                            <p:strVal val="#ppt_y"/>
+                                          </p:val>
+                                        </p:tav>
+                                      </p:tavLst>
+                                    </p:anim>
+                                  </p:childTnLst>
+                                </p:cTn>
+                              </p:par>
+                            </p:childTnLst>
+                          </p:cTn>
+                        </p:par>
+                      </p:childTnLst>
+                    </p:cTn>
+                  </p:par>
+                  <p:par>
+                    <p:cTn id="15" fill="hold">
+                      <p:stCondLst>
+                        <p:cond delay="indefinite"/>
+                      </p:stCondLst>
+                      <p:childTnLst>
+                        <p:par>
+                          <p:cTn id="16" fill="hold">
+                            <p:stCondLst>
+                              <p:cond delay="0"/>
+                            </p:stCondLst>
+                            <p:childTnLst>
+                              <p:par>
+                                <p:cTn id="17" presetID="2" presetClass="entr" presetSubtype="4" fill="hold" nodeType="clickEffect">
+                                  <p:stCondLst>
+                                    <p:cond delay="0"/>
+                                  </p:stCondLst>
+                                  <p:childTnLst>
+                                    <p:set>
+                                      <p:cBhvr>
+                                        <p:cTn id="18" dur="1" fill="hold">
+                                          <p:stCondLst>
+                                            <p:cond delay="0"/>
+                                          </p:stCondLst>
+                                        </p:cTn>
+                                        <p:tgtEl>
+                                          <p:spTgt spid="2">
+                                            <p:txEl>
+                                              <p:pRg st="2" end="2"/>
+                                            </p:txEl>
+                                          </p:spTgt>
+                                        </p:tgtEl>
+                                        <p:attrNameLst>
+                                          <p:attrName>style.visibility</p:attrName>
+                                        </p:attrNameLst>
+                                      </p:cBhvr>
+                                      <p:to>
+                                        <p:strVal val="visible"/>
+                                      </p:to>
+                                    </p:set>
+                                    <p:anim calcmode="lin" valueType="num">
+                                      <p:cBhvr additive="base">
+                                        <p:cTn id="19" dur="500" fill="hold"/>
+                                        <p:tgtEl>
+                                          <p:spTgt spid="2">
+                                            <p:txEl>
+                                              <p:pRg st="2" end="2"/>
+                                            </p:txEl>
+                                          </p:spTgt>
+                                        </p:tgtEl>
+                                        <p:attrNameLst>
+                                          <p:attrName>ppt_x</p:attrName>
+                                        </p:attrNameLst>
+                                      </p:cBhvr>
+                                      <p:tavLst>
+                                        <p:tav tm="0">
+                                          <p:val>
+                                            <p:strVal val="#ppt_x"/>
+                                          </p:val>
+                                        </p:tav>
+                                        <p:tav tm="100000">
+                                          <p:val>
+                                            <p:strVal val="#ppt_x"/>
+                                          </p:val>
+                                        </p:tav>
+                                      </p:tavLst>
+                                    </p:anim>
+                                    <p:anim calcmode="lin" valueType="num">
+                                      <p:cBhvr additive="base">
+                                        <p:cTn id="20" dur="500" fill="hold"/>
+                                        <p:tgtEl>
+                                          <p:spTgt spid="2">
+                                            <p:txEl>
+                                              <p:pRg st="2" end="2"/>
+                                            </p:txEl>
+                                          </p:spTgt>
+                                        </p:tgtEl>
+                                        <p:attrNameLst>
+                                          <p:attrName>ppt_y</p:attrName>
+                                        </p:attrNameLst>
+                                      </p:cBhvr>
+                                      <p:tavLst>
+                                        <p:tav tm="0">
+                                          <p:val>
+                                            <p:strVal val="1+#ppt_h/2"/>
+                                          </p:val>
+                                        </p:tav>
+                                        <p:tav tm="100000">
+                                          <p:val>
+                                            <p:strVal val="#ppt_y"/>
+                                          </p:val>
+                                        </p:tav>
+                                      </p:tavLst>
+                                    </p:anim>
+                                  </p:childTnLst>
+                                </p:cTn>
+                              </p:par>
+                            </p:childTnLst>
+                          </p:cTn>
+                        </p:par>
+                      </p:childTnLst>
+                    </p:cTn>
+                  </p:par>
+                  <p:par>
+                    <p:cTn id="21" fill="hold">
+                      <p:stCondLst>
+                        <p:cond delay="indefinite"/>
+                      </p:stCondLst>
+                      <p:childTnLst>
+                        <p:par>
+                          <p:cTn id="22" fill="hold">
+                            <p:stCondLst>
+                              <p:cond delay="0"/>
+                            </p:stCondLst>
+                            <p:childTnLst>
+                              <p:par>
+                                <p:cTn id="23" presetID="2" presetClass="entr" presetSubtype="4" fill="hold" nodeType="clickEffect">
+                                  <p:stCondLst>
+                                    <p:cond delay="0"/>
+                                  </p:stCondLst>
+                                  <p:childTnLst>
+                                    <p:set>
+                                      <p:cBhvr>
+                                        <p:cTn id="24" dur="1" fill="hold">
+                                          <p:stCondLst>
+                                            <p:cond delay="0"/>
+                                          </p:stCondLst>
+                                        </p:cTn>
+                                        <p:tgtEl>
+                                          <p:spTgt spid="2">
+                                            <p:txEl>
+                                              <p:pRg st="3" end="3"/>
+                                            </p:txEl>
+                                          </p:spTgt>
+                                        </p:tgtEl>
+                                        <p:attrNameLst>
+                                          <p:attrName>style.visibility</p:attrName>
+                                        </p:attrNameLst>
+                                      </p:cBhvr>
+                                      <p:to>
+                                        <p:strVal val="visible"/>
+                                      </p:to>
+                                    </p:set>
+                                    <p:anim calcmode="lin" valueType="num">
+                                      <p:cBhvr additive="base">
+                                        <p:cTn id="25" dur="500" fill="hold"/>
+                                        <p:tgtEl>
+                                          <p:spTgt spid="2">
+                                            <p:txEl>
+                                              <p:pRg st="3" end="3"/>
+                                            </p:txEl>
+                                          </p:spTgt>
+                                        </p:tgtEl>
+                                        <p:attrNameLst>
+                                          <p:attrName>ppt_x</p:attrName>
+                                        </p:attrNameLst>
+                                      </p:cBhvr>
+                                      <p:tavLst>
+                                        <p:tav tm="0">
+                                          <p:val>
+                                            <p:strVal val="#ppt_x"/>
+                                          </p:val>
+                                        </p:tav>
+                                        <p:tav tm="100000">
+                                          <p:val>
+                                            <p:strVal val="#ppt_x"/>
+                                          </p:val>
+                                        </p:tav>
+                                      </p:tavLst>
+                                    </p:anim>
+                                    <p:anim calcmode="lin" valueType="num">
+                                      <p:cBhvr additive="base">
+                                        <p:cTn id="26" dur="500" fill="hold"/>
+                                        <p:tgtEl>
+                                          <p:spTgt spid="2">
+                                            <p:txEl>
+                                              <p:pRg st="3" end="3"/>
+                                            </p:txEl>
+                                          </p:spTgt>
+                                        </p:tgtEl>
+                                        <p:attrNameLst>
+                                          <p:attrName>ppt_y</p:attrName>
+                                        </p:attrNameLst>
+                                      </p:cBhvr>
+                                      <p:tavLst>
+                                        <p:tav tm="0">
+                                          <p:val>
+                                            <p:strVal val="1+#ppt_h/2"/>
+                                          </p:val>
+                                        </p:tav>
+                                        <p:tav tm="100000">
+                                          <p:val>
+                                            <p:strVal val="#ppt_y"/>
+                                          </p:val>
+                                        </p:tav>
+                                      </p:tavLst>
+                                    </p:anim>
+                                  </p:childTnLst>
+                                </p:cTn>
+                              </p:par>
+                            </p:childTnLst>
+                          </p:cTn>
+                        </p:par>
+                      </p:childTnLst>
+                    </p:cTn>
+                  </p:par>
+                  <p:par>
+                    <p:cTn id="27" fill="hold">
+                      <p:stCondLst>
+                        <p:cond delay="indefinite"/>
+                      </p:stCondLst>
+                      <p:childTnLst>
+                        <p:par>
+                          <p:cTn id="28" fill="hold">
+                            <p:stCondLst>
+                              <p:cond delay="0"/>
+                            </p:stCondLst>
+                            <p:childTnLst>
+                              <p:par>
+                                <p:cTn id="29" presetID="2" presetClass="entr" presetSubtype="4" fill="hold" nodeType="clickEffect">
+                                  <p:stCondLst>
+                                    <p:cond delay="0"/>
+                                  </p:stCondLst>
+                                  <p:childTnLst>
+                                    <p:set>
+                                      <p:cBhvr>
+                                        <p:cTn id="30" dur="1" fill="hold">
+                                          <p:stCondLst>
+                                            <p:cond delay="0"/>
+                                          </p:stCondLst>
+                                        </p:cTn>
+                                        <p:tgtEl>
+                                          <p:spTgt spid="2">
+                                            <p:txEl>
+                                              <p:pRg st="4" end="4"/>
+                                            </p:txEl>
+                                          </p:spTgt>
+                                        </p:tgtEl>
+                                        <p:attrNameLst>
+                                          <p:attrName>style.visibility</p:attrName>
+                                        </p:attrNameLst>
+                                      </p:cBhvr>
+                                      <p:to>
+                                        <p:strVal val="visible"/>
+                                      </p:to>
+                                    </p:set>
+                                    <p:anim calcmode="lin" valueType="num">
+                                      <p:cBhvr additive="base">
+                                        <p:cTn id="31" dur="500" fill="hold"/>
+                                        <p:tgtEl>
+                                          <p:spTgt spid="2">
+                                            <p:txEl>
+                                              <p:pRg st="4" end="4"/>
+                                            </p:txEl>
+                                          </p:spTgt>
+                                        </p:tgtEl>
+                                        <p:attrNameLst>
+                                          <p:attrName>ppt_x</p:attrName>
+                                        </p:attrNameLst>
+                                      </p:cBhvr>
+                                      <p:tavLst>
+                                        <p:tav tm="0">
+                                          <p:val>
+                                            <p:strVal val="#ppt_x"/>
+                                          </p:val>
+                                        </p:tav>
+                                        <p:tav tm="100000">
+                                          <p:val>
+                                            <p:strVal val="#ppt_x"/>
+                                          </p:val>
+                                        </p:tav>
+                                      </p:tavLst>
+                                    </p:anim>
+                                    <p:anim calcmode="lin" valueType="num">
+                                      <p:cBhvr additive="base">
+                                        <p:cTn id="32" dur="500" fill="hold"/>
+                                        <p:tgtEl>
+                                          <p:spTgt spid="2">
+                                            <p:txEl>
+                                              <p:pRg st="4" end="4"/>
                                             </p:txEl>
                                           </p:spTgt>
                                         </p:tgtEl>
@@ -23671,6 +24001,1898 @@
     <p:bldLst>
       <p:bldP spid="2" grpId="0" build="p"/>
     </p:bldLst>
+  </p:timing>
+</p:sld>
+</file>
+
+<file path=ppt/slides/slide40.xml><?xml version="1.0" encoding="utf-8"?>
+<p:sld xmlns:a="http://schemas.openxmlformats.org/drawingml/2006/main" xmlns:r="http://schemas.openxmlformats.org/officeDocument/2006/relationships" xmlns:p="http://schemas.openxmlformats.org/presentationml/2006/main">
+  <p:cSld>
+    <p:spTree>
+      <p:nvGrpSpPr>
+        <p:cNvPr id="1" name=""/>
+        <p:cNvGrpSpPr/>
+        <p:nvPr/>
+      </p:nvGrpSpPr>
+      <p:grpSpPr>
+        <a:xfrm>
+          <a:off x="0" y="0"/>
+          <a:ext cx="0" cy="0"/>
+          <a:chOff x="0" y="0"/>
+          <a:chExt cx="0" cy="0"/>
+        </a:xfrm>
+      </p:grpSpPr>
+      <p:sp>
+        <p:nvSpPr>
+          <p:cNvPr id="2" name="Symbol zastępczy zawartości 1"/>
+          <p:cNvSpPr>
+            <a:spLocks noGrp="1"/>
+          </p:cNvSpPr>
+          <p:nvPr>
+            <p:ph idx="1"/>
+          </p:nvPr>
+        </p:nvSpPr>
+        <p:spPr/>
+        <p:txBody>
+          <a:bodyPr/>
+          <a:lstStyle/>
+          <a:p>
+            <a:r>
+              <a:rPr lang="pl-PL" dirty="0" smtClean="0"/>
+              <a:t>Już omawiane, w ramach przypomnienia może być mapowane przy użyciu następujących metod:</a:t>
+            </a:r>
+          </a:p>
+          <a:p>
+            <a:r>
+              <a:rPr lang="pl-PL" dirty="0" smtClean="0"/>
+              <a:t>Query</a:t>
+            </a:r>
+          </a:p>
+          <a:p>
+            <a:r>
+              <a:rPr lang="pl-PL" dirty="0" err="1" smtClean="0"/>
+              <a:t>QueryFirst</a:t>
+            </a:r>
+            <a:endParaRPr lang="pl-PL" dirty="0" smtClean="0"/>
+          </a:p>
+          <a:p>
+            <a:r>
+              <a:rPr lang="pl-PL" dirty="0" err="1" smtClean="0"/>
+              <a:t>QueryFirstOrDefault</a:t>
+            </a:r>
+            <a:endParaRPr lang="pl-PL" dirty="0" smtClean="0"/>
+          </a:p>
+          <a:p>
+            <a:r>
+              <a:rPr lang="pl-PL" dirty="0" err="1" smtClean="0"/>
+              <a:t>QuerySingle</a:t>
+            </a:r>
+            <a:endParaRPr lang="pl-PL" dirty="0" smtClean="0"/>
+          </a:p>
+          <a:p>
+            <a:r>
+              <a:rPr lang="pl-PL" dirty="0" err="1" smtClean="0"/>
+              <a:t>QuerySingleOrDefault</a:t>
+            </a:r>
+            <a:endParaRPr lang="pl-PL" dirty="0" smtClean="0"/>
+          </a:p>
+          <a:p>
+            <a:r>
+              <a:rPr lang="pl-PL" dirty="0" smtClean="0"/>
+              <a:t>Typ przekazujemy jako argument generyczny do powyższych metod</a:t>
+            </a:r>
+          </a:p>
+          <a:p>
+            <a:endParaRPr lang="pl-PL" dirty="0"/>
+          </a:p>
+        </p:txBody>
+      </p:sp>
+      <p:sp>
+        <p:nvSpPr>
+          <p:cNvPr id="3" name="Tytuł 2"/>
+          <p:cNvSpPr>
+            <a:spLocks noGrp="1"/>
+          </p:cNvSpPr>
+          <p:nvPr>
+            <p:ph type="title"/>
+          </p:nvPr>
+        </p:nvSpPr>
+        <p:spPr/>
+        <p:txBody>
+          <a:bodyPr/>
+          <a:lstStyle/>
+          <a:p>
+            <a:r>
+              <a:rPr lang="pl-PL" dirty="0" smtClean="0"/>
+              <a:t>Mapowanie silnie typowane</a:t>
+            </a:r>
+            <a:endParaRPr lang="pl-PL" dirty="0"/>
+          </a:p>
+        </p:txBody>
+      </p:sp>
+    </p:spTree>
+    <p:extLst>
+      <p:ext uri="{BB962C8B-B14F-4D97-AF65-F5344CB8AC3E}">
+        <p14:creationId xmlns:p14="http://schemas.microsoft.com/office/powerpoint/2010/main" val="1575044179"/>
+      </p:ext>
+    </p:extLst>
+  </p:cSld>
+  <p:clrMapOvr>
+    <a:masterClrMapping/>
+  </p:clrMapOvr>
+  <p:transition spd="slow">
+    <p:push dir="u"/>
+  </p:transition>
+  <p:timing>
+    <p:tnLst>
+      <p:par>
+        <p:cTn id="1" dur="indefinite" restart="never" nodeType="tmRoot">
+          <p:childTnLst>
+            <p:seq concurrent="1" nextAc="seek">
+              <p:cTn id="2" dur="indefinite" nodeType="mainSeq">
+                <p:childTnLst>
+                  <p:par>
+                    <p:cTn id="3" fill="hold">
+                      <p:stCondLst>
+                        <p:cond delay="indefinite"/>
+                      </p:stCondLst>
+                      <p:childTnLst>
+                        <p:par>
+                          <p:cTn id="4" fill="hold">
+                            <p:stCondLst>
+                              <p:cond delay="0"/>
+                            </p:stCondLst>
+                            <p:childTnLst>
+                              <p:par>
+                                <p:cTn id="5" presetID="2" presetClass="entr" presetSubtype="4" fill="hold" nodeType="clickEffect">
+                                  <p:stCondLst>
+                                    <p:cond delay="0"/>
+                                  </p:stCondLst>
+                                  <p:childTnLst>
+                                    <p:set>
+                                      <p:cBhvr>
+                                        <p:cTn id="6" dur="1" fill="hold">
+                                          <p:stCondLst>
+                                            <p:cond delay="0"/>
+                                          </p:stCondLst>
+                                        </p:cTn>
+                                        <p:tgtEl>
+                                          <p:spTgt spid="2">
+                                            <p:txEl>
+                                              <p:pRg st="0" end="0"/>
+                                            </p:txEl>
+                                          </p:spTgt>
+                                        </p:tgtEl>
+                                        <p:attrNameLst>
+                                          <p:attrName>style.visibility</p:attrName>
+                                        </p:attrNameLst>
+                                      </p:cBhvr>
+                                      <p:to>
+                                        <p:strVal val="visible"/>
+                                      </p:to>
+                                    </p:set>
+                                    <p:anim calcmode="lin" valueType="num">
+                                      <p:cBhvr additive="base">
+                                        <p:cTn id="7" dur="500" fill="hold"/>
+                                        <p:tgtEl>
+                                          <p:spTgt spid="2">
+                                            <p:txEl>
+                                              <p:pRg st="0" end="0"/>
+                                            </p:txEl>
+                                          </p:spTgt>
+                                        </p:tgtEl>
+                                        <p:attrNameLst>
+                                          <p:attrName>ppt_x</p:attrName>
+                                        </p:attrNameLst>
+                                      </p:cBhvr>
+                                      <p:tavLst>
+                                        <p:tav tm="0">
+                                          <p:val>
+                                            <p:strVal val="#ppt_x"/>
+                                          </p:val>
+                                        </p:tav>
+                                        <p:tav tm="100000">
+                                          <p:val>
+                                            <p:strVal val="#ppt_x"/>
+                                          </p:val>
+                                        </p:tav>
+                                      </p:tavLst>
+                                    </p:anim>
+                                    <p:anim calcmode="lin" valueType="num">
+                                      <p:cBhvr additive="base">
+                                        <p:cTn id="8" dur="500" fill="hold"/>
+                                        <p:tgtEl>
+                                          <p:spTgt spid="2">
+                                            <p:txEl>
+                                              <p:pRg st="0" end="0"/>
+                                            </p:txEl>
+                                          </p:spTgt>
+                                        </p:tgtEl>
+                                        <p:attrNameLst>
+                                          <p:attrName>ppt_y</p:attrName>
+                                        </p:attrNameLst>
+                                      </p:cBhvr>
+                                      <p:tavLst>
+                                        <p:tav tm="0">
+                                          <p:val>
+                                            <p:strVal val="1+#ppt_h/2"/>
+                                          </p:val>
+                                        </p:tav>
+                                        <p:tav tm="100000">
+                                          <p:val>
+                                            <p:strVal val="#ppt_y"/>
+                                          </p:val>
+                                        </p:tav>
+                                      </p:tavLst>
+                                    </p:anim>
+                                  </p:childTnLst>
+                                </p:cTn>
+                              </p:par>
+                            </p:childTnLst>
+                          </p:cTn>
+                        </p:par>
+                      </p:childTnLst>
+                    </p:cTn>
+                  </p:par>
+                  <p:par>
+                    <p:cTn id="9" fill="hold">
+                      <p:stCondLst>
+                        <p:cond delay="indefinite"/>
+                      </p:stCondLst>
+                      <p:childTnLst>
+                        <p:par>
+                          <p:cTn id="10" fill="hold">
+                            <p:stCondLst>
+                              <p:cond delay="0"/>
+                            </p:stCondLst>
+                            <p:childTnLst>
+                              <p:par>
+                                <p:cTn id="11" presetID="2" presetClass="entr" presetSubtype="4" fill="hold" nodeType="clickEffect">
+                                  <p:stCondLst>
+                                    <p:cond delay="0"/>
+                                  </p:stCondLst>
+                                  <p:childTnLst>
+                                    <p:set>
+                                      <p:cBhvr>
+                                        <p:cTn id="12" dur="1" fill="hold">
+                                          <p:stCondLst>
+                                            <p:cond delay="0"/>
+                                          </p:stCondLst>
+                                        </p:cTn>
+                                        <p:tgtEl>
+                                          <p:spTgt spid="2">
+                                            <p:txEl>
+                                              <p:pRg st="1" end="1"/>
+                                            </p:txEl>
+                                          </p:spTgt>
+                                        </p:tgtEl>
+                                        <p:attrNameLst>
+                                          <p:attrName>style.visibility</p:attrName>
+                                        </p:attrNameLst>
+                                      </p:cBhvr>
+                                      <p:to>
+                                        <p:strVal val="visible"/>
+                                      </p:to>
+                                    </p:set>
+                                    <p:anim calcmode="lin" valueType="num">
+                                      <p:cBhvr additive="base">
+                                        <p:cTn id="13" dur="500" fill="hold"/>
+                                        <p:tgtEl>
+                                          <p:spTgt spid="2">
+                                            <p:txEl>
+                                              <p:pRg st="1" end="1"/>
+                                            </p:txEl>
+                                          </p:spTgt>
+                                        </p:tgtEl>
+                                        <p:attrNameLst>
+                                          <p:attrName>ppt_x</p:attrName>
+                                        </p:attrNameLst>
+                                      </p:cBhvr>
+                                      <p:tavLst>
+                                        <p:tav tm="0">
+                                          <p:val>
+                                            <p:strVal val="#ppt_x"/>
+                                          </p:val>
+                                        </p:tav>
+                                        <p:tav tm="100000">
+                                          <p:val>
+                                            <p:strVal val="#ppt_x"/>
+                                          </p:val>
+                                        </p:tav>
+                                      </p:tavLst>
+                                    </p:anim>
+                                    <p:anim calcmode="lin" valueType="num">
+                                      <p:cBhvr additive="base">
+                                        <p:cTn id="14" dur="500" fill="hold"/>
+                                        <p:tgtEl>
+                                          <p:spTgt spid="2">
+                                            <p:txEl>
+                                              <p:pRg st="1" end="1"/>
+                                            </p:txEl>
+                                          </p:spTgt>
+                                        </p:tgtEl>
+                                        <p:attrNameLst>
+                                          <p:attrName>ppt_y</p:attrName>
+                                        </p:attrNameLst>
+                                      </p:cBhvr>
+                                      <p:tavLst>
+                                        <p:tav tm="0">
+                                          <p:val>
+                                            <p:strVal val="1+#ppt_h/2"/>
+                                          </p:val>
+                                        </p:tav>
+                                        <p:tav tm="100000">
+                                          <p:val>
+                                            <p:strVal val="#ppt_y"/>
+                                          </p:val>
+                                        </p:tav>
+                                      </p:tavLst>
+                                    </p:anim>
+                                  </p:childTnLst>
+                                </p:cTn>
+                              </p:par>
+                            </p:childTnLst>
+                          </p:cTn>
+                        </p:par>
+                      </p:childTnLst>
+                    </p:cTn>
+                  </p:par>
+                  <p:par>
+                    <p:cTn id="15" fill="hold">
+                      <p:stCondLst>
+                        <p:cond delay="indefinite"/>
+                      </p:stCondLst>
+                      <p:childTnLst>
+                        <p:par>
+                          <p:cTn id="16" fill="hold">
+                            <p:stCondLst>
+                              <p:cond delay="0"/>
+                            </p:stCondLst>
+                            <p:childTnLst>
+                              <p:par>
+                                <p:cTn id="17" presetID="2" presetClass="entr" presetSubtype="4" fill="hold" nodeType="clickEffect">
+                                  <p:stCondLst>
+                                    <p:cond delay="0"/>
+                                  </p:stCondLst>
+                                  <p:childTnLst>
+                                    <p:set>
+                                      <p:cBhvr>
+                                        <p:cTn id="18" dur="1" fill="hold">
+                                          <p:stCondLst>
+                                            <p:cond delay="0"/>
+                                          </p:stCondLst>
+                                        </p:cTn>
+                                        <p:tgtEl>
+                                          <p:spTgt spid="2">
+                                            <p:txEl>
+                                              <p:pRg st="2" end="2"/>
+                                            </p:txEl>
+                                          </p:spTgt>
+                                        </p:tgtEl>
+                                        <p:attrNameLst>
+                                          <p:attrName>style.visibility</p:attrName>
+                                        </p:attrNameLst>
+                                      </p:cBhvr>
+                                      <p:to>
+                                        <p:strVal val="visible"/>
+                                      </p:to>
+                                    </p:set>
+                                    <p:anim calcmode="lin" valueType="num">
+                                      <p:cBhvr additive="base">
+                                        <p:cTn id="19" dur="500" fill="hold"/>
+                                        <p:tgtEl>
+                                          <p:spTgt spid="2">
+                                            <p:txEl>
+                                              <p:pRg st="2" end="2"/>
+                                            </p:txEl>
+                                          </p:spTgt>
+                                        </p:tgtEl>
+                                        <p:attrNameLst>
+                                          <p:attrName>ppt_x</p:attrName>
+                                        </p:attrNameLst>
+                                      </p:cBhvr>
+                                      <p:tavLst>
+                                        <p:tav tm="0">
+                                          <p:val>
+                                            <p:strVal val="#ppt_x"/>
+                                          </p:val>
+                                        </p:tav>
+                                        <p:tav tm="100000">
+                                          <p:val>
+                                            <p:strVal val="#ppt_x"/>
+                                          </p:val>
+                                        </p:tav>
+                                      </p:tavLst>
+                                    </p:anim>
+                                    <p:anim calcmode="lin" valueType="num">
+                                      <p:cBhvr additive="base">
+                                        <p:cTn id="20" dur="500" fill="hold"/>
+                                        <p:tgtEl>
+                                          <p:spTgt spid="2">
+                                            <p:txEl>
+                                              <p:pRg st="2" end="2"/>
+                                            </p:txEl>
+                                          </p:spTgt>
+                                        </p:tgtEl>
+                                        <p:attrNameLst>
+                                          <p:attrName>ppt_y</p:attrName>
+                                        </p:attrNameLst>
+                                      </p:cBhvr>
+                                      <p:tavLst>
+                                        <p:tav tm="0">
+                                          <p:val>
+                                            <p:strVal val="1+#ppt_h/2"/>
+                                          </p:val>
+                                        </p:tav>
+                                        <p:tav tm="100000">
+                                          <p:val>
+                                            <p:strVal val="#ppt_y"/>
+                                          </p:val>
+                                        </p:tav>
+                                      </p:tavLst>
+                                    </p:anim>
+                                  </p:childTnLst>
+                                </p:cTn>
+                              </p:par>
+                            </p:childTnLst>
+                          </p:cTn>
+                        </p:par>
+                      </p:childTnLst>
+                    </p:cTn>
+                  </p:par>
+                  <p:par>
+                    <p:cTn id="21" fill="hold">
+                      <p:stCondLst>
+                        <p:cond delay="indefinite"/>
+                      </p:stCondLst>
+                      <p:childTnLst>
+                        <p:par>
+                          <p:cTn id="22" fill="hold">
+                            <p:stCondLst>
+                              <p:cond delay="0"/>
+                            </p:stCondLst>
+                            <p:childTnLst>
+                              <p:par>
+                                <p:cTn id="23" presetID="2" presetClass="entr" presetSubtype="4" fill="hold" nodeType="clickEffect">
+                                  <p:stCondLst>
+                                    <p:cond delay="0"/>
+                                  </p:stCondLst>
+                                  <p:childTnLst>
+                                    <p:set>
+                                      <p:cBhvr>
+                                        <p:cTn id="24" dur="1" fill="hold">
+                                          <p:stCondLst>
+                                            <p:cond delay="0"/>
+                                          </p:stCondLst>
+                                        </p:cTn>
+                                        <p:tgtEl>
+                                          <p:spTgt spid="2">
+                                            <p:txEl>
+                                              <p:pRg st="3" end="3"/>
+                                            </p:txEl>
+                                          </p:spTgt>
+                                        </p:tgtEl>
+                                        <p:attrNameLst>
+                                          <p:attrName>style.visibility</p:attrName>
+                                        </p:attrNameLst>
+                                      </p:cBhvr>
+                                      <p:to>
+                                        <p:strVal val="visible"/>
+                                      </p:to>
+                                    </p:set>
+                                    <p:anim calcmode="lin" valueType="num">
+                                      <p:cBhvr additive="base">
+                                        <p:cTn id="25" dur="500" fill="hold"/>
+                                        <p:tgtEl>
+                                          <p:spTgt spid="2">
+                                            <p:txEl>
+                                              <p:pRg st="3" end="3"/>
+                                            </p:txEl>
+                                          </p:spTgt>
+                                        </p:tgtEl>
+                                        <p:attrNameLst>
+                                          <p:attrName>ppt_x</p:attrName>
+                                        </p:attrNameLst>
+                                      </p:cBhvr>
+                                      <p:tavLst>
+                                        <p:tav tm="0">
+                                          <p:val>
+                                            <p:strVal val="#ppt_x"/>
+                                          </p:val>
+                                        </p:tav>
+                                        <p:tav tm="100000">
+                                          <p:val>
+                                            <p:strVal val="#ppt_x"/>
+                                          </p:val>
+                                        </p:tav>
+                                      </p:tavLst>
+                                    </p:anim>
+                                    <p:anim calcmode="lin" valueType="num">
+                                      <p:cBhvr additive="base">
+                                        <p:cTn id="26" dur="500" fill="hold"/>
+                                        <p:tgtEl>
+                                          <p:spTgt spid="2">
+                                            <p:txEl>
+                                              <p:pRg st="3" end="3"/>
+                                            </p:txEl>
+                                          </p:spTgt>
+                                        </p:tgtEl>
+                                        <p:attrNameLst>
+                                          <p:attrName>ppt_y</p:attrName>
+                                        </p:attrNameLst>
+                                      </p:cBhvr>
+                                      <p:tavLst>
+                                        <p:tav tm="0">
+                                          <p:val>
+                                            <p:strVal val="1+#ppt_h/2"/>
+                                          </p:val>
+                                        </p:tav>
+                                        <p:tav tm="100000">
+                                          <p:val>
+                                            <p:strVal val="#ppt_y"/>
+                                          </p:val>
+                                        </p:tav>
+                                      </p:tavLst>
+                                    </p:anim>
+                                  </p:childTnLst>
+                                </p:cTn>
+                              </p:par>
+                            </p:childTnLst>
+                          </p:cTn>
+                        </p:par>
+                      </p:childTnLst>
+                    </p:cTn>
+                  </p:par>
+                  <p:par>
+                    <p:cTn id="27" fill="hold">
+                      <p:stCondLst>
+                        <p:cond delay="indefinite"/>
+                      </p:stCondLst>
+                      <p:childTnLst>
+                        <p:par>
+                          <p:cTn id="28" fill="hold">
+                            <p:stCondLst>
+                              <p:cond delay="0"/>
+                            </p:stCondLst>
+                            <p:childTnLst>
+                              <p:par>
+                                <p:cTn id="29" presetID="2" presetClass="entr" presetSubtype="4" fill="hold" nodeType="clickEffect">
+                                  <p:stCondLst>
+                                    <p:cond delay="0"/>
+                                  </p:stCondLst>
+                                  <p:childTnLst>
+                                    <p:set>
+                                      <p:cBhvr>
+                                        <p:cTn id="30" dur="1" fill="hold">
+                                          <p:stCondLst>
+                                            <p:cond delay="0"/>
+                                          </p:stCondLst>
+                                        </p:cTn>
+                                        <p:tgtEl>
+                                          <p:spTgt spid="2">
+                                            <p:txEl>
+                                              <p:pRg st="4" end="4"/>
+                                            </p:txEl>
+                                          </p:spTgt>
+                                        </p:tgtEl>
+                                        <p:attrNameLst>
+                                          <p:attrName>style.visibility</p:attrName>
+                                        </p:attrNameLst>
+                                      </p:cBhvr>
+                                      <p:to>
+                                        <p:strVal val="visible"/>
+                                      </p:to>
+                                    </p:set>
+                                    <p:anim calcmode="lin" valueType="num">
+                                      <p:cBhvr additive="base">
+                                        <p:cTn id="31" dur="500" fill="hold"/>
+                                        <p:tgtEl>
+                                          <p:spTgt spid="2">
+                                            <p:txEl>
+                                              <p:pRg st="4" end="4"/>
+                                            </p:txEl>
+                                          </p:spTgt>
+                                        </p:tgtEl>
+                                        <p:attrNameLst>
+                                          <p:attrName>ppt_x</p:attrName>
+                                        </p:attrNameLst>
+                                      </p:cBhvr>
+                                      <p:tavLst>
+                                        <p:tav tm="0">
+                                          <p:val>
+                                            <p:strVal val="#ppt_x"/>
+                                          </p:val>
+                                        </p:tav>
+                                        <p:tav tm="100000">
+                                          <p:val>
+                                            <p:strVal val="#ppt_x"/>
+                                          </p:val>
+                                        </p:tav>
+                                      </p:tavLst>
+                                    </p:anim>
+                                    <p:anim calcmode="lin" valueType="num">
+                                      <p:cBhvr additive="base">
+                                        <p:cTn id="32" dur="500" fill="hold"/>
+                                        <p:tgtEl>
+                                          <p:spTgt spid="2">
+                                            <p:txEl>
+                                              <p:pRg st="4" end="4"/>
+                                            </p:txEl>
+                                          </p:spTgt>
+                                        </p:tgtEl>
+                                        <p:attrNameLst>
+                                          <p:attrName>ppt_y</p:attrName>
+                                        </p:attrNameLst>
+                                      </p:cBhvr>
+                                      <p:tavLst>
+                                        <p:tav tm="0">
+                                          <p:val>
+                                            <p:strVal val="1+#ppt_h/2"/>
+                                          </p:val>
+                                        </p:tav>
+                                        <p:tav tm="100000">
+                                          <p:val>
+                                            <p:strVal val="#ppt_y"/>
+                                          </p:val>
+                                        </p:tav>
+                                      </p:tavLst>
+                                    </p:anim>
+                                  </p:childTnLst>
+                                </p:cTn>
+                              </p:par>
+                            </p:childTnLst>
+                          </p:cTn>
+                        </p:par>
+                      </p:childTnLst>
+                    </p:cTn>
+                  </p:par>
+                  <p:par>
+                    <p:cTn id="33" fill="hold">
+                      <p:stCondLst>
+                        <p:cond delay="indefinite"/>
+                      </p:stCondLst>
+                      <p:childTnLst>
+                        <p:par>
+                          <p:cTn id="34" fill="hold">
+                            <p:stCondLst>
+                              <p:cond delay="0"/>
+                            </p:stCondLst>
+                            <p:childTnLst>
+                              <p:par>
+                                <p:cTn id="35" presetID="2" presetClass="entr" presetSubtype="4" fill="hold" nodeType="clickEffect">
+                                  <p:stCondLst>
+                                    <p:cond delay="0"/>
+                                  </p:stCondLst>
+                                  <p:childTnLst>
+                                    <p:set>
+                                      <p:cBhvr>
+                                        <p:cTn id="36" dur="1" fill="hold">
+                                          <p:stCondLst>
+                                            <p:cond delay="0"/>
+                                          </p:stCondLst>
+                                        </p:cTn>
+                                        <p:tgtEl>
+                                          <p:spTgt spid="2">
+                                            <p:txEl>
+                                              <p:pRg st="5" end="5"/>
+                                            </p:txEl>
+                                          </p:spTgt>
+                                        </p:tgtEl>
+                                        <p:attrNameLst>
+                                          <p:attrName>style.visibility</p:attrName>
+                                        </p:attrNameLst>
+                                      </p:cBhvr>
+                                      <p:to>
+                                        <p:strVal val="visible"/>
+                                      </p:to>
+                                    </p:set>
+                                    <p:anim calcmode="lin" valueType="num">
+                                      <p:cBhvr additive="base">
+                                        <p:cTn id="37" dur="500" fill="hold"/>
+                                        <p:tgtEl>
+                                          <p:spTgt spid="2">
+                                            <p:txEl>
+                                              <p:pRg st="5" end="5"/>
+                                            </p:txEl>
+                                          </p:spTgt>
+                                        </p:tgtEl>
+                                        <p:attrNameLst>
+                                          <p:attrName>ppt_x</p:attrName>
+                                        </p:attrNameLst>
+                                      </p:cBhvr>
+                                      <p:tavLst>
+                                        <p:tav tm="0">
+                                          <p:val>
+                                            <p:strVal val="#ppt_x"/>
+                                          </p:val>
+                                        </p:tav>
+                                        <p:tav tm="100000">
+                                          <p:val>
+                                            <p:strVal val="#ppt_x"/>
+                                          </p:val>
+                                        </p:tav>
+                                      </p:tavLst>
+                                    </p:anim>
+                                    <p:anim calcmode="lin" valueType="num">
+                                      <p:cBhvr additive="base">
+                                        <p:cTn id="38" dur="500" fill="hold"/>
+                                        <p:tgtEl>
+                                          <p:spTgt spid="2">
+                                            <p:txEl>
+                                              <p:pRg st="5" end="5"/>
+                                            </p:txEl>
+                                          </p:spTgt>
+                                        </p:tgtEl>
+                                        <p:attrNameLst>
+                                          <p:attrName>ppt_y</p:attrName>
+                                        </p:attrNameLst>
+                                      </p:cBhvr>
+                                      <p:tavLst>
+                                        <p:tav tm="0">
+                                          <p:val>
+                                            <p:strVal val="1+#ppt_h/2"/>
+                                          </p:val>
+                                        </p:tav>
+                                        <p:tav tm="100000">
+                                          <p:val>
+                                            <p:strVal val="#ppt_y"/>
+                                          </p:val>
+                                        </p:tav>
+                                      </p:tavLst>
+                                    </p:anim>
+                                  </p:childTnLst>
+                                </p:cTn>
+                              </p:par>
+                            </p:childTnLst>
+                          </p:cTn>
+                        </p:par>
+                      </p:childTnLst>
+                    </p:cTn>
+                  </p:par>
+                  <p:par>
+                    <p:cTn id="39" fill="hold">
+                      <p:stCondLst>
+                        <p:cond delay="indefinite"/>
+                      </p:stCondLst>
+                      <p:childTnLst>
+                        <p:par>
+                          <p:cTn id="40" fill="hold">
+                            <p:stCondLst>
+                              <p:cond delay="0"/>
+                            </p:stCondLst>
+                            <p:childTnLst>
+                              <p:par>
+                                <p:cTn id="41" presetID="2" presetClass="entr" presetSubtype="4" fill="hold" nodeType="clickEffect">
+                                  <p:stCondLst>
+                                    <p:cond delay="0"/>
+                                  </p:stCondLst>
+                                  <p:childTnLst>
+                                    <p:set>
+                                      <p:cBhvr>
+                                        <p:cTn id="42" dur="1" fill="hold">
+                                          <p:stCondLst>
+                                            <p:cond delay="0"/>
+                                          </p:stCondLst>
+                                        </p:cTn>
+                                        <p:tgtEl>
+                                          <p:spTgt spid="2">
+                                            <p:txEl>
+                                              <p:pRg st="6" end="6"/>
+                                            </p:txEl>
+                                          </p:spTgt>
+                                        </p:tgtEl>
+                                        <p:attrNameLst>
+                                          <p:attrName>style.visibility</p:attrName>
+                                        </p:attrNameLst>
+                                      </p:cBhvr>
+                                      <p:to>
+                                        <p:strVal val="visible"/>
+                                      </p:to>
+                                    </p:set>
+                                    <p:anim calcmode="lin" valueType="num">
+                                      <p:cBhvr additive="base">
+                                        <p:cTn id="43" dur="500" fill="hold"/>
+                                        <p:tgtEl>
+                                          <p:spTgt spid="2">
+                                            <p:txEl>
+                                              <p:pRg st="6" end="6"/>
+                                            </p:txEl>
+                                          </p:spTgt>
+                                        </p:tgtEl>
+                                        <p:attrNameLst>
+                                          <p:attrName>ppt_x</p:attrName>
+                                        </p:attrNameLst>
+                                      </p:cBhvr>
+                                      <p:tavLst>
+                                        <p:tav tm="0">
+                                          <p:val>
+                                            <p:strVal val="#ppt_x"/>
+                                          </p:val>
+                                        </p:tav>
+                                        <p:tav tm="100000">
+                                          <p:val>
+                                            <p:strVal val="#ppt_x"/>
+                                          </p:val>
+                                        </p:tav>
+                                      </p:tavLst>
+                                    </p:anim>
+                                    <p:anim calcmode="lin" valueType="num">
+                                      <p:cBhvr additive="base">
+                                        <p:cTn id="44" dur="500" fill="hold"/>
+                                        <p:tgtEl>
+                                          <p:spTgt spid="2">
+                                            <p:txEl>
+                                              <p:pRg st="6" end="6"/>
+                                            </p:txEl>
+                                          </p:spTgt>
+                                        </p:tgtEl>
+                                        <p:attrNameLst>
+                                          <p:attrName>ppt_y</p:attrName>
+                                        </p:attrNameLst>
+                                      </p:cBhvr>
+                                      <p:tavLst>
+                                        <p:tav tm="0">
+                                          <p:val>
+                                            <p:strVal val="1+#ppt_h/2"/>
+                                          </p:val>
+                                        </p:tav>
+                                        <p:tav tm="100000">
+                                          <p:val>
+                                            <p:strVal val="#ppt_y"/>
+                                          </p:val>
+                                        </p:tav>
+                                      </p:tavLst>
+                                    </p:anim>
+                                  </p:childTnLst>
+                                </p:cTn>
+                              </p:par>
+                            </p:childTnLst>
+                          </p:cTn>
+                        </p:par>
+                      </p:childTnLst>
+                    </p:cTn>
+                  </p:par>
+                </p:childTnLst>
+              </p:cTn>
+              <p:prevCondLst>
+                <p:cond evt="onPrev" delay="0">
+                  <p:tgtEl>
+                    <p:sldTgt/>
+                  </p:tgtEl>
+                </p:cond>
+              </p:prevCondLst>
+              <p:nextCondLst>
+                <p:cond evt="onNext" delay="0">
+                  <p:tgtEl>
+                    <p:sldTgt/>
+                  </p:tgtEl>
+                </p:cond>
+              </p:nextCondLst>
+            </p:seq>
+          </p:childTnLst>
+        </p:cTn>
+      </p:par>
+    </p:tnLst>
+  </p:timing>
+</p:sld>
+</file>
+
+<file path=ppt/slides/slide41.xml><?xml version="1.0" encoding="utf-8"?>
+<p:sld xmlns:a="http://schemas.openxmlformats.org/drawingml/2006/main" xmlns:r="http://schemas.openxmlformats.org/officeDocument/2006/relationships" xmlns:p="http://schemas.openxmlformats.org/presentationml/2006/main">
+  <p:cSld>
+    <p:spTree>
+      <p:nvGrpSpPr>
+        <p:cNvPr id="1" name=""/>
+        <p:cNvGrpSpPr/>
+        <p:nvPr/>
+      </p:nvGrpSpPr>
+      <p:grpSpPr>
+        <a:xfrm>
+          <a:off x="0" y="0"/>
+          <a:ext cx="0" cy="0"/>
+          <a:chOff x="0" y="0"/>
+          <a:chExt cx="0" cy="0"/>
+        </a:xfrm>
+      </p:grpSpPr>
+      <p:sp>
+        <p:nvSpPr>
+          <p:cNvPr id="2" name="Symbol zastępczy zawartości 1"/>
+          <p:cNvSpPr>
+            <a:spLocks noGrp="1"/>
+          </p:cNvSpPr>
+          <p:nvPr>
+            <p:ph idx="1"/>
+          </p:nvPr>
+        </p:nvSpPr>
+        <p:spPr/>
+        <p:txBody>
+          <a:bodyPr/>
+          <a:lstStyle/>
+          <a:p>
+            <a:r>
+              <a:rPr lang="pl-PL" dirty="0" smtClean="0"/>
+              <a:t>Mogą być mapowane przy użyciu tych samych metod jak dla mapowania silnie typowanego</a:t>
+            </a:r>
+          </a:p>
+          <a:p>
+            <a:r>
+              <a:rPr lang="pl-PL" dirty="0" smtClean="0"/>
+              <a:t>Zwracają obiekty dynamiczne </a:t>
+            </a:r>
+            <a:r>
+              <a:rPr lang="pl-PL" dirty="0" err="1" smtClean="0"/>
+              <a:t>dynamic</a:t>
+            </a:r>
+            <a:endParaRPr lang="pl-PL" dirty="0" smtClean="0"/>
+          </a:p>
+          <a:p>
+            <a:r>
+              <a:rPr lang="pl-PL" dirty="0" smtClean="0"/>
+              <a:t>Jak sprawdzić czy zwrócony obiekt jest obiektem dynamicznym?</a:t>
+            </a:r>
+          </a:p>
+          <a:p>
+            <a:r>
+              <a:rPr lang="pl-PL" dirty="0" smtClean="0"/>
+              <a:t>Przez mechanizm refleksji, o obiektach dynamicznych wiemy np. to, że implementują interfejs</a:t>
+            </a:r>
+          </a:p>
+          <a:p>
+            <a:endParaRPr lang="pl-PL" dirty="0"/>
+          </a:p>
+        </p:txBody>
+      </p:sp>
+      <p:sp>
+        <p:nvSpPr>
+          <p:cNvPr id="3" name="Tytuł 2"/>
+          <p:cNvSpPr>
+            <a:spLocks noGrp="1"/>
+          </p:cNvSpPr>
+          <p:nvPr>
+            <p:ph type="title"/>
+          </p:nvPr>
+        </p:nvSpPr>
+        <p:spPr/>
+        <p:txBody>
+          <a:bodyPr/>
+          <a:lstStyle/>
+          <a:p>
+            <a:r>
+              <a:rPr lang="pl-PL" dirty="0" smtClean="0"/>
+              <a:t>Metody anonimowe</a:t>
+            </a:r>
+            <a:endParaRPr lang="pl-PL" dirty="0"/>
+          </a:p>
+        </p:txBody>
+      </p:sp>
+      <p:pic>
+        <p:nvPicPr>
+          <p:cNvPr id="1026" name="Picture 2"/>
+          <p:cNvPicPr>
+            <a:picLocks noChangeAspect="1" noChangeArrowheads="1"/>
+          </p:cNvPicPr>
+          <p:nvPr/>
+        </p:nvPicPr>
+        <p:blipFill>
+          <a:blip r:embed="rId2">
+            <a:extLst>
+              <a:ext uri="{28A0092B-C50C-407E-A947-70E740481C1C}">
+                <a14:useLocalDpi xmlns:a14="http://schemas.microsoft.com/office/drawing/2010/main" val="0"/>
+              </a:ext>
+            </a:extLst>
+          </a:blip>
+          <a:srcRect/>
+          <a:stretch>
+            <a:fillRect/>
+          </a:stretch>
+        </p:blipFill>
+        <p:spPr bwMode="auto">
+          <a:xfrm>
+            <a:off x="251520" y="5049170"/>
+            <a:ext cx="8625377" cy="344745"/>
+          </a:xfrm>
+          <a:prstGeom prst="rect">
+            <a:avLst/>
+          </a:prstGeom>
+          <a:noFill/>
+          <a:ln>
+            <a:noFill/>
+          </a:ln>
+          <a:extLst>
+            <a:ext uri="{909E8E84-426E-40DD-AFC4-6F175D3DCCD1}">
+              <a14:hiddenFill xmlns:a14="http://schemas.microsoft.com/office/drawing/2010/main">
+                <a:solidFill>
+                  <a:schemeClr val="accent1"/>
+                </a:solidFill>
+              </a14:hiddenFill>
+            </a:ext>
+            <a:ext uri="{91240B29-F687-4F45-9708-019B960494DF}">
+              <a14:hiddenLine xmlns:a14="http://schemas.microsoft.com/office/drawing/2010/main" w="9525">
+                <a:solidFill>
+                  <a:schemeClr val="tx1"/>
+                </a:solidFill>
+                <a:miter lim="800000"/>
+                <a:headEnd/>
+                <a:tailEnd/>
+              </a14:hiddenLine>
+            </a:ext>
+          </a:extLst>
+        </p:spPr>
+      </p:pic>
+    </p:spTree>
+    <p:extLst>
+      <p:ext uri="{BB962C8B-B14F-4D97-AF65-F5344CB8AC3E}">
+        <p14:creationId xmlns:p14="http://schemas.microsoft.com/office/powerpoint/2010/main" val="549655440"/>
+      </p:ext>
+    </p:extLst>
+  </p:cSld>
+  <p:clrMapOvr>
+    <a:masterClrMapping/>
+  </p:clrMapOvr>
+  <p:transition spd="slow">
+    <p:push dir="u"/>
+  </p:transition>
+  <p:timing>
+    <p:tnLst>
+      <p:par>
+        <p:cTn id="1" dur="indefinite" restart="never" nodeType="tmRoot">
+          <p:childTnLst>
+            <p:seq concurrent="1" nextAc="seek">
+              <p:cTn id="2" dur="indefinite" nodeType="mainSeq">
+                <p:childTnLst>
+                  <p:par>
+                    <p:cTn id="3" fill="hold">
+                      <p:stCondLst>
+                        <p:cond delay="indefinite"/>
+                      </p:stCondLst>
+                      <p:childTnLst>
+                        <p:par>
+                          <p:cTn id="4" fill="hold">
+                            <p:stCondLst>
+                              <p:cond delay="0"/>
+                            </p:stCondLst>
+                            <p:childTnLst>
+                              <p:par>
+                                <p:cTn id="5" presetID="2" presetClass="entr" presetSubtype="4" fill="hold" nodeType="clickEffect">
+                                  <p:stCondLst>
+                                    <p:cond delay="0"/>
+                                  </p:stCondLst>
+                                  <p:childTnLst>
+                                    <p:set>
+                                      <p:cBhvr>
+                                        <p:cTn id="6" dur="1" fill="hold">
+                                          <p:stCondLst>
+                                            <p:cond delay="0"/>
+                                          </p:stCondLst>
+                                        </p:cTn>
+                                        <p:tgtEl>
+                                          <p:spTgt spid="2">
+                                            <p:txEl>
+                                              <p:pRg st="0" end="0"/>
+                                            </p:txEl>
+                                          </p:spTgt>
+                                        </p:tgtEl>
+                                        <p:attrNameLst>
+                                          <p:attrName>style.visibility</p:attrName>
+                                        </p:attrNameLst>
+                                      </p:cBhvr>
+                                      <p:to>
+                                        <p:strVal val="visible"/>
+                                      </p:to>
+                                    </p:set>
+                                    <p:anim calcmode="lin" valueType="num">
+                                      <p:cBhvr additive="base">
+                                        <p:cTn id="7" dur="500" fill="hold"/>
+                                        <p:tgtEl>
+                                          <p:spTgt spid="2">
+                                            <p:txEl>
+                                              <p:pRg st="0" end="0"/>
+                                            </p:txEl>
+                                          </p:spTgt>
+                                        </p:tgtEl>
+                                        <p:attrNameLst>
+                                          <p:attrName>ppt_x</p:attrName>
+                                        </p:attrNameLst>
+                                      </p:cBhvr>
+                                      <p:tavLst>
+                                        <p:tav tm="0">
+                                          <p:val>
+                                            <p:strVal val="#ppt_x"/>
+                                          </p:val>
+                                        </p:tav>
+                                        <p:tav tm="100000">
+                                          <p:val>
+                                            <p:strVal val="#ppt_x"/>
+                                          </p:val>
+                                        </p:tav>
+                                      </p:tavLst>
+                                    </p:anim>
+                                    <p:anim calcmode="lin" valueType="num">
+                                      <p:cBhvr additive="base">
+                                        <p:cTn id="8" dur="500" fill="hold"/>
+                                        <p:tgtEl>
+                                          <p:spTgt spid="2">
+                                            <p:txEl>
+                                              <p:pRg st="0" end="0"/>
+                                            </p:txEl>
+                                          </p:spTgt>
+                                        </p:tgtEl>
+                                        <p:attrNameLst>
+                                          <p:attrName>ppt_y</p:attrName>
+                                        </p:attrNameLst>
+                                      </p:cBhvr>
+                                      <p:tavLst>
+                                        <p:tav tm="0">
+                                          <p:val>
+                                            <p:strVal val="1+#ppt_h/2"/>
+                                          </p:val>
+                                        </p:tav>
+                                        <p:tav tm="100000">
+                                          <p:val>
+                                            <p:strVal val="#ppt_y"/>
+                                          </p:val>
+                                        </p:tav>
+                                      </p:tavLst>
+                                    </p:anim>
+                                  </p:childTnLst>
+                                </p:cTn>
+                              </p:par>
+                            </p:childTnLst>
+                          </p:cTn>
+                        </p:par>
+                      </p:childTnLst>
+                    </p:cTn>
+                  </p:par>
+                  <p:par>
+                    <p:cTn id="9" fill="hold">
+                      <p:stCondLst>
+                        <p:cond delay="indefinite"/>
+                      </p:stCondLst>
+                      <p:childTnLst>
+                        <p:par>
+                          <p:cTn id="10" fill="hold">
+                            <p:stCondLst>
+                              <p:cond delay="0"/>
+                            </p:stCondLst>
+                            <p:childTnLst>
+                              <p:par>
+                                <p:cTn id="11" presetID="2" presetClass="entr" presetSubtype="4" fill="hold" nodeType="clickEffect">
+                                  <p:stCondLst>
+                                    <p:cond delay="0"/>
+                                  </p:stCondLst>
+                                  <p:childTnLst>
+                                    <p:set>
+                                      <p:cBhvr>
+                                        <p:cTn id="12" dur="1" fill="hold">
+                                          <p:stCondLst>
+                                            <p:cond delay="0"/>
+                                          </p:stCondLst>
+                                        </p:cTn>
+                                        <p:tgtEl>
+                                          <p:spTgt spid="2">
+                                            <p:txEl>
+                                              <p:pRg st="1" end="1"/>
+                                            </p:txEl>
+                                          </p:spTgt>
+                                        </p:tgtEl>
+                                        <p:attrNameLst>
+                                          <p:attrName>style.visibility</p:attrName>
+                                        </p:attrNameLst>
+                                      </p:cBhvr>
+                                      <p:to>
+                                        <p:strVal val="visible"/>
+                                      </p:to>
+                                    </p:set>
+                                    <p:anim calcmode="lin" valueType="num">
+                                      <p:cBhvr additive="base">
+                                        <p:cTn id="13" dur="500" fill="hold"/>
+                                        <p:tgtEl>
+                                          <p:spTgt spid="2">
+                                            <p:txEl>
+                                              <p:pRg st="1" end="1"/>
+                                            </p:txEl>
+                                          </p:spTgt>
+                                        </p:tgtEl>
+                                        <p:attrNameLst>
+                                          <p:attrName>ppt_x</p:attrName>
+                                        </p:attrNameLst>
+                                      </p:cBhvr>
+                                      <p:tavLst>
+                                        <p:tav tm="0">
+                                          <p:val>
+                                            <p:strVal val="#ppt_x"/>
+                                          </p:val>
+                                        </p:tav>
+                                        <p:tav tm="100000">
+                                          <p:val>
+                                            <p:strVal val="#ppt_x"/>
+                                          </p:val>
+                                        </p:tav>
+                                      </p:tavLst>
+                                    </p:anim>
+                                    <p:anim calcmode="lin" valueType="num">
+                                      <p:cBhvr additive="base">
+                                        <p:cTn id="14" dur="500" fill="hold"/>
+                                        <p:tgtEl>
+                                          <p:spTgt spid="2">
+                                            <p:txEl>
+                                              <p:pRg st="1" end="1"/>
+                                            </p:txEl>
+                                          </p:spTgt>
+                                        </p:tgtEl>
+                                        <p:attrNameLst>
+                                          <p:attrName>ppt_y</p:attrName>
+                                        </p:attrNameLst>
+                                      </p:cBhvr>
+                                      <p:tavLst>
+                                        <p:tav tm="0">
+                                          <p:val>
+                                            <p:strVal val="1+#ppt_h/2"/>
+                                          </p:val>
+                                        </p:tav>
+                                        <p:tav tm="100000">
+                                          <p:val>
+                                            <p:strVal val="#ppt_y"/>
+                                          </p:val>
+                                        </p:tav>
+                                      </p:tavLst>
+                                    </p:anim>
+                                  </p:childTnLst>
+                                </p:cTn>
+                              </p:par>
+                            </p:childTnLst>
+                          </p:cTn>
+                        </p:par>
+                      </p:childTnLst>
+                    </p:cTn>
+                  </p:par>
+                  <p:par>
+                    <p:cTn id="15" fill="hold">
+                      <p:stCondLst>
+                        <p:cond delay="indefinite"/>
+                      </p:stCondLst>
+                      <p:childTnLst>
+                        <p:par>
+                          <p:cTn id="16" fill="hold">
+                            <p:stCondLst>
+                              <p:cond delay="0"/>
+                            </p:stCondLst>
+                            <p:childTnLst>
+                              <p:par>
+                                <p:cTn id="17" presetID="2" presetClass="entr" presetSubtype="4" fill="hold" nodeType="clickEffect">
+                                  <p:stCondLst>
+                                    <p:cond delay="0"/>
+                                  </p:stCondLst>
+                                  <p:childTnLst>
+                                    <p:set>
+                                      <p:cBhvr>
+                                        <p:cTn id="18" dur="1" fill="hold">
+                                          <p:stCondLst>
+                                            <p:cond delay="0"/>
+                                          </p:stCondLst>
+                                        </p:cTn>
+                                        <p:tgtEl>
+                                          <p:spTgt spid="2">
+                                            <p:txEl>
+                                              <p:pRg st="2" end="2"/>
+                                            </p:txEl>
+                                          </p:spTgt>
+                                        </p:tgtEl>
+                                        <p:attrNameLst>
+                                          <p:attrName>style.visibility</p:attrName>
+                                        </p:attrNameLst>
+                                      </p:cBhvr>
+                                      <p:to>
+                                        <p:strVal val="visible"/>
+                                      </p:to>
+                                    </p:set>
+                                    <p:anim calcmode="lin" valueType="num">
+                                      <p:cBhvr additive="base">
+                                        <p:cTn id="19" dur="500" fill="hold"/>
+                                        <p:tgtEl>
+                                          <p:spTgt spid="2">
+                                            <p:txEl>
+                                              <p:pRg st="2" end="2"/>
+                                            </p:txEl>
+                                          </p:spTgt>
+                                        </p:tgtEl>
+                                        <p:attrNameLst>
+                                          <p:attrName>ppt_x</p:attrName>
+                                        </p:attrNameLst>
+                                      </p:cBhvr>
+                                      <p:tavLst>
+                                        <p:tav tm="0">
+                                          <p:val>
+                                            <p:strVal val="#ppt_x"/>
+                                          </p:val>
+                                        </p:tav>
+                                        <p:tav tm="100000">
+                                          <p:val>
+                                            <p:strVal val="#ppt_x"/>
+                                          </p:val>
+                                        </p:tav>
+                                      </p:tavLst>
+                                    </p:anim>
+                                    <p:anim calcmode="lin" valueType="num">
+                                      <p:cBhvr additive="base">
+                                        <p:cTn id="20" dur="500" fill="hold"/>
+                                        <p:tgtEl>
+                                          <p:spTgt spid="2">
+                                            <p:txEl>
+                                              <p:pRg st="2" end="2"/>
+                                            </p:txEl>
+                                          </p:spTgt>
+                                        </p:tgtEl>
+                                        <p:attrNameLst>
+                                          <p:attrName>ppt_y</p:attrName>
+                                        </p:attrNameLst>
+                                      </p:cBhvr>
+                                      <p:tavLst>
+                                        <p:tav tm="0">
+                                          <p:val>
+                                            <p:strVal val="1+#ppt_h/2"/>
+                                          </p:val>
+                                        </p:tav>
+                                        <p:tav tm="100000">
+                                          <p:val>
+                                            <p:strVal val="#ppt_y"/>
+                                          </p:val>
+                                        </p:tav>
+                                      </p:tavLst>
+                                    </p:anim>
+                                  </p:childTnLst>
+                                </p:cTn>
+                              </p:par>
+                            </p:childTnLst>
+                          </p:cTn>
+                        </p:par>
+                      </p:childTnLst>
+                    </p:cTn>
+                  </p:par>
+                  <p:par>
+                    <p:cTn id="21" fill="hold">
+                      <p:stCondLst>
+                        <p:cond delay="indefinite"/>
+                      </p:stCondLst>
+                      <p:childTnLst>
+                        <p:par>
+                          <p:cTn id="22" fill="hold">
+                            <p:stCondLst>
+                              <p:cond delay="0"/>
+                            </p:stCondLst>
+                            <p:childTnLst>
+                              <p:par>
+                                <p:cTn id="23" presetID="2" presetClass="entr" presetSubtype="4" fill="hold" nodeType="clickEffect">
+                                  <p:stCondLst>
+                                    <p:cond delay="0"/>
+                                  </p:stCondLst>
+                                  <p:childTnLst>
+                                    <p:set>
+                                      <p:cBhvr>
+                                        <p:cTn id="24" dur="1" fill="hold">
+                                          <p:stCondLst>
+                                            <p:cond delay="0"/>
+                                          </p:stCondLst>
+                                        </p:cTn>
+                                        <p:tgtEl>
+                                          <p:spTgt spid="2">
+                                            <p:txEl>
+                                              <p:pRg st="3" end="3"/>
+                                            </p:txEl>
+                                          </p:spTgt>
+                                        </p:tgtEl>
+                                        <p:attrNameLst>
+                                          <p:attrName>style.visibility</p:attrName>
+                                        </p:attrNameLst>
+                                      </p:cBhvr>
+                                      <p:to>
+                                        <p:strVal val="visible"/>
+                                      </p:to>
+                                    </p:set>
+                                    <p:anim calcmode="lin" valueType="num">
+                                      <p:cBhvr additive="base">
+                                        <p:cTn id="25" dur="500" fill="hold"/>
+                                        <p:tgtEl>
+                                          <p:spTgt spid="2">
+                                            <p:txEl>
+                                              <p:pRg st="3" end="3"/>
+                                            </p:txEl>
+                                          </p:spTgt>
+                                        </p:tgtEl>
+                                        <p:attrNameLst>
+                                          <p:attrName>ppt_x</p:attrName>
+                                        </p:attrNameLst>
+                                      </p:cBhvr>
+                                      <p:tavLst>
+                                        <p:tav tm="0">
+                                          <p:val>
+                                            <p:strVal val="#ppt_x"/>
+                                          </p:val>
+                                        </p:tav>
+                                        <p:tav tm="100000">
+                                          <p:val>
+                                            <p:strVal val="#ppt_x"/>
+                                          </p:val>
+                                        </p:tav>
+                                      </p:tavLst>
+                                    </p:anim>
+                                    <p:anim calcmode="lin" valueType="num">
+                                      <p:cBhvr additive="base">
+                                        <p:cTn id="26" dur="500" fill="hold"/>
+                                        <p:tgtEl>
+                                          <p:spTgt spid="2">
+                                            <p:txEl>
+                                              <p:pRg st="3" end="3"/>
+                                            </p:txEl>
+                                          </p:spTgt>
+                                        </p:tgtEl>
+                                        <p:attrNameLst>
+                                          <p:attrName>ppt_y</p:attrName>
+                                        </p:attrNameLst>
+                                      </p:cBhvr>
+                                      <p:tavLst>
+                                        <p:tav tm="0">
+                                          <p:val>
+                                            <p:strVal val="1+#ppt_h/2"/>
+                                          </p:val>
+                                        </p:tav>
+                                        <p:tav tm="100000">
+                                          <p:val>
+                                            <p:strVal val="#ppt_y"/>
+                                          </p:val>
+                                        </p:tav>
+                                      </p:tavLst>
+                                    </p:anim>
+                                  </p:childTnLst>
+                                </p:cTn>
+                              </p:par>
+                            </p:childTnLst>
+                          </p:cTn>
+                        </p:par>
+                      </p:childTnLst>
+                    </p:cTn>
+                  </p:par>
+                  <p:par>
+                    <p:cTn id="27" fill="hold">
+                      <p:stCondLst>
+                        <p:cond delay="indefinite"/>
+                      </p:stCondLst>
+                      <p:childTnLst>
+                        <p:par>
+                          <p:cTn id="28" fill="hold">
+                            <p:stCondLst>
+                              <p:cond delay="0"/>
+                            </p:stCondLst>
+                            <p:childTnLst>
+                              <p:par>
+                                <p:cTn id="29" presetID="2" presetClass="entr" presetSubtype="4" fill="hold" nodeType="clickEffect">
+                                  <p:stCondLst>
+                                    <p:cond delay="0"/>
+                                  </p:stCondLst>
+                                  <p:childTnLst>
+                                    <p:set>
+                                      <p:cBhvr>
+                                        <p:cTn id="30" dur="1" fill="hold">
+                                          <p:stCondLst>
+                                            <p:cond delay="0"/>
+                                          </p:stCondLst>
+                                        </p:cTn>
+                                        <p:tgtEl>
+                                          <p:spTgt spid="1026"/>
+                                        </p:tgtEl>
+                                        <p:attrNameLst>
+                                          <p:attrName>style.visibility</p:attrName>
+                                        </p:attrNameLst>
+                                      </p:cBhvr>
+                                      <p:to>
+                                        <p:strVal val="visible"/>
+                                      </p:to>
+                                    </p:set>
+                                    <p:anim calcmode="lin" valueType="num">
+                                      <p:cBhvr additive="base">
+                                        <p:cTn id="31" dur="500" fill="hold"/>
+                                        <p:tgtEl>
+                                          <p:spTgt spid="1026"/>
+                                        </p:tgtEl>
+                                        <p:attrNameLst>
+                                          <p:attrName>ppt_x</p:attrName>
+                                        </p:attrNameLst>
+                                      </p:cBhvr>
+                                      <p:tavLst>
+                                        <p:tav tm="0">
+                                          <p:val>
+                                            <p:strVal val="#ppt_x"/>
+                                          </p:val>
+                                        </p:tav>
+                                        <p:tav tm="100000">
+                                          <p:val>
+                                            <p:strVal val="#ppt_x"/>
+                                          </p:val>
+                                        </p:tav>
+                                      </p:tavLst>
+                                    </p:anim>
+                                    <p:anim calcmode="lin" valueType="num">
+                                      <p:cBhvr additive="base">
+                                        <p:cTn id="32" dur="500" fill="hold"/>
+                                        <p:tgtEl>
+                                          <p:spTgt spid="1026"/>
+                                        </p:tgtEl>
+                                        <p:attrNameLst>
+                                          <p:attrName>ppt_y</p:attrName>
+                                        </p:attrNameLst>
+                                      </p:cBhvr>
+                                      <p:tavLst>
+                                        <p:tav tm="0">
+                                          <p:val>
+                                            <p:strVal val="1+#ppt_h/2"/>
+                                          </p:val>
+                                        </p:tav>
+                                        <p:tav tm="100000">
+                                          <p:val>
+                                            <p:strVal val="#ppt_y"/>
+                                          </p:val>
+                                        </p:tav>
+                                      </p:tavLst>
+                                    </p:anim>
+                                  </p:childTnLst>
+                                </p:cTn>
+                              </p:par>
+                            </p:childTnLst>
+                          </p:cTn>
+                        </p:par>
+                      </p:childTnLst>
+                    </p:cTn>
+                  </p:par>
+                </p:childTnLst>
+              </p:cTn>
+              <p:prevCondLst>
+                <p:cond evt="onPrev" delay="0">
+                  <p:tgtEl>
+                    <p:sldTgt/>
+                  </p:tgtEl>
+                </p:cond>
+              </p:prevCondLst>
+              <p:nextCondLst>
+                <p:cond evt="onNext" delay="0">
+                  <p:tgtEl>
+                    <p:sldTgt/>
+                  </p:tgtEl>
+                </p:cond>
+              </p:nextCondLst>
+            </p:seq>
+          </p:childTnLst>
+        </p:cTn>
+      </p:par>
+    </p:tnLst>
+  </p:timing>
+</p:sld>
+</file>
+
+<file path=ppt/slides/slide42.xml><?xml version="1.0" encoding="utf-8"?>
+<p:sld xmlns:a="http://schemas.openxmlformats.org/drawingml/2006/main" xmlns:r="http://schemas.openxmlformats.org/officeDocument/2006/relationships" xmlns:p="http://schemas.openxmlformats.org/presentationml/2006/main">
+  <p:cSld>
+    <p:spTree>
+      <p:nvGrpSpPr>
+        <p:cNvPr id="1" name=""/>
+        <p:cNvGrpSpPr/>
+        <p:nvPr/>
+      </p:nvGrpSpPr>
+      <p:grpSpPr>
+        <a:xfrm>
+          <a:off x="0" y="0"/>
+          <a:ext cx="0" cy="0"/>
+          <a:chOff x="0" y="0"/>
+          <a:chExt cx="0" cy="0"/>
+        </a:xfrm>
+      </p:grpSpPr>
+      <p:sp>
+        <p:nvSpPr>
+          <p:cNvPr id="3" name="Symbol zastępczy zawartości 2"/>
+          <p:cNvSpPr>
+            <a:spLocks noGrp="1"/>
+          </p:cNvSpPr>
+          <p:nvPr>
+            <p:ph idx="1"/>
+          </p:nvPr>
+        </p:nvSpPr>
+        <p:spPr/>
+        <p:txBody>
+          <a:bodyPr>
+            <a:normAutofit lnSpcReduction="10000"/>
+          </a:bodyPr>
+          <a:lstStyle/>
+          <a:p>
+            <a:pPr marL="109728" indent="0">
+              <a:buNone/>
+            </a:pPr>
+            <a:r>
+              <a:rPr lang="pl-PL" dirty="0" smtClean="0"/>
+              <a:t>Przedstawione materiały szkoleniowe, prezentacja wraz z konspektem, projekt użyty do prezentacji i warsztatów jest własnością intelektualną szkolących Michała Gwóźdź oraz Łukasza Szustaka.</a:t>
+            </a:r>
+          </a:p>
+          <a:p>
+            <a:pPr marL="109728" indent="0">
+              <a:buNone/>
+            </a:pPr>
+            <a:r>
+              <a:rPr lang="pl-PL" dirty="0" smtClean="0"/>
+              <a:t>Wykorzystanie bez zgody twórców któregokolwiek materiału do innych celów niż samokształcenie osoby szkolonej, takie jak upublicznianie, cytowanie lub inna forma redystrybucji jest jawnym naruszeniem praw autorskich.</a:t>
+            </a:r>
+            <a:endParaRPr lang="pl-PL" dirty="0"/>
+          </a:p>
+        </p:txBody>
+      </p:sp>
+      <p:sp>
+        <p:nvSpPr>
+          <p:cNvPr id="2" name="Tytuł 1"/>
+          <p:cNvSpPr>
+            <a:spLocks noGrp="1"/>
+          </p:cNvSpPr>
+          <p:nvPr>
+            <p:ph type="title"/>
+          </p:nvPr>
+        </p:nvSpPr>
+        <p:spPr/>
+        <p:txBody>
+          <a:bodyPr/>
+          <a:lstStyle/>
+          <a:p>
+            <a:r>
+              <a:rPr lang="pl-PL" dirty="0" smtClean="0"/>
+              <a:t>Słowo końcowe</a:t>
+            </a:r>
+            <a:endParaRPr lang="pl-PL" dirty="0"/>
+          </a:p>
+        </p:txBody>
+      </p:sp>
+    </p:spTree>
+    <p:extLst>
+      <p:ext uri="{BB962C8B-B14F-4D97-AF65-F5344CB8AC3E}">
+        <p14:creationId xmlns:p14="http://schemas.microsoft.com/office/powerpoint/2010/main" val="3785988704"/>
+      </p:ext>
+    </p:extLst>
+  </p:cSld>
+  <p:clrMapOvr>
+    <a:masterClrMapping/>
+  </p:clrMapOvr>
+  <p:transition spd="slow">
+    <p:push dir="u"/>
+  </p:transition>
+  <p:timing>
+    <p:tnLst>
+      <p:par>
+        <p:cTn id="1" dur="indefinite" restart="never" nodeType="tmRoot">
+          <p:childTnLst>
+            <p:seq concurrent="1" nextAc="seek">
+              <p:cTn id="2" dur="indefinite" nodeType="mainSeq">
+                <p:childTnLst>
+                  <p:par>
+                    <p:cTn id="3" fill="hold">
+                      <p:stCondLst>
+                        <p:cond delay="indefinite"/>
+                      </p:stCondLst>
+                      <p:childTnLst>
+                        <p:par>
+                          <p:cTn id="4" fill="hold">
+                            <p:stCondLst>
+                              <p:cond delay="0"/>
+                            </p:stCondLst>
+                            <p:childTnLst>
+                              <p:par>
+                                <p:cTn id="5" presetID="2" presetClass="entr" presetSubtype="4" fill="hold" nodeType="clickEffect">
+                                  <p:stCondLst>
+                                    <p:cond delay="0"/>
+                                  </p:stCondLst>
+                                  <p:childTnLst>
+                                    <p:set>
+                                      <p:cBhvr>
+                                        <p:cTn id="6" dur="1" fill="hold">
+                                          <p:stCondLst>
+                                            <p:cond delay="0"/>
+                                          </p:stCondLst>
+                                        </p:cTn>
+                                        <p:tgtEl>
+                                          <p:spTgt spid="3">
+                                            <p:txEl>
+                                              <p:pRg st="0" end="0"/>
+                                            </p:txEl>
+                                          </p:spTgt>
+                                        </p:tgtEl>
+                                        <p:attrNameLst>
+                                          <p:attrName>style.visibility</p:attrName>
+                                        </p:attrNameLst>
+                                      </p:cBhvr>
+                                      <p:to>
+                                        <p:strVal val="visible"/>
+                                      </p:to>
+                                    </p:set>
+                                    <p:anim calcmode="lin" valueType="num">
+                                      <p:cBhvr additive="base">
+                                        <p:cTn id="7" dur="500" fill="hold"/>
+                                        <p:tgtEl>
+                                          <p:spTgt spid="3">
+                                            <p:txEl>
+                                              <p:pRg st="0" end="0"/>
+                                            </p:txEl>
+                                          </p:spTgt>
+                                        </p:tgtEl>
+                                        <p:attrNameLst>
+                                          <p:attrName>ppt_x</p:attrName>
+                                        </p:attrNameLst>
+                                      </p:cBhvr>
+                                      <p:tavLst>
+                                        <p:tav tm="0">
+                                          <p:val>
+                                            <p:strVal val="#ppt_x"/>
+                                          </p:val>
+                                        </p:tav>
+                                        <p:tav tm="100000">
+                                          <p:val>
+                                            <p:strVal val="#ppt_x"/>
+                                          </p:val>
+                                        </p:tav>
+                                      </p:tavLst>
+                                    </p:anim>
+                                    <p:anim calcmode="lin" valueType="num">
+                                      <p:cBhvr additive="base">
+                                        <p:cTn id="8" dur="500" fill="hold"/>
+                                        <p:tgtEl>
+                                          <p:spTgt spid="3">
+                                            <p:txEl>
+                                              <p:pRg st="0" end="0"/>
+                                            </p:txEl>
+                                          </p:spTgt>
+                                        </p:tgtEl>
+                                        <p:attrNameLst>
+                                          <p:attrName>ppt_y</p:attrName>
+                                        </p:attrNameLst>
+                                      </p:cBhvr>
+                                      <p:tavLst>
+                                        <p:tav tm="0">
+                                          <p:val>
+                                            <p:strVal val="1+#ppt_h/2"/>
+                                          </p:val>
+                                        </p:tav>
+                                        <p:tav tm="100000">
+                                          <p:val>
+                                            <p:strVal val="#ppt_y"/>
+                                          </p:val>
+                                        </p:tav>
+                                      </p:tavLst>
+                                    </p:anim>
+                                  </p:childTnLst>
+                                </p:cTn>
+                              </p:par>
+                            </p:childTnLst>
+                          </p:cTn>
+                        </p:par>
+                      </p:childTnLst>
+                    </p:cTn>
+                  </p:par>
+                  <p:par>
+                    <p:cTn id="9" fill="hold">
+                      <p:stCondLst>
+                        <p:cond delay="indefinite"/>
+                      </p:stCondLst>
+                      <p:childTnLst>
+                        <p:par>
+                          <p:cTn id="10" fill="hold">
+                            <p:stCondLst>
+                              <p:cond delay="0"/>
+                            </p:stCondLst>
+                            <p:childTnLst>
+                              <p:par>
+                                <p:cTn id="11" presetID="2" presetClass="entr" presetSubtype="4" fill="hold" nodeType="clickEffect">
+                                  <p:stCondLst>
+                                    <p:cond delay="0"/>
+                                  </p:stCondLst>
+                                  <p:childTnLst>
+                                    <p:set>
+                                      <p:cBhvr>
+                                        <p:cTn id="12" dur="1" fill="hold">
+                                          <p:stCondLst>
+                                            <p:cond delay="0"/>
+                                          </p:stCondLst>
+                                        </p:cTn>
+                                        <p:tgtEl>
+                                          <p:spTgt spid="3">
+                                            <p:txEl>
+                                              <p:pRg st="1" end="1"/>
+                                            </p:txEl>
+                                          </p:spTgt>
+                                        </p:tgtEl>
+                                        <p:attrNameLst>
+                                          <p:attrName>style.visibility</p:attrName>
+                                        </p:attrNameLst>
+                                      </p:cBhvr>
+                                      <p:to>
+                                        <p:strVal val="visible"/>
+                                      </p:to>
+                                    </p:set>
+                                    <p:anim calcmode="lin" valueType="num">
+                                      <p:cBhvr additive="base">
+                                        <p:cTn id="13" dur="500" fill="hold"/>
+                                        <p:tgtEl>
+                                          <p:spTgt spid="3">
+                                            <p:txEl>
+                                              <p:pRg st="1" end="1"/>
+                                            </p:txEl>
+                                          </p:spTgt>
+                                        </p:tgtEl>
+                                        <p:attrNameLst>
+                                          <p:attrName>ppt_x</p:attrName>
+                                        </p:attrNameLst>
+                                      </p:cBhvr>
+                                      <p:tavLst>
+                                        <p:tav tm="0">
+                                          <p:val>
+                                            <p:strVal val="#ppt_x"/>
+                                          </p:val>
+                                        </p:tav>
+                                        <p:tav tm="100000">
+                                          <p:val>
+                                            <p:strVal val="#ppt_x"/>
+                                          </p:val>
+                                        </p:tav>
+                                      </p:tavLst>
+                                    </p:anim>
+                                    <p:anim calcmode="lin" valueType="num">
+                                      <p:cBhvr additive="base">
+                                        <p:cTn id="14" dur="500" fill="hold"/>
+                                        <p:tgtEl>
+                                          <p:spTgt spid="3">
+                                            <p:txEl>
+                                              <p:pRg st="1" end="1"/>
+                                            </p:txEl>
+                                          </p:spTgt>
+                                        </p:tgtEl>
+                                        <p:attrNameLst>
+                                          <p:attrName>ppt_y</p:attrName>
+                                        </p:attrNameLst>
+                                      </p:cBhvr>
+                                      <p:tavLst>
+                                        <p:tav tm="0">
+                                          <p:val>
+                                            <p:strVal val="1+#ppt_h/2"/>
+                                          </p:val>
+                                        </p:tav>
+                                        <p:tav tm="100000">
+                                          <p:val>
+                                            <p:strVal val="#ppt_y"/>
+                                          </p:val>
+                                        </p:tav>
+                                      </p:tavLst>
+                                    </p:anim>
+                                  </p:childTnLst>
+                                </p:cTn>
+                              </p:par>
+                            </p:childTnLst>
+                          </p:cTn>
+                        </p:par>
+                      </p:childTnLst>
+                    </p:cTn>
+                  </p:par>
+                </p:childTnLst>
+              </p:cTn>
+              <p:prevCondLst>
+                <p:cond evt="onPrev" delay="0">
+                  <p:tgtEl>
+                    <p:sldTgt/>
+                  </p:tgtEl>
+                </p:cond>
+              </p:prevCondLst>
+              <p:nextCondLst>
+                <p:cond evt="onNext" delay="0">
+                  <p:tgtEl>
+                    <p:sldTgt/>
+                  </p:tgtEl>
+                </p:cond>
+              </p:nextCondLst>
+            </p:seq>
+          </p:childTnLst>
+        </p:cTn>
+      </p:par>
+    </p:tnLst>
   </p:timing>
 </p:sld>
 </file>

</xml_diff>

<commit_message>
aktualizacja prezentacji oraz drobne poprawki
</commit_message>
<xml_diff>
--- a/Files/Szkolenie warsztatowe Dapper.pptx
+++ b/Files/Szkolenie warsztatowe Dapper.pptx
@@ -46,7 +46,13 @@
     <p:sldId id="295" r:id="rId40"/>
     <p:sldId id="296" r:id="rId41"/>
     <p:sldId id="297" r:id="rId42"/>
-    <p:sldId id="257" r:id="rId43"/>
+    <p:sldId id="298" r:id="rId43"/>
+    <p:sldId id="299" r:id="rId44"/>
+    <p:sldId id="300" r:id="rId45"/>
+    <p:sldId id="301" r:id="rId46"/>
+    <p:sldId id="302" r:id="rId47"/>
+    <p:sldId id="303" r:id="rId48"/>
+    <p:sldId id="257" r:id="rId49"/>
   </p:sldIdLst>
   <p:sldSz cx="9144000" cy="6858000" type="screen4x3"/>
   <p:notesSz cx="6858000" cy="9144000"/>
@@ -147,7 +153,7 @@
   </p:defaultTextStyle>
   <p:extLst>
     <p:ext uri="{EFAFB233-063F-42B5-8137-9DF3F51BA10A}">
-      <p15:sldGuideLst xmlns="" xmlns:p15="http://schemas.microsoft.com/office/powerpoint/2012/main">
+      <p15:sldGuideLst xmlns:p15="http://schemas.microsoft.com/office/powerpoint/2012/main">
         <p15:guide id="1" orient="horz" pos="2160">
           <p15:clr>
             <a:srgbClr val="A4A3A4"/>
@@ -781,7 +787,7 @@
           <a:p>
             <a:fld id="{16640E76-C82D-4E8C-B2F3-167F39B211B3}" type="datetimeFigureOut">
               <a:rPr lang="pl-PL" smtClean="0"/>
-              <a:t>12.11.2017</a:t>
+              <a:t>20.11.2017</a:t>
             </a:fld>
             <a:endParaRPr lang="pl-PL"/>
           </a:p>
@@ -974,7 +980,7 @@
           <a:p>
             <a:fld id="{16640E76-C82D-4E8C-B2F3-167F39B211B3}" type="datetimeFigureOut">
               <a:rPr lang="pl-PL" smtClean="0"/>
-              <a:t>12.11.2017</a:t>
+              <a:t>20.11.2017</a:t>
             </a:fld>
             <a:endParaRPr lang="pl-PL"/>
           </a:p>
@@ -1152,7 +1158,7 @@
           <a:p>
             <a:fld id="{16640E76-C82D-4E8C-B2F3-167F39B211B3}" type="datetimeFigureOut">
               <a:rPr lang="pl-PL" smtClean="0"/>
-              <a:t>12.11.2017</a:t>
+              <a:t>20.11.2017</a:t>
             </a:fld>
             <a:endParaRPr lang="pl-PL"/>
           </a:p>
@@ -1297,7 +1303,7 @@
           <a:p>
             <a:fld id="{16640E76-C82D-4E8C-B2F3-167F39B211B3}" type="datetimeFigureOut">
               <a:rPr lang="pl-PL" smtClean="0"/>
-              <a:t>12.11.2017</a:t>
+              <a:t>20.11.2017</a:t>
             </a:fld>
             <a:endParaRPr lang="pl-PL"/>
           </a:p>
@@ -1547,7 +1553,7 @@
           <a:p>
             <a:fld id="{16640E76-C82D-4E8C-B2F3-167F39B211B3}" type="datetimeFigureOut">
               <a:rPr lang="pl-PL" smtClean="0"/>
-              <a:t>12.11.2017</a:t>
+              <a:t>20.11.2017</a:t>
             </a:fld>
             <a:endParaRPr lang="pl-PL"/>
           </a:p>
@@ -1949,7 +1955,7 @@
           <a:p>
             <a:fld id="{16640E76-C82D-4E8C-B2F3-167F39B211B3}" type="datetimeFigureOut">
               <a:rPr lang="pl-PL" smtClean="0"/>
-              <a:t>12.11.2017</a:t>
+              <a:t>20.11.2017</a:t>
             </a:fld>
             <a:endParaRPr lang="pl-PL"/>
           </a:p>
@@ -2390,7 +2396,7 @@
           <a:p>
             <a:fld id="{16640E76-C82D-4E8C-B2F3-167F39B211B3}" type="datetimeFigureOut">
               <a:rPr lang="pl-PL" smtClean="0"/>
-              <a:t>12.11.2017</a:t>
+              <a:t>20.11.2017</a:t>
             </a:fld>
             <a:endParaRPr lang="pl-PL"/>
           </a:p>
@@ -2488,7 +2494,7 @@
           <a:p>
             <a:fld id="{16640E76-C82D-4E8C-B2F3-167F39B211B3}" type="datetimeFigureOut">
               <a:rPr lang="pl-PL" smtClean="0"/>
-              <a:t>12.11.2017</a:t>
+              <a:t>20.11.2017</a:t>
             </a:fld>
             <a:endParaRPr lang="pl-PL"/>
           </a:p>
@@ -2604,7 +2610,7 @@
           <a:p>
             <a:fld id="{16640E76-C82D-4E8C-B2F3-167F39B211B3}" type="datetimeFigureOut">
               <a:rPr lang="pl-PL" smtClean="0"/>
-              <a:t>12.11.2017</a:t>
+              <a:t>20.11.2017</a:t>
             </a:fld>
             <a:endParaRPr lang="pl-PL"/>
           </a:p>
@@ -2875,7 +2881,7 @@
           <a:p>
             <a:fld id="{16640E76-C82D-4E8C-B2F3-167F39B211B3}" type="datetimeFigureOut">
               <a:rPr lang="pl-PL" smtClean="0"/>
-              <a:t>12.11.2017</a:t>
+              <a:t>20.11.2017</a:t>
             </a:fld>
             <a:endParaRPr lang="pl-PL"/>
           </a:p>
@@ -3079,7 +3085,7 @@
           <a:p>
             <a:fld id="{16640E76-C82D-4E8C-B2F3-167F39B211B3}" type="datetimeFigureOut">
               <a:rPr lang="pl-PL" smtClean="0"/>
-              <a:t>12.11.2017</a:t>
+              <a:t>20.11.2017</a:t>
             </a:fld>
             <a:endParaRPr lang="pl-PL"/>
           </a:p>
@@ -4171,7 +4177,7 @@
           <a:p>
             <a:fld id="{16640E76-C82D-4E8C-B2F3-167F39B211B3}" type="datetimeFigureOut">
               <a:rPr lang="pl-PL" smtClean="0"/>
-              <a:t>12.11.2017</a:t>
+              <a:t>20.11.2017</a:t>
             </a:fld>
             <a:endParaRPr lang="pl-PL"/>
           </a:p>
@@ -25587,6 +25593,662 @@
       </p:grpSpPr>
       <p:sp>
         <p:nvSpPr>
+          <p:cNvPr id="2" name="Symbol zastępczy zawartości 1"/>
+          <p:cNvSpPr>
+            <a:spLocks noGrp="1"/>
+          </p:cNvSpPr>
+          <p:nvPr>
+            <p:ph idx="1"/>
+          </p:nvPr>
+        </p:nvSpPr>
+        <p:spPr/>
+        <p:txBody>
+          <a:bodyPr/>
+          <a:lstStyle/>
+          <a:p>
+            <a:r>
+              <a:rPr lang="pl-PL" dirty="0" smtClean="0"/>
+              <a:t>Wyszukanie klasy ćwiczenia (</a:t>
+            </a:r>
+            <a:r>
+              <a:rPr lang="pl-PL" dirty="0" err="1" smtClean="0"/>
+              <a:t>Exercise_X</a:t>
+            </a:r>
+            <a:r>
+              <a:rPr lang="pl-PL" dirty="0" smtClean="0"/>
+              <a:t>, gdzie X jest numerem ćwiczenia)</a:t>
+            </a:r>
+          </a:p>
+          <a:p>
+            <a:r>
+              <a:rPr lang="pl-PL" dirty="0" smtClean="0"/>
+              <a:t>W metodzie „</a:t>
+            </a:r>
+            <a:r>
+              <a:rPr lang="pl-PL" dirty="0" err="1" smtClean="0"/>
+              <a:t>RunExercise</a:t>
+            </a:r>
+            <a:r>
+              <a:rPr lang="pl-PL" dirty="0" smtClean="0"/>
+              <a:t>” (oraz w konstruktorze jeśli istnieję), należy zaimplementować wskazane ćwiczenie</a:t>
+            </a:r>
+          </a:p>
+          <a:p>
+            <a:r>
+              <a:rPr lang="pl-PL" dirty="0" smtClean="0"/>
+              <a:t>Sprawdzenie wykonania ćwiczenia (</a:t>
+            </a:r>
+            <a:r>
+              <a:rPr lang="pl-PL" dirty="0" err="1" smtClean="0"/>
+              <a:t>RunUnitTests</a:t>
+            </a:r>
+            <a:r>
+              <a:rPr lang="pl-PL" dirty="0" smtClean="0"/>
+              <a:t> na projekcie </a:t>
+            </a:r>
+            <a:r>
+              <a:rPr lang="pl-PL" dirty="0" err="1" smtClean="0"/>
+              <a:t>ExerciseTests</a:t>
+            </a:r>
+            <a:r>
+              <a:rPr lang="pl-PL" dirty="0" smtClean="0"/>
+              <a:t> bądź na pojedynczej klasie testu)</a:t>
+            </a:r>
+            <a:endParaRPr lang="pl-PL" dirty="0"/>
+          </a:p>
+        </p:txBody>
+      </p:sp>
+      <p:sp>
+        <p:nvSpPr>
+          <p:cNvPr id="3" name="Tytuł 2"/>
+          <p:cNvSpPr>
+            <a:spLocks noGrp="1"/>
+          </p:cNvSpPr>
+          <p:nvPr>
+            <p:ph type="title"/>
+          </p:nvPr>
+        </p:nvSpPr>
+        <p:spPr/>
+        <p:txBody>
+          <a:bodyPr/>
+          <a:lstStyle/>
+          <a:p>
+            <a:r>
+              <a:rPr lang="pl-PL" dirty="0" smtClean="0"/>
+              <a:t>Ćwiczenia</a:t>
+            </a:r>
+            <a:endParaRPr lang="pl-PL" dirty="0"/>
+          </a:p>
+        </p:txBody>
+      </p:sp>
+    </p:spTree>
+    <p:extLst>
+      <p:ext uri="{BB962C8B-B14F-4D97-AF65-F5344CB8AC3E}">
+        <p14:creationId xmlns:p14="http://schemas.microsoft.com/office/powerpoint/2010/main" val="1436643552"/>
+      </p:ext>
+    </p:extLst>
+  </p:cSld>
+  <p:clrMapOvr>
+    <a:masterClrMapping/>
+  </p:clrMapOvr>
+  <p:transition spd="slow">
+    <p:push dir="u"/>
+  </p:transition>
+</p:sld>
+</file>
+
+<file path=ppt/slides/slide43.xml><?xml version="1.0" encoding="utf-8"?>
+<p:sld xmlns:a="http://schemas.openxmlformats.org/drawingml/2006/main" xmlns:r="http://schemas.openxmlformats.org/officeDocument/2006/relationships" xmlns:p="http://schemas.openxmlformats.org/presentationml/2006/main">
+  <p:cSld>
+    <p:spTree>
+      <p:nvGrpSpPr>
+        <p:cNvPr id="1" name=""/>
+        <p:cNvGrpSpPr/>
+        <p:nvPr/>
+      </p:nvGrpSpPr>
+      <p:grpSpPr>
+        <a:xfrm>
+          <a:off x="0" y="0"/>
+          <a:ext cx="0" cy="0"/>
+          <a:chOff x="0" y="0"/>
+          <a:chExt cx="0" cy="0"/>
+        </a:xfrm>
+      </p:grpSpPr>
+      <p:sp>
+        <p:nvSpPr>
+          <p:cNvPr id="2" name="Symbol zastępczy zawartości 1"/>
+          <p:cNvSpPr>
+            <a:spLocks noGrp="1"/>
+          </p:cNvSpPr>
+          <p:nvPr>
+            <p:ph idx="1"/>
+          </p:nvPr>
+        </p:nvSpPr>
+        <p:spPr/>
+        <p:txBody>
+          <a:bodyPr/>
+          <a:lstStyle/>
+          <a:p>
+            <a:r>
+              <a:rPr lang="pl-PL" dirty="0" smtClean="0"/>
+              <a:t>Wykonanie zapytania i zwrócenie </a:t>
+            </a:r>
+            <a:r>
+              <a:rPr lang="pl-PL" b="1" dirty="0" smtClean="0"/>
+              <a:t>JEDNEGO</a:t>
+            </a:r>
+            <a:r>
+              <a:rPr lang="pl-PL" dirty="0" smtClean="0"/>
+              <a:t> obiektu typu </a:t>
+            </a:r>
+            <a:r>
+              <a:rPr lang="pl-PL" dirty="0" err="1" smtClean="0"/>
+              <a:t>EmployeeDTO</a:t>
+            </a:r>
+            <a:r>
+              <a:rPr lang="pl-PL" dirty="0" smtClean="0"/>
+              <a:t> z bazy danych</a:t>
+            </a:r>
+          </a:p>
+          <a:p>
+            <a:r>
+              <a:rPr lang="pl-PL" dirty="0" smtClean="0"/>
+              <a:t>Tabela „</a:t>
+            </a:r>
+            <a:r>
+              <a:rPr lang="pl-PL" dirty="0" err="1" smtClean="0"/>
+              <a:t>Address</a:t>
+            </a:r>
+            <a:r>
+              <a:rPr lang="pl-PL" dirty="0" smtClean="0"/>
+              <a:t>”</a:t>
+            </a:r>
+          </a:p>
+          <a:p>
+            <a:endParaRPr lang="pl-PL" dirty="0"/>
+          </a:p>
+        </p:txBody>
+      </p:sp>
+      <p:sp>
+        <p:nvSpPr>
+          <p:cNvPr id="3" name="Tytuł 2"/>
+          <p:cNvSpPr>
+            <a:spLocks noGrp="1"/>
+          </p:cNvSpPr>
+          <p:nvPr>
+            <p:ph type="title"/>
+          </p:nvPr>
+        </p:nvSpPr>
+        <p:spPr/>
+        <p:txBody>
+          <a:bodyPr/>
+          <a:lstStyle/>
+          <a:p>
+            <a:r>
+              <a:rPr lang="pl-PL" dirty="0" smtClean="0"/>
+              <a:t>Ćwiczenie 1</a:t>
+            </a:r>
+            <a:endParaRPr lang="pl-PL" dirty="0"/>
+          </a:p>
+        </p:txBody>
+      </p:sp>
+    </p:spTree>
+    <p:extLst>
+      <p:ext uri="{BB962C8B-B14F-4D97-AF65-F5344CB8AC3E}">
+        <p14:creationId xmlns:p14="http://schemas.microsoft.com/office/powerpoint/2010/main" val="1354416976"/>
+      </p:ext>
+    </p:extLst>
+  </p:cSld>
+  <p:clrMapOvr>
+    <a:masterClrMapping/>
+  </p:clrMapOvr>
+  <p:transition spd="slow">
+    <p:push dir="u"/>
+  </p:transition>
+</p:sld>
+</file>
+
+<file path=ppt/slides/slide44.xml><?xml version="1.0" encoding="utf-8"?>
+<p:sld xmlns:a="http://schemas.openxmlformats.org/drawingml/2006/main" xmlns:r="http://schemas.openxmlformats.org/officeDocument/2006/relationships" xmlns:p="http://schemas.openxmlformats.org/presentationml/2006/main">
+  <p:cSld>
+    <p:spTree>
+      <p:nvGrpSpPr>
+        <p:cNvPr id="1" name=""/>
+        <p:cNvGrpSpPr/>
+        <p:nvPr/>
+      </p:nvGrpSpPr>
+      <p:grpSpPr>
+        <a:xfrm>
+          <a:off x="0" y="0"/>
+          <a:ext cx="0" cy="0"/>
+          <a:chOff x="0" y="0"/>
+          <a:chExt cx="0" cy="0"/>
+        </a:xfrm>
+      </p:grpSpPr>
+      <p:sp>
+        <p:nvSpPr>
+          <p:cNvPr id="2" name="Symbol zastępczy zawartości 1"/>
+          <p:cNvSpPr>
+            <a:spLocks noGrp="1"/>
+          </p:cNvSpPr>
+          <p:nvPr>
+            <p:ph idx="1"/>
+          </p:nvPr>
+        </p:nvSpPr>
+        <p:spPr/>
+        <p:txBody>
+          <a:bodyPr/>
+          <a:lstStyle/>
+          <a:p>
+            <a:r>
+              <a:rPr lang="pl-PL" dirty="0" smtClean="0"/>
+              <a:t>Wykonanie procedury </a:t>
+            </a:r>
+            <a:r>
+              <a:rPr lang="pl-PL" dirty="0" err="1" smtClean="0"/>
+              <a:t>AddressSave</a:t>
+            </a:r>
+            <a:endParaRPr lang="pl-PL" dirty="0" smtClean="0"/>
+          </a:p>
+          <a:p>
+            <a:r>
+              <a:rPr lang="pl-PL" dirty="0" smtClean="0"/>
+              <a:t>Przekazanie anonimowych parametrów</a:t>
+            </a:r>
+          </a:p>
+          <a:p>
+            <a:r>
+              <a:rPr lang="pl-PL" dirty="0" smtClean="0"/>
+              <a:t>Wyjście: liczba dodanych adresów</a:t>
+            </a:r>
+            <a:endParaRPr lang="pl-PL" dirty="0"/>
+          </a:p>
+        </p:txBody>
+      </p:sp>
+      <p:sp>
+        <p:nvSpPr>
+          <p:cNvPr id="3" name="Tytuł 2"/>
+          <p:cNvSpPr>
+            <a:spLocks noGrp="1"/>
+          </p:cNvSpPr>
+          <p:nvPr>
+            <p:ph type="title"/>
+          </p:nvPr>
+        </p:nvSpPr>
+        <p:spPr/>
+        <p:txBody>
+          <a:bodyPr/>
+          <a:lstStyle/>
+          <a:p>
+            <a:r>
+              <a:rPr lang="pl-PL" dirty="0" smtClean="0"/>
+              <a:t>Ćwiczenie 2</a:t>
+            </a:r>
+            <a:endParaRPr lang="pl-PL" dirty="0"/>
+          </a:p>
+        </p:txBody>
+      </p:sp>
+    </p:spTree>
+    <p:extLst>
+      <p:ext uri="{BB962C8B-B14F-4D97-AF65-F5344CB8AC3E}">
+        <p14:creationId xmlns:p14="http://schemas.microsoft.com/office/powerpoint/2010/main" val="804516682"/>
+      </p:ext>
+    </p:extLst>
+  </p:cSld>
+  <p:clrMapOvr>
+    <a:masterClrMapping/>
+  </p:clrMapOvr>
+  <p:transition spd="slow">
+    <p:push dir="u"/>
+  </p:transition>
+</p:sld>
+</file>
+
+<file path=ppt/slides/slide45.xml><?xml version="1.0" encoding="utf-8"?>
+<p:sld xmlns:a="http://schemas.openxmlformats.org/drawingml/2006/main" xmlns:r="http://schemas.openxmlformats.org/officeDocument/2006/relationships" xmlns:p="http://schemas.openxmlformats.org/presentationml/2006/main">
+  <p:cSld>
+    <p:spTree>
+      <p:nvGrpSpPr>
+        <p:cNvPr id="1" name=""/>
+        <p:cNvGrpSpPr/>
+        <p:nvPr/>
+      </p:nvGrpSpPr>
+      <p:grpSpPr>
+        <a:xfrm>
+          <a:off x="0" y="0"/>
+          <a:ext cx="0" cy="0"/>
+          <a:chOff x="0" y="0"/>
+          <a:chExt cx="0" cy="0"/>
+        </a:xfrm>
+      </p:grpSpPr>
+      <p:sp>
+        <p:nvSpPr>
+          <p:cNvPr id="2" name="Symbol zastępczy zawartości 1"/>
+          <p:cNvSpPr>
+            <a:spLocks noGrp="1"/>
+          </p:cNvSpPr>
+          <p:nvPr>
+            <p:ph idx="1"/>
+          </p:nvPr>
+        </p:nvSpPr>
+        <p:spPr/>
+        <p:txBody>
+          <a:bodyPr/>
+          <a:lstStyle/>
+          <a:p>
+            <a:r>
+              <a:rPr lang="pl-PL" dirty="0" smtClean="0"/>
+              <a:t>Wykonanie procedury </a:t>
+            </a:r>
+            <a:r>
+              <a:rPr lang="pl-PL" dirty="0" err="1" smtClean="0"/>
+              <a:t>AddressUpdate</a:t>
+            </a:r>
+            <a:endParaRPr lang="pl-PL" dirty="0" smtClean="0"/>
+          </a:p>
+          <a:p>
+            <a:r>
+              <a:rPr lang="pl-PL" dirty="0" smtClean="0"/>
+              <a:t>Przekazanie parametru obiektowego (</a:t>
+            </a:r>
+            <a:r>
+              <a:rPr lang="pl-PL" dirty="0" err="1" smtClean="0"/>
+              <a:t>AddressDTO</a:t>
+            </a:r>
+            <a:r>
+              <a:rPr lang="pl-PL" dirty="0" smtClean="0"/>
+              <a:t>)</a:t>
+            </a:r>
+          </a:p>
+          <a:p>
+            <a:r>
+              <a:rPr lang="pl-PL" dirty="0" smtClean="0"/>
+              <a:t>Wyjście: liczba zaktualizowanych adresów</a:t>
+            </a:r>
+            <a:endParaRPr lang="pl-PL" dirty="0"/>
+          </a:p>
+        </p:txBody>
+      </p:sp>
+      <p:sp>
+        <p:nvSpPr>
+          <p:cNvPr id="3" name="Tytuł 2"/>
+          <p:cNvSpPr>
+            <a:spLocks noGrp="1"/>
+          </p:cNvSpPr>
+          <p:nvPr>
+            <p:ph type="title"/>
+          </p:nvPr>
+        </p:nvSpPr>
+        <p:spPr/>
+        <p:txBody>
+          <a:bodyPr/>
+          <a:lstStyle/>
+          <a:p>
+            <a:r>
+              <a:rPr lang="pl-PL" dirty="0" smtClean="0"/>
+              <a:t>Ćwiczenie 3</a:t>
+            </a:r>
+            <a:endParaRPr lang="pl-PL" dirty="0"/>
+          </a:p>
+        </p:txBody>
+      </p:sp>
+    </p:spTree>
+    <p:extLst>
+      <p:ext uri="{BB962C8B-B14F-4D97-AF65-F5344CB8AC3E}">
+        <p14:creationId xmlns:p14="http://schemas.microsoft.com/office/powerpoint/2010/main" val="753304209"/>
+      </p:ext>
+    </p:extLst>
+  </p:cSld>
+  <p:clrMapOvr>
+    <a:masterClrMapping/>
+  </p:clrMapOvr>
+  <p:transition spd="slow">
+    <p:push dir="u"/>
+  </p:transition>
+</p:sld>
+</file>
+
+<file path=ppt/slides/slide46.xml><?xml version="1.0" encoding="utf-8"?>
+<p:sld xmlns:a="http://schemas.openxmlformats.org/drawingml/2006/main" xmlns:r="http://schemas.openxmlformats.org/officeDocument/2006/relationships" xmlns:p="http://schemas.openxmlformats.org/presentationml/2006/main">
+  <p:cSld>
+    <p:spTree>
+      <p:nvGrpSpPr>
+        <p:cNvPr id="1" name=""/>
+        <p:cNvGrpSpPr/>
+        <p:nvPr/>
+      </p:nvGrpSpPr>
+      <p:grpSpPr>
+        <a:xfrm>
+          <a:off x="0" y="0"/>
+          <a:ext cx="0" cy="0"/>
+          <a:chOff x="0" y="0"/>
+          <a:chExt cx="0" cy="0"/>
+        </a:xfrm>
+      </p:grpSpPr>
+      <p:sp>
+        <p:nvSpPr>
+          <p:cNvPr id="2" name="Symbol zastępczy zawartości 1"/>
+          <p:cNvSpPr>
+            <a:spLocks noGrp="1"/>
+          </p:cNvSpPr>
+          <p:nvPr>
+            <p:ph idx="1"/>
+          </p:nvPr>
+        </p:nvSpPr>
+        <p:spPr/>
+        <p:txBody>
+          <a:bodyPr/>
+          <a:lstStyle/>
+          <a:p>
+            <a:r>
+              <a:rPr lang="pl-PL" dirty="0" smtClean="0"/>
+              <a:t>Konstruktor: Inicjalizacja listy/tablicy liczb (np. </a:t>
+            </a:r>
+            <a:r>
+              <a:rPr lang="pl-PL" dirty="0" err="1" smtClean="0"/>
+              <a:t>Enumerable.Range</a:t>
+            </a:r>
+            <a:r>
+              <a:rPr lang="pl-PL" dirty="0" smtClean="0"/>
+              <a:t>(1,2))</a:t>
+            </a:r>
+          </a:p>
+          <a:p>
+            <a:r>
+              <a:rPr lang="pl-PL" dirty="0" smtClean="0"/>
+              <a:t>Metoda: Zapytanie z tabeli adresów z przekazaniem parametru w postaci wcześniej utworzonej listy/tablicy liczb</a:t>
+            </a:r>
+          </a:p>
+          <a:p>
+            <a:r>
+              <a:rPr lang="pl-PL" dirty="0" smtClean="0"/>
+              <a:t>Wyjście: Lista </a:t>
+            </a:r>
+            <a:r>
+              <a:rPr lang="pl-PL" dirty="0" err="1" smtClean="0"/>
+              <a:t>AddressDTO</a:t>
+            </a:r>
+            <a:endParaRPr lang="pl-PL" dirty="0" smtClean="0"/>
+          </a:p>
+        </p:txBody>
+      </p:sp>
+      <p:sp>
+        <p:nvSpPr>
+          <p:cNvPr id="3" name="Tytuł 2"/>
+          <p:cNvSpPr>
+            <a:spLocks noGrp="1"/>
+          </p:cNvSpPr>
+          <p:nvPr>
+            <p:ph type="title"/>
+          </p:nvPr>
+        </p:nvSpPr>
+        <p:spPr/>
+        <p:txBody>
+          <a:bodyPr/>
+          <a:lstStyle/>
+          <a:p>
+            <a:r>
+              <a:rPr lang="pl-PL" dirty="0" smtClean="0"/>
+              <a:t>Ćwiczenie 4</a:t>
+            </a:r>
+            <a:endParaRPr lang="pl-PL" dirty="0"/>
+          </a:p>
+        </p:txBody>
+      </p:sp>
+    </p:spTree>
+    <p:extLst>
+      <p:ext uri="{BB962C8B-B14F-4D97-AF65-F5344CB8AC3E}">
+        <p14:creationId xmlns:p14="http://schemas.microsoft.com/office/powerpoint/2010/main" val="800667510"/>
+      </p:ext>
+    </p:extLst>
+  </p:cSld>
+  <p:clrMapOvr>
+    <a:masterClrMapping/>
+  </p:clrMapOvr>
+  <p:transition spd="slow">
+    <p:push dir="u"/>
+  </p:transition>
+</p:sld>
+</file>
+
+<file path=ppt/slides/slide47.xml><?xml version="1.0" encoding="utf-8"?>
+<p:sld xmlns:a="http://schemas.openxmlformats.org/drawingml/2006/main" xmlns:r="http://schemas.openxmlformats.org/officeDocument/2006/relationships" xmlns:p="http://schemas.openxmlformats.org/presentationml/2006/main">
+  <p:cSld>
+    <p:spTree>
+      <p:nvGrpSpPr>
+        <p:cNvPr id="1" name=""/>
+        <p:cNvGrpSpPr/>
+        <p:nvPr/>
+      </p:nvGrpSpPr>
+      <p:grpSpPr>
+        <a:xfrm>
+          <a:off x="0" y="0"/>
+          <a:ext cx="0" cy="0"/>
+          <a:chOff x="0" y="0"/>
+          <a:chExt cx="0" cy="0"/>
+        </a:xfrm>
+      </p:grpSpPr>
+      <p:sp>
+        <p:nvSpPr>
+          <p:cNvPr id="2" name="Symbol zastępczy zawartości 1"/>
+          <p:cNvSpPr>
+            <a:spLocks noGrp="1"/>
+          </p:cNvSpPr>
+          <p:nvPr>
+            <p:ph idx="1"/>
+          </p:nvPr>
+        </p:nvSpPr>
+        <p:spPr/>
+        <p:txBody>
+          <a:bodyPr/>
+          <a:lstStyle/>
+          <a:p>
+            <a:r>
+              <a:rPr lang="pl-PL" dirty="0" smtClean="0"/>
+              <a:t>Utworzenie </a:t>
+            </a:r>
+            <a:r>
+              <a:rPr lang="pl-PL" dirty="0" err="1" smtClean="0"/>
+              <a:t>multi</a:t>
+            </a:r>
+            <a:r>
+              <a:rPr lang="pl-PL" dirty="0" smtClean="0"/>
+              <a:t>-mapowania jeden do jednego, tabeli pracowników z użytkownikami</a:t>
+            </a:r>
+          </a:p>
+          <a:p>
+            <a:r>
+              <a:rPr lang="pl-PL" dirty="0" smtClean="0"/>
+              <a:t>Zapytanie powinno „</a:t>
+            </a:r>
+            <a:r>
+              <a:rPr lang="pl-PL" dirty="0" err="1" smtClean="0"/>
+              <a:t>joinować</a:t>
+            </a:r>
+            <a:r>
+              <a:rPr lang="pl-PL" dirty="0" smtClean="0"/>
+              <a:t>” tabelę pracowników z użytkownikami</a:t>
+            </a:r>
+          </a:p>
+          <a:p>
+            <a:r>
+              <a:rPr lang="pl-PL" dirty="0" smtClean="0"/>
+              <a:t>Wyjście: </a:t>
+            </a:r>
+            <a:r>
+              <a:rPr lang="pl-PL" dirty="0" err="1" smtClean="0"/>
+              <a:t>EmployeeDTO</a:t>
+            </a:r>
+            <a:r>
+              <a:rPr lang="pl-PL" dirty="0" smtClean="0"/>
+              <a:t> z uzupełnionym obiektem </a:t>
+            </a:r>
+            <a:r>
+              <a:rPr lang="pl-PL" dirty="0" err="1" smtClean="0"/>
+              <a:t>UserDTO</a:t>
+            </a:r>
+            <a:endParaRPr lang="pl-PL" dirty="0"/>
+          </a:p>
+        </p:txBody>
+      </p:sp>
+      <p:sp>
+        <p:nvSpPr>
+          <p:cNvPr id="3" name="Tytuł 2"/>
+          <p:cNvSpPr>
+            <a:spLocks noGrp="1"/>
+          </p:cNvSpPr>
+          <p:nvPr>
+            <p:ph type="title"/>
+          </p:nvPr>
+        </p:nvSpPr>
+        <p:spPr/>
+        <p:txBody>
+          <a:bodyPr/>
+          <a:lstStyle/>
+          <a:p>
+            <a:r>
+              <a:rPr lang="pl-PL" dirty="0" smtClean="0"/>
+              <a:t>Ćwiczenie 5</a:t>
+            </a:r>
+            <a:endParaRPr lang="pl-PL" dirty="0"/>
+          </a:p>
+        </p:txBody>
+      </p:sp>
+    </p:spTree>
+    <p:extLst>
+      <p:ext uri="{BB962C8B-B14F-4D97-AF65-F5344CB8AC3E}">
+        <p14:creationId xmlns:p14="http://schemas.microsoft.com/office/powerpoint/2010/main" val="384281103"/>
+      </p:ext>
+    </p:extLst>
+  </p:cSld>
+  <p:clrMapOvr>
+    <a:masterClrMapping/>
+  </p:clrMapOvr>
+  <p:transition spd="slow">
+    <p:push dir="u"/>
+  </p:transition>
+</p:sld>
+</file>
+
+<file path=ppt/slides/slide48.xml><?xml version="1.0" encoding="utf-8"?>
+<p:sld xmlns:a="http://schemas.openxmlformats.org/drawingml/2006/main" xmlns:r="http://schemas.openxmlformats.org/officeDocument/2006/relationships" xmlns:p="http://schemas.openxmlformats.org/presentationml/2006/main">
+  <p:cSld>
+    <p:spTree>
+      <p:nvGrpSpPr>
+        <p:cNvPr id="1" name=""/>
+        <p:cNvGrpSpPr/>
+        <p:nvPr/>
+      </p:nvGrpSpPr>
+      <p:grpSpPr>
+        <a:xfrm>
+          <a:off x="0" y="0"/>
+          <a:ext cx="0" cy="0"/>
+          <a:chOff x="0" y="0"/>
+          <a:chExt cx="0" cy="0"/>
+        </a:xfrm>
+      </p:grpSpPr>
+      <p:sp>
+        <p:nvSpPr>
           <p:cNvPr id="3" name="Symbol zastępczy zawartości 2"/>
           <p:cNvSpPr>
             <a:spLocks noGrp="1"/>

</xml_diff>